<commit_message>
changes to cloudcom - azure presentation
git-svn-id: file://localhost/tmp/svn2git/svn@3248 defb5e50-622e-49ec-a68e-d72c7db87b45
</commit_message>
<xml_diff>
--- a/papers/cloudcom10/presentation/saga-azure-cloudcom10.pptx
+++ b/papers/cloudcom10/presentation/saga-azure-cloudcom10.pptx
@@ -10,20 +10,20 @@
   <p:sldIdLst>
     <p:sldId id="256" r:id="rId2"/>
     <p:sldId id="715" r:id="rId3"/>
-    <p:sldId id="746" r:id="rId4"/>
-    <p:sldId id="576" r:id="rId5"/>
-    <p:sldId id="578" r:id="rId6"/>
-    <p:sldId id="634" r:id="rId7"/>
-    <p:sldId id="731" r:id="rId8"/>
-    <p:sldId id="743" r:id="rId9"/>
-    <p:sldId id="733" r:id="rId10"/>
-    <p:sldId id="274" r:id="rId11"/>
-    <p:sldId id="645" r:id="rId12"/>
-    <p:sldId id="647" r:id="rId13"/>
-    <p:sldId id="478" r:id="rId14"/>
-    <p:sldId id="555" r:id="rId15"/>
-    <p:sldId id="744" r:id="rId16"/>
-    <p:sldId id="682" r:id="rId17"/>
+    <p:sldId id="747" r:id="rId4"/>
+    <p:sldId id="746" r:id="rId5"/>
+    <p:sldId id="576" r:id="rId6"/>
+    <p:sldId id="578" r:id="rId7"/>
+    <p:sldId id="634" r:id="rId8"/>
+    <p:sldId id="731" r:id="rId9"/>
+    <p:sldId id="743" r:id="rId10"/>
+    <p:sldId id="733" r:id="rId11"/>
+    <p:sldId id="274" r:id="rId12"/>
+    <p:sldId id="645" r:id="rId13"/>
+    <p:sldId id="647" r:id="rId14"/>
+    <p:sldId id="478" r:id="rId15"/>
+    <p:sldId id="555" r:id="rId16"/>
+    <p:sldId id="744" r:id="rId17"/>
     <p:sldId id="688" r:id="rId18"/>
     <p:sldId id="693" r:id="rId19"/>
     <p:sldId id="745" r:id="rId20"/>
@@ -211,7 +211,7 @@
             <a:fld id="{8E161E8F-4E15-A840-9658-105F9DD3DE22}" type="datetimeFigureOut">
               <a:rPr lang="en-US" smtClean="0"/>
               <a:pPr/>
-              <a:t>28.11.2010</a:t>
+              <a:t>11/28/10</a:t>
             </a:fld>
             <a:endParaRPr lang="en-US"/>
           </a:p>
@@ -373,7 +373,7 @@
             <a:fld id="{D344DA2A-F2F4-D74A-8AEC-1933B33E97E0}" type="slidenum">
               <a:rPr lang="en-US" smtClean="0"/>
               <a:pPr/>
-              <a:t>‹Nr.›</a:t>
+              <a:t>‹#›</a:t>
             </a:fld>
             <a:endParaRPr lang="en-US"/>
           </a:p>
@@ -525,27 +525,25 @@
           <a:p>
             <a:r>
               <a:rPr lang="en-US" dirty="0" smtClean="0"/>
-              <a:t>“Clouds are about provisioning, grids are about federation”</a:t>
-            </a:r>
-          </a:p>
-          <a:p>
-            <a:r>
-              <a:rPr lang="en-US" dirty="0" smtClean="0"/>
-              <a:t>“</a:t>
-            </a:r>
-            <a:r>
-              <a:rPr lang="en-US" i="1" dirty="0" smtClean="0"/>
-              <a:t>IF</a:t>
-            </a:r>
-            <a:r>
-              <a:rPr lang="en-US" dirty="0" smtClean="0"/>
-              <a:t> you can keep your head when all about you, Are losing theirs and blaming it on you..”</a:t>
-            </a:r>
-          </a:p>
-          <a:p>
-            <a:r>
-              <a:rPr lang="en-US" dirty="0" smtClean="0"/>
-              <a:t>“The reason why we are so well prepared to handle the multi-core era, is because we took the trouble to understand parallel programming</a:t>
+              <a:t>Added</a:t>
+            </a:r>
+            <a:r>
+              <a:rPr lang="en-US" baseline="0" dirty="0" smtClean="0"/>
+              <a:t> slide 3</a:t>
+            </a:r>
+          </a:p>
+          <a:p>
+            <a:r>
+              <a:rPr lang="en-US" baseline="0" dirty="0" smtClean="0"/>
+              <a:t>I think there will not be time to focus on “assertion based” approach, </a:t>
+            </a:r>
+            <a:r>
+              <a:rPr lang="en-US" baseline="0" dirty="0" err="1" smtClean="0"/>
+              <a:t>i.e</a:t>
+            </a:r>
+            <a:r>
+              <a:rPr lang="en-US" baseline="0" dirty="0" smtClean="0"/>
+              <a:t> slides 4-7. Possibly include slide 8</a:t>
             </a:r>
             <a:endParaRPr lang="en-US" dirty="0"/>
           </a:p>
@@ -569,7 +567,7 @@
             <a:fld id="{D344DA2A-F2F4-D74A-8AEC-1933B33E97E0}" type="slidenum">
               <a:rPr lang="en-US" smtClean="0"/>
               <a:pPr/>
-              <a:t>6</a:t>
+              <a:t>1</a:t>
             </a:fld>
             <a:endParaRPr lang="en-US"/>
           </a:p>
@@ -629,36 +627,7 @@
           </a:bodyPr>
           <a:lstStyle/>
           <a:p>
-            <a:r>
-              <a:rPr lang="en-US" sz="1800" dirty="0" smtClean="0"/>
-              <a:t>“User knows where to run”:</a:t>
-            </a:r>
-          </a:p>
-          <a:p>
-            <a:endParaRPr lang="en-US" sz="1800" dirty="0" smtClean="0"/>
-          </a:p>
-          <a:p>
-            <a:r>
-              <a:rPr lang="en-US" sz="1800" dirty="0" smtClean="0"/>
-              <a:t>“Information Service is only required to determine decisions at the  deployment stage not run time”</a:t>
-            </a:r>
-          </a:p>
-          <a:p>
-            <a:r>
-              <a:rPr lang="en-US" sz="1800" dirty="0" smtClean="0"/>
-              <a:t>“Tool X provides Dynamic Decision </a:t>
-            </a:r>
-            <a:r>
-              <a:rPr lang="en-US" sz="1800" dirty="0" err="1" smtClean="0"/>
-              <a:t>Capabilties</a:t>
-            </a:r>
-            <a:r>
-              <a:rPr lang="en-US" sz="1800" dirty="0" smtClean="0"/>
-              <a:t>”</a:t>
-            </a:r>
-          </a:p>
-          <a:p>
-            <a:endParaRPr lang="en-US" sz="1800" dirty="0"/>
+            <a:endParaRPr lang="en-US" dirty="0"/>
           </a:p>
         </p:txBody>
       </p:sp>
@@ -680,7 +649,7 @@
             <a:fld id="{D344DA2A-F2F4-D74A-8AEC-1933B33E97E0}" type="slidenum">
               <a:rPr lang="en-US" smtClean="0"/>
               <a:pPr/>
-              <a:t>10</a:t>
+              <a:t>4</a:t>
             </a:fld>
             <a:endParaRPr lang="en-US"/>
           </a:p>
@@ -740,6 +709,305 @@
           </a:bodyPr>
           <a:lstStyle/>
           <a:p>
+            <a:r>
+              <a:rPr lang="en-US" dirty="0" smtClean="0"/>
+              <a:t>“Clouds are about provisioning, grids are about federation”</a:t>
+            </a:r>
+          </a:p>
+          <a:p>
+            <a:r>
+              <a:rPr lang="en-US" dirty="0" smtClean="0"/>
+              <a:t>“</a:t>
+            </a:r>
+            <a:r>
+              <a:rPr lang="en-US" i="1" dirty="0" smtClean="0"/>
+              <a:t>IF</a:t>
+            </a:r>
+            <a:r>
+              <a:rPr lang="en-US" dirty="0" smtClean="0"/>
+              <a:t> you can keep your head when all about you, Are losing theirs and blaming it on you..”</a:t>
+            </a:r>
+          </a:p>
+          <a:p>
+            <a:r>
+              <a:rPr lang="en-US" dirty="0" smtClean="0"/>
+              <a:t>“The reason why we are so well prepared to handle the multi-core era, is because we took the trouble to understand parallel programming</a:t>
+            </a:r>
+            <a:endParaRPr lang="en-US" dirty="0"/>
+          </a:p>
+        </p:txBody>
+      </p:sp>
+      <p:sp>
+        <p:nvSpPr>
+          <p:cNvPr id="4" name="Slide Number Placeholder 3"/>
+          <p:cNvSpPr>
+            <a:spLocks noGrp="1"/>
+          </p:cNvSpPr>
+          <p:nvPr>
+            <p:ph type="sldNum" sz="quarter" idx="10"/>
+          </p:nvPr>
+        </p:nvSpPr>
+        <p:spPr/>
+        <p:txBody>
+          <a:bodyPr/>
+          <a:lstStyle/>
+          <a:p>
+            <a:fld id="{D344DA2A-F2F4-D74A-8AEC-1933B33E97E0}" type="slidenum">
+              <a:rPr lang="en-US" smtClean="0"/>
+              <a:pPr/>
+              <a:t>7</a:t>
+            </a:fld>
+            <a:endParaRPr lang="en-US"/>
+          </a:p>
+        </p:txBody>
+      </p:sp>
+    </p:spTree>
+  </p:cSld>
+  <p:clrMapOvr>
+    <a:masterClrMapping/>
+  </p:clrMapOvr>
+</p:notes>
+</file>
+
+<file path=ppt/notesSlides/notesSlide4.xml><?xml version="1.0" encoding="utf-8"?>
+<p:notes xmlns:a="http://schemas.openxmlformats.org/drawingml/2006/main" xmlns:r="http://schemas.openxmlformats.org/officeDocument/2006/relationships" xmlns:mc="http://schemas.openxmlformats.org/markup-compatibility/2006" xmlns:mv="urn:schemas-microsoft-com:mac:vml" xmlns:p="http://schemas.openxmlformats.org/presentationml/2006/main" mc:Ignorable="mv" mc:PreserveAttributes="mv:*">
+  <p:cSld>
+    <p:spTree>
+      <p:nvGrpSpPr>
+        <p:cNvPr id="1" name=""/>
+        <p:cNvGrpSpPr/>
+        <p:nvPr/>
+      </p:nvGrpSpPr>
+      <p:grpSpPr>
+        <a:xfrm>
+          <a:off x="0" y="0"/>
+          <a:ext cx="0" cy="0"/>
+          <a:chOff x="0" y="0"/>
+          <a:chExt cx="0" cy="0"/>
+        </a:xfrm>
+      </p:grpSpPr>
+      <p:sp>
+        <p:nvSpPr>
+          <p:cNvPr id="2" name="Slide Image Placeholder 1"/>
+          <p:cNvSpPr>
+            <a:spLocks noGrp="1" noRot="1" noChangeAspect="1"/>
+          </p:cNvSpPr>
+          <p:nvPr>
+            <p:ph type="sldImg"/>
+          </p:nvPr>
+        </p:nvSpPr>
+        <p:spPr/>
+      </p:sp>
+      <p:sp>
+        <p:nvSpPr>
+          <p:cNvPr id="3" name="Notes Placeholder 2"/>
+          <p:cNvSpPr>
+            <a:spLocks noGrp="1"/>
+          </p:cNvSpPr>
+          <p:nvPr>
+            <p:ph type="body" idx="1"/>
+          </p:nvPr>
+        </p:nvSpPr>
+        <p:spPr/>
+        <p:txBody>
+          <a:bodyPr>
+            <a:normAutofit/>
+          </a:bodyPr>
+          <a:lstStyle/>
+          <a:p>
+            <a:endParaRPr lang="en-US" dirty="0"/>
+          </a:p>
+        </p:txBody>
+      </p:sp>
+      <p:sp>
+        <p:nvSpPr>
+          <p:cNvPr id="4" name="Slide Number Placeholder 3"/>
+          <p:cNvSpPr>
+            <a:spLocks noGrp="1"/>
+          </p:cNvSpPr>
+          <p:nvPr>
+            <p:ph type="sldNum" sz="quarter" idx="10"/>
+          </p:nvPr>
+        </p:nvSpPr>
+        <p:spPr/>
+        <p:txBody>
+          <a:bodyPr/>
+          <a:lstStyle/>
+          <a:p>
+            <a:fld id="{D344DA2A-F2F4-D74A-8AEC-1933B33E97E0}" type="slidenum">
+              <a:rPr lang="en-US" smtClean="0"/>
+              <a:pPr/>
+              <a:t>9</a:t>
+            </a:fld>
+            <a:endParaRPr lang="en-US"/>
+          </a:p>
+        </p:txBody>
+      </p:sp>
+    </p:spTree>
+  </p:cSld>
+  <p:clrMapOvr>
+    <a:masterClrMapping/>
+  </p:clrMapOvr>
+</p:notes>
+</file>
+
+<file path=ppt/notesSlides/notesSlide5.xml><?xml version="1.0" encoding="utf-8"?>
+<p:notes xmlns:a="http://schemas.openxmlformats.org/drawingml/2006/main" xmlns:r="http://schemas.openxmlformats.org/officeDocument/2006/relationships" xmlns:mc="http://schemas.openxmlformats.org/markup-compatibility/2006" xmlns:mv="urn:schemas-microsoft-com:mac:vml" xmlns:p="http://schemas.openxmlformats.org/presentationml/2006/main" mc:Ignorable="mv" mc:PreserveAttributes="mv:*">
+  <p:cSld>
+    <p:spTree>
+      <p:nvGrpSpPr>
+        <p:cNvPr id="1" name=""/>
+        <p:cNvGrpSpPr/>
+        <p:nvPr/>
+      </p:nvGrpSpPr>
+      <p:grpSpPr>
+        <a:xfrm>
+          <a:off x="0" y="0"/>
+          <a:ext cx="0" cy="0"/>
+          <a:chOff x="0" y="0"/>
+          <a:chExt cx="0" cy="0"/>
+        </a:xfrm>
+      </p:grpSpPr>
+      <p:sp>
+        <p:nvSpPr>
+          <p:cNvPr id="2" name="Slide Image Placeholder 1"/>
+          <p:cNvSpPr>
+            <a:spLocks noGrp="1" noRot="1" noChangeAspect="1"/>
+          </p:cNvSpPr>
+          <p:nvPr>
+            <p:ph type="sldImg"/>
+          </p:nvPr>
+        </p:nvSpPr>
+        <p:spPr/>
+      </p:sp>
+      <p:sp>
+        <p:nvSpPr>
+          <p:cNvPr id="3" name="Notes Placeholder 2"/>
+          <p:cNvSpPr>
+            <a:spLocks noGrp="1"/>
+          </p:cNvSpPr>
+          <p:nvPr>
+            <p:ph type="body" idx="1"/>
+          </p:nvPr>
+        </p:nvSpPr>
+        <p:spPr/>
+        <p:txBody>
+          <a:bodyPr>
+            <a:normAutofit/>
+          </a:bodyPr>
+          <a:lstStyle/>
+          <a:p>
+            <a:r>
+              <a:rPr lang="en-US" sz="1800" dirty="0" smtClean="0"/>
+              <a:t>“User knows where to run”:</a:t>
+            </a:r>
+          </a:p>
+          <a:p>
+            <a:endParaRPr lang="en-US" sz="1800" dirty="0" smtClean="0"/>
+          </a:p>
+          <a:p>
+            <a:r>
+              <a:rPr lang="en-US" sz="1800" dirty="0" smtClean="0"/>
+              <a:t>“Information Service is only required to determine decisions at the  deployment stage not run time”</a:t>
+            </a:r>
+          </a:p>
+          <a:p>
+            <a:r>
+              <a:rPr lang="en-US" sz="1800" dirty="0" smtClean="0"/>
+              <a:t>“Tool X provides Dynamic Decision </a:t>
+            </a:r>
+            <a:r>
+              <a:rPr lang="en-US" sz="1800" dirty="0" err="1" smtClean="0"/>
+              <a:t>Capabilties</a:t>
+            </a:r>
+            <a:r>
+              <a:rPr lang="en-US" sz="1800" dirty="0" smtClean="0"/>
+              <a:t>”</a:t>
+            </a:r>
+          </a:p>
+          <a:p>
+            <a:endParaRPr lang="en-US" sz="1800" dirty="0"/>
+          </a:p>
+        </p:txBody>
+      </p:sp>
+      <p:sp>
+        <p:nvSpPr>
+          <p:cNvPr id="4" name="Slide Number Placeholder 3"/>
+          <p:cNvSpPr>
+            <a:spLocks noGrp="1"/>
+          </p:cNvSpPr>
+          <p:nvPr>
+            <p:ph type="sldNum" sz="quarter" idx="10"/>
+          </p:nvPr>
+        </p:nvSpPr>
+        <p:spPr/>
+        <p:txBody>
+          <a:bodyPr/>
+          <a:lstStyle/>
+          <a:p>
+            <a:fld id="{D344DA2A-F2F4-D74A-8AEC-1933B33E97E0}" type="slidenum">
+              <a:rPr lang="en-US" smtClean="0"/>
+              <a:pPr/>
+              <a:t>11</a:t>
+            </a:fld>
+            <a:endParaRPr lang="en-US"/>
+          </a:p>
+        </p:txBody>
+      </p:sp>
+    </p:spTree>
+  </p:cSld>
+  <p:clrMapOvr>
+    <a:masterClrMapping/>
+  </p:clrMapOvr>
+</p:notes>
+</file>
+
+<file path=ppt/notesSlides/notesSlide6.xml><?xml version="1.0" encoding="utf-8"?>
+<p:notes xmlns:a="http://schemas.openxmlformats.org/drawingml/2006/main" xmlns:r="http://schemas.openxmlformats.org/officeDocument/2006/relationships" xmlns:mc="http://schemas.openxmlformats.org/markup-compatibility/2006" xmlns:mv="urn:schemas-microsoft-com:mac:vml" xmlns:p="http://schemas.openxmlformats.org/presentationml/2006/main" mc:Ignorable="mv" mc:PreserveAttributes="mv:*">
+  <p:cSld>
+    <p:spTree>
+      <p:nvGrpSpPr>
+        <p:cNvPr id="1" name=""/>
+        <p:cNvGrpSpPr/>
+        <p:nvPr/>
+      </p:nvGrpSpPr>
+      <p:grpSpPr>
+        <a:xfrm>
+          <a:off x="0" y="0"/>
+          <a:ext cx="0" cy="0"/>
+          <a:chOff x="0" y="0"/>
+          <a:chExt cx="0" cy="0"/>
+        </a:xfrm>
+      </p:grpSpPr>
+      <p:sp>
+        <p:nvSpPr>
+          <p:cNvPr id="2" name="Slide Image Placeholder 1"/>
+          <p:cNvSpPr>
+            <a:spLocks noGrp="1" noRot="1" noChangeAspect="1"/>
+          </p:cNvSpPr>
+          <p:nvPr>
+            <p:ph type="sldImg"/>
+          </p:nvPr>
+        </p:nvSpPr>
+        <p:spPr/>
+      </p:sp>
+      <p:sp>
+        <p:nvSpPr>
+          <p:cNvPr id="3" name="Notes Placeholder 2"/>
+          <p:cNvSpPr>
+            <a:spLocks noGrp="1"/>
+          </p:cNvSpPr>
+          <p:nvPr>
+            <p:ph type="body" idx="1"/>
+          </p:nvPr>
+        </p:nvSpPr>
+        <p:spPr/>
+        <p:txBody>
+          <a:bodyPr>
+            <a:normAutofit/>
+          </a:bodyPr>
+          <a:lstStyle/>
+          <a:p>
             <a:pPr marL="0" marR="0" lvl="1" indent="0" algn="l" defTabSz="457200" rtl="0" eaLnBrk="1" fontAlgn="auto" latinLnBrk="0" hangingPunct="1">
               <a:lnSpc>
                 <a:spcPct val="100000"/>
@@ -779,7 +1047,7 @@
             <a:fld id="{D770256F-FACB-CC4B-A3D9-71375CB20943}" type="slidenum">
               <a:rPr lang="en-US" smtClean="0"/>
               <a:pPr/>
-              <a:t>15</a:t>
+              <a:t>16</a:t>
             </a:fld>
             <a:endParaRPr lang="en-US"/>
           </a:p>
@@ -1019,7 +1287,7 @@
             <a:fld id="{4C4AD4EB-88D0-C141-9474-CCD86A78CB94}" type="datetimeFigureOut">
               <a:rPr lang="en-US" smtClean="0"/>
               <a:pPr/>
-              <a:t>28.11.2010</a:t>
+              <a:t>11/28/10</a:t>
             </a:fld>
             <a:endParaRPr lang="en-US" dirty="0"/>
           </a:p>
@@ -1062,7 +1330,7 @@
             <a:fld id="{DF7665AF-92BA-E649-941D-268879B3EA81}" type="slidenum">
               <a:rPr lang="en-US" smtClean="0"/>
               <a:pPr/>
-              <a:t>‹Nr.›</a:t>
+              <a:t>‹#›</a:t>
             </a:fld>
             <a:endParaRPr lang="en-US"/>
           </a:p>
@@ -1342,7 +1610,7 @@
             <a:fld id="{4C4AD4EB-88D0-C141-9474-CCD86A78CB94}" type="datetimeFigureOut">
               <a:rPr lang="en-US" smtClean="0"/>
               <a:pPr/>
-              <a:t>28.11.2010</a:t>
+              <a:t>11/28/10</a:t>
             </a:fld>
             <a:endParaRPr lang="en-US"/>
           </a:p>
@@ -1385,7 +1653,7 @@
             <a:fld id="{DF7665AF-92BA-E649-941D-268879B3EA81}" type="slidenum">
               <a:rPr lang="en-US" smtClean="0"/>
               <a:pPr/>
-              <a:t>‹Nr.›</a:t>
+              <a:t>‹#›</a:t>
             </a:fld>
             <a:endParaRPr lang="en-US"/>
           </a:p>
@@ -1618,7 +1886,7 @@
             <a:fld id="{4C4AD4EB-88D0-C141-9474-CCD86A78CB94}" type="datetimeFigureOut">
               <a:rPr lang="en-US" smtClean="0"/>
               <a:pPr/>
-              <a:t>28.11.2010</a:t>
+              <a:t>11/28/10</a:t>
             </a:fld>
             <a:endParaRPr lang="en-US"/>
           </a:p>
@@ -1910,7 +2178,7 @@
             <a:fld id="{4C4AD4EB-88D0-C141-9474-CCD86A78CB94}" type="datetimeFigureOut">
               <a:rPr lang="en-US" smtClean="0"/>
               <a:pPr/>
-              <a:t>28.11.2010</a:t>
+              <a:t>11/28/10</a:t>
             </a:fld>
             <a:endParaRPr lang="en-US"/>
           </a:p>
@@ -2237,7 +2505,7 @@
             <a:fld id="{4C4AD4EB-88D0-C141-9474-CCD86A78CB94}" type="datetimeFigureOut">
               <a:rPr lang="en-US" smtClean="0"/>
               <a:pPr/>
-              <a:t>28.11.2010</a:t>
+              <a:t>11/28/10</a:t>
             </a:fld>
             <a:endParaRPr lang="en-US"/>
           </a:p>
@@ -2485,7 +2753,7 @@
             <a:fld id="{4C4AD4EB-88D0-C141-9474-CCD86A78CB94}" type="datetimeFigureOut">
               <a:rPr lang="en-US" smtClean="0"/>
               <a:pPr/>
-              <a:t>28.11.2010</a:t>
+              <a:t>11/28/10</a:t>
             </a:fld>
             <a:endParaRPr lang="en-US"/>
           </a:p>
@@ -2528,7 +2796,7 @@
             <a:fld id="{DF7665AF-92BA-E649-941D-268879B3EA81}" type="slidenum">
               <a:rPr lang="en-US" smtClean="0"/>
               <a:pPr/>
-              <a:t>‹Nr.›</a:t>
+              <a:t>‹#›</a:t>
             </a:fld>
             <a:endParaRPr lang="en-US"/>
           </a:p>
@@ -2662,7 +2930,7 @@
             <a:fld id="{4C4AD4EB-88D0-C141-9474-CCD86A78CB94}" type="datetimeFigureOut">
               <a:rPr lang="en-US" smtClean="0"/>
               <a:pPr/>
-              <a:t>28.11.2010</a:t>
+              <a:t>11/28/10</a:t>
             </a:fld>
             <a:endParaRPr lang="en-US"/>
           </a:p>
@@ -2705,7 +2973,7 @@
             <a:fld id="{DF7665AF-92BA-E649-941D-268879B3EA81}" type="slidenum">
               <a:rPr lang="en-US" smtClean="0"/>
               <a:pPr/>
-              <a:t>‹Nr.›</a:t>
+              <a:t>‹#›</a:t>
             </a:fld>
             <a:endParaRPr lang="en-US"/>
           </a:p>
@@ -2867,7 +3135,7 @@
               <a:pPr>
                 <a:defRPr/>
               </a:pPr>
-              <a:t>‹Nr.›</a:t>
+              <a:t>‹#›</a:t>
             </a:fld>
             <a:endParaRPr lang="en-US"/>
           </a:p>
@@ -3039,7 +3307,7 @@
             <a:fld id="{4C4AD4EB-88D0-C141-9474-CCD86A78CB94}" type="datetimeFigureOut">
               <a:rPr lang="en-US" smtClean="0"/>
               <a:pPr/>
-              <a:t>28.11.2010</a:t>
+              <a:t>11/28/10</a:t>
             </a:fld>
             <a:endParaRPr lang="en-US"/>
           </a:p>
@@ -3082,7 +3350,7 @@
             <a:fld id="{DF7665AF-92BA-E649-941D-268879B3EA81}" type="slidenum">
               <a:rPr lang="en-US" smtClean="0"/>
               <a:pPr/>
-              <a:t>‹Nr.›</a:t>
+              <a:t>‹#›</a:t>
             </a:fld>
             <a:endParaRPr lang="en-US"/>
           </a:p>
@@ -3310,7 +3578,7 @@
             <a:fld id="{4C4AD4EB-88D0-C141-9474-CCD86A78CB94}" type="datetimeFigureOut">
               <a:rPr lang="en-US" smtClean="0"/>
               <a:pPr/>
-              <a:t>28.11.2010</a:t>
+              <a:t>11/28/10</a:t>
             </a:fld>
             <a:endParaRPr lang="en-US"/>
           </a:p>
@@ -3618,7 +3886,7 @@
             <a:fld id="{4C4AD4EB-88D0-C141-9474-CCD86A78CB94}" type="datetimeFigureOut">
               <a:rPr lang="en-US" smtClean="0"/>
               <a:pPr/>
-              <a:t>28.11.2010</a:t>
+              <a:t>11/28/10</a:t>
             </a:fld>
             <a:endParaRPr lang="en-US"/>
           </a:p>
@@ -3661,7 +3929,7 @@
             <a:fld id="{DF7665AF-92BA-E649-941D-268879B3EA81}" type="slidenum">
               <a:rPr lang="en-US" smtClean="0"/>
               <a:pPr/>
-              <a:t>‹Nr.›</a:t>
+              <a:t>‹#›</a:t>
             </a:fld>
             <a:endParaRPr lang="en-US"/>
           </a:p>
@@ -3912,7 +4180,7 @@
             <a:fld id="{4C4AD4EB-88D0-C141-9474-CCD86A78CB94}" type="datetimeFigureOut">
               <a:rPr lang="en-US" smtClean="0"/>
               <a:pPr/>
-              <a:t>28.11.2010</a:t>
+              <a:t>11/28/10</a:t>
             </a:fld>
             <a:endParaRPr lang="en-US"/>
           </a:p>
@@ -3955,7 +4223,7 @@
             <a:fld id="{DF7665AF-92BA-E649-941D-268879B3EA81}" type="slidenum">
               <a:rPr lang="en-US" smtClean="0"/>
               <a:pPr/>
-              <a:t>‹Nr.›</a:t>
+              <a:t>‹#›</a:t>
             </a:fld>
             <a:endParaRPr lang="en-US"/>
           </a:p>
@@ -4344,7 +4612,7 @@
             <a:fld id="{4C4AD4EB-88D0-C141-9474-CCD86A78CB94}" type="datetimeFigureOut">
               <a:rPr lang="en-US" smtClean="0"/>
               <a:pPr/>
-              <a:t>28.11.2010</a:t>
+              <a:t>11/28/10</a:t>
             </a:fld>
             <a:endParaRPr lang="en-US"/>
           </a:p>
@@ -4392,7 +4660,7 @@
             <a:fld id="{DF7665AF-92BA-E649-941D-268879B3EA81}" type="slidenum">
               <a:rPr lang="en-US" smtClean="0"/>
               <a:pPr/>
-              <a:t>‹Nr.›</a:t>
+              <a:t>‹#›</a:t>
             </a:fld>
             <a:endParaRPr lang="en-US"/>
           </a:p>
@@ -4692,7 +4960,7 @@
             <a:fld id="{4C4AD4EB-88D0-C141-9474-CCD86A78CB94}" type="datetimeFigureOut">
               <a:rPr lang="en-US" smtClean="0"/>
               <a:pPr/>
-              <a:t>28.11.2010</a:t>
+              <a:t>11/28/10</a:t>
             </a:fld>
             <a:endParaRPr lang="en-US"/>
           </a:p>
@@ -4735,7 +5003,7 @@
             <a:fld id="{DF7665AF-92BA-E649-941D-268879B3EA81}" type="slidenum">
               <a:rPr lang="en-US" smtClean="0"/>
               <a:pPr/>
-              <a:t>‹Nr.›</a:t>
+              <a:t>‹#›</a:t>
             </a:fld>
             <a:endParaRPr lang="en-US"/>
           </a:p>
@@ -4784,7 +5052,7 @@
             <a:fld id="{4C4AD4EB-88D0-C141-9474-CCD86A78CB94}" type="datetimeFigureOut">
               <a:rPr lang="en-US" smtClean="0"/>
               <a:pPr/>
-              <a:t>28.11.2010</a:t>
+              <a:t>11/28/10</a:t>
             </a:fld>
             <a:endParaRPr lang="en-US"/>
           </a:p>
@@ -4827,7 +5095,7 @@
             <a:fld id="{DF7665AF-92BA-E649-941D-268879B3EA81}" type="slidenum">
               <a:rPr lang="en-US" smtClean="0"/>
               <a:pPr/>
-              <a:t>‹Nr.›</a:t>
+              <a:t>‹#›</a:t>
             </a:fld>
             <a:endParaRPr lang="en-US"/>
           </a:p>
@@ -5123,7 +5391,7 @@
             <a:fld id="{4C4AD4EB-88D0-C141-9474-CCD86A78CB94}" type="datetimeFigureOut">
               <a:rPr lang="en-US" smtClean="0"/>
               <a:pPr/>
-              <a:t>28.11.2010</a:t>
+              <a:t>11/28/10</a:t>
             </a:fld>
             <a:endParaRPr lang="en-US"/>
           </a:p>
@@ -5166,7 +5434,7 @@
             <a:fld id="{DF7665AF-92BA-E649-941D-268879B3EA81}" type="slidenum">
               <a:rPr lang="en-US" smtClean="0"/>
               <a:pPr/>
-              <a:t>‹Nr.›</a:t>
+              <a:t>‹#›</a:t>
             </a:fld>
             <a:endParaRPr lang="en-US"/>
           </a:p>
@@ -5337,7 +5605,7 @@
             <a:fld id="{4C4AD4EB-88D0-C141-9474-CCD86A78CB94}" type="datetimeFigureOut">
               <a:rPr lang="en-US" smtClean="0"/>
               <a:pPr/>
-              <a:t>28.11.2010</a:t>
+              <a:t>11/28/10</a:t>
             </a:fld>
             <a:endParaRPr lang="en-US"/>
           </a:p>
@@ -5418,7 +5686,7 @@
             <a:fld id="{DF7665AF-92BA-E649-941D-268879B3EA81}" type="slidenum">
               <a:rPr lang="en-US" smtClean="0"/>
               <a:pPr/>
-              <a:t>‹Nr.›</a:t>
+              <a:t>‹#›</a:t>
             </a:fld>
             <a:endParaRPr lang="en-US"/>
           </a:p>
@@ -6020,7 +6288,7 @@
           <p:nvPr/>
         </p:nvPicPr>
         <p:blipFill>
-          <a:blip r:embed="rId2"/>
+          <a:blip r:embed="rId3"/>
           <a:stretch>
             <a:fillRect/>
           </a:stretch>
@@ -6069,18 +6337,111 @@
       </p:grpSpPr>
       <p:sp>
         <p:nvSpPr>
-          <p:cNvPr id="33794" name="Title 1"/>
+          <p:cNvPr id="20483" name="Rectangle 4"/>
+          <p:cNvSpPr>
+            <a:spLocks/>
+          </p:cNvSpPr>
+          <p:nvPr/>
+        </p:nvSpPr>
+        <p:spPr bwMode="auto">
+          <a:xfrm>
+            <a:off x="1447800" y="171450"/>
+            <a:ext cx="7162800" cy="647700"/>
+          </a:xfrm>
+          <a:prstGeom prst="rect">
+            <a:avLst/>
+          </a:prstGeom>
+          <a:noFill/>
+          <a:ln w="12700">
+            <a:noFill/>
+            <a:miter lim="800000"/>
+            <a:headEnd/>
+            <a:tailEnd/>
+          </a:ln>
+        </p:spPr>
+        <p:txBody>
+          <a:bodyPr lIns="0" tIns="0" rIns="0" bIns="0" anchor="ctr">
+            <a:prstTxWarp prst="textNoShape">
+              <a:avLst/>
+            </a:prstTxWarp>
+          </a:bodyPr>
+          <a:lstStyle/>
+          <a:p>
+            <a:pPr>
+              <a:lnSpc>
+                <a:spcPct val="100000"/>
+              </a:lnSpc>
+              <a:tabLst>
+                <a:tab pos="457200" algn="l"/>
+                <a:tab pos="914400" algn="l"/>
+                <a:tab pos="1371600" algn="l"/>
+                <a:tab pos="1828800" algn="l"/>
+                <a:tab pos="2286000" algn="l"/>
+                <a:tab pos="2743200" algn="l"/>
+                <a:tab pos="3200400" algn="l"/>
+                <a:tab pos="3657600" algn="l"/>
+                <a:tab pos="4114800" algn="l"/>
+                <a:tab pos="4572000" algn="l"/>
+                <a:tab pos="5029200" algn="l"/>
+                <a:tab pos="5486400" algn="l"/>
+                <a:tab pos="5943600" algn="l"/>
+                <a:tab pos="6400800" algn="l"/>
+                <a:tab pos="6858000" algn="l"/>
+                <a:tab pos="7315200" algn="l"/>
+                <a:tab pos="7772400" algn="l"/>
+                <a:tab pos="8229600" algn="l"/>
+                <a:tab pos="8686800" algn="l"/>
+                <a:tab pos="9144000" algn="l"/>
+              </a:tabLst>
+            </a:pPr>
+            <a:endParaRPr lang="en-US" sz="2800">
+              <a:solidFill>
+                <a:srgbClr val="000080"/>
+              </a:solidFill>
+              <a:ea typeface="Arial" charset="0"/>
+              <a:cs typeface="Arial" charset="0"/>
+            </a:endParaRPr>
+          </a:p>
+        </p:txBody>
+      </p:sp>
+      <p:sp>
+        <p:nvSpPr>
+          <p:cNvPr id="20485" name="Title 5"/>
           <p:cNvSpPr>
             <a:spLocks noGrp="1"/>
           </p:cNvSpPr>
           <p:nvPr>
             <p:ph type="title"/>
+          </p:nvPr>
+        </p:nvSpPr>
+        <p:spPr/>
+        <p:txBody>
+          <a:bodyPr>
+            <a:normAutofit fontScale="90000"/>
+          </a:bodyPr>
+          <a:lstStyle/>
+          <a:p>
+            <a:r>
+              <a:rPr lang="en-US" sz="2600" dirty="0" smtClean="0"/>
+              <a:t>Assertion #5: Need an Autonomic Approach to managing complexity and dynamism</a:t>
+            </a:r>
+          </a:p>
+        </p:txBody>
+      </p:sp>
+      <p:sp>
+        <p:nvSpPr>
+          <p:cNvPr id="16" name="Content Placeholder 15"/>
+          <p:cNvSpPr>
+            <a:spLocks noGrp="1"/>
+          </p:cNvSpPr>
+          <p:nvPr>
+            <p:ph sz="half" idx="1"/>
           </p:nvPr>
         </p:nvSpPr>
         <p:spPr>
           <a:xfrm>
-            <a:off x="928542" y="263714"/>
-            <a:ext cx="8215458" cy="914400"/>
+            <a:off x="355600" y="1219200"/>
+            <a:ext cx="8597900" cy="5016500"/>
           </a:xfrm>
         </p:spPr>
         <p:txBody>
@@ -6090,32 +6451,142 @@
           <a:lstStyle/>
           <a:p>
             <a:r>
-              <a:rPr lang="en-US" sz="2400" dirty="0" smtClean="0">
+              <a:rPr lang="en-US" sz="1700" dirty="0" smtClean="0"/>
+              <a:t>Challenges in Distributed Applications:</a:t>
+            </a:r>
+          </a:p>
+          <a:p>
+            <a:pPr lvl="1"/>
+            <a:r>
+              <a:rPr lang="en-US" sz="1700" dirty="0" smtClean="0"/>
+              <a:t>Complexity: </a:t>
+            </a:r>
+            <a:r>
+              <a:rPr lang="en-US" sz="1700" dirty="0" smtClean="0">
                 <a:solidFill>
-                  <a:schemeClr val="bg1">
-                    <a:lumMod val="95000"/>
+                  <a:schemeClr val="tx1">
+                    <a:lumMod val="65000"/>
+                    <a:lumOff val="35000"/>
                   </a:schemeClr>
                 </a:solidFill>
               </a:rPr>
-              <a:t>IDEAS: DA Development Objectives</a:t>
-            </a:r>
-          </a:p>
-        </p:txBody>
-      </p:sp>
-      <p:sp>
-        <p:nvSpPr>
-          <p:cNvPr id="33795" name="Content Placeholder 2"/>
-          <p:cNvSpPr>
-            <a:spLocks noGrp="1"/>
-          </p:cNvSpPr>
-          <p:nvPr>
-            <p:ph idx="1"/>
-          </p:nvPr>
-        </p:nvSpPr>
+              <a:t>Multiple-levels, External Dependency, Varying control </a:t>
+            </a:r>
+          </a:p>
+          <a:p>
+            <a:pPr lvl="1"/>
+            <a:r>
+              <a:rPr lang="en-US" sz="1700" dirty="0" smtClean="0"/>
+              <a:t>Dynamism:   </a:t>
+            </a:r>
+            <a:r>
+              <a:rPr lang="en-US" sz="1700" dirty="0" smtClean="0">
+                <a:solidFill>
+                  <a:schemeClr val="tx1">
+                    <a:lumMod val="65000"/>
+                    <a:lumOff val="35000"/>
+                  </a:schemeClr>
+                </a:solidFill>
+              </a:rPr>
+              <a:t>Changing resource availability and requirements</a:t>
+            </a:r>
+          </a:p>
+          <a:p>
+            <a:r>
+              <a:rPr lang="en-US" sz="1700" dirty="0" smtClean="0"/>
+              <a:t>Posit that Autonomic Approaches can help address two challenges</a:t>
+            </a:r>
+          </a:p>
+          <a:p>
+            <a:pPr lvl="1"/>
+            <a:r>
+              <a:rPr lang="en-US" sz="1700" dirty="0" smtClean="0"/>
+              <a:t> Provide formulations that hide complexity &amp; support dynamism</a:t>
+            </a:r>
+          </a:p>
+          <a:p>
+            <a:pPr lvl="2"/>
+            <a:r>
+              <a:rPr lang="en-US" sz="1700" dirty="0" smtClean="0"/>
+              <a:t>Programming the Infrastructure “</a:t>
+            </a:r>
+            <a:r>
+              <a:rPr lang="en-US" sz="1700" dirty="0" err="1" smtClean="0"/>
+              <a:t>autonomically</a:t>
+            </a:r>
+            <a:r>
+              <a:rPr lang="en-US" sz="1700" dirty="0" smtClean="0"/>
+              <a:t>”</a:t>
+            </a:r>
+          </a:p>
+          <a:p>
+            <a:pPr lvl="3"/>
+            <a:endParaRPr lang="en-US" sz="1700" dirty="0" smtClean="0"/>
+          </a:p>
+          <a:p>
+            <a:pPr lvl="2">
+              <a:buNone/>
+            </a:pPr>
+            <a:r>
+              <a:rPr lang="en-US" sz="1700" dirty="0" smtClean="0"/>
+              <a:t>	</a:t>
+            </a:r>
+          </a:p>
+          <a:p>
+            <a:endParaRPr lang="en-US" sz="1700" dirty="0" smtClean="0"/>
+          </a:p>
+          <a:p>
+            <a:pPr lvl="1"/>
+            <a:endParaRPr lang="en-US" sz="1700" dirty="0" smtClean="0"/>
+          </a:p>
+          <a:p>
+            <a:pPr lvl="1"/>
+            <a:endParaRPr lang="en-US" sz="1700" dirty="0" smtClean="0"/>
+          </a:p>
+          <a:p>
+            <a:pPr lvl="1"/>
+            <a:endParaRPr lang="en-US" sz="1700" dirty="0" smtClean="0"/>
+          </a:p>
+        </p:txBody>
+      </p:sp>
+      <p:pic>
+        <p:nvPicPr>
+          <p:cNvPr id="5" name="Picture 4" descr="proposed_f3.jpg"/>
+          <p:cNvPicPr>
+            <a:picLocks noChangeAspect="1"/>
+          </p:cNvPicPr>
+          <p:nvPr/>
+        </p:nvPicPr>
+        <p:blipFill>
+          <a:blip r:embed="rId2"/>
+          <a:stretch>
+            <a:fillRect/>
+          </a:stretch>
+        </p:blipFill>
         <p:spPr>
           <a:xfrm>
-            <a:off x="673100" y="1498600"/>
-            <a:ext cx="8191501" cy="4765778"/>
+            <a:off x="5515278" y="4688681"/>
+            <a:ext cx="3628722" cy="1976438"/>
+          </a:xfrm>
+          <a:prstGeom prst="rect">
+            <a:avLst/>
+          </a:prstGeom>
+        </p:spPr>
+      </p:pic>
+      <p:sp>
+        <p:nvSpPr>
+          <p:cNvPr id="6" name="Content Placeholder 15"/>
+          <p:cNvSpPr>
+            <a:spLocks noGrp="1"/>
+          </p:cNvSpPr>
+          <p:nvPr>
+            <p:ph sz="half" idx="1"/>
+          </p:nvPr>
+        </p:nvSpPr>
+        <p:spPr>
+          <a:xfrm>
+            <a:off x="355600" y="3505200"/>
+            <a:ext cx="6807200" cy="2743200"/>
           </a:xfrm>
         </p:spPr>
         <p:txBody>
@@ -6125,139 +6596,87 @@
           <a:lstStyle/>
           <a:p>
             <a:r>
-              <a:rPr lang="en-US" sz="1700" b="1" dirty="0" smtClean="0">
-                <a:solidFill>
-                  <a:srgbClr val="800000"/>
-                </a:solidFill>
-              </a:rPr>
-              <a:t>Interoperable:</a:t>
-            </a:r>
-            <a:r>
-              <a:rPr lang="en-US" sz="1700" b="1" dirty="0" smtClean="0"/>
-              <a:t>  </a:t>
-            </a:r>
-            <a:r>
               <a:rPr lang="en-US" sz="1700" dirty="0" smtClean="0"/>
-              <a:t>Ability to work across multiple resources concurrently</a:t>
+              <a:t>Objective: Intelligence in Compute-Data placement</a:t>
+            </a:r>
+          </a:p>
+          <a:p>
+            <a:pPr lvl="1"/>
+            <a:r>
+              <a:rPr lang="en-US" sz="1700" dirty="0" smtClean="0"/>
+              <a:t>Sophisticated models of data-compute co-movement</a:t>
             </a:r>
           </a:p>
           <a:p>
             <a:pPr lvl="2"/>
             <a:r>
               <a:rPr lang="en-US" sz="1700" dirty="0" smtClean="0"/>
-              <a:t>Includes jobs submission, coordination mechanism,</a:t>
-            </a:r>
-          </a:p>
-          <a:p>
-            <a:r>
-              <a:rPr lang="en-US" sz="1700" b="1" dirty="0" smtClean="0">
-                <a:solidFill>
-                  <a:srgbClr val="800000"/>
-                </a:solidFill>
-              </a:rPr>
-              <a:t>Dynamic: </a:t>
-            </a:r>
-            <a:r>
-              <a:rPr lang="en-US" sz="1700" dirty="0" smtClean="0"/>
-              <a:t>Beyond legacy static execution &amp;  resource allocation models</a:t>
-            </a:r>
-          </a:p>
-          <a:p>
-            <a:pPr lvl="2"/>
-            <a:r>
-              <a:rPr lang="en-US" sz="1700" dirty="0" smtClean="0"/>
-              <a:t>Decisions at both deployment and run-time</a:t>
-            </a:r>
-          </a:p>
-          <a:p>
-            <a:pPr lvl="2"/>
-            <a:r>
-              <a:rPr lang="en-US" sz="1700" dirty="0" smtClean="0"/>
-              <a:t>Dynamical execution is  almost fundamental at scale</a:t>
-            </a:r>
-            <a:endParaRPr lang="en-US" sz="1700" baseline="-25000" dirty="0" smtClean="0"/>
-          </a:p>
-          <a:p>
-            <a:r>
-              <a:rPr lang="en-US" sz="1700" b="1" dirty="0" smtClean="0">
-                <a:solidFill>
-                  <a:srgbClr val="800000"/>
-                </a:solidFill>
-              </a:rPr>
-              <a:t>Extensible:</a:t>
-            </a:r>
-            <a:r>
-              <a:rPr lang="en-US" sz="1700" dirty="0" smtClean="0">
-                <a:solidFill>
-                  <a:srgbClr val="800000"/>
-                </a:solidFill>
-              </a:rPr>
-              <a:t> </a:t>
-            </a:r>
-            <a:r>
-              <a:rPr lang="en-US" sz="1700" dirty="0" smtClean="0"/>
-              <a:t>Support new functionality &amp; infrastructure without wholesale refactoring, i.e., lower coupling to tools &amp; infrastructure</a:t>
-            </a:r>
-          </a:p>
-          <a:p>
-            <a:r>
-              <a:rPr lang="en-US" sz="1700" b="1" dirty="0" smtClean="0">
-                <a:solidFill>
-                  <a:srgbClr val="800000"/>
-                </a:solidFill>
-              </a:rPr>
-              <a:t>Adaptive/Autonomic:</a:t>
-            </a:r>
-            <a:r>
-              <a:rPr lang="en-US" sz="1700" dirty="0" smtClean="0">
-                <a:solidFill>
-                  <a:srgbClr val="800000"/>
-                </a:solidFill>
-              </a:rPr>
-              <a:t> </a:t>
-            </a:r>
-            <a:r>
-              <a:rPr lang="en-US" sz="1700" dirty="0" smtClean="0"/>
-              <a:t>Flexible response to fluctuations in dynamic resources, availability of dynamic data</a:t>
-            </a:r>
-          </a:p>
-          <a:p>
-            <a:r>
-              <a:rPr lang="en-US" sz="1700" b="1" dirty="0" smtClean="0">
-                <a:solidFill>
-                  <a:srgbClr val="800000"/>
-                </a:solidFill>
-              </a:rPr>
-              <a:t>Scalable:</a:t>
-            </a:r>
-            <a:r>
-              <a:rPr lang="en-US" sz="1700" dirty="0" smtClean="0">
-                <a:solidFill>
-                  <a:srgbClr val="800000"/>
-                </a:solidFill>
-              </a:rPr>
-              <a:t> </a:t>
-            </a:r>
-            <a:r>
-              <a:rPr lang="en-US" sz="1700" dirty="0" smtClean="0"/>
-              <a:t>Along many dimensions and design points </a:t>
-            </a:r>
-          </a:p>
-          <a:p>
-            <a:pPr>
-              <a:buNone/>
-            </a:pPr>
-            <a:r>
-              <a:rPr lang="en-US" sz="1700" dirty="0" smtClean="0">
-                <a:solidFill>
-                  <a:srgbClr val="800000"/>
-                </a:solidFill>
-              </a:rPr>
-              <a:t>     Challenge: To develop DA effectively and efficiently with IDEAS as first class objectives with  simplicity an over-aching concern</a:t>
-            </a:r>
-          </a:p>
-          <a:p>
+              <a:t>Tier 0 data at BNL; all compute migrated to Tier 0 </a:t>
+            </a:r>
+          </a:p>
+          <a:p>
+            <a:r>
+              <a:rPr lang="en-US" dirty="0" smtClean="0"/>
+              <a:t>For an objective, which strategy? </a:t>
+            </a:r>
             <a:endParaRPr lang="en-US" sz="1700" dirty="0" smtClean="0"/>
+          </a:p>
+          <a:p>
+            <a:pPr lvl="1"/>
+            <a:r>
+              <a:rPr lang="en-US" dirty="0" smtClean="0"/>
+              <a:t>S1: Assignment of workers  determined by min </a:t>
+            </a:r>
+            <a:r>
+              <a:rPr lang="en-US" dirty="0" err="1" smtClean="0"/>
+              <a:t>T</a:t>
+            </a:r>
+            <a:r>
+              <a:rPr lang="en-US" baseline="-25000" dirty="0" err="1" smtClean="0"/>
+              <a:t>r</a:t>
+            </a:r>
+            <a:endParaRPr lang="en-US" baseline="-25000" dirty="0" smtClean="0"/>
+          </a:p>
+          <a:p>
+            <a:pPr lvl="1"/>
+            <a:r>
+              <a:rPr lang="en-US" dirty="0" smtClean="0"/>
+              <a:t>S2: Assignment of workers, by min data transfer</a:t>
+            </a:r>
+          </a:p>
+          <a:p>
+            <a:pPr lvl="1"/>
+            <a:r>
+              <a:rPr lang="en-US" dirty="0" smtClean="0"/>
+              <a:t>S3: Upon tracked dependencies</a:t>
+            </a:r>
+          </a:p>
+          <a:p>
+            <a:r>
+              <a:rPr lang="en-US" dirty="0" smtClean="0"/>
+              <a:t>Each S</a:t>
+            </a:r>
+            <a:r>
+              <a:rPr lang="en-US" sz="1600" dirty="0" smtClean="0"/>
+              <a:t>N</a:t>
+            </a:r>
+            <a:r>
+              <a:rPr lang="en-US" dirty="0" smtClean="0"/>
+              <a:t>: Could have different mechanism</a:t>
+            </a:r>
+            <a:endParaRPr lang="en-US" sz="2000" dirty="0" smtClean="0"/>
+          </a:p>
+          <a:p>
+            <a:pPr lvl="1"/>
+            <a:endParaRPr lang="en-US" dirty="0" smtClean="0"/>
+          </a:p>
+          <a:p>
+            <a:pPr lvl="1"/>
+            <a:endParaRPr lang="en-US" dirty="0" smtClean="0"/>
+          </a:p>
+          <a:p>
+            <a:pPr lvl="1"/>
+            <a:endParaRPr lang="en-US" baseline="-25000" dirty="0" smtClean="0"/>
           </a:p>
           <a:p>
             <a:endParaRPr lang="en-US" sz="1700" dirty="0" smtClean="0"/>
@@ -6281,6 +6700,236 @@
 </file>
 
 <file path=ppt/slides/slide11.xml><?xml version="1.0" encoding="utf-8"?>
+<p:sld xmlns:a="http://schemas.openxmlformats.org/drawingml/2006/main" xmlns:r="http://schemas.openxmlformats.org/officeDocument/2006/relationships" xmlns:mc="http://schemas.openxmlformats.org/markup-compatibility/2006" xmlns:mv="urn:schemas-microsoft-com:mac:vml" xmlns:p="http://schemas.openxmlformats.org/presentationml/2006/main" mc:Ignorable="mv" mc:PreserveAttributes="mv:*">
+  <p:cSld>
+    <p:spTree>
+      <p:nvGrpSpPr>
+        <p:cNvPr id="1" name=""/>
+        <p:cNvGrpSpPr/>
+        <p:nvPr/>
+      </p:nvGrpSpPr>
+      <p:grpSpPr>
+        <a:xfrm>
+          <a:off x="0" y="0"/>
+          <a:ext cx="0" cy="0"/>
+          <a:chOff x="0" y="0"/>
+          <a:chExt cx="0" cy="0"/>
+        </a:xfrm>
+      </p:grpSpPr>
+      <p:sp>
+        <p:nvSpPr>
+          <p:cNvPr id="33794" name="Title 1"/>
+          <p:cNvSpPr>
+            <a:spLocks noGrp="1"/>
+          </p:cNvSpPr>
+          <p:nvPr>
+            <p:ph type="title"/>
+          </p:nvPr>
+        </p:nvSpPr>
+        <p:spPr>
+          <a:xfrm>
+            <a:off x="928542" y="263714"/>
+            <a:ext cx="8215458" cy="914400"/>
+          </a:xfrm>
+        </p:spPr>
+        <p:txBody>
+          <a:bodyPr>
+            <a:noAutofit/>
+          </a:bodyPr>
+          <a:lstStyle/>
+          <a:p>
+            <a:r>
+              <a:rPr lang="en-US" sz="2400" dirty="0" smtClean="0">
+                <a:solidFill>
+                  <a:schemeClr val="bg1">
+                    <a:lumMod val="95000"/>
+                  </a:schemeClr>
+                </a:solidFill>
+              </a:rPr>
+              <a:t>IDEAS: DA Development Objectives</a:t>
+            </a:r>
+          </a:p>
+        </p:txBody>
+      </p:sp>
+      <p:sp>
+        <p:nvSpPr>
+          <p:cNvPr id="33795" name="Content Placeholder 2"/>
+          <p:cNvSpPr>
+            <a:spLocks noGrp="1"/>
+          </p:cNvSpPr>
+          <p:nvPr>
+            <p:ph idx="1"/>
+          </p:nvPr>
+        </p:nvSpPr>
+        <p:spPr>
+          <a:xfrm>
+            <a:off x="673100" y="1498600"/>
+            <a:ext cx="8191501" cy="4765778"/>
+          </a:xfrm>
+        </p:spPr>
+        <p:txBody>
+          <a:bodyPr>
+            <a:noAutofit/>
+          </a:bodyPr>
+          <a:lstStyle/>
+          <a:p>
+            <a:r>
+              <a:rPr lang="en-US" sz="1700" b="1" dirty="0" smtClean="0">
+                <a:solidFill>
+                  <a:srgbClr val="800000"/>
+                </a:solidFill>
+              </a:rPr>
+              <a:t>Interoperable:</a:t>
+            </a:r>
+            <a:r>
+              <a:rPr lang="en-US" sz="1700" b="1" dirty="0" smtClean="0"/>
+              <a:t>  </a:t>
+            </a:r>
+            <a:r>
+              <a:rPr lang="en-US" sz="1700" dirty="0" smtClean="0"/>
+              <a:t>Ability to work across multiple resources concurrently</a:t>
+            </a:r>
+          </a:p>
+          <a:p>
+            <a:pPr lvl="2"/>
+            <a:r>
+              <a:rPr lang="en-US" sz="1700" dirty="0" smtClean="0"/>
+              <a:t>Includes jobs submission, coordination mechanism,</a:t>
+            </a:r>
+          </a:p>
+          <a:p>
+            <a:r>
+              <a:rPr lang="en-US" sz="1700" b="1" dirty="0" smtClean="0">
+                <a:solidFill>
+                  <a:srgbClr val="800000"/>
+                </a:solidFill>
+              </a:rPr>
+              <a:t>Dynamic: </a:t>
+            </a:r>
+            <a:r>
+              <a:rPr lang="en-US" sz="1700" dirty="0" smtClean="0"/>
+              <a:t>Beyond legacy static execution &amp;  resource allocation models</a:t>
+            </a:r>
+          </a:p>
+          <a:p>
+            <a:pPr lvl="2"/>
+            <a:r>
+              <a:rPr lang="en-US" sz="1700" dirty="0" smtClean="0"/>
+              <a:t>Decisions at both deployment and run-time</a:t>
+            </a:r>
+          </a:p>
+          <a:p>
+            <a:pPr lvl="2"/>
+            <a:r>
+              <a:rPr lang="en-US" sz="1700" dirty="0" smtClean="0"/>
+              <a:t>Dynamical execution is  almost fundamental at scale</a:t>
+            </a:r>
+            <a:endParaRPr lang="en-US" sz="1700" baseline="-25000" dirty="0" smtClean="0"/>
+          </a:p>
+          <a:p>
+            <a:r>
+              <a:rPr lang="en-US" sz="1700" b="1" dirty="0" smtClean="0">
+                <a:solidFill>
+                  <a:srgbClr val="800000"/>
+                </a:solidFill>
+              </a:rPr>
+              <a:t>Extensible:</a:t>
+            </a:r>
+            <a:r>
+              <a:rPr lang="en-US" sz="1700" dirty="0" smtClean="0">
+                <a:solidFill>
+                  <a:srgbClr val="800000"/>
+                </a:solidFill>
+              </a:rPr>
+              <a:t> </a:t>
+            </a:r>
+            <a:r>
+              <a:rPr lang="en-US" sz="1700" dirty="0" smtClean="0"/>
+              <a:t>Support new functionality &amp; infrastructure without wholesale refactoring, i.e., lower coupling to tools &amp; infrastructure</a:t>
+            </a:r>
+          </a:p>
+          <a:p>
+            <a:r>
+              <a:rPr lang="en-US" sz="1700" b="1" dirty="0" smtClean="0">
+                <a:solidFill>
+                  <a:srgbClr val="800000"/>
+                </a:solidFill>
+              </a:rPr>
+              <a:t>Adaptive/Autonomic:</a:t>
+            </a:r>
+            <a:r>
+              <a:rPr lang="en-US" sz="1700" dirty="0" smtClean="0">
+                <a:solidFill>
+                  <a:srgbClr val="800000"/>
+                </a:solidFill>
+              </a:rPr>
+              <a:t> </a:t>
+            </a:r>
+            <a:r>
+              <a:rPr lang="en-US" sz="1700" dirty="0" smtClean="0"/>
+              <a:t>Flexible response to fluctuations in dynamic resources, availability of dynamic data</a:t>
+            </a:r>
+          </a:p>
+          <a:p>
+            <a:r>
+              <a:rPr lang="en-US" sz="1700" b="1" dirty="0" smtClean="0">
+                <a:solidFill>
+                  <a:srgbClr val="800000"/>
+                </a:solidFill>
+              </a:rPr>
+              <a:t>Scalable:</a:t>
+            </a:r>
+            <a:r>
+              <a:rPr lang="en-US" sz="1700" dirty="0" smtClean="0">
+                <a:solidFill>
+                  <a:srgbClr val="800000"/>
+                </a:solidFill>
+              </a:rPr>
+              <a:t> </a:t>
+            </a:r>
+            <a:r>
+              <a:rPr lang="en-US" sz="1700" dirty="0" smtClean="0"/>
+              <a:t>Along many dimensions and design points </a:t>
+            </a:r>
+          </a:p>
+          <a:p>
+            <a:pPr>
+              <a:buNone/>
+            </a:pPr>
+            <a:r>
+              <a:rPr lang="en-US" sz="1700" dirty="0" smtClean="0">
+                <a:solidFill>
+                  <a:srgbClr val="800000"/>
+                </a:solidFill>
+              </a:rPr>
+              <a:t>     Challenge: To develop DA effectively and efficiently with IDEAS as first class objectives with  simplicity an over-aching concern</a:t>
+            </a:r>
+          </a:p>
+          <a:p>
+            <a:endParaRPr lang="en-US" sz="1700" dirty="0" smtClean="0"/>
+          </a:p>
+          <a:p>
+            <a:endParaRPr lang="en-US" sz="1700" dirty="0" smtClean="0"/>
+          </a:p>
+        </p:txBody>
+      </p:sp>
+    </p:spTree>
+  </p:cSld>
+  <p:clrMapOvr>
+    <a:masterClrMapping/>
+  </p:clrMapOvr>
+  <p:transition/>
+  <p:timing>
+    <p:tnLst>
+      <p:par>
+        <p:cTn id="1" dur="indefinite" restart="never" nodeType="tmRoot"/>
+      </p:par>
+    </p:tnLst>
+  </p:timing>
+</p:sld>
+</file>
+
+<file path=ppt/slides/slide12.xml><?xml version="1.0" encoding="utf-8"?>
 <p:sld xmlns:a="http://schemas.openxmlformats.org/drawingml/2006/main" xmlns:r="http://schemas.openxmlformats.org/officeDocument/2006/relationships" xmlns:mc="http://schemas.openxmlformats.org/markup-compatibility/2006" xmlns:mv="urn:schemas-microsoft-com:mac:vml" xmlns:p="http://schemas.openxmlformats.org/presentationml/2006/main" mc:Ignorable="mv" mc:PreserveAttributes="mv:*">
   <p:cSld>
     <p:spTree>
@@ -6975,81 +7624,6 @@
 </p:sld>
 </file>
 
-<file path=ppt/slides/slide12.xml><?xml version="1.0" encoding="utf-8"?>
-<p:sld xmlns:a="http://schemas.openxmlformats.org/drawingml/2006/main" xmlns:r="http://schemas.openxmlformats.org/officeDocument/2006/relationships" xmlns:mc="http://schemas.openxmlformats.org/markup-compatibility/2006" xmlns:mv="urn:schemas-microsoft-com:mac:vml" xmlns:p="http://schemas.openxmlformats.org/presentationml/2006/main" mc:Ignorable="mv" mc:PreserveAttributes="mv:*">
-  <p:cSld>
-    <p:spTree>
-      <p:nvGrpSpPr>
-        <p:cNvPr id="1" name=""/>
-        <p:cNvGrpSpPr/>
-        <p:nvPr/>
-      </p:nvGrpSpPr>
-      <p:grpSpPr>
-        <a:xfrm>
-          <a:off x="0" y="0"/>
-          <a:ext cx="0" cy="0"/>
-          <a:chOff x="0" y="0"/>
-          <a:chExt cx="0" cy="0"/>
-        </a:xfrm>
-      </p:grpSpPr>
-      <p:sp>
-        <p:nvSpPr>
-          <p:cNvPr id="2" name="Title 1"/>
-          <p:cNvSpPr>
-            <a:spLocks noGrp="1"/>
-          </p:cNvSpPr>
-          <p:nvPr>
-            <p:ph type="title"/>
-          </p:nvPr>
-        </p:nvSpPr>
-        <p:spPr/>
-        <p:txBody>
-          <a:bodyPr/>
-          <a:lstStyle/>
-          <a:p>
-            <a:r>
-              <a:rPr lang="en-US" dirty="0" smtClean="0"/>
-              <a:t>SAGA: Architecture</a:t>
-            </a:r>
-            <a:endParaRPr lang="en-US" dirty="0"/>
-          </a:p>
-        </p:txBody>
-      </p:sp>
-      <p:pic>
-        <p:nvPicPr>
-          <p:cNvPr id="4" name="Content Placeholder 3" descr="saga-architecture.png"/>
-          <p:cNvPicPr>
-            <a:picLocks noGrp="1" noChangeAspect="1"/>
-          </p:cNvPicPr>
-          <p:nvPr>
-            <p:ph idx="1"/>
-          </p:nvPr>
-        </p:nvPicPr>
-        <p:blipFill>
-          <a:blip r:embed="rId2"/>
-          <a:srcRect t="-1090" b="-1090"/>
-          <a:stretch>
-            <a:fillRect/>
-          </a:stretch>
-        </p:blipFill>
-        <p:spPr/>
-      </p:pic>
-    </p:spTree>
-  </p:cSld>
-  <p:clrMapOvr>
-    <a:masterClrMapping/>
-  </p:clrMapOvr>
-  <p:transition/>
-  <p:timing>
-    <p:tnLst>
-      <p:par>
-        <p:cTn id="1" dur="indefinite" restart="never" nodeType="tmRoot"/>
-      </p:par>
-    </p:tnLst>
-  </p:timing>
-</p:sld>
-</file>
-
 <file path=ppt/slides/slide13.xml><?xml version="1.0" encoding="utf-8"?>
 <p:sld xmlns:a="http://schemas.openxmlformats.org/drawingml/2006/main" xmlns:r="http://schemas.openxmlformats.org/officeDocument/2006/relationships" xmlns:mc="http://schemas.openxmlformats.org/markup-compatibility/2006" xmlns:mv="urn:schemas-microsoft-com:mac:vml" xmlns:p="http://schemas.openxmlformats.org/presentationml/2006/main" mc:Ignorable="mv" mc:PreserveAttributes="mv:*">
   <p:cSld>
@@ -7079,38 +7653,20 @@
         </p:nvSpPr>
         <p:spPr/>
         <p:txBody>
-          <a:bodyPr>
-            <a:noAutofit/>
-          </a:bodyPr>
+          <a:bodyPr/>
           <a:lstStyle/>
           <a:p>
             <a:r>
-              <a:rPr lang="en-US" sz="2600" dirty="0" smtClean="0"/>
-              <a:t>Abstractions for Dynamic Execution</a:t>
-            </a:r>
-            <a:r>
-              <a:rPr lang="en-US" sz="2600" dirty="0" smtClean="0"/>
-              <a:t> SAGA </a:t>
-            </a:r>
-            <a:r>
-              <a:rPr lang="en-US" sz="2600" dirty="0" smtClean="0"/>
-              <a:t>Pilot-Job (</a:t>
-            </a:r>
-            <a:r>
-              <a:rPr lang="en-US" sz="2600" dirty="0" err="1" smtClean="0"/>
-              <a:t>BigJob</a:t>
-            </a:r>
-            <a:r>
-              <a:rPr lang="en-US" sz="2600" dirty="0" smtClean="0"/>
-              <a:t>)</a:t>
-            </a:r>
-            <a:endParaRPr lang="en-US" sz="2600" dirty="0"/>
+              <a:rPr lang="en-US" dirty="0" smtClean="0"/>
+              <a:t>SAGA: Architecture</a:t>
+            </a:r>
+            <a:endParaRPr lang="en-US" dirty="0"/>
           </a:p>
         </p:txBody>
       </p:sp>
       <p:pic>
         <p:nvPicPr>
-          <p:cNvPr id="4" name="Content Placeholder 3" descr="bigjob.png"/>
+          <p:cNvPr id="4" name="Content Placeholder 3" descr="saga-architecture.png"/>
           <p:cNvPicPr>
             <a:picLocks noGrp="1" noChangeAspect="1"/>
           </p:cNvPicPr>
@@ -7120,7 +7676,7 @@
         </p:nvPicPr>
         <p:blipFill>
           <a:blip r:embed="rId2"/>
-          <a:srcRect l="-2356" r="-2356"/>
+          <a:srcRect t="-1090" b="-1090"/>
           <a:stretch>
             <a:fillRect/>
           </a:stretch>
@@ -7132,6 +7688,7 @@
   <p:clrMapOvr>
     <a:masterClrMapping/>
   </p:clrMapOvr>
+  <p:transition/>
   <p:timing>
     <p:tnLst>
       <p:par>
@@ -7177,16 +7734,24 @@
           <a:lstStyle/>
           <a:p>
             <a:r>
-              <a:rPr lang="en-US" sz="2400" dirty="0" smtClean="0"/>
-              <a:t>Deployment &amp; Scheduling of  Multiple  Infrastructure Independent Pilot-Jobs</a:t>
-            </a:r>
-            <a:endParaRPr lang="en-US" sz="2400" dirty="0"/>
+              <a:rPr lang="en-US" sz="2600" dirty="0" smtClean="0"/>
+              <a:t>Abstractions for Dynamic Execution SAGA Pilot-Job (</a:t>
+            </a:r>
+            <a:r>
+              <a:rPr lang="en-US" sz="2600" dirty="0" err="1" smtClean="0"/>
+              <a:t>BigJob</a:t>
+            </a:r>
+            <a:r>
+              <a:rPr lang="en-US" sz="2600" dirty="0" smtClean="0"/>
+              <a:t>)</a:t>
+            </a:r>
+            <a:endParaRPr lang="en-US" sz="2600" dirty="0"/>
           </a:p>
         </p:txBody>
       </p:sp>
       <p:pic>
         <p:nvPicPr>
-          <p:cNvPr id="5" name="Content Placeholder 4" descr="distributed_pilot_job.png"/>
+          <p:cNvPr id="4" name="Content Placeholder 3" descr="bigjob.png"/>
           <p:cNvPicPr>
             <a:picLocks noGrp="1" noChangeAspect="1"/>
           </p:cNvPicPr>
@@ -7196,7 +7761,7 @@
         </p:nvPicPr>
         <p:blipFill>
           <a:blip r:embed="rId2"/>
-          <a:srcRect t="-10678" b="-10678"/>
+          <a:srcRect l="-2356" r="-2356"/>
           <a:stretch>
             <a:fillRect/>
           </a:stretch>
@@ -7248,21 +7813,93 @@
         <p:spPr/>
         <p:txBody>
           <a:bodyPr>
+            <a:noAutofit/>
+          </a:bodyPr>
+          <a:lstStyle/>
+          <a:p>
+            <a:r>
+              <a:rPr lang="en-US" sz="2400" dirty="0" smtClean="0"/>
+              <a:t>Deployment &amp; Scheduling of  Multiple  Infrastructure Independent Pilot-Jobs</a:t>
+            </a:r>
+            <a:endParaRPr lang="en-US" sz="2400" dirty="0"/>
+          </a:p>
+        </p:txBody>
+      </p:sp>
+      <p:pic>
+        <p:nvPicPr>
+          <p:cNvPr id="5" name="Content Placeholder 4" descr="distributed_pilot_job.png"/>
+          <p:cNvPicPr>
+            <a:picLocks noGrp="1" noChangeAspect="1"/>
+          </p:cNvPicPr>
+          <p:nvPr>
+            <p:ph idx="1"/>
+          </p:nvPr>
+        </p:nvPicPr>
+        <p:blipFill>
+          <a:blip r:embed="rId2"/>
+          <a:srcRect t="-10678" b="-10678"/>
+          <a:stretch>
+            <a:fillRect/>
+          </a:stretch>
+        </p:blipFill>
+        <p:spPr/>
+      </p:pic>
+    </p:spTree>
+  </p:cSld>
+  <p:clrMapOvr>
+    <a:masterClrMapping/>
+  </p:clrMapOvr>
+  <p:timing>
+    <p:tnLst>
+      <p:par>
+        <p:cTn id="1" dur="indefinite" restart="never" nodeType="tmRoot"/>
+      </p:par>
+    </p:tnLst>
+  </p:timing>
+</p:sld>
+</file>
+
+<file path=ppt/slides/slide16.xml><?xml version="1.0" encoding="utf-8"?>
+<p:sld xmlns:a="http://schemas.openxmlformats.org/drawingml/2006/main" xmlns:r="http://schemas.openxmlformats.org/officeDocument/2006/relationships" xmlns:mc="http://schemas.openxmlformats.org/markup-compatibility/2006" xmlns:mv="urn:schemas-microsoft-com:mac:vml" xmlns:p="http://schemas.openxmlformats.org/presentationml/2006/main" mc:Ignorable="mv" mc:PreserveAttributes="mv:*">
+  <p:cSld>
+    <p:spTree>
+      <p:nvGrpSpPr>
+        <p:cNvPr id="1" name=""/>
+        <p:cNvGrpSpPr/>
+        <p:nvPr/>
+      </p:nvGrpSpPr>
+      <p:grpSpPr>
+        <a:xfrm>
+          <a:off x="0" y="0"/>
+          <a:ext cx="0" cy="0"/>
+          <a:chOff x="0" y="0"/>
+          <a:chExt cx="0" cy="0"/>
+        </a:xfrm>
+      </p:grpSpPr>
+      <p:sp>
+        <p:nvSpPr>
+          <p:cNvPr id="2" name="Title 1"/>
+          <p:cNvSpPr>
+            <a:spLocks noGrp="1"/>
+          </p:cNvSpPr>
+          <p:nvPr>
+            <p:ph type="title"/>
+          </p:nvPr>
+        </p:nvSpPr>
+        <p:spPr/>
+        <p:txBody>
+          <a:bodyPr>
             <a:normAutofit fontScale="90000"/>
           </a:bodyPr>
           <a:lstStyle/>
           <a:p>
             <a:r>
-              <a:rPr lang="en-US" sz="2800" dirty="0" err="1" smtClean="0"/>
-              <a:t>Ensembel</a:t>
-            </a:r>
-            <a:r>
               <a:rPr lang="en-US" sz="2800" dirty="0" smtClean="0"/>
-              <a:t> and Replica</a:t>
+              <a:t>Ensemble </a:t>
             </a:r>
             <a:r>
               <a:rPr lang="en-US" sz="2800" dirty="0" smtClean="0"/>
-              <a:t>-Exchange  Simulations</a:t>
+              <a:t>and Replica-Exchange  Simulations</a:t>
             </a:r>
             <a:endParaRPr lang="en-US" sz="2800" dirty="0"/>
           </a:p>
@@ -7327,7 +7964,6 @@
               <a:rPr lang="en-US" dirty="0" smtClean="0"/>
               <a:t>Many successful implementations</a:t>
             </a:r>
-            <a:endParaRPr lang="en-US" dirty="0" smtClean="0"/>
           </a:p>
           <a:p>
             <a:pPr lvl="1"/>
@@ -7337,11 +7973,7 @@
             </a:r>
             <a:r>
               <a:rPr lang="en-US" dirty="0" err="1" smtClean="0"/>
-              <a:t>folding</a:t>
-            </a:r>
-            <a:r>
-              <a:rPr lang="en-US" dirty="0" err="1" smtClean="0"/>
-              <a:t>@home</a:t>
+              <a:t>folding@home</a:t>
             </a:r>
             <a:r>
               <a:rPr lang="en-US" dirty="0" smtClean="0"/>
@@ -7384,180 +8016,6 @@
     <a:masterClrMapping/>
   </p:clrMapOvr>
   <p:transition/>
-  <p:timing>
-    <p:tnLst>
-      <p:par>
-        <p:cTn id="1" dur="indefinite" restart="never" nodeType="tmRoot"/>
-      </p:par>
-    </p:tnLst>
-  </p:timing>
-</p:sld>
-</file>
-
-<file path=ppt/slides/slide16.xml><?xml version="1.0" encoding="utf-8"?>
-<p:sld xmlns:a="http://schemas.openxmlformats.org/drawingml/2006/main" xmlns:r="http://schemas.openxmlformats.org/officeDocument/2006/relationships" xmlns:mc="http://schemas.openxmlformats.org/markup-compatibility/2006" xmlns:mv="urn:schemas-microsoft-com:mac:vml" xmlns:p="http://schemas.openxmlformats.org/presentationml/2006/main" mc:Ignorable="mv" mc:PreserveAttributes="mv:*">
-  <p:cSld>
-    <p:spTree>
-      <p:nvGrpSpPr>
-        <p:cNvPr id="1" name=""/>
-        <p:cNvGrpSpPr/>
-        <p:nvPr/>
-      </p:nvGrpSpPr>
-      <p:grpSpPr>
-        <a:xfrm>
-          <a:off x="0" y="0"/>
-          <a:ext cx="0" cy="0"/>
-          <a:chOff x="0" y="0"/>
-          <a:chExt cx="0" cy="0"/>
-        </a:xfrm>
-      </p:grpSpPr>
-      <p:sp>
-        <p:nvSpPr>
-          <p:cNvPr id="2" name="Title 1"/>
-          <p:cNvSpPr>
-            <a:spLocks noGrp="1"/>
-          </p:cNvSpPr>
-          <p:nvPr>
-            <p:ph type="title"/>
-          </p:nvPr>
-        </p:nvSpPr>
-        <p:spPr>
-          <a:xfrm>
-            <a:off x="836377" y="263714"/>
-            <a:ext cx="8307623" cy="914400"/>
-          </a:xfrm>
-        </p:spPr>
-        <p:txBody>
-          <a:bodyPr>
-            <a:normAutofit/>
-          </a:bodyPr>
-          <a:lstStyle/>
-          <a:p>
-            <a:r>
-              <a:rPr lang="en-US" sz="2400" dirty="0" smtClean="0"/>
-              <a:t> IDEAS: Facilitating Novel Execution Modes</a:t>
-            </a:r>
-            <a:endParaRPr lang="en-US" sz="2400" dirty="0"/>
-          </a:p>
-        </p:txBody>
-      </p:sp>
-      <p:pic>
-        <p:nvPicPr>
-          <p:cNvPr id="4" name="Content Placeholder 3" descr="8replica_scenario_grid_condor_cloud.png"/>
-          <p:cNvPicPr>
-            <a:picLocks noGrp="1" noChangeAspect="1"/>
-          </p:cNvPicPr>
-          <p:nvPr>
-            <p:ph sz="half" idx="1"/>
-          </p:nvPr>
-        </p:nvPicPr>
-        <p:blipFill>
-          <a:blip r:embed="rId2"/>
-          <a:srcRect t="-28996" b="-28996"/>
-          <a:stretch>
-            <a:fillRect/>
-          </a:stretch>
-        </p:blipFill>
-        <p:spPr>
-          <a:xfrm>
-            <a:off x="3985305" y="857272"/>
-            <a:ext cx="5021023" cy="4322519"/>
-          </a:xfrm>
-        </p:spPr>
-      </p:pic>
-      <p:pic>
-        <p:nvPicPr>
-          <p:cNvPr id="7" name="Content Placeholder 6" descr="deadline.png"/>
-          <p:cNvPicPr>
-            <a:picLocks noGrp="1" noChangeAspect="1"/>
-          </p:cNvPicPr>
-          <p:nvPr>
-            <p:ph sz="half" idx="2"/>
-          </p:nvPr>
-        </p:nvPicPr>
-        <p:blipFill>
-          <a:blip r:embed="rId3"/>
-          <a:srcRect t="-118806" b="-118806"/>
-          <a:stretch>
-            <a:fillRect/>
-          </a:stretch>
-        </p:blipFill>
-        <p:spPr>
-          <a:xfrm>
-            <a:off x="3918465" y="3769895"/>
-            <a:ext cx="5225535" cy="3960404"/>
-          </a:xfrm>
-        </p:spPr>
-      </p:pic>
-      <p:sp>
-        <p:nvSpPr>
-          <p:cNvPr id="11" name="Text Placeholder 10"/>
-          <p:cNvSpPr>
-            <a:spLocks noGrp="1"/>
-          </p:cNvSpPr>
-          <p:nvPr>
-            <p:ph type="body" sz="half" idx="4294967295"/>
-          </p:nvPr>
-        </p:nvSpPr>
-        <p:spPr>
-          <a:xfrm>
-            <a:off x="173784" y="2886068"/>
-            <a:ext cx="4067360" cy="3811504"/>
-          </a:xfrm>
-        </p:spPr>
-        <p:txBody>
-          <a:bodyPr/>
-          <a:lstStyle/>
-          <a:p>
-            <a:r>
-              <a:rPr lang="en-US" dirty="0" smtClean="0"/>
-              <a:t>Interoperability and Scale-out enable new ways of resource planning and application execution</a:t>
-            </a:r>
-          </a:p>
-          <a:p>
-            <a:r>
-              <a:rPr lang="en-US" dirty="0" smtClean="0"/>
-              <a:t>Deadline-driven scheduling:  e.g., task done before time T</a:t>
-            </a:r>
-          </a:p>
-          <a:p>
-            <a:r>
-              <a:rPr lang="en-US" dirty="0" smtClean="0"/>
-              <a:t>Adapt workload distribution and resource utilization to ensure completion</a:t>
-            </a:r>
-          </a:p>
-        </p:txBody>
-      </p:sp>
-      <p:pic>
-        <p:nvPicPr>
-          <p:cNvPr id="9" name="Content Placeholder 3" descr="distributed_pilot_job.png"/>
-          <p:cNvPicPr>
-            <a:picLocks noChangeAspect="1"/>
-          </p:cNvPicPr>
-          <p:nvPr/>
-        </p:nvPicPr>
-        <p:blipFill>
-          <a:blip r:embed="rId4"/>
-          <a:srcRect l="-7759" r="-7759"/>
-          <a:stretch>
-            <a:fillRect/>
-          </a:stretch>
-        </p:blipFill>
-        <p:spPr>
-          <a:xfrm>
-            <a:off x="649225" y="1224194"/>
-            <a:ext cx="2872729" cy="1661874"/>
-          </a:xfrm>
-          <a:prstGeom prst="rect">
-            <a:avLst/>
-          </a:prstGeom>
-        </p:spPr>
-      </p:pic>
-    </p:spTree>
-  </p:cSld>
-  <p:clrMapOvr>
-    <a:masterClrMapping/>
-  </p:clrMapOvr>
   <p:timing>
     <p:tnLst>
       <p:par>
@@ -8114,51 +8572,7 @@
                   </a:prstClr>
                 </a:solidFill>
               </a:rPr>
-              <a:t>“We” have lost intellectual leadership to</a:t>
-            </a:r>
-            <a:r>
-              <a:rPr lang="en-US" sz="1700" dirty="0" smtClean="0">
-                <a:solidFill>
-                  <a:prstClr val="black">
-                    <a:lumMod val="65000"/>
-                    <a:lumOff val="35000"/>
-                  </a:prstClr>
-                </a:solidFill>
-              </a:rPr>
-              <a:t> </a:t>
-            </a:r>
-            <a:r>
-              <a:rPr lang="en-US" sz="1700" dirty="0" smtClean="0">
-                <a:solidFill>
-                  <a:prstClr val="black">
-                    <a:lumMod val="65000"/>
-                    <a:lumOff val="35000"/>
-                  </a:prstClr>
-                </a:solidFill>
-              </a:rPr>
-              <a:t>commercial</a:t>
-            </a:r>
-            <a:r>
-              <a:rPr lang="en-US" sz="1700" dirty="0" smtClean="0">
-                <a:solidFill>
-                  <a:prstClr val="black">
-                    <a:lumMod val="65000"/>
-                    <a:lumOff val="35000"/>
-                  </a:prstClr>
-                </a:solidFill>
-              </a:rPr>
-              <a:t> </a:t>
-            </a:r>
-            <a:r>
-              <a:rPr lang="en-US" sz="1700" dirty="0" smtClean="0">
-                <a:solidFill>
-                  <a:prstClr val="black">
-                    <a:lumMod val="65000"/>
-                    <a:lumOff val="35000"/>
-                  </a:prstClr>
-                </a:solidFill>
-              </a:rPr>
-              <a:t>providers!</a:t>
+              <a:t>“We” have lost intellectual leadership to commercial providers!</a:t>
             </a:r>
             <a:endParaRPr lang="en-US" sz="1700" dirty="0" smtClean="0"/>
           </a:p>
@@ -8326,11 +8740,7 @@
           <a:p>
             <a:r>
               <a:rPr lang="en-US" dirty="0" smtClean="0"/>
-              <a:t>Introduction: Understanding Distributed </a:t>
-            </a:r>
-            <a:r>
-              <a:rPr lang="en-US" dirty="0" smtClean="0"/>
-              <a:t>Abstractions</a:t>
+              <a:t>Introduction: Understanding Distributed Abstractions</a:t>
             </a:r>
           </a:p>
           <a:p>
@@ -8339,16 +8749,11 @@
               <a:rPr lang="en-US" dirty="0" smtClean="0"/>
               <a:t>Introduce IDEAS as minimal set of DA Design Objective</a:t>
             </a:r>
-            <a:endParaRPr lang="en-US" dirty="0" smtClean="0"/>
           </a:p>
           <a:p>
             <a:r>
               <a:rPr lang="en-US" dirty="0" smtClean="0"/>
-              <a:t>SAGA, Pilot</a:t>
-            </a:r>
-            <a:r>
-              <a:rPr lang="en-US" dirty="0" smtClean="0"/>
-              <a:t>-Jobs and SAGA </a:t>
+              <a:t>SAGA, Pilot-Jobs and SAGA </a:t>
             </a:r>
             <a:r>
               <a:rPr lang="en-US" dirty="0" err="1" smtClean="0"/>
@@ -8401,7 +8806,6 @@
               <a:rPr lang="en-US" dirty="0" smtClean="0"/>
               <a:t> replica-exchange) using bio-molecular simulations for range of biophysical and personalized medicine</a:t>
             </a:r>
-            <a:endParaRPr lang="en-US" dirty="0" smtClean="0"/>
           </a:p>
           <a:p>
             <a:r>
@@ -8410,11 +8814,7 @@
             </a:r>
             <a:r>
               <a:rPr lang="en-US" dirty="0" smtClean="0"/>
-              <a:t> on Azure: Architecture, </a:t>
-            </a:r>
-            <a:r>
-              <a:rPr lang="en-US" dirty="0" smtClean="0"/>
-              <a:t>Performance and Scalability</a:t>
+              <a:t> on Azure: Architecture, Performance and Scalability</a:t>
             </a:r>
           </a:p>
           <a:p>
@@ -8447,6 +8847,187 @@
 </file>
 
 <file path=ppt/slides/slide3.xml><?xml version="1.0" encoding="utf-8"?>
+<p:sld xmlns:a="http://schemas.openxmlformats.org/drawingml/2006/main" xmlns:r="http://schemas.openxmlformats.org/officeDocument/2006/relationships" xmlns:mc="http://schemas.openxmlformats.org/markup-compatibility/2006" xmlns:mv="urn:schemas-microsoft-com:mac:vml" xmlns:p="http://schemas.openxmlformats.org/presentationml/2006/main" mc:Ignorable="mv" mc:PreserveAttributes="mv:*">
+  <p:cSld>
+    <p:spTree>
+      <p:nvGrpSpPr>
+        <p:cNvPr id="1" name=""/>
+        <p:cNvGrpSpPr/>
+        <p:nvPr/>
+      </p:nvGrpSpPr>
+      <p:grpSpPr>
+        <a:xfrm>
+          <a:off x="0" y="0"/>
+          <a:ext cx="0" cy="0"/>
+          <a:chOff x="0" y="0"/>
+          <a:chExt cx="0" cy="0"/>
+        </a:xfrm>
+      </p:grpSpPr>
+      <p:sp>
+        <p:nvSpPr>
+          <p:cNvPr id="2" name="Title 1"/>
+          <p:cNvSpPr>
+            <a:spLocks noGrp="1"/>
+          </p:cNvSpPr>
+          <p:nvPr>
+            <p:ph type="title"/>
+          </p:nvPr>
+        </p:nvSpPr>
+        <p:spPr/>
+        <p:txBody>
+          <a:bodyPr>
+            <a:normAutofit/>
+          </a:bodyPr>
+          <a:lstStyle/>
+          <a:p>
+            <a:r>
+              <a:rPr lang="en-US" sz="2600" dirty="0" smtClean="0"/>
+              <a:t>DPA: Primary Observations</a:t>
+            </a:r>
+            <a:endParaRPr lang="en-US" sz="2600" dirty="0"/>
+          </a:p>
+        </p:txBody>
+      </p:sp>
+      <p:sp>
+        <p:nvSpPr>
+          <p:cNvPr id="3" name="Content Placeholder 2"/>
+          <p:cNvSpPr>
+            <a:spLocks noGrp="1"/>
+          </p:cNvSpPr>
+          <p:nvPr>
+            <p:ph idx="1"/>
+          </p:nvPr>
+        </p:nvSpPr>
+        <p:spPr>
+          <a:xfrm>
+            <a:off x="757946" y="1529880"/>
+            <a:ext cx="8195553" cy="5163020"/>
+          </a:xfrm>
+        </p:spPr>
+        <p:txBody>
+          <a:bodyPr>
+            <a:noAutofit/>
+          </a:bodyPr>
+          <a:lstStyle/>
+          <a:p>
+            <a:r>
+              <a:rPr lang="en-US" sz="1700" dirty="0" smtClean="0"/>
+              <a:t>Is large (and rich), but the number of effective and extensible DA small</a:t>
+            </a:r>
+          </a:p>
+          <a:p>
+            <a:pPr lvl="1"/>
+            <a:r>
+              <a:rPr lang="en-US" sz="1700" dirty="0" smtClean="0"/>
+              <a:t>More than just submitting jobs here and there!</a:t>
+            </a:r>
+          </a:p>
+          <a:p>
+            <a:r>
+              <a:rPr lang="en-US" sz="1700" dirty="0" smtClean="0"/>
+              <a:t>Developing DA is a hard undertaking</a:t>
+            </a:r>
+          </a:p>
+          <a:p>
+            <a:pPr lvl="1"/>
+            <a:r>
+              <a:rPr lang="en-US" sz="1700" dirty="0" smtClean="0"/>
+              <a:t>Intrinsic and Extrinsic Factors</a:t>
+            </a:r>
+          </a:p>
+          <a:p>
+            <a:pPr lvl="1"/>
+            <a:r>
+              <a:rPr lang="en-US" sz="1700" dirty="0" smtClean="0"/>
+              <a:t>Unique role of the Execution Environment (Infrastructure)</a:t>
+            </a:r>
+          </a:p>
+          <a:p>
+            <a:r>
+              <a:rPr lang="en-US" sz="1700" dirty="0" smtClean="0"/>
+              <a:t>Embrace “</a:t>
+            </a:r>
+            <a:r>
+              <a:rPr lang="en-US" sz="1700" dirty="0" err="1" smtClean="0"/>
+              <a:t>distributedness</a:t>
+            </a:r>
+            <a:r>
+              <a:rPr lang="en-US" sz="1700" dirty="0" smtClean="0"/>
+              <a:t>”</a:t>
+            </a:r>
+          </a:p>
+          <a:p>
+            <a:pPr lvl="1"/>
+            <a:r>
+              <a:rPr lang="en-US" sz="1700" dirty="0" smtClean="0"/>
+              <a:t>Understanding </a:t>
+            </a:r>
+            <a:r>
+              <a:rPr lang="en-US" sz="1700" dirty="0" err="1" smtClean="0"/>
+              <a:t>distributedness</a:t>
+            </a:r>
+            <a:r>
+              <a:rPr lang="en-US" sz="1700" dirty="0" smtClean="0"/>
+              <a:t>,  heterogeneity &amp; dynamic execution is fundamental (e.g., </a:t>
+            </a:r>
+            <a:r>
+              <a:rPr lang="en-US" sz="1700" dirty="0" err="1" smtClean="0"/>
+              <a:t>Exascale</a:t>
+            </a:r>
+            <a:r>
+              <a:rPr lang="en-US" sz="1700" dirty="0" smtClean="0"/>
+              <a:t> logically distributed </a:t>
+            </a:r>
+            <a:r>
+              <a:rPr lang="en-US" sz="1700" dirty="0" err="1" smtClean="0"/>
+              <a:t>prog</a:t>
+            </a:r>
+            <a:r>
+              <a:rPr lang="en-US" sz="1700" dirty="0" smtClean="0"/>
+              <a:t>. Models)</a:t>
+            </a:r>
+          </a:p>
+          <a:p>
+            <a:pPr lvl="1"/>
+            <a:r>
+              <a:rPr lang="en-US" sz="1700" dirty="0" smtClean="0"/>
+              <a:t>Data-centric application will be the drivers!</a:t>
+            </a:r>
+          </a:p>
+          <a:p>
+            <a:r>
+              <a:rPr lang="en-US" sz="1700" dirty="0" smtClean="0"/>
+              <a:t>Role for Pattern-oriented and Abstractions-based Development</a:t>
+            </a:r>
+            <a:endParaRPr lang="en-US" sz="1500" dirty="0" smtClean="0"/>
+          </a:p>
+          <a:p>
+            <a:r>
+              <a:rPr lang="en-US" sz="1700" dirty="0" smtClean="0"/>
+              <a:t>Autonomic approaches  required to manage complexity and dynamism</a:t>
+            </a:r>
+          </a:p>
+          <a:p>
+            <a:endParaRPr lang="en-US" sz="1700" dirty="0" smtClean="0"/>
+          </a:p>
+        </p:txBody>
+      </p:sp>
+    </p:spTree>
+  </p:cSld>
+  <p:clrMapOvr>
+    <a:masterClrMapping/>
+  </p:clrMapOvr>
+  <p:timing>
+    <p:tnLst>
+      <p:par>
+        <p:cTn id="1" dur="indefinite" restart="never" nodeType="tmRoot"/>
+      </p:par>
+    </p:tnLst>
+  </p:timing>
+</p:sld>
+</file>
+
+<file path=ppt/slides/slide4.xml><?xml version="1.0" encoding="utf-8"?>
 <p:sld xmlns:a="http://schemas.openxmlformats.org/drawingml/2006/main" xmlns:r="http://schemas.openxmlformats.org/officeDocument/2006/relationships" xmlns:mc="http://schemas.openxmlformats.org/markup-compatibility/2006" xmlns:mv="urn:schemas-microsoft-com:mac:vml" xmlns:p="http://schemas.openxmlformats.org/presentationml/2006/main" mc:Ignorable="mv" mc:PreserveAttributes="mv:*">
   <p:cSld>
     <p:spTree>
@@ -8551,11 +9132,7 @@
           <a:p>
             <a:r>
               <a:rPr lang="en-US" sz="2100" dirty="0" smtClean="0"/>
-              <a:t>Assertion </a:t>
-            </a:r>
-            <a:r>
-              <a:rPr lang="en-US" sz="2100" dirty="0" smtClean="0"/>
-              <a:t>#1: </a:t>
+              <a:t>Assertion #1: </a:t>
             </a:r>
             <a:r>
               <a:rPr lang="de-DE" sz="2400" dirty="0" err="1" smtClean="0"/>
@@ -8680,7 +9257,7 @@
 </p:sld>
 </file>
 
-<file path=ppt/slides/slide4.xml><?xml version="1.0" encoding="utf-8"?>
+<file path=ppt/slides/slide5.xml><?xml version="1.0" encoding="utf-8"?>
 <p:sld xmlns:a="http://schemas.openxmlformats.org/drawingml/2006/main" xmlns:r="http://schemas.openxmlformats.org/officeDocument/2006/relationships" xmlns:mc="http://schemas.openxmlformats.org/markup-compatibility/2006" xmlns:mv="urn:schemas-microsoft-com:mac:vml" xmlns:p="http://schemas.openxmlformats.org/presentationml/2006/main" mc:Ignorable="mv" mc:PreserveAttributes="mv:*">
   <p:cSld>
     <p:spTree>
@@ -8930,7 +9507,7 @@
 </p:sld>
 </file>
 
-<file path=ppt/slides/slide5.xml><?xml version="1.0" encoding="utf-8"?>
+<file path=ppt/slides/slide6.xml><?xml version="1.0" encoding="utf-8"?>
 <p:sld xmlns:a="http://schemas.openxmlformats.org/drawingml/2006/main" xmlns:r="http://schemas.openxmlformats.org/officeDocument/2006/relationships" xmlns:mc="http://schemas.openxmlformats.org/markup-compatibility/2006" xmlns:mv="urn:schemas-microsoft-com:mac:vml" xmlns:p="http://schemas.openxmlformats.org/presentationml/2006/main" mc:Ignorable="mv" mc:PreserveAttributes="mv:*">
   <p:cSld>
     <p:spTree>
@@ -9152,7 +9729,7 @@
 </p:sld>
 </file>
 
-<file path=ppt/slides/slide6.xml><?xml version="1.0" encoding="utf-8"?>
+<file path=ppt/slides/slide7.xml><?xml version="1.0" encoding="utf-8"?>
 <p:sld xmlns:a="http://schemas.openxmlformats.org/drawingml/2006/main" xmlns:r="http://schemas.openxmlformats.org/officeDocument/2006/relationships" xmlns:mc="http://schemas.openxmlformats.org/markup-compatibility/2006" xmlns:mv="urn:schemas-microsoft-com:mac:vml" xmlns:p="http://schemas.openxmlformats.org/presentationml/2006/main" mc:Ignorable="mv" mc:PreserveAttributes="mv:*">
   <p:cSld>
     <p:spTree>
@@ -9336,7 +9913,7 @@
 </p:sld>
 </file>
 
-<file path=ppt/slides/slide7.xml><?xml version="1.0" encoding="utf-8"?>
+<file path=ppt/slides/slide8.xml><?xml version="1.0" encoding="utf-8"?>
 <p:sld xmlns:a="http://schemas.openxmlformats.org/drawingml/2006/main" xmlns:r="http://schemas.openxmlformats.org/officeDocument/2006/relationships" xmlns:mc="http://schemas.openxmlformats.org/markup-compatibility/2006" xmlns:mv="urn:schemas-microsoft-com:mac:vml" xmlns:p="http://schemas.openxmlformats.org/presentationml/2006/main" mc:Ignorable="mv" mc:PreserveAttributes="mv:*">
   <p:cSld>
     <p:spTree>
@@ -9491,11 +10068,7 @@
             <a:pPr lvl="2"/>
             <a:r>
               <a:rPr lang="en-US" dirty="0" smtClean="0"/>
-              <a:t>Develop, </a:t>
-            </a:r>
-            <a:r>
-              <a:rPr lang="en-US" dirty="0" smtClean="0"/>
-              <a:t>Deploy &amp; Exec Phase</a:t>
+              <a:t>Develop, Deploy &amp; Exec Phase</a:t>
             </a:r>
           </a:p>
           <a:p>
@@ -9572,7 +10145,7 @@
 </p:sld>
 </file>
 
-<file path=ppt/slides/slide8.xml><?xml version="1.0" encoding="utf-8"?>
+<file path=ppt/slides/slide9.xml><?xml version="1.0" encoding="utf-8"?>
 <p:sld xmlns:a="http://schemas.openxmlformats.org/drawingml/2006/main" xmlns:r="http://schemas.openxmlformats.org/officeDocument/2006/relationships" xmlns:mc="http://schemas.openxmlformats.org/markup-compatibility/2006" xmlns:mv="urn:schemas-microsoft-com:mac:vml" xmlns:p="http://schemas.openxmlformats.org/presentationml/2006/main" mc:Ignorable="mv" mc:PreserveAttributes="mv:*">
   <p:cSld>
     <p:spTree>
@@ -9728,11 +10301,7 @@
             </a:r>
             <a:r>
               <a:rPr lang="en-US" sz="1700" dirty="0" smtClean="0"/>
-              <a:t> </a:t>
-            </a:r>
-            <a:r>
-              <a:rPr lang="en-US" sz="1700" dirty="0" smtClean="0"/>
-              <a:t>@HOME, consensus)</a:t>
+              <a:t> @HOME, consensus)</a:t>
             </a:r>
           </a:p>
           <a:p>
@@ -9775,7 +10344,7 @@
           <p:nvPr/>
         </p:nvPicPr>
         <p:blipFill>
-          <a:blip r:embed="rId2"/>
+          <a:blip r:embed="rId3"/>
           <a:stretch>
             <a:fillRect/>
           </a:stretch>
@@ -9799,7 +10368,7 @@
           <p:nvPr/>
         </p:nvPicPr>
         <p:blipFill>
-          <a:blip r:embed="rId3"/>
+          <a:blip r:embed="rId4"/>
           <a:stretch>
             <a:fillRect/>
           </a:stretch>
@@ -9814,387 +10383,6 @@
           </a:prstGeom>
         </p:spPr>
       </p:pic>
-    </p:spTree>
-  </p:cSld>
-  <p:clrMapOvr>
-    <a:masterClrMapping/>
-  </p:clrMapOvr>
-  <p:transition/>
-  <p:timing>
-    <p:tnLst>
-      <p:par>
-        <p:cTn id="1" dur="indefinite" restart="never" nodeType="tmRoot"/>
-      </p:par>
-    </p:tnLst>
-  </p:timing>
-</p:sld>
-</file>
-
-<file path=ppt/slides/slide9.xml><?xml version="1.0" encoding="utf-8"?>
-<p:sld xmlns:a="http://schemas.openxmlformats.org/drawingml/2006/main" xmlns:r="http://schemas.openxmlformats.org/officeDocument/2006/relationships" xmlns:mc="http://schemas.openxmlformats.org/markup-compatibility/2006" xmlns:mv="urn:schemas-microsoft-com:mac:vml" xmlns:p="http://schemas.openxmlformats.org/presentationml/2006/main" mc:Ignorable="mv" mc:PreserveAttributes="mv:*">
-  <p:cSld>
-    <p:spTree>
-      <p:nvGrpSpPr>
-        <p:cNvPr id="1" name=""/>
-        <p:cNvGrpSpPr/>
-        <p:nvPr/>
-      </p:nvGrpSpPr>
-      <p:grpSpPr>
-        <a:xfrm>
-          <a:off x="0" y="0"/>
-          <a:ext cx="0" cy="0"/>
-          <a:chOff x="0" y="0"/>
-          <a:chExt cx="0" cy="0"/>
-        </a:xfrm>
-      </p:grpSpPr>
-      <p:sp>
-        <p:nvSpPr>
-          <p:cNvPr id="20483" name="Rectangle 4"/>
-          <p:cNvSpPr>
-            <a:spLocks/>
-          </p:cNvSpPr>
-          <p:nvPr/>
-        </p:nvSpPr>
-        <p:spPr bwMode="auto">
-          <a:xfrm>
-            <a:off x="1447800" y="171450"/>
-            <a:ext cx="7162800" cy="647700"/>
-          </a:xfrm>
-          <a:prstGeom prst="rect">
-            <a:avLst/>
-          </a:prstGeom>
-          <a:noFill/>
-          <a:ln w="12700">
-            <a:noFill/>
-            <a:miter lim="800000"/>
-            <a:headEnd/>
-            <a:tailEnd/>
-          </a:ln>
-        </p:spPr>
-        <p:txBody>
-          <a:bodyPr lIns="0" tIns="0" rIns="0" bIns="0" anchor="ctr">
-            <a:prstTxWarp prst="textNoShape">
-              <a:avLst/>
-            </a:prstTxWarp>
-          </a:bodyPr>
-          <a:lstStyle/>
-          <a:p>
-            <a:pPr>
-              <a:lnSpc>
-                <a:spcPct val="100000"/>
-              </a:lnSpc>
-              <a:tabLst>
-                <a:tab pos="457200" algn="l"/>
-                <a:tab pos="914400" algn="l"/>
-                <a:tab pos="1371600" algn="l"/>
-                <a:tab pos="1828800" algn="l"/>
-                <a:tab pos="2286000" algn="l"/>
-                <a:tab pos="2743200" algn="l"/>
-                <a:tab pos="3200400" algn="l"/>
-                <a:tab pos="3657600" algn="l"/>
-                <a:tab pos="4114800" algn="l"/>
-                <a:tab pos="4572000" algn="l"/>
-                <a:tab pos="5029200" algn="l"/>
-                <a:tab pos="5486400" algn="l"/>
-                <a:tab pos="5943600" algn="l"/>
-                <a:tab pos="6400800" algn="l"/>
-                <a:tab pos="6858000" algn="l"/>
-                <a:tab pos="7315200" algn="l"/>
-                <a:tab pos="7772400" algn="l"/>
-                <a:tab pos="8229600" algn="l"/>
-                <a:tab pos="8686800" algn="l"/>
-                <a:tab pos="9144000" algn="l"/>
-              </a:tabLst>
-            </a:pPr>
-            <a:endParaRPr lang="en-US" sz="2800">
-              <a:solidFill>
-                <a:srgbClr val="000080"/>
-              </a:solidFill>
-              <a:ea typeface="Arial" charset="0"/>
-              <a:cs typeface="Arial" charset="0"/>
-            </a:endParaRPr>
-          </a:p>
-        </p:txBody>
-      </p:sp>
-      <p:sp>
-        <p:nvSpPr>
-          <p:cNvPr id="20485" name="Title 5"/>
-          <p:cNvSpPr>
-            <a:spLocks noGrp="1"/>
-          </p:cNvSpPr>
-          <p:nvPr>
-            <p:ph type="title"/>
-          </p:nvPr>
-        </p:nvSpPr>
-        <p:spPr/>
-        <p:txBody>
-          <a:bodyPr>
-            <a:normAutofit fontScale="90000"/>
-          </a:bodyPr>
-          <a:lstStyle/>
-          <a:p>
-            <a:r>
-              <a:rPr lang="en-US" sz="2600" dirty="0" smtClean="0"/>
-              <a:t>Assertion #5: Need an Autonomic Approach to managing complexity and dynamism</a:t>
-            </a:r>
-          </a:p>
-        </p:txBody>
-      </p:sp>
-      <p:sp>
-        <p:nvSpPr>
-          <p:cNvPr id="16" name="Content Placeholder 15"/>
-          <p:cNvSpPr>
-            <a:spLocks noGrp="1"/>
-          </p:cNvSpPr>
-          <p:nvPr>
-            <p:ph sz="half" idx="1"/>
-          </p:nvPr>
-        </p:nvSpPr>
-        <p:spPr>
-          <a:xfrm>
-            <a:off x="355600" y="1219200"/>
-            <a:ext cx="8597900" cy="5016500"/>
-          </a:xfrm>
-        </p:spPr>
-        <p:txBody>
-          <a:bodyPr>
-            <a:noAutofit/>
-          </a:bodyPr>
-          <a:lstStyle/>
-          <a:p>
-            <a:r>
-              <a:rPr lang="en-US" sz="1700" dirty="0" smtClean="0"/>
-              <a:t>Challenges in Distributed Applications:</a:t>
-            </a:r>
-          </a:p>
-          <a:p>
-            <a:pPr lvl="1"/>
-            <a:r>
-              <a:rPr lang="en-US" sz="1700" dirty="0" smtClean="0"/>
-              <a:t>Complexity: </a:t>
-            </a:r>
-            <a:r>
-              <a:rPr lang="en-US" sz="1700" dirty="0" smtClean="0">
-                <a:solidFill>
-                  <a:schemeClr val="tx1">
-                    <a:lumMod val="65000"/>
-                    <a:lumOff val="35000"/>
-                  </a:schemeClr>
-                </a:solidFill>
-              </a:rPr>
-              <a:t>Multiple-levels, External Dependency, Varying control </a:t>
-            </a:r>
-          </a:p>
-          <a:p>
-            <a:pPr lvl="1"/>
-            <a:r>
-              <a:rPr lang="en-US" sz="1700" dirty="0" smtClean="0"/>
-              <a:t>Dynamism:   </a:t>
-            </a:r>
-            <a:r>
-              <a:rPr lang="en-US" sz="1700" dirty="0" smtClean="0">
-                <a:solidFill>
-                  <a:schemeClr val="tx1">
-                    <a:lumMod val="65000"/>
-                    <a:lumOff val="35000"/>
-                  </a:schemeClr>
-                </a:solidFill>
-              </a:rPr>
-              <a:t>Changing resource availability and requirements</a:t>
-            </a:r>
-          </a:p>
-          <a:p>
-            <a:r>
-              <a:rPr lang="en-US" sz="1700" dirty="0" smtClean="0"/>
-              <a:t>Posit that Autonomic Approaches can help address two challenges</a:t>
-            </a:r>
-          </a:p>
-          <a:p>
-            <a:pPr lvl="1"/>
-            <a:r>
-              <a:rPr lang="en-US" sz="1700" dirty="0" smtClean="0"/>
-              <a:t> Provide formulations that hide complexity &amp; support dynamism</a:t>
-            </a:r>
-          </a:p>
-          <a:p>
-            <a:pPr lvl="2"/>
-            <a:r>
-              <a:rPr lang="en-US" sz="1700" dirty="0" smtClean="0"/>
-              <a:t>Programming the Infrastructure “</a:t>
-            </a:r>
-            <a:r>
-              <a:rPr lang="en-US" sz="1700" dirty="0" err="1" smtClean="0"/>
-              <a:t>autonomically</a:t>
-            </a:r>
-            <a:r>
-              <a:rPr lang="en-US" sz="1700" dirty="0" smtClean="0"/>
-              <a:t>”</a:t>
-            </a:r>
-          </a:p>
-          <a:p>
-            <a:pPr lvl="3"/>
-            <a:endParaRPr lang="en-US" sz="1700" dirty="0" smtClean="0"/>
-          </a:p>
-          <a:p>
-            <a:pPr lvl="2">
-              <a:buNone/>
-            </a:pPr>
-            <a:r>
-              <a:rPr lang="en-US" sz="1700" dirty="0" smtClean="0"/>
-              <a:t>	</a:t>
-            </a:r>
-          </a:p>
-          <a:p>
-            <a:endParaRPr lang="en-US" sz="1700" dirty="0" smtClean="0"/>
-          </a:p>
-          <a:p>
-            <a:pPr lvl="1"/>
-            <a:endParaRPr lang="en-US" sz="1700" dirty="0" smtClean="0"/>
-          </a:p>
-          <a:p>
-            <a:pPr lvl="1"/>
-            <a:endParaRPr lang="en-US" sz="1700" dirty="0" smtClean="0"/>
-          </a:p>
-          <a:p>
-            <a:pPr lvl="1"/>
-            <a:endParaRPr lang="en-US" sz="1700" dirty="0" smtClean="0"/>
-          </a:p>
-        </p:txBody>
-      </p:sp>
-      <p:pic>
-        <p:nvPicPr>
-          <p:cNvPr id="5" name="Picture 4" descr="proposed_f3.jpg"/>
-          <p:cNvPicPr>
-            <a:picLocks noChangeAspect="1"/>
-          </p:cNvPicPr>
-          <p:nvPr/>
-        </p:nvPicPr>
-        <p:blipFill>
-          <a:blip r:embed="rId2"/>
-          <a:stretch>
-            <a:fillRect/>
-          </a:stretch>
-        </p:blipFill>
-        <p:spPr>
-          <a:xfrm>
-            <a:off x="5515278" y="4688681"/>
-            <a:ext cx="3628722" cy="1976438"/>
-          </a:xfrm>
-          <a:prstGeom prst="rect">
-            <a:avLst/>
-          </a:prstGeom>
-        </p:spPr>
-      </p:pic>
-      <p:sp>
-        <p:nvSpPr>
-          <p:cNvPr id="6" name="Content Placeholder 15"/>
-          <p:cNvSpPr>
-            <a:spLocks noGrp="1"/>
-          </p:cNvSpPr>
-          <p:nvPr>
-            <p:ph sz="half" idx="1"/>
-          </p:nvPr>
-        </p:nvSpPr>
-        <p:spPr>
-          <a:xfrm>
-            <a:off x="355600" y="3505200"/>
-            <a:ext cx="6807200" cy="2743200"/>
-          </a:xfrm>
-        </p:spPr>
-        <p:txBody>
-          <a:bodyPr>
-            <a:noAutofit/>
-          </a:bodyPr>
-          <a:lstStyle/>
-          <a:p>
-            <a:r>
-              <a:rPr lang="en-US" sz="1700" dirty="0" smtClean="0"/>
-              <a:t>Objective: Intelligence in Compute-Data placement</a:t>
-            </a:r>
-          </a:p>
-          <a:p>
-            <a:pPr lvl="1"/>
-            <a:r>
-              <a:rPr lang="en-US" sz="1700" dirty="0" smtClean="0"/>
-              <a:t>Sophisticated models of data-compute co-movement</a:t>
-            </a:r>
-          </a:p>
-          <a:p>
-            <a:pPr lvl="2"/>
-            <a:r>
-              <a:rPr lang="en-US" sz="1700" dirty="0" smtClean="0"/>
-              <a:t>Tier 0 data at BNL; all compute migrated to Tier 0 </a:t>
-            </a:r>
-          </a:p>
-          <a:p>
-            <a:r>
-              <a:rPr lang="en-US" dirty="0" smtClean="0"/>
-              <a:t>For an objective, which strategy? </a:t>
-            </a:r>
-            <a:endParaRPr lang="en-US" sz="1700" dirty="0" smtClean="0"/>
-          </a:p>
-          <a:p>
-            <a:pPr lvl="1"/>
-            <a:r>
-              <a:rPr lang="en-US" dirty="0" smtClean="0"/>
-              <a:t>S1: Assignment of workers  determined by min </a:t>
-            </a:r>
-            <a:r>
-              <a:rPr lang="en-US" dirty="0" err="1" smtClean="0"/>
-              <a:t>T</a:t>
-            </a:r>
-            <a:r>
-              <a:rPr lang="en-US" baseline="-25000" dirty="0" err="1" smtClean="0"/>
-              <a:t>r</a:t>
-            </a:r>
-            <a:endParaRPr lang="en-US" baseline="-25000" dirty="0" smtClean="0"/>
-          </a:p>
-          <a:p>
-            <a:pPr lvl="1"/>
-            <a:r>
-              <a:rPr lang="en-US" dirty="0" smtClean="0"/>
-              <a:t>S2: Assignment of workers, by min data transfer</a:t>
-            </a:r>
-          </a:p>
-          <a:p>
-            <a:pPr lvl="1"/>
-            <a:r>
-              <a:rPr lang="en-US" dirty="0" smtClean="0"/>
-              <a:t>S3: Upon tracked dependencies</a:t>
-            </a:r>
-          </a:p>
-          <a:p>
-            <a:r>
-              <a:rPr lang="en-US" dirty="0" smtClean="0"/>
-              <a:t>Each S</a:t>
-            </a:r>
-            <a:r>
-              <a:rPr lang="en-US" sz="1600" dirty="0" smtClean="0"/>
-              <a:t>N</a:t>
-            </a:r>
-            <a:r>
-              <a:rPr lang="en-US" dirty="0" smtClean="0"/>
-              <a:t>: Could have different mechanism</a:t>
-            </a:r>
-            <a:endParaRPr lang="en-US" sz="2000" dirty="0" smtClean="0"/>
-          </a:p>
-          <a:p>
-            <a:pPr lvl="1"/>
-            <a:endParaRPr lang="en-US" dirty="0" smtClean="0"/>
-          </a:p>
-          <a:p>
-            <a:pPr lvl="1"/>
-            <a:endParaRPr lang="en-US" dirty="0" smtClean="0"/>
-          </a:p>
-          <a:p>
-            <a:pPr lvl="1"/>
-            <a:endParaRPr lang="en-US" baseline="-25000" dirty="0" smtClean="0"/>
-          </a:p>
-          <a:p>
-            <a:endParaRPr lang="en-US" sz="1700" dirty="0" smtClean="0"/>
-          </a:p>
-        </p:txBody>
-      </p:sp>
     </p:spTree>
   </p:cSld>
   <p:clrMapOvr>

</xml_diff>

<commit_message>
added one performance and pilot store slide
git-svn-id: file://localhost/tmp/svn2git/svn@3292 defb5e50-622e-49ec-a68e-d72c7db87b45
</commit_message>
<xml_diff>
--- a/papers/cloudcom10/presentation/saga-azure-cloudcom10.pptx
+++ b/papers/cloudcom10/presentation/saga-azure-cloudcom10.pptx
@@ -5,7 +5,7 @@
     <p:sldMasterId id="2147483660" r:id="rId1"/>
   </p:sldMasterIdLst>
   <p:notesMasterIdLst>
-    <p:notesMasterId r:id="rId21"/>
+    <p:notesMasterId r:id="rId23"/>
   </p:notesMasterIdLst>
   <p:sldIdLst>
     <p:sldId id="256" r:id="rId2"/>
@@ -26,7 +26,9 @@
     <p:sldId id="744" r:id="rId17"/>
     <p:sldId id="688" r:id="rId18"/>
     <p:sldId id="693" r:id="rId19"/>
-    <p:sldId id="745" r:id="rId20"/>
+    <p:sldId id="748" r:id="rId20"/>
+    <p:sldId id="745" r:id="rId21"/>
+    <p:sldId id="749" r:id="rId22"/>
   </p:sldIdLst>
   <p:sldSz cx="9144000" cy="6858000" type="screen4x3"/>
   <p:notesSz cx="6858000" cy="9144000"/>
@@ -211,7 +213,7 @@
             <a:fld id="{8E161E8F-4E15-A840-9658-105F9DD3DE22}" type="datetimeFigureOut">
               <a:rPr lang="en-US" smtClean="0"/>
               <a:pPr/>
-              <a:t>11/28/10</a:t>
+              <a:t>30.11.2010</a:t>
             </a:fld>
             <a:endParaRPr lang="en-US"/>
           </a:p>
@@ -373,7 +375,7 @@
             <a:fld id="{D344DA2A-F2F4-D74A-8AEC-1933B33E97E0}" type="slidenum">
               <a:rPr lang="en-US" smtClean="0"/>
               <a:pPr/>
-              <a:t>‹#›</a:t>
+              <a:t>‹Nr.›</a:t>
             </a:fld>
             <a:endParaRPr lang="en-US"/>
           </a:p>
@@ -1061,6 +1063,3477 @@
 </p:notes>
 </file>
 
+<file path=ppt/notesSlides/notesSlide7.xml><?xml version="1.0" encoding="utf-8"?>
+<p:notes xmlns:a="http://schemas.openxmlformats.org/drawingml/2006/main" xmlns:r="http://schemas.openxmlformats.org/officeDocument/2006/relationships" xmlns:mc="http://schemas.openxmlformats.org/markup-compatibility/2006" xmlns:mv="urn:schemas-microsoft-com:mac:vml" xmlns:p="http://schemas.openxmlformats.org/presentationml/2006/main" mc:Ignorable="mv" mc:PreserveAttributes="mv:*">
+  <p:cSld>
+    <p:spTree>
+      <p:nvGrpSpPr>
+        <p:cNvPr id="1" name=""/>
+        <p:cNvGrpSpPr/>
+        <p:nvPr/>
+      </p:nvGrpSpPr>
+      <p:grpSpPr>
+        <a:xfrm>
+          <a:off x="0" y="0"/>
+          <a:ext cx="0" cy="0"/>
+          <a:chOff x="0" y="0"/>
+          <a:chExt cx="0" cy="0"/>
+        </a:xfrm>
+      </p:grpSpPr>
+      <p:sp>
+        <p:nvSpPr>
+          <p:cNvPr id="2" name="Folienbildplatzhalter 1"/>
+          <p:cNvSpPr>
+            <a:spLocks noGrp="1" noRot="1" noChangeAspect="1"/>
+          </p:cNvSpPr>
+          <p:nvPr>
+            <p:ph type="sldImg"/>
+          </p:nvPr>
+        </p:nvSpPr>
+        <p:spPr/>
+      </p:sp>
+      <p:sp>
+        <p:nvSpPr>
+          <p:cNvPr id="3" name="Notizenplatzhalter 2"/>
+          <p:cNvSpPr>
+            <a:spLocks noGrp="1"/>
+          </p:cNvSpPr>
+          <p:nvPr>
+            <p:ph type="body" idx="1"/>
+          </p:nvPr>
+        </p:nvSpPr>
+        <p:spPr/>
+        <p:txBody>
+          <a:bodyPr>
+            <a:normAutofit/>
+          </a:bodyPr>
+          <a:lstStyle/>
+          <a:p>
+            <a:endParaRPr lang="de-DE" dirty="0"/>
+          </a:p>
+        </p:txBody>
+      </p:sp>
+      <p:sp>
+        <p:nvSpPr>
+          <p:cNvPr id="4" name="Foliennummernplatzhalter 3"/>
+          <p:cNvSpPr>
+            <a:spLocks noGrp="1"/>
+          </p:cNvSpPr>
+          <p:nvPr>
+            <p:ph type="sldNum" sz="quarter" idx="10"/>
+          </p:nvPr>
+        </p:nvSpPr>
+        <p:spPr/>
+        <p:txBody>
+          <a:bodyPr/>
+          <a:lstStyle/>
+          <a:p>
+            <a:fld id="{D344DA2A-F2F4-D74A-8AEC-1933B33E97E0}" type="slidenum">
+              <a:rPr lang="en-US" smtClean="0"/>
+              <a:pPr/>
+              <a:t>18</a:t>
+            </a:fld>
+            <a:endParaRPr lang="en-US"/>
+          </a:p>
+        </p:txBody>
+      </p:sp>
+    </p:spTree>
+  </p:cSld>
+  <p:clrMapOvr>
+    <a:masterClrMapping/>
+  </p:clrMapOvr>
+</p:notes>
+</file>
+
+<file path=ppt/notesSlides/notesSlide8.xml><?xml version="1.0" encoding="utf-8"?>
+<p:notes xmlns:a="http://schemas.openxmlformats.org/drawingml/2006/main" xmlns:r="http://schemas.openxmlformats.org/officeDocument/2006/relationships" xmlns:mc="http://schemas.openxmlformats.org/markup-compatibility/2006" xmlns:mv="urn:schemas-microsoft-com:mac:vml" xmlns:p="http://schemas.openxmlformats.org/presentationml/2006/main" mc:Ignorable="mv" mc:PreserveAttributes="mv:*">
+  <p:cSld>
+    <p:spTree>
+      <p:nvGrpSpPr>
+        <p:cNvPr id="1" name=""/>
+        <p:cNvGrpSpPr/>
+        <p:nvPr/>
+      </p:nvGrpSpPr>
+      <p:grpSpPr>
+        <a:xfrm>
+          <a:off x="0" y="0"/>
+          <a:ext cx="0" cy="0"/>
+          <a:chOff x="0" y="0"/>
+          <a:chExt cx="0" cy="0"/>
+        </a:xfrm>
+      </p:grpSpPr>
+      <p:sp>
+        <p:nvSpPr>
+          <p:cNvPr id="2" name="Folienbildplatzhalter 1"/>
+          <p:cNvSpPr>
+            <a:spLocks noGrp="1" noRot="1" noChangeAspect="1"/>
+          </p:cNvSpPr>
+          <p:nvPr>
+            <p:ph type="sldImg"/>
+          </p:nvPr>
+        </p:nvSpPr>
+        <p:spPr/>
+      </p:sp>
+      <p:sp>
+        <p:nvSpPr>
+          <p:cNvPr id="3" name="Notizenplatzhalter 2"/>
+          <p:cNvSpPr>
+            <a:spLocks noGrp="1"/>
+          </p:cNvSpPr>
+          <p:nvPr>
+            <p:ph type="body" idx="1"/>
+          </p:nvPr>
+        </p:nvSpPr>
+        <p:spPr/>
+        <p:txBody>
+          <a:bodyPr>
+            <a:normAutofit/>
+          </a:bodyPr>
+          <a:lstStyle/>
+          <a:p>
+            <a:r>
+              <a:rPr lang="de-DE" sz="1200" kern="1200" dirty="0" smtClean="0">
+                <a:solidFill>
+                  <a:schemeClr val="tx1"/>
+                </a:solidFill>
+                <a:latin typeface="+mn-lt"/>
+                <a:ea typeface="+mn-ea"/>
+                <a:cs typeface="+mn-cs"/>
+              </a:rPr>
+              <a:t>(D1) Data Management: </a:t>
+            </a:r>
+            <a:r>
+              <a:rPr lang="de-DE" sz="1200" kern="1200" dirty="0" err="1" smtClean="0">
+                <a:solidFill>
+                  <a:schemeClr val="tx1"/>
+                </a:solidFill>
+                <a:latin typeface="+mn-lt"/>
+                <a:ea typeface="+mn-ea"/>
+                <a:cs typeface="+mn-cs"/>
+              </a:rPr>
+              <a:t>This</a:t>
+            </a:r>
+            <a:r>
+              <a:rPr lang="de-DE" sz="1200" kern="1200" dirty="0" smtClean="0">
+                <a:solidFill>
+                  <a:schemeClr val="tx1"/>
+                </a:solidFill>
+                <a:latin typeface="+mn-lt"/>
+                <a:ea typeface="+mn-ea"/>
+                <a:cs typeface="+mn-cs"/>
+              </a:rPr>
+              <a:t> </a:t>
+            </a:r>
+            <a:r>
+              <a:rPr lang="de-DE" sz="1200" kern="1200" dirty="0" err="1" smtClean="0">
+                <a:solidFill>
+                  <a:schemeClr val="tx1"/>
+                </a:solidFill>
+                <a:latin typeface="+mn-lt"/>
+                <a:ea typeface="+mn-ea"/>
+                <a:cs typeface="+mn-cs"/>
+              </a:rPr>
+              <a:t>concerns</a:t>
+            </a:r>
+            <a:r>
+              <a:rPr lang="de-DE" sz="1200" kern="1200" dirty="0" smtClean="0">
+                <a:solidFill>
+                  <a:schemeClr val="tx1"/>
+                </a:solidFill>
+                <a:latin typeface="+mn-lt"/>
+                <a:ea typeface="+mn-ea"/>
+                <a:cs typeface="+mn-cs"/>
+              </a:rPr>
+              <a:t> all </a:t>
+            </a:r>
+            <a:r>
+              <a:rPr lang="de-DE" sz="1200" kern="1200" dirty="0" err="1" smtClean="0">
+                <a:solidFill>
+                  <a:schemeClr val="tx1"/>
+                </a:solidFill>
+                <a:latin typeface="+mn-lt"/>
+                <a:ea typeface="+mn-ea"/>
+                <a:cs typeface="+mn-cs"/>
+              </a:rPr>
+              <a:t>aspects</a:t>
+            </a:r>
+            <a:r>
+              <a:rPr lang="de-DE" sz="1200" kern="1200" dirty="0" smtClean="0">
+                <a:solidFill>
+                  <a:schemeClr val="tx1"/>
+                </a:solidFill>
+                <a:latin typeface="+mn-lt"/>
+                <a:ea typeface="+mn-ea"/>
+                <a:cs typeface="+mn-cs"/>
+              </a:rPr>
+              <a:t> </a:t>
+            </a:r>
+            <a:r>
+              <a:rPr lang="de-DE" sz="1200" kern="1200" dirty="0" err="1" smtClean="0">
+                <a:solidFill>
+                  <a:schemeClr val="tx1"/>
+                </a:solidFill>
+                <a:latin typeface="+mn-lt"/>
+                <a:ea typeface="+mn-ea"/>
+                <a:cs typeface="+mn-cs"/>
+              </a:rPr>
+              <a:t>associtaed</a:t>
+            </a:r>
+            <a:r>
+              <a:rPr lang="de-DE" sz="1200" kern="1200" dirty="0" smtClean="0">
+                <a:solidFill>
+                  <a:schemeClr val="tx1"/>
+                </a:solidFill>
+                <a:latin typeface="+mn-lt"/>
+                <a:ea typeface="+mn-ea"/>
+                <a:cs typeface="+mn-cs"/>
+              </a:rPr>
+              <a:t> </a:t>
+            </a:r>
+            <a:r>
+              <a:rPr lang="de-DE" sz="1200" kern="1200" dirty="0" err="1" smtClean="0">
+                <a:solidFill>
+                  <a:schemeClr val="tx1"/>
+                </a:solidFill>
+                <a:latin typeface="+mn-lt"/>
+                <a:ea typeface="+mn-ea"/>
+                <a:cs typeface="+mn-cs"/>
+              </a:rPr>
+              <a:t>with</a:t>
+            </a:r>
+            <a:r>
+              <a:rPr lang="de-DE" sz="1200" kern="1200" dirty="0" smtClean="0">
+                <a:solidFill>
+                  <a:schemeClr val="tx1"/>
+                </a:solidFill>
+                <a:latin typeface="+mn-lt"/>
+                <a:ea typeface="+mn-ea"/>
+                <a:cs typeface="+mn-cs"/>
+              </a:rPr>
+              <a:t> </a:t>
+            </a:r>
+            <a:r>
+              <a:rPr lang="de-DE" sz="1200" kern="1200" dirty="0" err="1" smtClean="0">
+                <a:solidFill>
+                  <a:schemeClr val="tx1"/>
+                </a:solidFill>
+                <a:latin typeface="+mn-lt"/>
+                <a:ea typeface="+mn-ea"/>
+                <a:cs typeface="+mn-cs"/>
+              </a:rPr>
+              <a:t>the</a:t>
+            </a:r>
+            <a:r>
+              <a:rPr lang="de-DE" sz="1200" kern="1200" dirty="0" smtClean="0">
+                <a:solidFill>
+                  <a:schemeClr val="tx1"/>
+                </a:solidFill>
+                <a:latin typeface="+mn-lt"/>
+                <a:ea typeface="+mn-ea"/>
+                <a:cs typeface="+mn-cs"/>
+              </a:rPr>
+              <a:t> </a:t>
+            </a:r>
+            <a:r>
+              <a:rPr lang="de-DE" sz="1200" kern="1200" dirty="0" err="1" smtClean="0">
+                <a:solidFill>
+                  <a:schemeClr val="tx1"/>
+                </a:solidFill>
+                <a:latin typeface="+mn-lt"/>
+                <a:ea typeface="+mn-ea"/>
+                <a:cs typeface="+mn-cs"/>
+              </a:rPr>
+              <a:t>lifecycle</a:t>
+            </a:r>
+            <a:r>
+              <a:rPr lang="de-DE" sz="1200" kern="1200" dirty="0" smtClean="0">
+                <a:solidFill>
+                  <a:schemeClr val="tx1"/>
+                </a:solidFill>
+                <a:latin typeface="+mn-lt"/>
+                <a:ea typeface="+mn-ea"/>
+                <a:cs typeface="+mn-cs"/>
+              </a:rPr>
+              <a:t> </a:t>
+            </a:r>
+            <a:r>
+              <a:rPr lang="de-DE" sz="1200" kern="1200" dirty="0" err="1" smtClean="0">
+                <a:solidFill>
+                  <a:schemeClr val="tx1"/>
+                </a:solidFill>
+                <a:latin typeface="+mn-lt"/>
+                <a:ea typeface="+mn-ea"/>
+                <a:cs typeface="+mn-cs"/>
+              </a:rPr>
+              <a:t>maintenance</a:t>
+            </a:r>
+            <a:r>
+              <a:rPr lang="de-DE" sz="1200" kern="1200" dirty="0" smtClean="0">
+                <a:solidFill>
+                  <a:schemeClr val="tx1"/>
+                </a:solidFill>
+                <a:latin typeface="+mn-lt"/>
+                <a:ea typeface="+mn-ea"/>
+                <a:cs typeface="+mn-cs"/>
+              </a:rPr>
+              <a:t> of </a:t>
+            </a:r>
+            <a:r>
+              <a:rPr lang="de-DE" sz="1200" kern="1200" dirty="0" err="1" smtClean="0">
+                <a:solidFill>
+                  <a:schemeClr val="tx1"/>
+                </a:solidFill>
+                <a:latin typeface="+mn-lt"/>
+                <a:ea typeface="+mn-ea"/>
+                <a:cs typeface="+mn-cs"/>
+              </a:rPr>
+              <a:t>data</a:t>
+            </a:r>
+            <a:r>
+              <a:rPr lang="de-DE" sz="1200" kern="1200" dirty="0" smtClean="0">
+                <a:solidFill>
+                  <a:schemeClr val="tx1"/>
+                </a:solidFill>
+                <a:latin typeface="+mn-lt"/>
+                <a:ea typeface="+mn-ea"/>
+                <a:cs typeface="+mn-cs"/>
+              </a:rPr>
+              <a:t> </a:t>
+            </a:r>
+            <a:r>
+              <a:rPr lang="de-DE" sz="1200" kern="1200" dirty="0" err="1" smtClean="0">
+                <a:solidFill>
+                  <a:schemeClr val="tx1"/>
+                </a:solidFill>
+                <a:latin typeface="+mn-lt"/>
+                <a:ea typeface="+mn-ea"/>
+                <a:cs typeface="+mn-cs"/>
+              </a:rPr>
+              <a:t>including</a:t>
+            </a:r>
+            <a:r>
+              <a:rPr lang="de-DE" sz="1200" kern="1200" dirty="0" smtClean="0">
+                <a:solidFill>
+                  <a:schemeClr val="tx1"/>
+                </a:solidFill>
+                <a:latin typeface="+mn-lt"/>
+                <a:ea typeface="+mn-ea"/>
+                <a:cs typeface="+mn-cs"/>
+              </a:rPr>
+              <a:t>: </a:t>
+            </a:r>
+            <a:r>
+              <a:rPr lang="de-DE" sz="1200" kern="1200" dirty="0" err="1" smtClean="0">
+                <a:solidFill>
+                  <a:schemeClr val="tx1"/>
+                </a:solidFill>
+                <a:latin typeface="+mn-lt"/>
+                <a:ea typeface="+mn-ea"/>
+                <a:cs typeface="+mn-cs"/>
+              </a:rPr>
+              <a:t>acquisition</a:t>
+            </a:r>
+            <a:r>
+              <a:rPr lang="de-DE" sz="1200" kern="1200" dirty="0" smtClean="0">
+                <a:solidFill>
+                  <a:schemeClr val="tx1"/>
+                </a:solidFill>
+                <a:latin typeface="+mn-lt"/>
+                <a:ea typeface="+mn-ea"/>
+                <a:cs typeface="+mn-cs"/>
+              </a:rPr>
+              <a:t>, </a:t>
+            </a:r>
+            <a:r>
+              <a:rPr lang="de-DE" sz="1200" kern="1200" dirty="0" err="1" smtClean="0">
+                <a:solidFill>
+                  <a:schemeClr val="tx1"/>
+                </a:solidFill>
+                <a:latin typeface="+mn-lt"/>
+                <a:ea typeface="+mn-ea"/>
+                <a:cs typeface="+mn-cs"/>
+              </a:rPr>
+              <a:t>access</a:t>
+            </a:r>
+            <a:r>
+              <a:rPr lang="de-DE" sz="1200" kern="1200" dirty="0" smtClean="0">
+                <a:solidFill>
+                  <a:schemeClr val="tx1"/>
+                </a:solidFill>
+                <a:latin typeface="+mn-lt"/>
+                <a:ea typeface="+mn-ea"/>
+                <a:cs typeface="+mn-cs"/>
+              </a:rPr>
+              <a:t>, </a:t>
+            </a:r>
+            <a:r>
+              <a:rPr lang="de-DE" sz="1200" kern="1200" dirty="0" err="1" smtClean="0">
+                <a:solidFill>
+                  <a:schemeClr val="tx1"/>
+                </a:solidFill>
+                <a:latin typeface="+mn-lt"/>
+                <a:ea typeface="+mn-ea"/>
+                <a:cs typeface="+mn-cs"/>
+              </a:rPr>
+              <a:t>archiving</a:t>
+            </a:r>
+            <a:r>
+              <a:rPr lang="de-DE" sz="1200" kern="1200" dirty="0" smtClean="0">
+                <a:solidFill>
+                  <a:schemeClr val="tx1"/>
+                </a:solidFill>
+                <a:latin typeface="+mn-lt"/>
+                <a:ea typeface="+mn-ea"/>
+                <a:cs typeface="+mn-cs"/>
+              </a:rPr>
+              <a:t>, to </a:t>
+            </a:r>
+            <a:r>
+              <a:rPr lang="de-DE" sz="1200" kern="1200" dirty="0" err="1" smtClean="0">
+                <a:solidFill>
+                  <a:schemeClr val="tx1"/>
+                </a:solidFill>
+                <a:latin typeface="+mn-lt"/>
+                <a:ea typeface="+mn-ea"/>
+                <a:cs typeface="+mn-cs"/>
+              </a:rPr>
+              <a:t>name</a:t>
+            </a:r>
+            <a:r>
+              <a:rPr lang="de-DE" sz="1200" kern="1200" dirty="0" smtClean="0">
+                <a:solidFill>
+                  <a:schemeClr val="tx1"/>
+                </a:solidFill>
+                <a:latin typeface="+mn-lt"/>
+                <a:ea typeface="+mn-ea"/>
+                <a:cs typeface="+mn-cs"/>
+              </a:rPr>
+              <a:t> a </a:t>
+            </a:r>
+            <a:r>
+              <a:rPr lang="de-DE" sz="1200" kern="1200" dirty="0" err="1" smtClean="0">
+                <a:solidFill>
+                  <a:schemeClr val="tx1"/>
+                </a:solidFill>
+                <a:latin typeface="+mn-lt"/>
+                <a:ea typeface="+mn-ea"/>
+                <a:cs typeface="+mn-cs"/>
+              </a:rPr>
+              <a:t>few</a:t>
+            </a:r>
+            <a:r>
+              <a:rPr lang="de-DE" sz="1200" kern="1200" dirty="0" smtClean="0">
+                <a:solidFill>
+                  <a:schemeClr val="tx1"/>
+                </a:solidFill>
+                <a:latin typeface="+mn-lt"/>
+                <a:ea typeface="+mn-ea"/>
+                <a:cs typeface="+mn-cs"/>
+              </a:rPr>
+              <a:t>. </a:t>
+            </a:r>
+            <a:r>
+              <a:rPr lang="de-DE" sz="1200" kern="1200" dirty="0" err="1" smtClean="0">
+                <a:solidFill>
+                  <a:schemeClr val="tx1"/>
+                </a:solidFill>
+                <a:latin typeface="+mn-lt"/>
+                <a:ea typeface="+mn-ea"/>
+                <a:cs typeface="+mn-cs"/>
+              </a:rPr>
+              <a:t>This</a:t>
+            </a:r>
+            <a:r>
+              <a:rPr lang="de-DE" sz="1200" kern="1200" dirty="0" smtClean="0">
+                <a:solidFill>
+                  <a:schemeClr val="tx1"/>
+                </a:solidFill>
+                <a:latin typeface="+mn-lt"/>
+                <a:ea typeface="+mn-ea"/>
+                <a:cs typeface="+mn-cs"/>
+              </a:rPr>
+              <a:t> </a:t>
+            </a:r>
+            <a:r>
+              <a:rPr lang="de-DE" sz="1200" kern="1200" dirty="0" err="1" smtClean="0">
+                <a:solidFill>
+                  <a:schemeClr val="tx1"/>
+                </a:solidFill>
+                <a:latin typeface="+mn-lt"/>
+                <a:ea typeface="+mn-ea"/>
+                <a:cs typeface="+mn-cs"/>
+              </a:rPr>
+              <a:t>includes</a:t>
+            </a:r>
+            <a:r>
+              <a:rPr lang="de-DE" sz="1200" kern="1200" dirty="0" smtClean="0">
+                <a:solidFill>
+                  <a:schemeClr val="tx1"/>
+                </a:solidFill>
+                <a:latin typeface="+mn-lt"/>
+                <a:ea typeface="+mn-ea"/>
+                <a:cs typeface="+mn-cs"/>
+              </a:rPr>
+              <a:t> </a:t>
+            </a:r>
+            <a:r>
+              <a:rPr lang="de-DE" sz="1200" kern="1200" dirty="0" err="1" smtClean="0">
+                <a:solidFill>
+                  <a:schemeClr val="tx1"/>
+                </a:solidFill>
+                <a:latin typeface="+mn-lt"/>
+                <a:ea typeface="+mn-ea"/>
+                <a:cs typeface="+mn-cs"/>
+              </a:rPr>
+              <a:t>the</a:t>
+            </a:r>
+            <a:r>
+              <a:rPr lang="de-DE" sz="1200" kern="1200" dirty="0" smtClean="0">
+                <a:solidFill>
+                  <a:schemeClr val="tx1"/>
+                </a:solidFill>
+                <a:latin typeface="+mn-lt"/>
+                <a:ea typeface="+mn-ea"/>
+                <a:cs typeface="+mn-cs"/>
+              </a:rPr>
+              <a:t> </a:t>
+            </a:r>
+            <a:r>
+              <a:rPr lang="de-DE" sz="1200" kern="1200" dirty="0" err="1" smtClean="0">
+                <a:solidFill>
+                  <a:schemeClr val="tx1"/>
+                </a:solidFill>
+                <a:latin typeface="+mn-lt"/>
+                <a:ea typeface="+mn-ea"/>
+                <a:cs typeface="+mn-cs"/>
+              </a:rPr>
+              <a:t>policies</a:t>
+            </a:r>
+            <a:r>
+              <a:rPr lang="de-DE" sz="1200" kern="1200" dirty="0" smtClean="0">
+                <a:solidFill>
+                  <a:schemeClr val="tx1"/>
+                </a:solidFill>
+                <a:latin typeface="+mn-lt"/>
+                <a:ea typeface="+mn-ea"/>
+                <a:cs typeface="+mn-cs"/>
+              </a:rPr>
+              <a:t> and </a:t>
+            </a:r>
+            <a:r>
+              <a:rPr lang="de-DE" sz="1200" kern="1200" dirty="0" err="1" smtClean="0">
+                <a:solidFill>
+                  <a:schemeClr val="tx1"/>
+                </a:solidFill>
+                <a:latin typeface="+mn-lt"/>
+                <a:ea typeface="+mn-ea"/>
+                <a:cs typeface="+mn-cs"/>
+              </a:rPr>
+              <a:t>practices</a:t>
+            </a:r>
+            <a:r>
+              <a:rPr lang="de-DE" sz="1200" kern="1200" dirty="0" smtClean="0">
+                <a:solidFill>
+                  <a:schemeClr val="tx1"/>
+                </a:solidFill>
+                <a:latin typeface="+mn-lt"/>
+                <a:ea typeface="+mn-ea"/>
+                <a:cs typeface="+mn-cs"/>
+              </a:rPr>
+              <a:t> </a:t>
+            </a:r>
+            <a:r>
+              <a:rPr lang="de-DE" sz="1200" kern="1200" dirty="0" err="1" smtClean="0">
+                <a:solidFill>
+                  <a:schemeClr val="tx1"/>
+                </a:solidFill>
+                <a:latin typeface="+mn-lt"/>
+                <a:ea typeface="+mn-ea"/>
+                <a:cs typeface="+mn-cs"/>
+              </a:rPr>
+              <a:t>that</a:t>
+            </a:r>
+            <a:r>
+              <a:rPr lang="de-DE" sz="1200" kern="1200" dirty="0" smtClean="0">
+                <a:solidFill>
+                  <a:schemeClr val="tx1"/>
+                </a:solidFill>
+                <a:latin typeface="+mn-lt"/>
+                <a:ea typeface="+mn-ea"/>
+                <a:cs typeface="+mn-cs"/>
+              </a:rPr>
+              <a:t> </a:t>
+            </a:r>
+            <a:r>
+              <a:rPr lang="de-DE" sz="1200" kern="1200" dirty="0" err="1" smtClean="0">
+                <a:solidFill>
+                  <a:schemeClr val="tx1"/>
+                </a:solidFill>
+                <a:latin typeface="+mn-lt"/>
+                <a:ea typeface="+mn-ea"/>
+                <a:cs typeface="+mn-cs"/>
+              </a:rPr>
+              <a:t>control</a:t>
+            </a:r>
+            <a:r>
+              <a:rPr lang="de-DE" sz="1200" kern="1200" dirty="0" smtClean="0">
+                <a:solidFill>
+                  <a:schemeClr val="tx1"/>
+                </a:solidFill>
+                <a:latin typeface="+mn-lt"/>
+                <a:ea typeface="+mn-ea"/>
+                <a:cs typeface="+mn-cs"/>
+              </a:rPr>
+              <a:t>, </a:t>
+            </a:r>
+            <a:r>
+              <a:rPr lang="de-DE" sz="1200" kern="1200" dirty="0" err="1" smtClean="0">
+                <a:solidFill>
+                  <a:schemeClr val="tx1"/>
+                </a:solidFill>
+                <a:latin typeface="+mn-lt"/>
+                <a:ea typeface="+mn-ea"/>
+                <a:cs typeface="+mn-cs"/>
+              </a:rPr>
+              <a:t>protect</a:t>
+            </a:r>
+            <a:r>
+              <a:rPr lang="de-DE" sz="1200" kern="1200" dirty="0" smtClean="0">
+                <a:solidFill>
+                  <a:schemeClr val="tx1"/>
+                </a:solidFill>
+                <a:latin typeface="+mn-lt"/>
+                <a:ea typeface="+mn-ea"/>
+                <a:cs typeface="+mn-cs"/>
+              </a:rPr>
+              <a:t>, </a:t>
+            </a:r>
+            <a:r>
+              <a:rPr lang="de-DE" sz="1200" kern="1200" dirty="0" err="1" smtClean="0">
+                <a:solidFill>
+                  <a:schemeClr val="tx1"/>
+                </a:solidFill>
+                <a:latin typeface="+mn-lt"/>
+                <a:ea typeface="+mn-ea"/>
+                <a:cs typeface="+mn-cs"/>
+              </a:rPr>
+              <a:t>deliver</a:t>
+            </a:r>
+            <a:r>
+              <a:rPr lang="de-DE" sz="1200" kern="1200" dirty="0" smtClean="0">
+                <a:solidFill>
+                  <a:schemeClr val="tx1"/>
+                </a:solidFill>
+                <a:latin typeface="+mn-lt"/>
+                <a:ea typeface="+mn-ea"/>
+                <a:cs typeface="+mn-cs"/>
+              </a:rPr>
+              <a:t> and </a:t>
+            </a:r>
+            <a:r>
+              <a:rPr lang="de-DE" sz="1200" kern="1200" dirty="0" err="1" smtClean="0">
+                <a:solidFill>
+                  <a:schemeClr val="tx1"/>
+                </a:solidFill>
+                <a:latin typeface="+mn-lt"/>
+                <a:ea typeface="+mn-ea"/>
+                <a:cs typeface="+mn-cs"/>
+              </a:rPr>
+              <a:t>enhance</a:t>
+            </a:r>
+            <a:r>
+              <a:rPr lang="de-DE" sz="1200" kern="1200" dirty="0" smtClean="0">
+                <a:solidFill>
+                  <a:schemeClr val="tx1"/>
+                </a:solidFill>
+                <a:latin typeface="+mn-lt"/>
+                <a:ea typeface="+mn-ea"/>
+                <a:cs typeface="+mn-cs"/>
+              </a:rPr>
+              <a:t> </a:t>
+            </a:r>
+            <a:r>
+              <a:rPr lang="de-DE" sz="1200" kern="1200" dirty="0" err="1" smtClean="0">
+                <a:solidFill>
+                  <a:schemeClr val="tx1"/>
+                </a:solidFill>
+                <a:latin typeface="+mn-lt"/>
+                <a:ea typeface="+mn-ea"/>
+                <a:cs typeface="+mn-cs"/>
+              </a:rPr>
+              <a:t>the</a:t>
+            </a:r>
+            <a:r>
+              <a:rPr lang="de-DE" sz="1200" kern="1200" dirty="0" smtClean="0">
+                <a:solidFill>
+                  <a:schemeClr val="tx1"/>
+                </a:solidFill>
+                <a:latin typeface="+mn-lt"/>
+                <a:ea typeface="+mn-ea"/>
+                <a:cs typeface="+mn-cs"/>
+              </a:rPr>
+              <a:t> </a:t>
+            </a:r>
+            <a:r>
+              <a:rPr lang="de-DE" sz="1200" kern="1200" dirty="0" err="1" smtClean="0">
+                <a:solidFill>
+                  <a:schemeClr val="tx1"/>
+                </a:solidFill>
+                <a:latin typeface="+mn-lt"/>
+                <a:ea typeface="+mn-ea"/>
+                <a:cs typeface="+mn-cs"/>
+              </a:rPr>
+              <a:t>value</a:t>
+            </a:r>
+            <a:r>
+              <a:rPr lang="de-DE" sz="1200" kern="1200" dirty="0" smtClean="0">
+                <a:solidFill>
+                  <a:schemeClr val="tx1"/>
+                </a:solidFill>
+                <a:latin typeface="+mn-lt"/>
+                <a:ea typeface="+mn-ea"/>
+                <a:cs typeface="+mn-cs"/>
+              </a:rPr>
+              <a:t> of </a:t>
+            </a:r>
+            <a:r>
+              <a:rPr lang="de-DE" sz="1200" kern="1200" dirty="0" err="1" smtClean="0">
+                <a:solidFill>
+                  <a:schemeClr val="tx1"/>
+                </a:solidFill>
+                <a:latin typeface="+mn-lt"/>
+                <a:ea typeface="+mn-ea"/>
+                <a:cs typeface="+mn-cs"/>
+              </a:rPr>
+              <a:t>data</a:t>
+            </a:r>
+            <a:r>
+              <a:rPr lang="de-DE" sz="1200" kern="1200" dirty="0" smtClean="0">
+                <a:solidFill>
+                  <a:schemeClr val="tx1"/>
+                </a:solidFill>
+                <a:latin typeface="+mn-lt"/>
+                <a:ea typeface="+mn-ea"/>
+                <a:cs typeface="+mn-cs"/>
+              </a:rPr>
+              <a:t>.</a:t>
+            </a:r>
+          </a:p>
+          <a:p>
+            <a:r>
+              <a:rPr lang="de-DE" sz="1200" kern="1200" dirty="0" smtClean="0">
+                <a:solidFill>
+                  <a:schemeClr val="tx1"/>
+                </a:solidFill>
+                <a:latin typeface="+mn-lt"/>
+                <a:ea typeface="+mn-ea"/>
+                <a:cs typeface="+mn-cs"/>
+              </a:rPr>
+              <a:t>• (D2) Distribution: Data </a:t>
+            </a:r>
+            <a:r>
+              <a:rPr lang="de-DE" sz="1200" kern="1200" dirty="0" err="1" smtClean="0">
+                <a:solidFill>
+                  <a:schemeClr val="tx1"/>
+                </a:solidFill>
+                <a:latin typeface="+mn-lt"/>
+                <a:ea typeface="+mn-ea"/>
+                <a:cs typeface="+mn-cs"/>
+              </a:rPr>
+              <a:t>is</a:t>
+            </a:r>
+            <a:r>
+              <a:rPr lang="de-DE" sz="1200" kern="1200" dirty="0" smtClean="0">
+                <a:solidFill>
+                  <a:schemeClr val="tx1"/>
+                </a:solidFill>
+                <a:latin typeface="+mn-lt"/>
+                <a:ea typeface="+mn-ea"/>
+                <a:cs typeface="+mn-cs"/>
+              </a:rPr>
+              <a:t> </a:t>
+            </a:r>
+            <a:r>
+              <a:rPr lang="de-DE" sz="1200" kern="1200" dirty="0" err="1" smtClean="0">
+                <a:solidFill>
+                  <a:schemeClr val="tx1"/>
+                </a:solidFill>
+                <a:latin typeface="+mn-lt"/>
+                <a:ea typeface="+mn-ea"/>
+                <a:cs typeface="+mn-cs"/>
+              </a:rPr>
+              <a:t>either</a:t>
+            </a:r>
+            <a:r>
+              <a:rPr lang="de-DE" sz="1200" kern="1200" dirty="0" smtClean="0">
+                <a:solidFill>
+                  <a:schemeClr val="tx1"/>
+                </a:solidFill>
+                <a:latin typeface="+mn-lt"/>
+                <a:ea typeface="+mn-ea"/>
+                <a:cs typeface="+mn-cs"/>
+              </a:rPr>
+              <a:t> </a:t>
+            </a:r>
+            <a:r>
+              <a:rPr lang="de-DE" sz="1200" kern="1200" dirty="0" err="1" smtClean="0">
+                <a:solidFill>
+                  <a:schemeClr val="tx1"/>
+                </a:solidFill>
+                <a:latin typeface="+mn-lt"/>
+                <a:ea typeface="+mn-ea"/>
+                <a:cs typeface="+mn-cs"/>
+              </a:rPr>
+              <a:t>distributed</a:t>
+            </a:r>
+            <a:r>
+              <a:rPr lang="de-DE" sz="1200" kern="1200" dirty="0" smtClean="0">
+                <a:solidFill>
+                  <a:schemeClr val="tx1"/>
+                </a:solidFill>
+                <a:latin typeface="+mn-lt"/>
+                <a:ea typeface="+mn-ea"/>
+                <a:cs typeface="+mn-cs"/>
+              </a:rPr>
+              <a:t> </a:t>
+            </a:r>
+            <a:r>
+              <a:rPr lang="de-DE" sz="1200" kern="1200" dirty="0" err="1" smtClean="0">
+                <a:solidFill>
+                  <a:schemeClr val="tx1"/>
+                </a:solidFill>
+                <a:latin typeface="+mn-lt"/>
+                <a:ea typeface="+mn-ea"/>
+                <a:cs typeface="+mn-cs"/>
+              </a:rPr>
+              <a:t>or</a:t>
+            </a:r>
+            <a:r>
+              <a:rPr lang="de-DE" sz="1200" kern="1200" dirty="0" smtClean="0">
+                <a:solidFill>
+                  <a:schemeClr val="tx1"/>
+                </a:solidFill>
+                <a:latin typeface="+mn-lt"/>
+                <a:ea typeface="+mn-ea"/>
+                <a:cs typeface="+mn-cs"/>
+              </a:rPr>
+              <a:t> </a:t>
+            </a:r>
+            <a:r>
+              <a:rPr lang="de-DE" sz="1200" kern="1200" dirty="0" err="1" smtClean="0">
+                <a:solidFill>
+                  <a:schemeClr val="tx1"/>
+                </a:solidFill>
+                <a:latin typeface="+mn-lt"/>
+                <a:ea typeface="+mn-ea"/>
+                <a:cs typeface="+mn-cs"/>
+              </a:rPr>
+              <a:t>needs</a:t>
+            </a:r>
+            <a:r>
+              <a:rPr lang="de-DE" sz="1200" kern="1200" dirty="0" smtClean="0">
+                <a:solidFill>
+                  <a:schemeClr val="tx1"/>
+                </a:solidFill>
+                <a:latin typeface="+mn-lt"/>
+                <a:ea typeface="+mn-ea"/>
+                <a:cs typeface="+mn-cs"/>
+              </a:rPr>
+              <a:t> to </a:t>
+            </a:r>
+            <a:r>
+              <a:rPr lang="de-DE" sz="1200" kern="1200" dirty="0" err="1" smtClean="0">
+                <a:solidFill>
+                  <a:schemeClr val="tx1"/>
+                </a:solidFill>
+                <a:latin typeface="+mn-lt"/>
+                <a:ea typeface="+mn-ea"/>
+                <a:cs typeface="+mn-cs"/>
+              </a:rPr>
+              <a:t>be</a:t>
+            </a:r>
+            <a:r>
+              <a:rPr lang="de-DE" sz="1200" kern="1200" dirty="0" smtClean="0">
+                <a:solidFill>
+                  <a:schemeClr val="tx1"/>
+                </a:solidFill>
+                <a:latin typeface="+mn-lt"/>
+                <a:ea typeface="+mn-ea"/>
+                <a:cs typeface="+mn-cs"/>
+              </a:rPr>
+              <a:t> </a:t>
+            </a:r>
+            <a:r>
+              <a:rPr lang="de-DE" sz="1200" kern="1200" dirty="0" err="1" smtClean="0">
+                <a:solidFill>
+                  <a:schemeClr val="tx1"/>
+                </a:solidFill>
+                <a:latin typeface="+mn-lt"/>
+                <a:ea typeface="+mn-ea"/>
+                <a:cs typeface="+mn-cs"/>
+              </a:rPr>
+              <a:t>distributed</a:t>
+            </a:r>
+            <a:r>
+              <a:rPr lang="de-DE" sz="1200" kern="1200" dirty="0" smtClean="0">
+                <a:solidFill>
+                  <a:schemeClr val="tx1"/>
+                </a:solidFill>
+                <a:latin typeface="+mn-lt"/>
+                <a:ea typeface="+mn-ea"/>
+                <a:cs typeface="+mn-cs"/>
+              </a:rPr>
+              <a:t>. </a:t>
+            </a:r>
+            <a:r>
+              <a:rPr lang="de-DE" sz="1200" kern="1200" dirty="0" err="1" smtClean="0">
+                <a:solidFill>
+                  <a:schemeClr val="tx1"/>
+                </a:solidFill>
+                <a:latin typeface="+mn-lt"/>
+                <a:ea typeface="+mn-ea"/>
+                <a:cs typeface="+mn-cs"/>
+              </a:rPr>
+              <a:t>This</a:t>
+            </a:r>
+            <a:r>
+              <a:rPr lang="de-DE" sz="1200" kern="1200" dirty="0" smtClean="0">
+                <a:solidFill>
+                  <a:schemeClr val="tx1"/>
+                </a:solidFill>
+                <a:latin typeface="+mn-lt"/>
+                <a:ea typeface="+mn-ea"/>
+                <a:cs typeface="+mn-cs"/>
+              </a:rPr>
+              <a:t> </a:t>
+            </a:r>
+            <a:r>
+              <a:rPr lang="de-DE" sz="1200" kern="1200" dirty="0" err="1" smtClean="0">
+                <a:solidFill>
+                  <a:schemeClr val="tx1"/>
+                </a:solidFill>
+                <a:latin typeface="+mn-lt"/>
+                <a:ea typeface="+mn-ea"/>
+                <a:cs typeface="+mn-cs"/>
+              </a:rPr>
+              <a:t>raises</a:t>
+            </a:r>
+            <a:r>
+              <a:rPr lang="de-DE" sz="1200" kern="1200" dirty="0" smtClean="0">
+                <a:solidFill>
+                  <a:schemeClr val="tx1"/>
+                </a:solidFill>
+                <a:latin typeface="+mn-lt"/>
+                <a:ea typeface="+mn-ea"/>
+                <a:cs typeface="+mn-cs"/>
+              </a:rPr>
+              <a:t> </a:t>
+            </a:r>
+            <a:r>
+              <a:rPr lang="de-DE" sz="1200" kern="1200" dirty="0" err="1" smtClean="0">
+                <a:solidFill>
+                  <a:schemeClr val="tx1"/>
+                </a:solidFill>
+                <a:latin typeface="+mn-lt"/>
+                <a:ea typeface="+mn-ea"/>
+                <a:cs typeface="+mn-cs"/>
+              </a:rPr>
+              <a:t>the</a:t>
+            </a:r>
+            <a:r>
+              <a:rPr lang="de-DE" sz="1200" kern="1200" dirty="0" smtClean="0">
+                <a:solidFill>
+                  <a:schemeClr val="tx1"/>
+                </a:solidFill>
+                <a:latin typeface="+mn-lt"/>
+                <a:ea typeface="+mn-ea"/>
+                <a:cs typeface="+mn-cs"/>
+              </a:rPr>
+              <a:t> </a:t>
+            </a:r>
+            <a:r>
+              <a:rPr lang="de-DE" sz="1200" kern="1200" dirty="0" err="1" smtClean="0">
+                <a:solidFill>
+                  <a:schemeClr val="tx1"/>
+                </a:solidFill>
+                <a:latin typeface="+mn-lt"/>
+                <a:ea typeface="+mn-ea"/>
+                <a:cs typeface="+mn-cs"/>
+              </a:rPr>
+              <a:t>issue</a:t>
+            </a:r>
+            <a:r>
+              <a:rPr lang="de-DE" sz="1200" kern="1200" dirty="0" smtClean="0">
+                <a:solidFill>
+                  <a:schemeClr val="tx1"/>
+                </a:solidFill>
+                <a:latin typeface="+mn-lt"/>
+                <a:ea typeface="+mn-ea"/>
+                <a:cs typeface="+mn-cs"/>
+              </a:rPr>
+              <a:t> of </a:t>
+            </a:r>
+            <a:r>
+              <a:rPr lang="de-DE" sz="1200" kern="1200" dirty="0" err="1" smtClean="0">
+                <a:solidFill>
+                  <a:schemeClr val="tx1"/>
+                </a:solidFill>
+                <a:latin typeface="+mn-lt"/>
+                <a:ea typeface="+mn-ea"/>
+                <a:cs typeface="+mn-cs"/>
+              </a:rPr>
+              <a:t>efficient</a:t>
+            </a:r>
+            <a:r>
+              <a:rPr lang="de-DE" sz="1200" kern="1200" dirty="0" smtClean="0">
+                <a:solidFill>
+                  <a:schemeClr val="tx1"/>
+                </a:solidFill>
+                <a:latin typeface="+mn-lt"/>
+                <a:ea typeface="+mn-ea"/>
+                <a:cs typeface="+mn-cs"/>
+              </a:rPr>
+              <a:t> and </a:t>
+            </a:r>
+            <a:r>
+              <a:rPr lang="de-DE" sz="1200" kern="1200" dirty="0" err="1" smtClean="0">
+                <a:solidFill>
+                  <a:schemeClr val="tx1"/>
+                </a:solidFill>
+                <a:latin typeface="+mn-lt"/>
+                <a:ea typeface="+mn-ea"/>
+                <a:cs typeface="+mn-cs"/>
+              </a:rPr>
+              <a:t>reliable</a:t>
+            </a:r>
+            <a:r>
+              <a:rPr lang="de-DE" sz="1200" kern="1200" dirty="0" smtClean="0">
+                <a:solidFill>
+                  <a:schemeClr val="tx1"/>
+                </a:solidFill>
+                <a:latin typeface="+mn-lt"/>
+                <a:ea typeface="+mn-ea"/>
+                <a:cs typeface="+mn-cs"/>
+              </a:rPr>
+              <a:t> </a:t>
+            </a:r>
+            <a:r>
+              <a:rPr lang="de-DE" sz="1200" kern="1200" dirty="0" err="1" smtClean="0">
+                <a:solidFill>
+                  <a:schemeClr val="tx1"/>
+                </a:solidFill>
+                <a:latin typeface="+mn-lt"/>
+                <a:ea typeface="+mn-ea"/>
+                <a:cs typeface="+mn-cs"/>
+              </a:rPr>
+              <a:t>large-scale</a:t>
+            </a:r>
+            <a:r>
+              <a:rPr lang="de-DE" sz="1200" kern="1200" dirty="0" smtClean="0">
+                <a:solidFill>
+                  <a:schemeClr val="tx1"/>
+                </a:solidFill>
+                <a:latin typeface="+mn-lt"/>
+                <a:ea typeface="+mn-ea"/>
+                <a:cs typeface="+mn-cs"/>
+              </a:rPr>
+              <a:t> </a:t>
+            </a:r>
+            <a:r>
+              <a:rPr lang="de-DE" sz="1200" kern="1200" dirty="0" err="1" smtClean="0">
+                <a:solidFill>
+                  <a:schemeClr val="tx1"/>
+                </a:solidFill>
+                <a:latin typeface="+mn-lt"/>
+                <a:ea typeface="+mn-ea"/>
+                <a:cs typeface="+mn-cs"/>
+              </a:rPr>
+              <a:t>data</a:t>
+            </a:r>
+            <a:r>
+              <a:rPr lang="de-DE" sz="1200" kern="1200" dirty="0" smtClean="0">
+                <a:solidFill>
+                  <a:schemeClr val="tx1"/>
+                </a:solidFill>
+                <a:latin typeface="+mn-lt"/>
+                <a:ea typeface="+mn-ea"/>
+                <a:cs typeface="+mn-cs"/>
+              </a:rPr>
+              <a:t> </a:t>
+            </a:r>
+            <a:r>
+              <a:rPr lang="de-DE" sz="1200" kern="1200" dirty="0" err="1" smtClean="0">
+                <a:solidFill>
+                  <a:schemeClr val="tx1"/>
+                </a:solidFill>
+                <a:latin typeface="+mn-lt"/>
+                <a:ea typeface="+mn-ea"/>
+                <a:cs typeface="+mn-cs"/>
+              </a:rPr>
+              <a:t>transport</a:t>
+            </a:r>
+            <a:r>
+              <a:rPr lang="de-DE" sz="1200" kern="1200" dirty="0" smtClean="0">
+                <a:solidFill>
+                  <a:schemeClr val="tx1"/>
+                </a:solidFill>
+                <a:latin typeface="+mn-lt"/>
+                <a:ea typeface="+mn-ea"/>
+                <a:cs typeface="+mn-cs"/>
+              </a:rPr>
+              <a:t> and </a:t>
+            </a:r>
+            <a:r>
+              <a:rPr lang="de-DE" sz="1200" kern="1200" dirty="0" err="1" smtClean="0">
+                <a:solidFill>
+                  <a:schemeClr val="tx1"/>
+                </a:solidFill>
+                <a:latin typeface="+mn-lt"/>
+                <a:ea typeface="+mn-ea"/>
+                <a:cs typeface="+mn-cs"/>
+              </a:rPr>
+              <a:t>the</a:t>
+            </a:r>
+            <a:r>
+              <a:rPr lang="de-DE" sz="1200" kern="1200" dirty="0" smtClean="0">
+                <a:solidFill>
+                  <a:schemeClr val="tx1"/>
+                </a:solidFill>
+                <a:latin typeface="+mn-lt"/>
+                <a:ea typeface="+mn-ea"/>
+                <a:cs typeface="+mn-cs"/>
+              </a:rPr>
+              <a:t> </a:t>
+            </a:r>
+            <a:r>
+              <a:rPr lang="de-DE" sz="1200" kern="1200" dirty="0" err="1" smtClean="0">
+                <a:solidFill>
+                  <a:schemeClr val="tx1"/>
+                </a:solidFill>
+                <a:latin typeface="+mn-lt"/>
+                <a:ea typeface="+mn-ea"/>
+                <a:cs typeface="+mn-cs"/>
+              </a:rPr>
+              <a:t>association</a:t>
+            </a:r>
+            <a:r>
+              <a:rPr lang="de-DE" sz="1200" kern="1200" dirty="0" smtClean="0">
+                <a:solidFill>
+                  <a:schemeClr val="tx1"/>
+                </a:solidFill>
+                <a:latin typeface="+mn-lt"/>
+                <a:ea typeface="+mn-ea"/>
+                <a:cs typeface="+mn-cs"/>
+              </a:rPr>
+              <a:t> of </a:t>
+            </a:r>
+            <a:r>
+              <a:rPr lang="de-DE" sz="1200" kern="1200" dirty="0" err="1" smtClean="0">
+                <a:solidFill>
+                  <a:schemeClr val="tx1"/>
+                </a:solidFill>
+                <a:latin typeface="+mn-lt"/>
+                <a:ea typeface="+mn-ea"/>
+                <a:cs typeface="+mn-cs"/>
+              </a:rPr>
+              <a:t>computation</a:t>
+            </a:r>
+            <a:r>
+              <a:rPr lang="de-DE" sz="1200" kern="1200" dirty="0" smtClean="0">
+                <a:solidFill>
+                  <a:schemeClr val="tx1"/>
+                </a:solidFill>
+                <a:latin typeface="+mn-lt"/>
+                <a:ea typeface="+mn-ea"/>
+                <a:cs typeface="+mn-cs"/>
+              </a:rPr>
+              <a:t> to date.</a:t>
+            </a:r>
+          </a:p>
+          <a:p>
+            <a:r>
+              <a:rPr lang="de-DE" sz="1200" kern="1200" dirty="0" smtClean="0">
+                <a:solidFill>
+                  <a:schemeClr val="tx1"/>
+                </a:solidFill>
+                <a:latin typeface="+mn-lt"/>
+                <a:ea typeface="+mn-ea"/>
+                <a:cs typeface="+mn-cs"/>
+              </a:rPr>
+              <a:t>• (D3) </a:t>
+            </a:r>
+            <a:r>
+              <a:rPr lang="de-DE" sz="1200" kern="1200" dirty="0" err="1" smtClean="0">
+                <a:solidFill>
+                  <a:schemeClr val="tx1"/>
+                </a:solidFill>
+                <a:latin typeface="+mn-lt"/>
+                <a:ea typeface="+mn-ea"/>
+                <a:cs typeface="+mn-cs"/>
+              </a:rPr>
+              <a:t>Dynamism</a:t>
+            </a:r>
+            <a:r>
+              <a:rPr lang="de-DE" sz="1200" kern="1200" dirty="0" smtClean="0">
+                <a:solidFill>
+                  <a:schemeClr val="tx1"/>
+                </a:solidFill>
+                <a:latin typeface="+mn-lt"/>
+                <a:ea typeface="+mn-ea"/>
+                <a:cs typeface="+mn-cs"/>
+              </a:rPr>
+              <a:t>: Data </a:t>
+            </a:r>
+            <a:r>
+              <a:rPr lang="de-DE" sz="1200" kern="1200" dirty="0" err="1" smtClean="0">
+                <a:solidFill>
+                  <a:schemeClr val="tx1"/>
+                </a:solidFill>
+                <a:latin typeface="+mn-lt"/>
+                <a:ea typeface="+mn-ea"/>
+                <a:cs typeface="+mn-cs"/>
+              </a:rPr>
+              <a:t>may</a:t>
+            </a:r>
+            <a:r>
+              <a:rPr lang="de-DE" sz="1200" kern="1200" dirty="0" smtClean="0">
+                <a:solidFill>
+                  <a:schemeClr val="tx1"/>
+                </a:solidFill>
+                <a:latin typeface="+mn-lt"/>
+                <a:ea typeface="+mn-ea"/>
+                <a:cs typeface="+mn-cs"/>
+              </a:rPr>
+              <a:t> </a:t>
+            </a:r>
+            <a:r>
+              <a:rPr lang="de-DE" sz="1200" kern="1200" dirty="0" err="1" smtClean="0">
+                <a:solidFill>
+                  <a:schemeClr val="tx1"/>
+                </a:solidFill>
+                <a:latin typeface="+mn-lt"/>
+                <a:ea typeface="+mn-ea"/>
+                <a:cs typeface="+mn-cs"/>
+              </a:rPr>
+              <a:t>be</a:t>
+            </a:r>
+            <a:r>
+              <a:rPr lang="de-DE" sz="1200" kern="1200" dirty="0" smtClean="0">
+                <a:solidFill>
+                  <a:schemeClr val="tx1"/>
+                </a:solidFill>
+                <a:latin typeface="+mn-lt"/>
+                <a:ea typeface="+mn-ea"/>
+                <a:cs typeface="+mn-cs"/>
+              </a:rPr>
+              <a:t> </a:t>
+            </a:r>
+            <a:r>
+              <a:rPr lang="de-DE" sz="1200" kern="1200" dirty="0" err="1" smtClean="0">
+                <a:solidFill>
+                  <a:schemeClr val="tx1"/>
+                </a:solidFill>
+                <a:latin typeface="+mn-lt"/>
+                <a:ea typeface="+mn-ea"/>
+                <a:cs typeface="+mn-cs"/>
+              </a:rPr>
+              <a:t>dynamically</a:t>
+            </a:r>
+            <a:r>
+              <a:rPr lang="de-DE" sz="1200" kern="1200" dirty="0" smtClean="0">
+                <a:solidFill>
+                  <a:schemeClr val="tx1"/>
+                </a:solidFill>
+                <a:latin typeface="+mn-lt"/>
+                <a:ea typeface="+mn-ea"/>
+                <a:cs typeface="+mn-cs"/>
+              </a:rPr>
+              <a:t> </a:t>
+            </a:r>
+            <a:r>
+              <a:rPr lang="de-DE" sz="1200" kern="1200" dirty="0" err="1" smtClean="0">
+                <a:solidFill>
+                  <a:schemeClr val="tx1"/>
+                </a:solidFill>
+                <a:latin typeface="+mn-lt"/>
+                <a:ea typeface="+mn-ea"/>
+                <a:cs typeface="+mn-cs"/>
+              </a:rPr>
+              <a:t>generated</a:t>
+            </a:r>
+            <a:r>
+              <a:rPr lang="de-DE" sz="1200" kern="1200" dirty="0" smtClean="0">
+                <a:solidFill>
+                  <a:schemeClr val="tx1"/>
+                </a:solidFill>
+                <a:latin typeface="+mn-lt"/>
+                <a:ea typeface="+mn-ea"/>
+                <a:cs typeface="+mn-cs"/>
+              </a:rPr>
+              <a:t> and </a:t>
+            </a:r>
+            <a:r>
+              <a:rPr lang="de-DE" sz="1200" kern="1200" dirty="0" err="1" smtClean="0">
+                <a:solidFill>
+                  <a:schemeClr val="tx1"/>
+                </a:solidFill>
+                <a:latin typeface="+mn-lt"/>
+                <a:ea typeface="+mn-ea"/>
+                <a:cs typeface="+mn-cs"/>
+              </a:rPr>
+              <a:t>collected</a:t>
+            </a:r>
+            <a:r>
+              <a:rPr lang="de-DE" sz="1200" kern="1200" dirty="0" smtClean="0">
+                <a:solidFill>
+                  <a:schemeClr val="tx1"/>
+                </a:solidFill>
+                <a:latin typeface="+mn-lt"/>
+                <a:ea typeface="+mn-ea"/>
+                <a:cs typeface="+mn-cs"/>
+              </a:rPr>
+              <a:t> (</a:t>
+            </a:r>
+            <a:r>
+              <a:rPr lang="de-DE" sz="1200" kern="1200" dirty="0" err="1" smtClean="0">
+                <a:solidFill>
+                  <a:schemeClr val="tx1"/>
+                </a:solidFill>
+                <a:latin typeface="+mn-lt"/>
+                <a:ea typeface="+mn-ea"/>
+                <a:cs typeface="+mn-cs"/>
+              </a:rPr>
+              <a:t>e.g</a:t>
+            </a:r>
+            <a:r>
+              <a:rPr lang="de-DE" sz="1200" kern="1200" dirty="0" smtClean="0">
+                <a:solidFill>
+                  <a:schemeClr val="tx1"/>
+                </a:solidFill>
+                <a:latin typeface="+mn-lt"/>
+                <a:ea typeface="+mn-ea"/>
+                <a:cs typeface="+mn-cs"/>
+              </a:rPr>
+              <a:t>. via </a:t>
+            </a:r>
+            <a:r>
+              <a:rPr lang="de-DE" sz="1200" kern="1200" dirty="0" err="1" smtClean="0">
+                <a:solidFill>
+                  <a:schemeClr val="tx1"/>
+                </a:solidFill>
+                <a:latin typeface="+mn-lt"/>
+                <a:ea typeface="+mn-ea"/>
+                <a:cs typeface="+mn-cs"/>
+              </a:rPr>
+              <a:t>sensors</a:t>
+            </a:r>
+            <a:r>
+              <a:rPr lang="de-DE" sz="1200" kern="1200" dirty="0" smtClean="0">
+                <a:solidFill>
+                  <a:schemeClr val="tx1"/>
+                </a:solidFill>
+                <a:latin typeface="+mn-lt"/>
+                <a:ea typeface="+mn-ea"/>
+                <a:cs typeface="+mn-cs"/>
+              </a:rPr>
+              <a:t>) </a:t>
+            </a:r>
+            <a:r>
+              <a:rPr lang="de-DE" sz="1200" kern="1200" dirty="0" err="1" smtClean="0">
+                <a:solidFill>
+                  <a:schemeClr val="tx1"/>
+                </a:solidFill>
+                <a:latin typeface="+mn-lt"/>
+                <a:ea typeface="+mn-ea"/>
+                <a:cs typeface="+mn-cs"/>
+              </a:rPr>
+              <a:t>that</a:t>
+            </a:r>
+            <a:r>
+              <a:rPr lang="de-DE" sz="1200" kern="1200" dirty="0" smtClean="0">
+                <a:solidFill>
+                  <a:schemeClr val="tx1"/>
+                </a:solidFill>
+                <a:latin typeface="+mn-lt"/>
+                <a:ea typeface="+mn-ea"/>
+                <a:cs typeface="+mn-cs"/>
+              </a:rPr>
+              <a:t> </a:t>
+            </a:r>
+            <a:r>
+              <a:rPr lang="de-DE" sz="1200" kern="1200" dirty="0" err="1" smtClean="0">
+                <a:solidFill>
+                  <a:schemeClr val="tx1"/>
+                </a:solidFill>
+                <a:latin typeface="+mn-lt"/>
+                <a:ea typeface="+mn-ea"/>
+                <a:cs typeface="+mn-cs"/>
+              </a:rPr>
+              <a:t>trigger</a:t>
+            </a:r>
+            <a:r>
+              <a:rPr lang="de-DE" sz="1200" kern="1200" dirty="0" smtClean="0">
+                <a:solidFill>
+                  <a:schemeClr val="tx1"/>
+                </a:solidFill>
+                <a:latin typeface="+mn-lt"/>
+                <a:ea typeface="+mn-ea"/>
+                <a:cs typeface="+mn-cs"/>
+              </a:rPr>
+              <a:t> adaptive </a:t>
+            </a:r>
+            <a:r>
+              <a:rPr lang="de-DE" sz="1200" kern="1200" dirty="0" err="1" smtClean="0">
+                <a:solidFill>
+                  <a:schemeClr val="tx1"/>
+                </a:solidFill>
+                <a:latin typeface="+mn-lt"/>
+                <a:ea typeface="+mn-ea"/>
+                <a:cs typeface="+mn-cs"/>
+              </a:rPr>
+              <a:t>computation</a:t>
+            </a:r>
+            <a:r>
+              <a:rPr lang="de-DE" sz="1200" kern="1200" dirty="0" smtClean="0">
+                <a:solidFill>
+                  <a:schemeClr val="tx1"/>
+                </a:solidFill>
+                <a:latin typeface="+mn-lt"/>
+                <a:ea typeface="+mn-ea"/>
+                <a:cs typeface="+mn-cs"/>
+              </a:rPr>
+              <a:t> and </a:t>
+            </a:r>
+            <a:r>
+              <a:rPr lang="de-DE" sz="1200" kern="1200" dirty="0" err="1" smtClean="0">
+                <a:solidFill>
+                  <a:schemeClr val="tx1"/>
+                </a:solidFill>
+                <a:latin typeface="+mn-lt"/>
+                <a:ea typeface="+mn-ea"/>
+                <a:cs typeface="+mn-cs"/>
+              </a:rPr>
+              <a:t>steering</a:t>
+            </a:r>
+            <a:r>
+              <a:rPr lang="de-DE" sz="1200" kern="1200" dirty="0" smtClean="0">
+                <a:solidFill>
+                  <a:schemeClr val="tx1"/>
+                </a:solidFill>
+                <a:latin typeface="+mn-lt"/>
+                <a:ea typeface="+mn-ea"/>
+                <a:cs typeface="+mn-cs"/>
+              </a:rPr>
+              <a:t> </a:t>
+            </a:r>
+            <a:r>
+              <a:rPr lang="de-DE" sz="1200" kern="1200" dirty="0" err="1" smtClean="0">
+                <a:solidFill>
+                  <a:schemeClr val="tx1"/>
+                </a:solidFill>
+                <a:latin typeface="+mn-lt"/>
+                <a:ea typeface="+mn-ea"/>
+                <a:cs typeface="+mn-cs"/>
+              </a:rPr>
+              <a:t>which</a:t>
+            </a:r>
+            <a:r>
+              <a:rPr lang="de-DE" sz="1200" kern="1200" dirty="0" smtClean="0">
+                <a:solidFill>
+                  <a:schemeClr val="tx1"/>
+                </a:solidFill>
+                <a:latin typeface="+mn-lt"/>
+                <a:ea typeface="+mn-ea"/>
+                <a:cs typeface="+mn-cs"/>
+              </a:rPr>
+              <a:t> </a:t>
+            </a:r>
+            <a:r>
+              <a:rPr lang="de-DE" sz="1200" kern="1200" dirty="0" err="1" smtClean="0">
+                <a:solidFill>
+                  <a:schemeClr val="tx1"/>
+                </a:solidFill>
+                <a:latin typeface="+mn-lt"/>
+                <a:ea typeface="+mn-ea"/>
+                <a:cs typeface="+mn-cs"/>
+              </a:rPr>
+              <a:t>may</a:t>
+            </a:r>
+            <a:r>
+              <a:rPr lang="de-DE" sz="1200" kern="1200" dirty="0" smtClean="0">
+                <a:solidFill>
+                  <a:schemeClr val="tx1"/>
+                </a:solidFill>
+                <a:latin typeface="+mn-lt"/>
+                <a:ea typeface="+mn-ea"/>
+                <a:cs typeface="+mn-cs"/>
+              </a:rPr>
+              <a:t> in turn </a:t>
+            </a:r>
+            <a:r>
+              <a:rPr lang="de-DE" sz="1200" kern="1200" dirty="0" err="1" smtClean="0">
+                <a:solidFill>
+                  <a:schemeClr val="tx1"/>
+                </a:solidFill>
+                <a:latin typeface="+mn-lt"/>
+                <a:ea typeface="+mn-ea"/>
+                <a:cs typeface="+mn-cs"/>
+              </a:rPr>
+              <a:t>impact</a:t>
+            </a:r>
+            <a:r>
+              <a:rPr lang="de-DE" sz="1200" kern="1200" dirty="0" smtClean="0">
+                <a:solidFill>
+                  <a:schemeClr val="tx1"/>
+                </a:solidFill>
+                <a:latin typeface="+mn-lt"/>
+                <a:ea typeface="+mn-ea"/>
+                <a:cs typeface="+mn-cs"/>
+              </a:rPr>
+              <a:t> </a:t>
+            </a:r>
+            <a:r>
+              <a:rPr lang="de-DE" sz="1200" kern="1200" dirty="0" err="1" smtClean="0">
+                <a:solidFill>
+                  <a:schemeClr val="tx1"/>
+                </a:solidFill>
+                <a:latin typeface="+mn-lt"/>
+                <a:ea typeface="+mn-ea"/>
+                <a:cs typeface="+mn-cs"/>
+              </a:rPr>
+              <a:t>the</a:t>
+            </a:r>
+            <a:r>
+              <a:rPr lang="de-DE" sz="1200" kern="1200" dirty="0" smtClean="0">
+                <a:solidFill>
+                  <a:schemeClr val="tx1"/>
+                </a:solidFill>
+                <a:latin typeface="+mn-lt"/>
+                <a:ea typeface="+mn-ea"/>
+                <a:cs typeface="+mn-cs"/>
+              </a:rPr>
+              <a:t> </a:t>
+            </a:r>
+            <a:r>
+              <a:rPr lang="de-DE" sz="1200" kern="1200" dirty="0" err="1" smtClean="0">
+                <a:solidFill>
+                  <a:schemeClr val="tx1"/>
+                </a:solidFill>
+                <a:latin typeface="+mn-lt"/>
+                <a:ea typeface="+mn-ea"/>
+                <a:cs typeface="+mn-cs"/>
+              </a:rPr>
+              <a:t>data</a:t>
+            </a:r>
+            <a:r>
+              <a:rPr lang="de-DE" sz="1200" kern="1200" dirty="0" smtClean="0">
+                <a:solidFill>
+                  <a:schemeClr val="tx1"/>
+                </a:solidFill>
+                <a:latin typeface="+mn-lt"/>
+                <a:ea typeface="+mn-ea"/>
+                <a:cs typeface="+mn-cs"/>
+              </a:rPr>
+              <a:t> </a:t>
+            </a:r>
+            <a:r>
+              <a:rPr lang="de-DE" sz="1200" kern="1200" dirty="0" err="1" smtClean="0">
+                <a:solidFill>
+                  <a:schemeClr val="tx1"/>
+                </a:solidFill>
+                <a:latin typeface="+mn-lt"/>
+                <a:ea typeface="+mn-ea"/>
+                <a:cs typeface="+mn-cs"/>
+              </a:rPr>
+              <a:t>collection</a:t>
+            </a:r>
+            <a:r>
+              <a:rPr lang="de-DE" sz="1200" kern="1200" dirty="0" smtClean="0">
+                <a:solidFill>
+                  <a:schemeClr val="tx1"/>
+                </a:solidFill>
+                <a:latin typeface="+mn-lt"/>
+                <a:ea typeface="+mn-ea"/>
+                <a:cs typeface="+mn-cs"/>
+              </a:rPr>
+              <a:t> </a:t>
+            </a:r>
+            <a:r>
+              <a:rPr lang="de-DE" sz="1200" kern="1200" dirty="0" err="1" smtClean="0">
+                <a:solidFill>
+                  <a:schemeClr val="tx1"/>
+                </a:solidFill>
+                <a:latin typeface="+mn-lt"/>
+                <a:ea typeface="+mn-ea"/>
+                <a:cs typeface="+mn-cs"/>
+              </a:rPr>
+              <a:t>process</a:t>
+            </a:r>
+            <a:r>
+              <a:rPr lang="de-DE" sz="1200" kern="1200" dirty="0" smtClean="0">
+                <a:solidFill>
+                  <a:schemeClr val="tx1"/>
+                </a:solidFill>
+                <a:latin typeface="+mn-lt"/>
+                <a:ea typeface="+mn-ea"/>
+                <a:cs typeface="+mn-cs"/>
+              </a:rPr>
+              <a:t>. </a:t>
+            </a:r>
+            <a:r>
+              <a:rPr lang="de-DE" sz="1200" kern="1200" dirty="0" err="1" smtClean="0">
+                <a:solidFill>
+                  <a:schemeClr val="tx1"/>
+                </a:solidFill>
+                <a:latin typeface="+mn-lt"/>
+                <a:ea typeface="+mn-ea"/>
+                <a:cs typeface="+mn-cs"/>
+              </a:rPr>
+              <a:t>This</a:t>
+            </a:r>
+            <a:r>
+              <a:rPr lang="de-DE" sz="1200" kern="1200" dirty="0" smtClean="0">
+                <a:solidFill>
+                  <a:schemeClr val="tx1"/>
+                </a:solidFill>
+                <a:latin typeface="+mn-lt"/>
+                <a:ea typeface="+mn-ea"/>
+                <a:cs typeface="+mn-cs"/>
+              </a:rPr>
+              <a:t> has </a:t>
+            </a:r>
+            <a:r>
+              <a:rPr lang="de-DE" sz="1200" kern="1200" dirty="0" err="1" smtClean="0">
+                <a:solidFill>
+                  <a:schemeClr val="tx1"/>
+                </a:solidFill>
+                <a:latin typeface="+mn-lt"/>
+                <a:ea typeface="+mn-ea"/>
+                <a:cs typeface="+mn-cs"/>
+              </a:rPr>
+              <a:t>been</a:t>
+            </a:r>
+            <a:r>
+              <a:rPr lang="de-DE" sz="1200" kern="1200" dirty="0" smtClean="0">
+                <a:solidFill>
+                  <a:schemeClr val="tx1"/>
+                </a:solidFill>
+                <a:latin typeface="+mn-lt"/>
+                <a:ea typeface="+mn-ea"/>
+                <a:cs typeface="+mn-cs"/>
+              </a:rPr>
+              <a:t> </a:t>
+            </a:r>
+            <a:r>
+              <a:rPr lang="de-DE" sz="1200" kern="1200" dirty="0" err="1" smtClean="0">
+                <a:solidFill>
+                  <a:schemeClr val="tx1"/>
+                </a:solidFill>
+                <a:latin typeface="+mn-lt"/>
+                <a:ea typeface="+mn-ea"/>
+                <a:cs typeface="+mn-cs"/>
+              </a:rPr>
+              <a:t>termed</a:t>
+            </a:r>
+            <a:r>
+              <a:rPr lang="de-DE" sz="1200" kern="1200" dirty="0" smtClean="0">
+                <a:solidFill>
+                  <a:schemeClr val="tx1"/>
+                </a:solidFill>
+                <a:latin typeface="+mn-lt"/>
+                <a:ea typeface="+mn-ea"/>
+                <a:cs typeface="+mn-cs"/>
+              </a:rPr>
+              <a:t> </a:t>
+            </a:r>
+            <a:r>
+              <a:rPr lang="de-DE" sz="1200" kern="1200" dirty="0" err="1" smtClean="0">
+                <a:solidFill>
+                  <a:schemeClr val="tx1"/>
+                </a:solidFill>
+                <a:latin typeface="+mn-lt"/>
+                <a:ea typeface="+mn-ea"/>
+                <a:cs typeface="+mn-cs"/>
+              </a:rPr>
+              <a:t>dynamic</a:t>
+            </a:r>
+            <a:r>
+              <a:rPr lang="de-DE" sz="1200" kern="1200" dirty="0" smtClean="0">
+                <a:solidFill>
+                  <a:schemeClr val="tx1"/>
+                </a:solidFill>
+                <a:latin typeface="+mn-lt"/>
+                <a:ea typeface="+mn-ea"/>
+                <a:cs typeface="+mn-cs"/>
+              </a:rPr>
+              <a:t> </a:t>
+            </a:r>
+            <a:r>
+              <a:rPr lang="de-DE" sz="1200" kern="1200" dirty="0" err="1" smtClean="0">
+                <a:solidFill>
+                  <a:schemeClr val="tx1"/>
+                </a:solidFill>
+                <a:latin typeface="+mn-lt"/>
+                <a:ea typeface="+mn-ea"/>
+                <a:cs typeface="+mn-cs"/>
+              </a:rPr>
+              <a:t>data</a:t>
+            </a:r>
+            <a:r>
+              <a:rPr lang="de-DE" sz="1200" kern="1200" dirty="0" smtClean="0">
+                <a:solidFill>
+                  <a:schemeClr val="tx1"/>
+                </a:solidFill>
+                <a:latin typeface="+mn-lt"/>
+                <a:ea typeface="+mn-ea"/>
+                <a:cs typeface="+mn-cs"/>
+              </a:rPr>
+              <a:t> </a:t>
+            </a:r>
+            <a:r>
+              <a:rPr lang="de-DE" sz="1200" kern="1200" dirty="0" err="1" smtClean="0">
+                <a:solidFill>
+                  <a:schemeClr val="tx1"/>
+                </a:solidFill>
+                <a:latin typeface="+mn-lt"/>
+                <a:ea typeface="+mn-ea"/>
+                <a:cs typeface="+mn-cs"/>
+              </a:rPr>
+              <a:t>driven</a:t>
+            </a:r>
+            <a:r>
+              <a:rPr lang="de-DE" sz="1200" kern="1200" dirty="0" smtClean="0">
+                <a:solidFill>
+                  <a:schemeClr val="tx1"/>
+                </a:solidFill>
+                <a:latin typeface="+mn-lt"/>
+                <a:ea typeface="+mn-ea"/>
+                <a:cs typeface="+mn-cs"/>
+              </a:rPr>
+              <a:t> </a:t>
+            </a:r>
+            <a:r>
+              <a:rPr lang="de-DE" sz="1200" kern="1200" dirty="0" err="1" smtClean="0">
+                <a:solidFill>
+                  <a:schemeClr val="tx1"/>
+                </a:solidFill>
+                <a:latin typeface="+mn-lt"/>
+                <a:ea typeface="+mn-ea"/>
+                <a:cs typeface="+mn-cs"/>
+              </a:rPr>
+              <a:t>application</a:t>
+            </a:r>
+            <a:r>
+              <a:rPr lang="de-DE" sz="1200" kern="1200" dirty="0" smtClean="0">
+                <a:solidFill>
+                  <a:schemeClr val="tx1"/>
+                </a:solidFill>
+                <a:latin typeface="+mn-lt"/>
+                <a:ea typeface="+mn-ea"/>
+                <a:cs typeface="+mn-cs"/>
+              </a:rPr>
+              <a:t> </a:t>
+            </a:r>
+            <a:r>
+              <a:rPr lang="de-DE" sz="1200" kern="1200" dirty="0" err="1" smtClean="0">
+                <a:solidFill>
+                  <a:schemeClr val="tx1"/>
+                </a:solidFill>
+                <a:latin typeface="+mn-lt"/>
+                <a:ea typeface="+mn-ea"/>
+                <a:cs typeface="+mn-cs"/>
+              </a:rPr>
+              <a:t>systems</a:t>
+            </a:r>
+            <a:r>
+              <a:rPr lang="de-DE" sz="1200" kern="1200" dirty="0" smtClean="0">
+                <a:solidFill>
+                  <a:schemeClr val="tx1"/>
+                </a:solidFill>
+                <a:latin typeface="+mn-lt"/>
+                <a:ea typeface="+mn-ea"/>
+                <a:cs typeface="+mn-cs"/>
+              </a:rPr>
+              <a:t> (DDDAS) </a:t>
+            </a:r>
+            <a:r>
+              <a:rPr lang="de-DE" sz="1200" kern="1200" dirty="0" err="1" smtClean="0">
+                <a:solidFill>
+                  <a:schemeClr val="tx1"/>
+                </a:solidFill>
+                <a:latin typeface="+mn-lt"/>
+                <a:ea typeface="+mn-ea"/>
+                <a:cs typeface="+mn-cs"/>
+              </a:rPr>
+              <a:t>or</a:t>
+            </a:r>
+            <a:r>
+              <a:rPr lang="de-DE" sz="1200" kern="1200" dirty="0" smtClean="0">
+                <a:solidFill>
+                  <a:schemeClr val="tx1"/>
+                </a:solidFill>
+                <a:latin typeface="+mn-lt"/>
+                <a:ea typeface="+mn-ea"/>
+                <a:cs typeface="+mn-cs"/>
+              </a:rPr>
+              <a:t> </a:t>
+            </a:r>
+            <a:r>
+              <a:rPr lang="de-DE" sz="1200" kern="1200" dirty="0" err="1" smtClean="0">
+                <a:solidFill>
+                  <a:schemeClr val="tx1"/>
+                </a:solidFill>
+                <a:latin typeface="+mn-lt"/>
+                <a:ea typeface="+mn-ea"/>
+                <a:cs typeface="+mn-cs"/>
+              </a:rPr>
+              <a:t>more</a:t>
+            </a:r>
+            <a:r>
+              <a:rPr lang="de-DE" sz="1200" kern="1200" dirty="0" smtClean="0">
+                <a:solidFill>
+                  <a:schemeClr val="tx1"/>
+                </a:solidFill>
+                <a:latin typeface="+mn-lt"/>
+                <a:ea typeface="+mn-ea"/>
+                <a:cs typeface="+mn-cs"/>
+              </a:rPr>
+              <a:t> </a:t>
+            </a:r>
+            <a:r>
+              <a:rPr lang="de-DE" sz="1200" kern="1200" dirty="0" err="1" smtClean="0">
+                <a:solidFill>
+                  <a:schemeClr val="tx1"/>
+                </a:solidFill>
+                <a:latin typeface="+mn-lt"/>
+                <a:ea typeface="+mn-ea"/>
+                <a:cs typeface="+mn-cs"/>
+              </a:rPr>
+              <a:t>recently</a:t>
+            </a:r>
+            <a:r>
+              <a:rPr lang="de-DE" sz="1200" kern="1200" dirty="0" smtClean="0">
+                <a:solidFill>
+                  <a:schemeClr val="tx1"/>
+                </a:solidFill>
+                <a:latin typeface="+mn-lt"/>
+                <a:ea typeface="+mn-ea"/>
+                <a:cs typeface="+mn-cs"/>
+              </a:rPr>
+              <a:t> </a:t>
+            </a:r>
+            <a:r>
+              <a:rPr lang="de-DE" sz="1200" kern="1200" dirty="0" err="1" smtClean="0">
+                <a:solidFill>
+                  <a:schemeClr val="tx1"/>
+                </a:solidFill>
+                <a:latin typeface="+mn-lt"/>
+                <a:ea typeface="+mn-ea"/>
+                <a:cs typeface="+mn-cs"/>
+              </a:rPr>
+              <a:t>InfoSymbiotic</a:t>
+            </a:r>
+            <a:r>
+              <a:rPr lang="de-DE" sz="1200" kern="1200" dirty="0" smtClean="0">
+                <a:solidFill>
+                  <a:schemeClr val="tx1"/>
+                </a:solidFill>
+                <a:latin typeface="+mn-lt"/>
+                <a:ea typeface="+mn-ea"/>
+                <a:cs typeface="+mn-cs"/>
+              </a:rPr>
+              <a:t> </a:t>
+            </a:r>
+            <a:r>
+              <a:rPr lang="de-DE" sz="1200" kern="1200" dirty="0" err="1" smtClean="0">
+                <a:solidFill>
+                  <a:schemeClr val="tx1"/>
+                </a:solidFill>
+                <a:latin typeface="+mn-lt"/>
+                <a:ea typeface="+mn-ea"/>
+                <a:cs typeface="+mn-cs"/>
+              </a:rPr>
+              <a:t>systems</a:t>
+            </a:r>
+            <a:r>
+              <a:rPr lang="de-DE" sz="1200" kern="1200" dirty="0" smtClean="0">
+                <a:solidFill>
+                  <a:schemeClr val="tx1"/>
+                </a:solidFill>
+                <a:latin typeface="+mn-lt"/>
+                <a:ea typeface="+mn-ea"/>
+                <a:cs typeface="+mn-cs"/>
+              </a:rPr>
+              <a:t>.</a:t>
+            </a:r>
+          </a:p>
+          <a:p>
+            <a:r>
+              <a:rPr lang="de-DE" sz="1200" kern="1200" dirty="0" smtClean="0">
+                <a:solidFill>
+                  <a:schemeClr val="tx1"/>
+                </a:solidFill>
+                <a:latin typeface="+mn-lt"/>
+                <a:ea typeface="+mn-ea"/>
+                <a:cs typeface="+mn-cs"/>
+              </a:rPr>
+              <a:t>• (D4) Access </a:t>
+            </a:r>
+            <a:r>
+              <a:rPr lang="de-DE" sz="1200" kern="1200" dirty="0" err="1" smtClean="0">
+                <a:solidFill>
+                  <a:schemeClr val="tx1"/>
+                </a:solidFill>
+                <a:latin typeface="+mn-lt"/>
+                <a:ea typeface="+mn-ea"/>
+                <a:cs typeface="+mn-cs"/>
+              </a:rPr>
+              <a:t>Mechanisms</a:t>
+            </a:r>
+            <a:r>
+              <a:rPr lang="de-DE" sz="1200" kern="1200" dirty="0" smtClean="0">
+                <a:solidFill>
+                  <a:schemeClr val="tx1"/>
+                </a:solidFill>
+                <a:latin typeface="+mn-lt"/>
+                <a:ea typeface="+mn-ea"/>
+                <a:cs typeface="+mn-cs"/>
+              </a:rPr>
+              <a:t>: Data </a:t>
+            </a:r>
+            <a:r>
+              <a:rPr lang="de-DE" sz="1200" kern="1200" dirty="0" err="1" smtClean="0">
+                <a:solidFill>
+                  <a:schemeClr val="tx1"/>
+                </a:solidFill>
+                <a:latin typeface="+mn-lt"/>
+                <a:ea typeface="+mn-ea"/>
+                <a:cs typeface="+mn-cs"/>
+              </a:rPr>
+              <a:t>access</a:t>
+            </a:r>
+            <a:r>
+              <a:rPr lang="de-DE" sz="1200" kern="1200" dirty="0" smtClean="0">
+                <a:solidFill>
+                  <a:schemeClr val="tx1"/>
+                </a:solidFill>
+                <a:latin typeface="+mn-lt"/>
+                <a:ea typeface="+mn-ea"/>
+                <a:cs typeface="+mn-cs"/>
+              </a:rPr>
+              <a:t> </a:t>
+            </a:r>
+            <a:r>
+              <a:rPr lang="de-DE" sz="1200" kern="1200" dirty="0" err="1" smtClean="0">
+                <a:solidFill>
+                  <a:schemeClr val="tx1"/>
+                </a:solidFill>
+                <a:latin typeface="+mn-lt"/>
+                <a:ea typeface="+mn-ea"/>
+                <a:cs typeface="+mn-cs"/>
+              </a:rPr>
+              <a:t>includes</a:t>
+            </a:r>
+            <a:r>
+              <a:rPr lang="de-DE" sz="1200" kern="1200" dirty="0" smtClean="0">
+                <a:solidFill>
+                  <a:schemeClr val="tx1"/>
+                </a:solidFill>
+                <a:latin typeface="+mn-lt"/>
+                <a:ea typeface="+mn-ea"/>
+                <a:cs typeface="+mn-cs"/>
+              </a:rPr>
+              <a:t> </a:t>
+            </a:r>
+            <a:r>
+              <a:rPr lang="de-DE" sz="1200" kern="1200" dirty="0" err="1" smtClean="0">
+                <a:solidFill>
+                  <a:schemeClr val="tx1"/>
+                </a:solidFill>
+                <a:latin typeface="+mn-lt"/>
+                <a:ea typeface="+mn-ea"/>
+                <a:cs typeface="+mn-cs"/>
+              </a:rPr>
+              <a:t>low-level</a:t>
+            </a:r>
+            <a:r>
+              <a:rPr lang="de-DE" sz="1200" kern="1200" dirty="0" smtClean="0">
+                <a:solidFill>
+                  <a:schemeClr val="tx1"/>
+                </a:solidFill>
+                <a:latin typeface="+mn-lt"/>
+                <a:ea typeface="+mn-ea"/>
+                <a:cs typeface="+mn-cs"/>
+              </a:rPr>
+              <a:t> </a:t>
+            </a:r>
+            <a:r>
+              <a:rPr lang="de-DE" sz="1200" kern="1200" dirty="0" err="1" smtClean="0">
+                <a:solidFill>
+                  <a:schemeClr val="tx1"/>
+                </a:solidFill>
+                <a:latin typeface="+mn-lt"/>
+                <a:ea typeface="+mn-ea"/>
+                <a:cs typeface="+mn-cs"/>
+              </a:rPr>
+              <a:t>protocols</a:t>
+            </a:r>
+            <a:r>
+              <a:rPr lang="de-DE" sz="1200" kern="1200" dirty="0" smtClean="0">
+                <a:solidFill>
+                  <a:schemeClr val="tx1"/>
+                </a:solidFill>
+                <a:latin typeface="+mn-lt"/>
+                <a:ea typeface="+mn-ea"/>
+                <a:cs typeface="+mn-cs"/>
+              </a:rPr>
+              <a:t> </a:t>
+            </a:r>
+            <a:r>
+              <a:rPr lang="de-DE" sz="1200" kern="1200" dirty="0" err="1" smtClean="0">
+                <a:solidFill>
+                  <a:schemeClr val="tx1"/>
+                </a:solidFill>
+                <a:latin typeface="+mn-lt"/>
+                <a:ea typeface="+mn-ea"/>
+                <a:cs typeface="+mn-cs"/>
+              </a:rPr>
+              <a:t>that</a:t>
+            </a:r>
+            <a:r>
+              <a:rPr lang="de-DE" sz="1200" kern="1200" dirty="0" smtClean="0">
+                <a:solidFill>
+                  <a:schemeClr val="tx1"/>
+                </a:solidFill>
+                <a:latin typeface="+mn-lt"/>
+                <a:ea typeface="+mn-ea"/>
+                <a:cs typeface="+mn-cs"/>
+              </a:rPr>
+              <a:t> </a:t>
+            </a:r>
+            <a:r>
+              <a:rPr lang="de-DE" sz="1200" kern="1200" dirty="0" err="1" smtClean="0">
+                <a:solidFill>
+                  <a:schemeClr val="tx1"/>
+                </a:solidFill>
+                <a:latin typeface="+mn-lt"/>
+                <a:ea typeface="+mn-ea"/>
+                <a:cs typeface="+mn-cs"/>
+              </a:rPr>
+              <a:t>hide</a:t>
+            </a:r>
+            <a:r>
+              <a:rPr lang="de-DE" sz="1200" kern="1200" dirty="0" smtClean="0">
+                <a:solidFill>
+                  <a:schemeClr val="tx1"/>
+                </a:solidFill>
+                <a:latin typeface="+mn-lt"/>
+                <a:ea typeface="+mn-ea"/>
+                <a:cs typeface="+mn-cs"/>
+              </a:rPr>
+              <a:t> </a:t>
+            </a:r>
+            <a:r>
+              <a:rPr lang="de-DE" sz="1200" kern="1200" dirty="0" err="1" smtClean="0">
+                <a:solidFill>
+                  <a:schemeClr val="tx1"/>
+                </a:solidFill>
+                <a:latin typeface="+mn-lt"/>
+                <a:ea typeface="+mn-ea"/>
+                <a:cs typeface="+mn-cs"/>
+              </a:rPr>
+              <a:t>the</a:t>
+            </a:r>
+            <a:r>
+              <a:rPr lang="de-DE" sz="1200" kern="1200" dirty="0" smtClean="0">
+                <a:solidFill>
+                  <a:schemeClr val="tx1"/>
+                </a:solidFill>
+                <a:latin typeface="+mn-lt"/>
+                <a:ea typeface="+mn-ea"/>
+                <a:cs typeface="+mn-cs"/>
+              </a:rPr>
+              <a:t> </a:t>
+            </a:r>
+            <a:r>
+              <a:rPr lang="de-DE" sz="1200" kern="1200" dirty="0" err="1" smtClean="0">
+                <a:solidFill>
+                  <a:schemeClr val="tx1"/>
+                </a:solidFill>
+                <a:latin typeface="+mn-lt"/>
+                <a:ea typeface="+mn-ea"/>
+                <a:cs typeface="+mn-cs"/>
+              </a:rPr>
+              <a:t>distribution</a:t>
+            </a:r>
+            <a:r>
+              <a:rPr lang="de-DE" sz="1200" kern="1200" dirty="0" smtClean="0">
+                <a:solidFill>
+                  <a:schemeClr val="tx1"/>
+                </a:solidFill>
+                <a:latin typeface="+mn-lt"/>
+                <a:ea typeface="+mn-ea"/>
+                <a:cs typeface="+mn-cs"/>
+              </a:rPr>
+              <a:t> and </a:t>
+            </a:r>
+            <a:r>
+              <a:rPr lang="de-DE" sz="1200" kern="1200" dirty="0" err="1" smtClean="0">
+                <a:solidFill>
+                  <a:schemeClr val="tx1"/>
+                </a:solidFill>
+                <a:latin typeface="+mn-lt"/>
+                <a:ea typeface="+mn-ea"/>
+                <a:cs typeface="+mn-cs"/>
+              </a:rPr>
+              <a:t>heterogeneous</a:t>
+            </a:r>
+            <a:r>
+              <a:rPr lang="de-DE" sz="1200" kern="1200" dirty="0" smtClean="0">
+                <a:solidFill>
+                  <a:schemeClr val="tx1"/>
+                </a:solidFill>
+                <a:latin typeface="+mn-lt"/>
+                <a:ea typeface="+mn-ea"/>
+                <a:cs typeface="+mn-cs"/>
+              </a:rPr>
+              <a:t> nature of </a:t>
+            </a:r>
+            <a:r>
+              <a:rPr lang="de-DE" sz="1200" kern="1200" dirty="0" err="1" smtClean="0">
+                <a:solidFill>
+                  <a:schemeClr val="tx1"/>
+                </a:solidFill>
+                <a:latin typeface="+mn-lt"/>
+                <a:ea typeface="+mn-ea"/>
+                <a:cs typeface="+mn-cs"/>
+              </a:rPr>
+              <a:t>data</a:t>
+            </a:r>
+            <a:r>
+              <a:rPr lang="de-DE" sz="1200" kern="1200" dirty="0" smtClean="0">
+                <a:solidFill>
+                  <a:schemeClr val="tx1"/>
+                </a:solidFill>
+                <a:latin typeface="+mn-lt"/>
+                <a:ea typeface="+mn-ea"/>
+                <a:cs typeface="+mn-cs"/>
+              </a:rPr>
+              <a:t> </a:t>
+            </a:r>
+            <a:r>
+              <a:rPr lang="de-DE" sz="1200" kern="1200" dirty="0" err="1" smtClean="0">
+                <a:solidFill>
+                  <a:schemeClr val="tx1"/>
+                </a:solidFill>
+                <a:latin typeface="+mn-lt"/>
+                <a:ea typeface="+mn-ea"/>
+                <a:cs typeface="+mn-cs"/>
+              </a:rPr>
+              <a:t>sources</a:t>
+            </a:r>
+            <a:r>
+              <a:rPr lang="de-DE" sz="1200" kern="1200" dirty="0" smtClean="0">
+                <a:solidFill>
+                  <a:schemeClr val="tx1"/>
+                </a:solidFill>
+                <a:latin typeface="+mn-lt"/>
+                <a:ea typeface="+mn-ea"/>
+                <a:cs typeface="+mn-cs"/>
+              </a:rPr>
+              <a:t> via uniform </a:t>
+            </a:r>
+            <a:r>
+              <a:rPr lang="de-DE" sz="1200" kern="1200" dirty="0" err="1" smtClean="0">
+                <a:solidFill>
+                  <a:schemeClr val="tx1"/>
+                </a:solidFill>
+                <a:latin typeface="+mn-lt"/>
+                <a:ea typeface="+mn-ea"/>
+                <a:cs typeface="+mn-cs"/>
+              </a:rPr>
+              <a:t>interaces</a:t>
+            </a:r>
+            <a:r>
+              <a:rPr lang="de-DE" sz="1200" kern="1200" dirty="0" smtClean="0">
+                <a:solidFill>
+                  <a:schemeClr val="tx1"/>
+                </a:solidFill>
+                <a:latin typeface="+mn-lt"/>
+                <a:ea typeface="+mn-ea"/>
+                <a:cs typeface="+mn-cs"/>
+              </a:rPr>
+              <a:t>. </a:t>
+            </a:r>
+            <a:r>
+              <a:rPr lang="de-DE" sz="1200" kern="1200" dirty="0" err="1" smtClean="0">
+                <a:solidFill>
+                  <a:schemeClr val="tx1"/>
+                </a:solidFill>
+                <a:latin typeface="+mn-lt"/>
+                <a:ea typeface="+mn-ea"/>
+                <a:cs typeface="+mn-cs"/>
+              </a:rPr>
+              <a:t>This</a:t>
+            </a:r>
+            <a:r>
+              <a:rPr lang="de-DE" sz="1200" kern="1200" dirty="0" smtClean="0">
+                <a:solidFill>
+                  <a:schemeClr val="tx1"/>
+                </a:solidFill>
+                <a:latin typeface="+mn-lt"/>
+                <a:ea typeface="+mn-ea"/>
+                <a:cs typeface="+mn-cs"/>
+              </a:rPr>
+              <a:t> also </a:t>
+            </a:r>
+            <a:r>
+              <a:rPr lang="de-DE" sz="1200" kern="1200" dirty="0" err="1" smtClean="0">
+                <a:solidFill>
+                  <a:schemeClr val="tx1"/>
+                </a:solidFill>
+                <a:latin typeface="+mn-lt"/>
+                <a:ea typeface="+mn-ea"/>
+                <a:cs typeface="+mn-cs"/>
+              </a:rPr>
+              <a:t>includes</a:t>
+            </a:r>
+            <a:r>
+              <a:rPr lang="de-DE" sz="1200" kern="1200" dirty="0" smtClean="0">
+                <a:solidFill>
+                  <a:schemeClr val="tx1"/>
+                </a:solidFill>
+                <a:latin typeface="+mn-lt"/>
+                <a:ea typeface="+mn-ea"/>
+                <a:cs typeface="+mn-cs"/>
+              </a:rPr>
+              <a:t> </a:t>
+            </a:r>
+            <a:r>
+              <a:rPr lang="de-DE" sz="1200" kern="1200" dirty="0" err="1" smtClean="0">
+                <a:solidFill>
+                  <a:schemeClr val="tx1"/>
+                </a:solidFill>
+                <a:latin typeface="+mn-lt"/>
+                <a:ea typeface="+mn-ea"/>
+                <a:cs typeface="+mn-cs"/>
+              </a:rPr>
+              <a:t>access</a:t>
+            </a:r>
+            <a:r>
+              <a:rPr lang="de-DE" sz="1200" kern="1200" dirty="0" smtClean="0">
+                <a:solidFill>
+                  <a:schemeClr val="tx1"/>
+                </a:solidFill>
+                <a:latin typeface="+mn-lt"/>
+                <a:ea typeface="+mn-ea"/>
+                <a:cs typeface="+mn-cs"/>
+              </a:rPr>
+              <a:t> </a:t>
+            </a:r>
+            <a:r>
+              <a:rPr lang="de-DE" sz="1200" kern="1200" dirty="0" err="1" smtClean="0">
+                <a:solidFill>
+                  <a:schemeClr val="tx1"/>
+                </a:solidFill>
+                <a:latin typeface="+mn-lt"/>
+                <a:ea typeface="+mn-ea"/>
+                <a:cs typeface="+mn-cs"/>
+              </a:rPr>
+              <a:t>policy</a:t>
+            </a:r>
+            <a:r>
+              <a:rPr lang="de-DE" sz="1200" kern="1200" dirty="0" smtClean="0">
+                <a:solidFill>
+                  <a:schemeClr val="tx1"/>
+                </a:solidFill>
+                <a:latin typeface="+mn-lt"/>
+                <a:ea typeface="+mn-ea"/>
+                <a:cs typeface="+mn-cs"/>
+              </a:rPr>
+              <a:t> </a:t>
+            </a:r>
+            <a:r>
+              <a:rPr lang="de-DE" sz="1200" kern="1200" dirty="0" err="1" smtClean="0">
+                <a:solidFill>
+                  <a:schemeClr val="tx1"/>
+                </a:solidFill>
+                <a:latin typeface="+mn-lt"/>
+                <a:ea typeface="+mn-ea"/>
+                <a:cs typeface="+mn-cs"/>
+              </a:rPr>
+              <a:t>that</a:t>
+            </a:r>
+            <a:r>
+              <a:rPr lang="de-DE" sz="1200" kern="1200" dirty="0" smtClean="0">
+                <a:solidFill>
+                  <a:schemeClr val="tx1"/>
+                </a:solidFill>
+                <a:latin typeface="+mn-lt"/>
+                <a:ea typeface="+mn-ea"/>
+                <a:cs typeface="+mn-cs"/>
+              </a:rPr>
+              <a:t> </a:t>
+            </a:r>
+            <a:r>
+              <a:rPr lang="de-DE" sz="1200" kern="1200" dirty="0" err="1" smtClean="0">
+                <a:solidFill>
+                  <a:schemeClr val="tx1"/>
+                </a:solidFill>
+                <a:latin typeface="+mn-lt"/>
+                <a:ea typeface="+mn-ea"/>
+                <a:cs typeface="+mn-cs"/>
+              </a:rPr>
+              <a:t>govern</a:t>
+            </a:r>
+            <a:r>
+              <a:rPr lang="de-DE" sz="1200" kern="1200" dirty="0" smtClean="0">
+                <a:solidFill>
+                  <a:schemeClr val="tx1"/>
+                </a:solidFill>
+                <a:latin typeface="+mn-lt"/>
+                <a:ea typeface="+mn-ea"/>
+                <a:cs typeface="+mn-cs"/>
+              </a:rPr>
+              <a:t> </a:t>
+            </a:r>
+            <a:r>
+              <a:rPr lang="de-DE" sz="1200" kern="1200" dirty="0" err="1" smtClean="0">
+                <a:solidFill>
+                  <a:schemeClr val="tx1"/>
+                </a:solidFill>
+                <a:latin typeface="+mn-lt"/>
+                <a:ea typeface="+mn-ea"/>
+                <a:cs typeface="+mn-cs"/>
+              </a:rPr>
+              <a:t>who</a:t>
+            </a:r>
+            <a:r>
+              <a:rPr lang="de-DE" sz="1200" kern="1200" dirty="0" smtClean="0">
+                <a:solidFill>
+                  <a:schemeClr val="tx1"/>
+                </a:solidFill>
+                <a:latin typeface="+mn-lt"/>
+                <a:ea typeface="+mn-ea"/>
+                <a:cs typeface="+mn-cs"/>
+              </a:rPr>
+              <a:t> </a:t>
+            </a:r>
+            <a:r>
+              <a:rPr lang="de-DE" sz="1200" kern="1200" dirty="0" err="1" smtClean="0">
+                <a:solidFill>
+                  <a:schemeClr val="tx1"/>
+                </a:solidFill>
+                <a:latin typeface="+mn-lt"/>
+                <a:ea typeface="+mn-ea"/>
+                <a:cs typeface="+mn-cs"/>
+              </a:rPr>
+              <a:t>is</a:t>
+            </a:r>
+            <a:r>
+              <a:rPr lang="de-DE" sz="1200" kern="1200" dirty="0" smtClean="0">
+                <a:solidFill>
+                  <a:schemeClr val="tx1"/>
+                </a:solidFill>
+                <a:latin typeface="+mn-lt"/>
+                <a:ea typeface="+mn-ea"/>
+                <a:cs typeface="+mn-cs"/>
+              </a:rPr>
+              <a:t> </a:t>
+            </a:r>
+            <a:r>
+              <a:rPr lang="de-DE" sz="1200" kern="1200" dirty="0" err="1" smtClean="0">
+                <a:solidFill>
+                  <a:schemeClr val="tx1"/>
+                </a:solidFill>
+                <a:latin typeface="+mn-lt"/>
+                <a:ea typeface="+mn-ea"/>
+                <a:cs typeface="+mn-cs"/>
+              </a:rPr>
+              <a:t>allowed</a:t>
+            </a:r>
+            <a:r>
+              <a:rPr lang="de-DE" sz="1200" kern="1200" dirty="0" smtClean="0">
+                <a:solidFill>
+                  <a:schemeClr val="tx1"/>
+                </a:solidFill>
+                <a:latin typeface="+mn-lt"/>
+                <a:ea typeface="+mn-ea"/>
+                <a:cs typeface="+mn-cs"/>
+              </a:rPr>
+              <a:t> to </a:t>
+            </a:r>
+            <a:r>
+              <a:rPr lang="de-DE" sz="1200" kern="1200" dirty="0" err="1" smtClean="0">
+                <a:solidFill>
+                  <a:schemeClr val="tx1"/>
+                </a:solidFill>
+                <a:latin typeface="+mn-lt"/>
+                <a:ea typeface="+mn-ea"/>
+                <a:cs typeface="+mn-cs"/>
+              </a:rPr>
+              <a:t>access</a:t>
+            </a:r>
+            <a:r>
+              <a:rPr lang="de-DE" sz="1200" kern="1200" dirty="0" smtClean="0">
+                <a:solidFill>
+                  <a:schemeClr val="tx1"/>
+                </a:solidFill>
+                <a:latin typeface="+mn-lt"/>
+                <a:ea typeface="+mn-ea"/>
+                <a:cs typeface="+mn-cs"/>
+              </a:rPr>
+              <a:t> (</a:t>
+            </a:r>
+            <a:r>
+              <a:rPr lang="de-DE" sz="1200" kern="1200" dirty="0" err="1" smtClean="0">
+                <a:solidFill>
+                  <a:schemeClr val="tx1"/>
+                </a:solidFill>
+                <a:latin typeface="+mn-lt"/>
+                <a:ea typeface="+mn-ea"/>
+                <a:cs typeface="+mn-cs"/>
+              </a:rPr>
+              <a:t>read</a:t>
+            </a:r>
+            <a:r>
+              <a:rPr lang="de-DE" sz="1200" kern="1200" dirty="0" smtClean="0">
+                <a:solidFill>
+                  <a:schemeClr val="tx1"/>
+                </a:solidFill>
+                <a:latin typeface="+mn-lt"/>
+                <a:ea typeface="+mn-ea"/>
+                <a:cs typeface="+mn-cs"/>
+              </a:rPr>
+              <a:t> </a:t>
+            </a:r>
+            <a:r>
+              <a:rPr lang="de-DE" sz="1200" kern="1200" dirty="0" err="1" smtClean="0">
+                <a:solidFill>
+                  <a:schemeClr val="tx1"/>
+                </a:solidFill>
+                <a:latin typeface="+mn-lt"/>
+                <a:ea typeface="+mn-ea"/>
+                <a:cs typeface="+mn-cs"/>
+              </a:rPr>
+              <a:t>or</a:t>
+            </a:r>
+            <a:r>
+              <a:rPr lang="de-DE" sz="1200" kern="1200" dirty="0" smtClean="0">
+                <a:solidFill>
+                  <a:schemeClr val="tx1"/>
+                </a:solidFill>
+                <a:latin typeface="+mn-lt"/>
+                <a:ea typeface="+mn-ea"/>
+                <a:cs typeface="+mn-cs"/>
+              </a:rPr>
+              <a:t> </a:t>
+            </a:r>
+            <a:r>
+              <a:rPr lang="de-DE" sz="1200" kern="1200" dirty="0" err="1" smtClean="0">
+                <a:solidFill>
+                  <a:schemeClr val="tx1"/>
+                </a:solidFill>
+                <a:latin typeface="+mn-lt"/>
+                <a:ea typeface="+mn-ea"/>
+                <a:cs typeface="+mn-cs"/>
+              </a:rPr>
+              <a:t>write</a:t>
+            </a:r>
+            <a:r>
+              <a:rPr lang="de-DE" sz="1200" kern="1200" dirty="0" smtClean="0">
+                <a:solidFill>
+                  <a:schemeClr val="tx1"/>
+                </a:solidFill>
+                <a:latin typeface="+mn-lt"/>
+                <a:ea typeface="+mn-ea"/>
+                <a:cs typeface="+mn-cs"/>
+              </a:rPr>
+              <a:t>) </a:t>
+            </a:r>
+            <a:r>
+              <a:rPr lang="de-DE" sz="1200" kern="1200" dirty="0" err="1" smtClean="0">
+                <a:solidFill>
+                  <a:schemeClr val="tx1"/>
+                </a:solidFill>
+                <a:latin typeface="+mn-lt"/>
+                <a:ea typeface="+mn-ea"/>
+                <a:cs typeface="+mn-cs"/>
+              </a:rPr>
+              <a:t>data</a:t>
+            </a:r>
+            <a:r>
+              <a:rPr lang="de-DE" sz="1200" kern="1200" dirty="0" smtClean="0">
+                <a:solidFill>
+                  <a:schemeClr val="tx1"/>
+                </a:solidFill>
+                <a:latin typeface="+mn-lt"/>
+                <a:ea typeface="+mn-ea"/>
+                <a:cs typeface="+mn-cs"/>
+              </a:rPr>
+              <a:t> and </a:t>
+            </a:r>
+            <a:r>
+              <a:rPr lang="de-DE" sz="1200" kern="1200" dirty="0" err="1" smtClean="0">
+                <a:solidFill>
+                  <a:schemeClr val="tx1"/>
+                </a:solidFill>
+                <a:latin typeface="+mn-lt"/>
+                <a:ea typeface="+mn-ea"/>
+                <a:cs typeface="+mn-cs"/>
+              </a:rPr>
+              <a:t>under</a:t>
+            </a:r>
+            <a:r>
+              <a:rPr lang="de-DE" sz="1200" kern="1200" dirty="0" smtClean="0">
+                <a:solidFill>
+                  <a:schemeClr val="tx1"/>
+                </a:solidFill>
+                <a:latin typeface="+mn-lt"/>
+                <a:ea typeface="+mn-ea"/>
+                <a:cs typeface="+mn-cs"/>
+              </a:rPr>
+              <a:t> </a:t>
+            </a:r>
+            <a:r>
+              <a:rPr lang="de-DE" sz="1200" kern="1200" dirty="0" err="1" smtClean="0">
+                <a:solidFill>
+                  <a:schemeClr val="tx1"/>
+                </a:solidFill>
+                <a:latin typeface="+mn-lt"/>
+                <a:ea typeface="+mn-ea"/>
+                <a:cs typeface="+mn-cs"/>
+              </a:rPr>
+              <a:t>what</a:t>
+            </a:r>
+            <a:r>
+              <a:rPr lang="de-DE" sz="1200" kern="1200" dirty="0" smtClean="0">
+                <a:solidFill>
+                  <a:schemeClr val="tx1"/>
+                </a:solidFill>
+                <a:latin typeface="+mn-lt"/>
+                <a:ea typeface="+mn-ea"/>
+                <a:cs typeface="+mn-cs"/>
+              </a:rPr>
+              <a:t> </a:t>
+            </a:r>
+            <a:r>
+              <a:rPr lang="de-DE" sz="1200" kern="1200" dirty="0" err="1" smtClean="0">
+                <a:solidFill>
+                  <a:schemeClr val="tx1"/>
+                </a:solidFill>
+                <a:latin typeface="+mn-lt"/>
+                <a:ea typeface="+mn-ea"/>
+                <a:cs typeface="+mn-cs"/>
+              </a:rPr>
+              <a:t>conditions</a:t>
+            </a:r>
+            <a:r>
+              <a:rPr lang="de-DE" sz="1200" kern="1200" dirty="0" smtClean="0">
+                <a:solidFill>
+                  <a:schemeClr val="tx1"/>
+                </a:solidFill>
+                <a:latin typeface="+mn-lt"/>
+                <a:ea typeface="+mn-ea"/>
+                <a:cs typeface="+mn-cs"/>
+              </a:rPr>
+              <a:t>.</a:t>
+            </a:r>
+          </a:p>
+          <a:p>
+            <a:r>
+              <a:rPr lang="de-DE" sz="1200" kern="1200" dirty="0" smtClean="0">
+                <a:solidFill>
+                  <a:schemeClr val="tx1"/>
+                </a:solidFill>
+                <a:latin typeface="+mn-lt"/>
+                <a:ea typeface="+mn-ea"/>
+                <a:cs typeface="+mn-cs"/>
+              </a:rPr>
+              <a:t>• (D5) Performance: Access to </a:t>
+            </a:r>
+            <a:r>
+              <a:rPr lang="de-DE" sz="1200" kern="1200" dirty="0" err="1" smtClean="0">
+                <a:solidFill>
+                  <a:schemeClr val="tx1"/>
+                </a:solidFill>
+                <a:latin typeface="+mn-lt"/>
+                <a:ea typeface="+mn-ea"/>
+                <a:cs typeface="+mn-cs"/>
+              </a:rPr>
+              <a:t>large-scale</a:t>
+            </a:r>
+            <a:r>
+              <a:rPr lang="de-DE" sz="1200" kern="1200" dirty="0" smtClean="0">
+                <a:solidFill>
+                  <a:schemeClr val="tx1"/>
+                </a:solidFill>
+                <a:latin typeface="+mn-lt"/>
+                <a:ea typeface="+mn-ea"/>
+                <a:cs typeface="+mn-cs"/>
+              </a:rPr>
+              <a:t> </a:t>
+            </a:r>
+            <a:r>
+              <a:rPr lang="de-DE" sz="1200" kern="1200" dirty="0" err="1" smtClean="0">
+                <a:solidFill>
+                  <a:schemeClr val="tx1"/>
+                </a:solidFill>
+                <a:latin typeface="+mn-lt"/>
+                <a:ea typeface="+mn-ea"/>
+                <a:cs typeface="+mn-cs"/>
+              </a:rPr>
+              <a:t>distributed</a:t>
+            </a:r>
+            <a:r>
+              <a:rPr lang="de-DE" sz="1200" kern="1200" dirty="0" smtClean="0">
+                <a:solidFill>
+                  <a:schemeClr val="tx1"/>
+                </a:solidFill>
+                <a:latin typeface="+mn-lt"/>
+                <a:ea typeface="+mn-ea"/>
+                <a:cs typeface="+mn-cs"/>
+              </a:rPr>
+              <a:t> </a:t>
+            </a:r>
+            <a:r>
+              <a:rPr lang="de-DE" sz="1200" kern="1200" dirty="0" err="1" smtClean="0">
+                <a:solidFill>
+                  <a:schemeClr val="tx1"/>
+                </a:solidFill>
+                <a:latin typeface="+mn-lt"/>
+                <a:ea typeface="+mn-ea"/>
+                <a:cs typeface="+mn-cs"/>
+              </a:rPr>
+              <a:t>data</a:t>
+            </a:r>
+            <a:r>
+              <a:rPr lang="de-DE" sz="1200" kern="1200" dirty="0" smtClean="0">
+                <a:solidFill>
+                  <a:schemeClr val="tx1"/>
+                </a:solidFill>
+                <a:latin typeface="+mn-lt"/>
+                <a:ea typeface="+mn-ea"/>
+                <a:cs typeface="+mn-cs"/>
+              </a:rPr>
+              <a:t> </a:t>
+            </a:r>
+            <a:r>
+              <a:rPr lang="de-DE" sz="1200" kern="1200" dirty="0" err="1" smtClean="0">
+                <a:solidFill>
+                  <a:schemeClr val="tx1"/>
+                </a:solidFill>
+                <a:latin typeface="+mn-lt"/>
+                <a:ea typeface="+mn-ea"/>
+                <a:cs typeface="+mn-cs"/>
+              </a:rPr>
+              <a:t>raises</a:t>
+            </a:r>
+            <a:r>
+              <a:rPr lang="de-DE" sz="1200" kern="1200" dirty="0" smtClean="0">
+                <a:solidFill>
+                  <a:schemeClr val="tx1"/>
+                </a:solidFill>
+                <a:latin typeface="+mn-lt"/>
+                <a:ea typeface="+mn-ea"/>
+                <a:cs typeface="+mn-cs"/>
+              </a:rPr>
+              <a:t> </a:t>
+            </a:r>
+            <a:r>
+              <a:rPr lang="de-DE" sz="1200" kern="1200" dirty="0" err="1" smtClean="0">
+                <a:solidFill>
+                  <a:schemeClr val="tx1"/>
+                </a:solidFill>
+                <a:latin typeface="+mn-lt"/>
+                <a:ea typeface="+mn-ea"/>
+                <a:cs typeface="+mn-cs"/>
+              </a:rPr>
+              <a:t>critical</a:t>
+            </a:r>
+            <a:r>
+              <a:rPr lang="de-DE" sz="1200" kern="1200" dirty="0" smtClean="0">
+                <a:solidFill>
+                  <a:schemeClr val="tx1"/>
+                </a:solidFill>
+                <a:latin typeface="+mn-lt"/>
+                <a:ea typeface="+mn-ea"/>
+                <a:cs typeface="+mn-cs"/>
+              </a:rPr>
+              <a:t> </a:t>
+            </a:r>
+            <a:r>
+              <a:rPr lang="de-DE" sz="1200" kern="1200" dirty="0" err="1" smtClean="0">
+                <a:solidFill>
+                  <a:schemeClr val="tx1"/>
+                </a:solidFill>
+                <a:latin typeface="+mn-lt"/>
+                <a:ea typeface="+mn-ea"/>
+                <a:cs typeface="+mn-cs"/>
+              </a:rPr>
+              <a:t>performance</a:t>
+            </a:r>
+            <a:r>
+              <a:rPr lang="de-DE" sz="1200" kern="1200" dirty="0" smtClean="0">
+                <a:solidFill>
+                  <a:schemeClr val="tx1"/>
+                </a:solidFill>
+                <a:latin typeface="+mn-lt"/>
+                <a:ea typeface="+mn-ea"/>
+                <a:cs typeface="+mn-cs"/>
+              </a:rPr>
+              <a:t> </a:t>
+            </a:r>
+            <a:r>
+              <a:rPr lang="de-DE" sz="1200" kern="1200" dirty="0" err="1" smtClean="0">
+                <a:solidFill>
+                  <a:schemeClr val="tx1"/>
+                </a:solidFill>
+                <a:latin typeface="+mn-lt"/>
+                <a:ea typeface="+mn-ea"/>
+                <a:cs typeface="+mn-cs"/>
+              </a:rPr>
+              <a:t>concerns</a:t>
+            </a:r>
+            <a:r>
+              <a:rPr lang="de-DE" sz="1200" kern="1200" dirty="0" smtClean="0">
+                <a:solidFill>
+                  <a:schemeClr val="tx1"/>
+                </a:solidFill>
+                <a:latin typeface="+mn-lt"/>
+                <a:ea typeface="+mn-ea"/>
+                <a:cs typeface="+mn-cs"/>
+              </a:rPr>
+              <a:t> </a:t>
+            </a:r>
+            <a:r>
+              <a:rPr lang="de-DE" sz="1200" kern="1200" dirty="0" err="1" smtClean="0">
+                <a:solidFill>
+                  <a:schemeClr val="tx1"/>
+                </a:solidFill>
+                <a:latin typeface="+mn-lt"/>
+                <a:ea typeface="+mn-ea"/>
+                <a:cs typeface="+mn-cs"/>
+              </a:rPr>
+              <a:t>with</a:t>
+            </a:r>
+            <a:r>
+              <a:rPr lang="de-DE" sz="1200" kern="1200" dirty="0" smtClean="0">
+                <a:solidFill>
+                  <a:schemeClr val="tx1"/>
+                </a:solidFill>
+                <a:latin typeface="+mn-lt"/>
+                <a:ea typeface="+mn-ea"/>
+                <a:cs typeface="+mn-cs"/>
+              </a:rPr>
+              <a:t> </a:t>
+            </a:r>
+            <a:r>
+              <a:rPr lang="de-DE" sz="1200" kern="1200" dirty="0" err="1" smtClean="0">
+                <a:solidFill>
+                  <a:schemeClr val="tx1"/>
+                </a:solidFill>
+                <a:latin typeface="+mn-lt"/>
+                <a:ea typeface="+mn-ea"/>
+                <a:cs typeface="+mn-cs"/>
+              </a:rPr>
+              <a:t>respect</a:t>
+            </a:r>
+            <a:r>
+              <a:rPr lang="de-DE" sz="1200" kern="1200" dirty="0" smtClean="0">
+                <a:solidFill>
+                  <a:schemeClr val="tx1"/>
+                </a:solidFill>
+                <a:latin typeface="+mn-lt"/>
+                <a:ea typeface="+mn-ea"/>
+                <a:cs typeface="+mn-cs"/>
+              </a:rPr>
+              <a:t> to </a:t>
+            </a:r>
+            <a:r>
+              <a:rPr lang="de-DE" sz="1200" kern="1200" dirty="0" err="1" smtClean="0">
+                <a:solidFill>
+                  <a:schemeClr val="tx1"/>
+                </a:solidFill>
+                <a:latin typeface="+mn-lt"/>
+                <a:ea typeface="+mn-ea"/>
+                <a:cs typeface="+mn-cs"/>
+              </a:rPr>
+              <a:t>scale-up</a:t>
+            </a:r>
+            <a:r>
+              <a:rPr lang="de-DE" sz="1200" kern="1200" dirty="0" smtClean="0">
+                <a:solidFill>
+                  <a:schemeClr val="tx1"/>
+                </a:solidFill>
+                <a:latin typeface="+mn-lt"/>
+                <a:ea typeface="+mn-ea"/>
+                <a:cs typeface="+mn-cs"/>
+              </a:rPr>
+              <a:t> and </a:t>
+            </a:r>
+            <a:r>
+              <a:rPr lang="de-DE" sz="1200" kern="1200" dirty="0" err="1" smtClean="0">
+                <a:solidFill>
+                  <a:schemeClr val="tx1"/>
+                </a:solidFill>
+                <a:latin typeface="+mn-lt"/>
+                <a:ea typeface="+mn-ea"/>
+                <a:cs typeface="+mn-cs"/>
+              </a:rPr>
+              <a:t>scale-out</a:t>
+            </a:r>
+            <a:endParaRPr lang="de-DE" sz="1200" kern="1200" dirty="0" smtClean="0">
+              <a:solidFill>
+                <a:schemeClr val="tx1"/>
+              </a:solidFill>
+              <a:latin typeface="+mn-lt"/>
+              <a:ea typeface="+mn-ea"/>
+              <a:cs typeface="+mn-cs"/>
+            </a:endParaRPr>
+          </a:p>
+          <a:p>
+            <a:r>
+              <a:rPr lang="de-DE" sz="1200" kern="1200" dirty="0" smtClean="0">
+                <a:solidFill>
+                  <a:schemeClr val="tx1"/>
+                </a:solidFill>
+                <a:latin typeface="+mn-lt"/>
+                <a:ea typeface="+mn-ea"/>
+                <a:cs typeface="+mn-cs"/>
+              </a:rPr>
+              <a:t>• (D6) Data Integration : Data </a:t>
+            </a:r>
+            <a:r>
+              <a:rPr lang="de-DE" sz="1200" kern="1200" dirty="0" err="1" smtClean="0">
+                <a:solidFill>
+                  <a:schemeClr val="tx1"/>
+                </a:solidFill>
+                <a:latin typeface="+mn-lt"/>
+                <a:ea typeface="+mn-ea"/>
+                <a:cs typeface="+mn-cs"/>
+              </a:rPr>
+              <a:t>residing</a:t>
+            </a:r>
+            <a:r>
+              <a:rPr lang="de-DE" sz="1200" kern="1200" dirty="0" smtClean="0">
+                <a:solidFill>
+                  <a:schemeClr val="tx1"/>
+                </a:solidFill>
+                <a:latin typeface="+mn-lt"/>
+                <a:ea typeface="+mn-ea"/>
+                <a:cs typeface="+mn-cs"/>
+              </a:rPr>
+              <a:t> in different </a:t>
+            </a:r>
+            <a:r>
+              <a:rPr lang="de-DE" sz="1200" kern="1200" dirty="0" err="1" smtClean="0">
+                <a:solidFill>
+                  <a:schemeClr val="tx1"/>
+                </a:solidFill>
+                <a:latin typeface="+mn-lt"/>
+                <a:ea typeface="+mn-ea"/>
+                <a:cs typeface="+mn-cs"/>
+              </a:rPr>
+              <a:t>sources</a:t>
+            </a:r>
+            <a:r>
+              <a:rPr lang="de-DE" sz="1200" kern="1200" dirty="0" smtClean="0">
+                <a:solidFill>
+                  <a:schemeClr val="tx1"/>
+                </a:solidFill>
+                <a:latin typeface="+mn-lt"/>
+                <a:ea typeface="+mn-ea"/>
+                <a:cs typeface="+mn-cs"/>
+              </a:rPr>
+              <a:t> </a:t>
+            </a:r>
+            <a:r>
+              <a:rPr lang="de-DE" sz="1200" kern="1200" dirty="0" err="1" smtClean="0">
+                <a:solidFill>
+                  <a:schemeClr val="tx1"/>
+                </a:solidFill>
+                <a:latin typeface="+mn-lt"/>
+                <a:ea typeface="+mn-ea"/>
+                <a:cs typeface="+mn-cs"/>
+              </a:rPr>
+              <a:t>must</a:t>
+            </a:r>
+            <a:r>
+              <a:rPr lang="de-DE" sz="1200" kern="1200" dirty="0" smtClean="0">
+                <a:solidFill>
+                  <a:schemeClr val="tx1"/>
+                </a:solidFill>
+                <a:latin typeface="+mn-lt"/>
+                <a:ea typeface="+mn-ea"/>
+                <a:cs typeface="+mn-cs"/>
+              </a:rPr>
+              <a:t> </a:t>
+            </a:r>
+            <a:r>
+              <a:rPr lang="de-DE" sz="1200" kern="1200" dirty="0" err="1" smtClean="0">
+                <a:solidFill>
+                  <a:schemeClr val="tx1"/>
+                </a:solidFill>
+                <a:latin typeface="+mn-lt"/>
+                <a:ea typeface="+mn-ea"/>
+                <a:cs typeface="+mn-cs"/>
+              </a:rPr>
+              <a:t>be</a:t>
+            </a:r>
+            <a:r>
+              <a:rPr lang="de-DE" sz="1200" kern="1200" dirty="0" smtClean="0">
+                <a:solidFill>
+                  <a:schemeClr val="tx1"/>
+                </a:solidFill>
+                <a:latin typeface="+mn-lt"/>
+                <a:ea typeface="+mn-ea"/>
+                <a:cs typeface="+mn-cs"/>
+              </a:rPr>
+              <a:t> </a:t>
+            </a:r>
+            <a:r>
+              <a:rPr lang="de-DE" sz="1200" kern="1200" dirty="0" err="1" smtClean="0">
+                <a:solidFill>
+                  <a:schemeClr val="tx1"/>
+                </a:solidFill>
+                <a:latin typeface="+mn-lt"/>
+                <a:ea typeface="+mn-ea"/>
+                <a:cs typeface="+mn-cs"/>
+              </a:rPr>
+              <a:t>com-</a:t>
+            </a:r>
+            <a:r>
+              <a:rPr lang="de-DE" sz="1200" kern="1200" dirty="0" smtClean="0">
+                <a:solidFill>
+                  <a:schemeClr val="tx1"/>
+                </a:solidFill>
+                <a:latin typeface="+mn-lt"/>
+                <a:ea typeface="+mn-ea"/>
+                <a:cs typeface="+mn-cs"/>
+              </a:rPr>
+              <a:t> </a:t>
+            </a:r>
+            <a:r>
+              <a:rPr lang="de-DE" sz="1200" kern="1200" dirty="0" err="1" smtClean="0">
+                <a:solidFill>
+                  <a:schemeClr val="tx1"/>
+                </a:solidFill>
+                <a:latin typeface="+mn-lt"/>
+                <a:ea typeface="+mn-ea"/>
+                <a:cs typeface="+mn-cs"/>
+              </a:rPr>
+              <a:t>bined</a:t>
+            </a:r>
+            <a:r>
+              <a:rPr lang="de-DE" sz="1200" kern="1200" dirty="0" smtClean="0">
+                <a:solidFill>
+                  <a:schemeClr val="tx1"/>
+                </a:solidFill>
+                <a:latin typeface="+mn-lt"/>
+                <a:ea typeface="+mn-ea"/>
+                <a:cs typeface="+mn-cs"/>
+              </a:rPr>
+              <a:t> to </a:t>
+            </a:r>
+            <a:r>
+              <a:rPr lang="de-DE" sz="1200" kern="1200" dirty="0" err="1" smtClean="0">
+                <a:solidFill>
+                  <a:schemeClr val="tx1"/>
+                </a:solidFill>
+                <a:latin typeface="+mn-lt"/>
+                <a:ea typeface="+mn-ea"/>
+                <a:cs typeface="+mn-cs"/>
+              </a:rPr>
+              <a:t>provide</a:t>
+            </a:r>
+            <a:r>
+              <a:rPr lang="de-DE" sz="1200" kern="1200" dirty="0" smtClean="0">
+                <a:solidFill>
+                  <a:schemeClr val="tx1"/>
+                </a:solidFill>
+                <a:latin typeface="+mn-lt"/>
+                <a:ea typeface="+mn-ea"/>
+                <a:cs typeface="+mn-cs"/>
+              </a:rPr>
+              <a:t> </a:t>
+            </a:r>
+            <a:r>
+              <a:rPr lang="de-DE" sz="1200" kern="1200" dirty="0" err="1" smtClean="0">
+                <a:solidFill>
+                  <a:schemeClr val="tx1"/>
+                </a:solidFill>
+                <a:latin typeface="+mn-lt"/>
+                <a:ea typeface="+mn-ea"/>
+                <a:cs typeface="+mn-cs"/>
+              </a:rPr>
+              <a:t>users</a:t>
+            </a:r>
+            <a:r>
+              <a:rPr lang="de-DE" sz="1200" kern="1200" dirty="0" smtClean="0">
+                <a:solidFill>
+                  <a:schemeClr val="tx1"/>
+                </a:solidFill>
+                <a:latin typeface="+mn-lt"/>
+                <a:ea typeface="+mn-ea"/>
+                <a:cs typeface="+mn-cs"/>
+              </a:rPr>
+              <a:t> </a:t>
+            </a:r>
+            <a:r>
+              <a:rPr lang="de-DE" sz="1200" kern="1200" dirty="0" err="1" smtClean="0">
+                <a:solidFill>
+                  <a:schemeClr val="tx1"/>
+                </a:solidFill>
+                <a:latin typeface="+mn-lt"/>
+                <a:ea typeface="+mn-ea"/>
+                <a:cs typeface="+mn-cs"/>
+              </a:rPr>
+              <a:t>with</a:t>
+            </a:r>
+            <a:r>
+              <a:rPr lang="de-DE" sz="1200" kern="1200" dirty="0" smtClean="0">
+                <a:solidFill>
+                  <a:schemeClr val="tx1"/>
+                </a:solidFill>
+                <a:latin typeface="+mn-lt"/>
+                <a:ea typeface="+mn-ea"/>
+                <a:cs typeface="+mn-cs"/>
+              </a:rPr>
+              <a:t> a </a:t>
+            </a:r>
+            <a:r>
+              <a:rPr lang="de-DE" sz="1200" kern="1200" dirty="0" err="1" smtClean="0">
+                <a:solidFill>
+                  <a:schemeClr val="tx1"/>
+                </a:solidFill>
+                <a:latin typeface="+mn-lt"/>
+                <a:ea typeface="+mn-ea"/>
+                <a:cs typeface="+mn-cs"/>
+              </a:rPr>
+              <a:t>unified</a:t>
+            </a:r>
+            <a:r>
+              <a:rPr lang="de-DE" sz="1200" kern="1200" dirty="0" smtClean="0">
+                <a:solidFill>
+                  <a:schemeClr val="tx1"/>
+                </a:solidFill>
+                <a:latin typeface="+mn-lt"/>
+                <a:ea typeface="+mn-ea"/>
+                <a:cs typeface="+mn-cs"/>
+              </a:rPr>
+              <a:t> </a:t>
+            </a:r>
+            <a:r>
+              <a:rPr lang="de-DE" sz="1200" kern="1200" dirty="0" err="1" smtClean="0">
+                <a:solidFill>
+                  <a:schemeClr val="tx1"/>
+                </a:solidFill>
+                <a:latin typeface="+mn-lt"/>
+                <a:ea typeface="+mn-ea"/>
+                <a:cs typeface="+mn-cs"/>
+              </a:rPr>
+              <a:t>view</a:t>
+            </a:r>
+            <a:r>
+              <a:rPr lang="de-DE" sz="1200" kern="1200" dirty="0" smtClean="0">
+                <a:solidFill>
+                  <a:schemeClr val="tx1"/>
+                </a:solidFill>
+                <a:latin typeface="+mn-lt"/>
+                <a:ea typeface="+mn-ea"/>
+                <a:cs typeface="+mn-cs"/>
+              </a:rPr>
+              <a:t>. </a:t>
+            </a:r>
+            <a:r>
+              <a:rPr lang="de-DE" sz="1200" kern="1200" dirty="0" err="1" smtClean="0">
+                <a:solidFill>
+                  <a:schemeClr val="tx1"/>
+                </a:solidFill>
+                <a:latin typeface="+mn-lt"/>
+                <a:ea typeface="+mn-ea"/>
+                <a:cs typeface="+mn-cs"/>
+              </a:rPr>
+              <a:t>Associated</a:t>
+            </a:r>
+            <a:r>
+              <a:rPr lang="de-DE" sz="1200" kern="1200" dirty="0" smtClean="0">
+                <a:solidFill>
+                  <a:schemeClr val="tx1"/>
+                </a:solidFill>
+                <a:latin typeface="+mn-lt"/>
+                <a:ea typeface="+mn-ea"/>
+                <a:cs typeface="+mn-cs"/>
+              </a:rPr>
+              <a:t> </a:t>
+            </a:r>
+            <a:r>
+              <a:rPr lang="de-DE" sz="1200" kern="1200" dirty="0" err="1" smtClean="0">
+                <a:solidFill>
+                  <a:schemeClr val="tx1"/>
+                </a:solidFill>
+                <a:latin typeface="+mn-lt"/>
+                <a:ea typeface="+mn-ea"/>
+                <a:cs typeface="+mn-cs"/>
+              </a:rPr>
+              <a:t>issues</a:t>
+            </a:r>
+            <a:r>
+              <a:rPr lang="de-DE" sz="1200" kern="1200" dirty="0" smtClean="0">
+                <a:solidFill>
+                  <a:schemeClr val="tx1"/>
+                </a:solidFill>
+                <a:latin typeface="+mn-lt"/>
+                <a:ea typeface="+mn-ea"/>
+                <a:cs typeface="+mn-cs"/>
+              </a:rPr>
+              <a:t> </a:t>
+            </a:r>
+            <a:r>
+              <a:rPr lang="de-DE" sz="1200" kern="1200" dirty="0" err="1" smtClean="0">
+                <a:solidFill>
+                  <a:schemeClr val="tx1"/>
+                </a:solidFill>
+                <a:latin typeface="+mn-lt"/>
+                <a:ea typeface="+mn-ea"/>
+                <a:cs typeface="+mn-cs"/>
+              </a:rPr>
+              <a:t>include</a:t>
+            </a:r>
+            <a:r>
+              <a:rPr lang="de-DE" sz="1200" kern="1200" dirty="0" smtClean="0">
+                <a:solidFill>
+                  <a:schemeClr val="tx1"/>
+                </a:solidFill>
+                <a:latin typeface="+mn-lt"/>
+                <a:ea typeface="+mn-ea"/>
+                <a:cs typeface="+mn-cs"/>
+              </a:rPr>
+              <a:t> </a:t>
+            </a:r>
+            <a:r>
+              <a:rPr lang="de-DE" sz="1200" kern="1200" dirty="0" err="1" smtClean="0">
+                <a:solidFill>
+                  <a:schemeClr val="tx1"/>
+                </a:solidFill>
+                <a:latin typeface="+mn-lt"/>
+                <a:ea typeface="+mn-ea"/>
+                <a:cs typeface="+mn-cs"/>
+              </a:rPr>
+              <a:t>format</a:t>
+            </a:r>
+            <a:r>
+              <a:rPr lang="de-DE" sz="1200" kern="1200" dirty="0" smtClean="0">
+                <a:solidFill>
+                  <a:schemeClr val="tx1"/>
+                </a:solidFill>
+                <a:latin typeface="+mn-lt"/>
+                <a:ea typeface="+mn-ea"/>
+                <a:cs typeface="+mn-cs"/>
+              </a:rPr>
+              <a:t> </a:t>
+            </a:r>
+            <a:r>
+              <a:rPr lang="de-DE" sz="1200" kern="1200" dirty="0" err="1" smtClean="0">
+                <a:solidFill>
+                  <a:schemeClr val="tx1"/>
+                </a:solidFill>
+                <a:latin typeface="+mn-lt"/>
+                <a:ea typeface="+mn-ea"/>
+                <a:cs typeface="+mn-cs"/>
+              </a:rPr>
+              <a:t>conversion</a:t>
+            </a:r>
+            <a:r>
+              <a:rPr lang="de-DE" sz="1200" kern="1200" dirty="0" smtClean="0">
+                <a:solidFill>
+                  <a:schemeClr val="tx1"/>
+                </a:solidFill>
+                <a:latin typeface="+mn-lt"/>
+                <a:ea typeface="+mn-ea"/>
+                <a:cs typeface="+mn-cs"/>
+              </a:rPr>
+              <a:t>, </a:t>
+            </a:r>
+            <a:r>
+              <a:rPr lang="de-DE" sz="1200" kern="1200" dirty="0" err="1" smtClean="0">
+                <a:solidFill>
+                  <a:schemeClr val="tx1"/>
+                </a:solidFill>
+                <a:latin typeface="+mn-lt"/>
+                <a:ea typeface="+mn-ea"/>
+                <a:cs typeface="+mn-cs"/>
+              </a:rPr>
+              <a:t>the</a:t>
+            </a:r>
+            <a:r>
+              <a:rPr lang="de-DE" sz="1200" kern="1200" dirty="0" smtClean="0">
+                <a:solidFill>
+                  <a:schemeClr val="tx1"/>
+                </a:solidFill>
+                <a:latin typeface="+mn-lt"/>
+                <a:ea typeface="+mn-ea"/>
+                <a:cs typeface="+mn-cs"/>
+              </a:rPr>
+              <a:t> </a:t>
+            </a:r>
+            <a:r>
+              <a:rPr lang="de-DE" sz="1200" kern="1200" dirty="0" err="1" smtClean="0">
+                <a:solidFill>
+                  <a:schemeClr val="tx1"/>
+                </a:solidFill>
+                <a:latin typeface="+mn-lt"/>
+                <a:ea typeface="+mn-ea"/>
+                <a:cs typeface="+mn-cs"/>
+              </a:rPr>
+              <a:t>use</a:t>
+            </a:r>
+            <a:r>
+              <a:rPr lang="de-DE" sz="1200" kern="1200" dirty="0" smtClean="0">
+                <a:solidFill>
+                  <a:schemeClr val="tx1"/>
+                </a:solidFill>
+                <a:latin typeface="+mn-lt"/>
+                <a:ea typeface="+mn-ea"/>
+                <a:cs typeface="+mn-cs"/>
+              </a:rPr>
+              <a:t> of </a:t>
+            </a:r>
+            <a:r>
+              <a:rPr lang="de-DE" sz="1200" kern="1200" dirty="0" err="1" smtClean="0">
+                <a:solidFill>
+                  <a:schemeClr val="tx1"/>
+                </a:solidFill>
+                <a:latin typeface="+mn-lt"/>
+                <a:ea typeface="+mn-ea"/>
+                <a:cs typeface="+mn-cs"/>
+              </a:rPr>
+              <a:t>data</a:t>
+            </a:r>
+            <a:r>
+              <a:rPr lang="de-DE" sz="1200" kern="1200" dirty="0" smtClean="0">
+                <a:solidFill>
+                  <a:schemeClr val="tx1"/>
+                </a:solidFill>
+                <a:latin typeface="+mn-lt"/>
+                <a:ea typeface="+mn-ea"/>
+                <a:cs typeface="+mn-cs"/>
+              </a:rPr>
+              <a:t> </a:t>
+            </a:r>
+            <a:r>
+              <a:rPr lang="de-DE" sz="1200" kern="1200" dirty="0" err="1" smtClean="0">
+                <a:solidFill>
+                  <a:schemeClr val="tx1"/>
+                </a:solidFill>
+                <a:latin typeface="+mn-lt"/>
+                <a:ea typeface="+mn-ea"/>
+                <a:cs typeface="+mn-cs"/>
+              </a:rPr>
+              <a:t>shims</a:t>
+            </a:r>
+            <a:r>
+              <a:rPr lang="de-DE" sz="1200" kern="1200" dirty="0" smtClean="0">
+                <a:solidFill>
+                  <a:schemeClr val="tx1"/>
+                </a:solidFill>
+                <a:latin typeface="+mn-lt"/>
+                <a:ea typeface="+mn-ea"/>
+                <a:cs typeface="+mn-cs"/>
+              </a:rPr>
+              <a:t>, and </a:t>
+            </a:r>
+            <a:r>
+              <a:rPr lang="de-DE" sz="1200" kern="1200" dirty="0" err="1" smtClean="0">
+                <a:solidFill>
+                  <a:schemeClr val="tx1"/>
+                </a:solidFill>
+                <a:latin typeface="+mn-lt"/>
+                <a:ea typeface="+mn-ea"/>
+                <a:cs typeface="+mn-cs"/>
+              </a:rPr>
+              <a:t>semantic</a:t>
+            </a:r>
+            <a:r>
+              <a:rPr lang="de-DE" sz="1200" kern="1200" dirty="0" smtClean="0">
+                <a:solidFill>
+                  <a:schemeClr val="tx1"/>
+                </a:solidFill>
+                <a:latin typeface="+mn-lt"/>
+                <a:ea typeface="+mn-ea"/>
+                <a:cs typeface="+mn-cs"/>
+              </a:rPr>
+              <a:t> </a:t>
+            </a:r>
+            <a:r>
+              <a:rPr lang="de-DE" sz="1200" kern="1200" dirty="0" err="1" smtClean="0">
+                <a:solidFill>
+                  <a:schemeClr val="tx1"/>
+                </a:solidFill>
+                <a:latin typeface="+mn-lt"/>
+                <a:ea typeface="+mn-ea"/>
+                <a:cs typeface="+mn-cs"/>
+              </a:rPr>
+              <a:t>descriptors</a:t>
+            </a:r>
+            <a:r>
+              <a:rPr lang="de-DE" sz="1200" kern="1200" dirty="0" smtClean="0">
+                <a:solidFill>
+                  <a:schemeClr val="tx1"/>
+                </a:solidFill>
+                <a:latin typeface="+mn-lt"/>
+                <a:ea typeface="+mn-ea"/>
+                <a:cs typeface="+mn-cs"/>
+              </a:rPr>
+              <a:t> and </a:t>
+            </a:r>
+            <a:r>
+              <a:rPr lang="de-DE" sz="1200" kern="1200" dirty="0" err="1" smtClean="0">
+                <a:solidFill>
+                  <a:schemeClr val="tx1"/>
+                </a:solidFill>
+                <a:latin typeface="+mn-lt"/>
+                <a:ea typeface="+mn-ea"/>
+                <a:cs typeface="+mn-cs"/>
+              </a:rPr>
+              <a:t>ontologies</a:t>
+            </a:r>
+            <a:r>
+              <a:rPr lang="de-DE" sz="1200" kern="1200" dirty="0" smtClean="0">
+                <a:solidFill>
+                  <a:schemeClr val="tx1"/>
+                </a:solidFill>
+                <a:latin typeface="+mn-lt"/>
+                <a:ea typeface="+mn-ea"/>
+                <a:cs typeface="+mn-cs"/>
+              </a:rPr>
+              <a:t> to </a:t>
+            </a:r>
+            <a:r>
+              <a:rPr lang="de-DE" sz="1200" kern="1200" dirty="0" err="1" smtClean="0">
+                <a:solidFill>
+                  <a:schemeClr val="tx1"/>
+                </a:solidFill>
+                <a:latin typeface="+mn-lt"/>
+                <a:ea typeface="+mn-ea"/>
+                <a:cs typeface="+mn-cs"/>
+              </a:rPr>
+              <a:t>help</a:t>
+            </a:r>
+            <a:r>
+              <a:rPr lang="de-DE" sz="1200" kern="1200" dirty="0" smtClean="0">
+                <a:solidFill>
+                  <a:schemeClr val="tx1"/>
+                </a:solidFill>
+                <a:latin typeface="+mn-lt"/>
+                <a:ea typeface="+mn-ea"/>
+                <a:cs typeface="+mn-cs"/>
+              </a:rPr>
+              <a:t> </a:t>
+            </a:r>
+            <a:r>
+              <a:rPr lang="de-DE" sz="1200" kern="1200" dirty="0" err="1" smtClean="0">
+                <a:solidFill>
+                  <a:schemeClr val="tx1"/>
+                </a:solidFill>
+                <a:latin typeface="+mn-lt"/>
+                <a:ea typeface="+mn-ea"/>
+                <a:cs typeface="+mn-cs"/>
+              </a:rPr>
+              <a:t>harmonize</a:t>
+            </a:r>
+            <a:r>
+              <a:rPr lang="de-DE" sz="1200" kern="1200" dirty="0" smtClean="0">
+                <a:solidFill>
+                  <a:schemeClr val="tx1"/>
+                </a:solidFill>
+                <a:latin typeface="+mn-lt"/>
+                <a:ea typeface="+mn-ea"/>
+                <a:cs typeface="+mn-cs"/>
+              </a:rPr>
+              <a:t> </a:t>
+            </a:r>
+            <a:r>
+              <a:rPr lang="de-DE" sz="1200" kern="1200" dirty="0" err="1" smtClean="0">
+                <a:solidFill>
+                  <a:schemeClr val="tx1"/>
+                </a:solidFill>
+                <a:latin typeface="+mn-lt"/>
+                <a:ea typeface="+mn-ea"/>
+                <a:cs typeface="+mn-cs"/>
+              </a:rPr>
+              <a:t>the</a:t>
+            </a:r>
+            <a:r>
+              <a:rPr lang="de-DE" sz="1200" kern="1200" dirty="0" smtClean="0">
+                <a:solidFill>
+                  <a:schemeClr val="tx1"/>
+                </a:solidFill>
+                <a:latin typeface="+mn-lt"/>
+                <a:ea typeface="+mn-ea"/>
+                <a:cs typeface="+mn-cs"/>
+              </a:rPr>
+              <a:t> </a:t>
+            </a:r>
+            <a:r>
+              <a:rPr lang="de-DE" sz="1200" kern="1200" dirty="0" err="1" smtClean="0">
+                <a:solidFill>
+                  <a:schemeClr val="tx1"/>
+                </a:solidFill>
+                <a:latin typeface="+mn-lt"/>
+                <a:ea typeface="+mn-ea"/>
+                <a:cs typeface="+mn-cs"/>
+              </a:rPr>
+              <a:t>data</a:t>
+            </a:r>
+            <a:r>
+              <a:rPr lang="de-DE" sz="1200" kern="1200" dirty="0" smtClean="0">
+                <a:solidFill>
+                  <a:schemeClr val="tx1"/>
+                </a:solidFill>
+                <a:latin typeface="+mn-lt"/>
+                <a:ea typeface="+mn-ea"/>
+                <a:cs typeface="+mn-cs"/>
+              </a:rPr>
+              <a:t>.</a:t>
+            </a:r>
+            <a:endParaRPr lang="de-DE" dirty="0"/>
+          </a:p>
+        </p:txBody>
+      </p:sp>
+      <p:sp>
+        <p:nvSpPr>
+          <p:cNvPr id="4" name="Foliennummernplatzhalter 3"/>
+          <p:cNvSpPr>
+            <a:spLocks noGrp="1"/>
+          </p:cNvSpPr>
+          <p:nvPr>
+            <p:ph type="sldNum" sz="quarter" idx="10"/>
+          </p:nvPr>
+        </p:nvSpPr>
+        <p:spPr/>
+        <p:txBody>
+          <a:bodyPr/>
+          <a:lstStyle/>
+          <a:p>
+            <a:fld id="{EE41C05A-BBAC-0741-9B8E-1278839E95FE}" type="slidenum">
+              <a:rPr lang="en-US" smtClean="0"/>
+              <a:pPr/>
+              <a:t>21</a:t>
+            </a:fld>
+            <a:endParaRPr lang="en-US"/>
+          </a:p>
+        </p:txBody>
+      </p:sp>
+    </p:spTree>
+  </p:cSld>
+  <p:clrMapOvr>
+    <a:masterClrMapping/>
+  </p:clrMapOvr>
+</p:notes>
+</file>
+
 <file path=ppt/slideLayouts/slideLayout1.xml><?xml version="1.0" encoding="utf-8"?>
 <p:sldLayout xmlns:a="http://schemas.openxmlformats.org/drawingml/2006/main" xmlns:r="http://schemas.openxmlformats.org/officeDocument/2006/relationships" xmlns:mc="http://schemas.openxmlformats.org/markup-compatibility/2006" xmlns:mv="urn:schemas-microsoft-com:mac:vml" xmlns:p="http://schemas.openxmlformats.org/presentationml/2006/main" mc:Ignorable="mv" mc:PreserveAttributes="mv:*" type="title" preserve="1">
   <p:cSld name="Title Slide">
@@ -1287,7 +4760,7 @@
             <a:fld id="{4C4AD4EB-88D0-C141-9474-CCD86A78CB94}" type="datetimeFigureOut">
               <a:rPr lang="en-US" smtClean="0"/>
               <a:pPr/>
-              <a:t>11/28/10</a:t>
+              <a:t>30.11.2010</a:t>
             </a:fld>
             <a:endParaRPr lang="en-US" dirty="0"/>
           </a:p>
@@ -1330,7 +4803,7 @@
             <a:fld id="{DF7665AF-92BA-E649-941D-268879B3EA81}" type="slidenum">
               <a:rPr lang="en-US" smtClean="0"/>
               <a:pPr/>
-              <a:t>‹#›</a:t>
+              <a:t>‹Nr.›</a:t>
             </a:fld>
             <a:endParaRPr lang="en-US"/>
           </a:p>
@@ -1610,7 +5083,7 @@
             <a:fld id="{4C4AD4EB-88D0-C141-9474-CCD86A78CB94}" type="datetimeFigureOut">
               <a:rPr lang="en-US" smtClean="0"/>
               <a:pPr/>
-              <a:t>11/28/10</a:t>
+              <a:t>30.11.2010</a:t>
             </a:fld>
             <a:endParaRPr lang="en-US"/>
           </a:p>
@@ -1653,7 +5126,7 @@
             <a:fld id="{DF7665AF-92BA-E649-941D-268879B3EA81}" type="slidenum">
               <a:rPr lang="en-US" smtClean="0"/>
               <a:pPr/>
-              <a:t>‹#›</a:t>
+              <a:t>‹Nr.›</a:t>
             </a:fld>
             <a:endParaRPr lang="en-US"/>
           </a:p>
@@ -1886,7 +5359,7 @@
             <a:fld id="{4C4AD4EB-88D0-C141-9474-CCD86A78CB94}" type="datetimeFigureOut">
               <a:rPr lang="en-US" smtClean="0"/>
               <a:pPr/>
-              <a:t>11/28/10</a:t>
+              <a:t>30.11.2010</a:t>
             </a:fld>
             <a:endParaRPr lang="en-US"/>
           </a:p>
@@ -2178,7 +5651,7 @@
             <a:fld id="{4C4AD4EB-88D0-C141-9474-CCD86A78CB94}" type="datetimeFigureOut">
               <a:rPr lang="en-US" smtClean="0"/>
               <a:pPr/>
-              <a:t>11/28/10</a:t>
+              <a:t>30.11.2010</a:t>
             </a:fld>
             <a:endParaRPr lang="en-US"/>
           </a:p>
@@ -2505,7 +5978,7 @@
             <a:fld id="{4C4AD4EB-88D0-C141-9474-CCD86A78CB94}" type="datetimeFigureOut">
               <a:rPr lang="en-US" smtClean="0"/>
               <a:pPr/>
-              <a:t>11/28/10</a:t>
+              <a:t>30.11.2010</a:t>
             </a:fld>
             <a:endParaRPr lang="en-US"/>
           </a:p>
@@ -2753,7 +6226,7 @@
             <a:fld id="{4C4AD4EB-88D0-C141-9474-CCD86A78CB94}" type="datetimeFigureOut">
               <a:rPr lang="en-US" smtClean="0"/>
               <a:pPr/>
-              <a:t>11/28/10</a:t>
+              <a:t>30.11.2010</a:t>
             </a:fld>
             <a:endParaRPr lang="en-US"/>
           </a:p>
@@ -2796,7 +6269,7 @@
             <a:fld id="{DF7665AF-92BA-E649-941D-268879B3EA81}" type="slidenum">
               <a:rPr lang="en-US" smtClean="0"/>
               <a:pPr/>
-              <a:t>‹#›</a:t>
+              <a:t>‹Nr.›</a:t>
             </a:fld>
             <a:endParaRPr lang="en-US"/>
           </a:p>
@@ -2930,7 +6403,7 @@
             <a:fld id="{4C4AD4EB-88D0-C141-9474-CCD86A78CB94}" type="datetimeFigureOut">
               <a:rPr lang="en-US" smtClean="0"/>
               <a:pPr/>
-              <a:t>11/28/10</a:t>
+              <a:t>30.11.2010</a:t>
             </a:fld>
             <a:endParaRPr lang="en-US"/>
           </a:p>
@@ -2973,7 +6446,7 @@
             <a:fld id="{DF7665AF-92BA-E649-941D-268879B3EA81}" type="slidenum">
               <a:rPr lang="en-US" smtClean="0"/>
               <a:pPr/>
-              <a:t>‹#›</a:t>
+              <a:t>‹Nr.›</a:t>
             </a:fld>
             <a:endParaRPr lang="en-US"/>
           </a:p>
@@ -3135,7 +6608,7 @@
               <a:pPr>
                 <a:defRPr/>
               </a:pPr>
-              <a:t>‹#›</a:t>
+              <a:t>‹Nr.›</a:t>
             </a:fld>
             <a:endParaRPr lang="en-US"/>
           </a:p>
@@ -3307,7 +6780,7 @@
             <a:fld id="{4C4AD4EB-88D0-C141-9474-CCD86A78CB94}" type="datetimeFigureOut">
               <a:rPr lang="en-US" smtClean="0"/>
               <a:pPr/>
-              <a:t>11/28/10</a:t>
+              <a:t>30.11.2010</a:t>
             </a:fld>
             <a:endParaRPr lang="en-US"/>
           </a:p>
@@ -3350,7 +6823,7 @@
             <a:fld id="{DF7665AF-92BA-E649-941D-268879B3EA81}" type="slidenum">
               <a:rPr lang="en-US" smtClean="0"/>
               <a:pPr/>
-              <a:t>‹#›</a:t>
+              <a:t>‹Nr.›</a:t>
             </a:fld>
             <a:endParaRPr lang="en-US"/>
           </a:p>
@@ -3578,7 +7051,7 @@
             <a:fld id="{4C4AD4EB-88D0-C141-9474-CCD86A78CB94}" type="datetimeFigureOut">
               <a:rPr lang="en-US" smtClean="0"/>
               <a:pPr/>
-              <a:t>11/28/10</a:t>
+              <a:t>30.11.2010</a:t>
             </a:fld>
             <a:endParaRPr lang="en-US"/>
           </a:p>
@@ -3886,7 +7359,7 @@
             <a:fld id="{4C4AD4EB-88D0-C141-9474-CCD86A78CB94}" type="datetimeFigureOut">
               <a:rPr lang="en-US" smtClean="0"/>
               <a:pPr/>
-              <a:t>11/28/10</a:t>
+              <a:t>30.11.2010</a:t>
             </a:fld>
             <a:endParaRPr lang="en-US"/>
           </a:p>
@@ -3929,7 +7402,7 @@
             <a:fld id="{DF7665AF-92BA-E649-941D-268879B3EA81}" type="slidenum">
               <a:rPr lang="en-US" smtClean="0"/>
               <a:pPr/>
-              <a:t>‹#›</a:t>
+              <a:t>‹Nr.›</a:t>
             </a:fld>
             <a:endParaRPr lang="en-US"/>
           </a:p>
@@ -4180,7 +7653,7 @@
             <a:fld id="{4C4AD4EB-88D0-C141-9474-CCD86A78CB94}" type="datetimeFigureOut">
               <a:rPr lang="en-US" smtClean="0"/>
               <a:pPr/>
-              <a:t>11/28/10</a:t>
+              <a:t>30.11.2010</a:t>
             </a:fld>
             <a:endParaRPr lang="en-US"/>
           </a:p>
@@ -4223,7 +7696,7 @@
             <a:fld id="{DF7665AF-92BA-E649-941D-268879B3EA81}" type="slidenum">
               <a:rPr lang="en-US" smtClean="0"/>
               <a:pPr/>
-              <a:t>‹#›</a:t>
+              <a:t>‹Nr.›</a:t>
             </a:fld>
             <a:endParaRPr lang="en-US"/>
           </a:p>
@@ -4612,7 +8085,7 @@
             <a:fld id="{4C4AD4EB-88D0-C141-9474-CCD86A78CB94}" type="datetimeFigureOut">
               <a:rPr lang="en-US" smtClean="0"/>
               <a:pPr/>
-              <a:t>11/28/10</a:t>
+              <a:t>30.11.2010</a:t>
             </a:fld>
             <a:endParaRPr lang="en-US"/>
           </a:p>
@@ -4660,7 +8133,7 @@
             <a:fld id="{DF7665AF-92BA-E649-941D-268879B3EA81}" type="slidenum">
               <a:rPr lang="en-US" smtClean="0"/>
               <a:pPr/>
-              <a:t>‹#›</a:t>
+              <a:t>‹Nr.›</a:t>
             </a:fld>
             <a:endParaRPr lang="en-US"/>
           </a:p>
@@ -4960,7 +8433,7 @@
             <a:fld id="{4C4AD4EB-88D0-C141-9474-CCD86A78CB94}" type="datetimeFigureOut">
               <a:rPr lang="en-US" smtClean="0"/>
               <a:pPr/>
-              <a:t>11/28/10</a:t>
+              <a:t>30.11.2010</a:t>
             </a:fld>
             <a:endParaRPr lang="en-US"/>
           </a:p>
@@ -5003,7 +8476,7 @@
             <a:fld id="{DF7665AF-92BA-E649-941D-268879B3EA81}" type="slidenum">
               <a:rPr lang="en-US" smtClean="0"/>
               <a:pPr/>
-              <a:t>‹#›</a:t>
+              <a:t>‹Nr.›</a:t>
             </a:fld>
             <a:endParaRPr lang="en-US"/>
           </a:p>
@@ -5052,7 +8525,7 @@
             <a:fld id="{4C4AD4EB-88D0-C141-9474-CCD86A78CB94}" type="datetimeFigureOut">
               <a:rPr lang="en-US" smtClean="0"/>
               <a:pPr/>
-              <a:t>11/28/10</a:t>
+              <a:t>30.11.2010</a:t>
             </a:fld>
             <a:endParaRPr lang="en-US"/>
           </a:p>
@@ -5095,7 +8568,7 @@
             <a:fld id="{DF7665AF-92BA-E649-941D-268879B3EA81}" type="slidenum">
               <a:rPr lang="en-US" smtClean="0"/>
               <a:pPr/>
-              <a:t>‹#›</a:t>
+              <a:t>‹Nr.›</a:t>
             </a:fld>
             <a:endParaRPr lang="en-US"/>
           </a:p>
@@ -5391,7 +8864,7 @@
             <a:fld id="{4C4AD4EB-88D0-C141-9474-CCD86A78CB94}" type="datetimeFigureOut">
               <a:rPr lang="en-US" smtClean="0"/>
               <a:pPr/>
-              <a:t>11/28/10</a:t>
+              <a:t>30.11.2010</a:t>
             </a:fld>
             <a:endParaRPr lang="en-US"/>
           </a:p>
@@ -5434,7 +8907,7 @@
             <a:fld id="{DF7665AF-92BA-E649-941D-268879B3EA81}" type="slidenum">
               <a:rPr lang="en-US" smtClean="0"/>
               <a:pPr/>
-              <a:t>‹#›</a:t>
+              <a:t>‹Nr.›</a:t>
             </a:fld>
             <a:endParaRPr lang="en-US"/>
           </a:p>
@@ -5605,7 +9078,7 @@
             <a:fld id="{4C4AD4EB-88D0-C141-9474-CCD86A78CB94}" type="datetimeFigureOut">
               <a:rPr lang="en-US" smtClean="0"/>
               <a:pPr/>
-              <a:t>11/28/10</a:t>
+              <a:t>30.11.2010</a:t>
             </a:fld>
             <a:endParaRPr lang="en-US"/>
           </a:p>
@@ -5686,7 +9159,7 @@
             <a:fld id="{DF7665AF-92BA-E649-941D-268879B3EA81}" type="slidenum">
               <a:rPr lang="en-US" smtClean="0"/>
               <a:pPr/>
-              <a:t>‹#›</a:t>
+              <a:t>‹Nr.›</a:t>
             </a:fld>
             <a:endParaRPr lang="en-US"/>
           </a:p>
@@ -7895,11 +11368,7 @@
           <a:p>
             <a:r>
               <a:rPr lang="en-US" sz="2800" dirty="0" smtClean="0"/>
-              <a:t>Ensemble </a:t>
-            </a:r>
-            <a:r>
-              <a:rPr lang="en-US" sz="2800" dirty="0" smtClean="0"/>
-              <a:t>and Replica-Exchange  Simulations</a:t>
+              <a:t>Ensemble and Replica-Exchange  Simulations</a:t>
             </a:r>
             <a:endParaRPr lang="en-US" sz="2800" dirty="0"/>
           </a:p>
@@ -8427,7 +11896,7 @@
           </p:nvPr>
         </p:nvPicPr>
         <p:blipFill>
-          <a:blip r:embed="rId2"/>
+          <a:blip r:embed="rId3"/>
           <a:srcRect t="-31965" b="-31965"/>
           <a:stretch>
             <a:fillRect/>
@@ -8435,36 +11904,119 @@
         </p:blipFill>
         <p:spPr>
           <a:xfrm>
-            <a:off x="4599746" y="3276600"/>
+            <a:off x="4625146" y="3136900"/>
             <a:ext cx="4333523" cy="4473575"/>
           </a:xfrm>
         </p:spPr>
       </p:pic>
       <p:pic>
         <p:nvPicPr>
-          <p:cNvPr id="6" name="Content Placeholder 3" descr="repex-azure.png"/>
+          <p:cNvPr id="7" name="Bild 6" descr="namd_ec2_azure.pdf"/>
           <p:cNvPicPr>
             <a:picLocks noChangeAspect="1"/>
           </p:cNvPicPr>
           <p:nvPr/>
         </p:nvPicPr>
-        <p:blipFill>
-          <a:blip r:embed="rId3"/>
-          <a:srcRect l="-10403" r="-10403"/>
-          <a:stretch>
-            <a:fillRect/>
-          </a:stretch>
-        </p:blipFill>
+        <mc:AlternateContent>
+          <mc:Choice xmlns:ma="http://schemas.microsoft.com/office/mac/drawingml/2008/main" Requires="ma">
+            <p:blipFill>
+              <a:blip r:embed="rId4"/>
+              <a:stretch>
+                <a:fillRect/>
+              </a:stretch>
+            </p:blipFill>
+          </mc:Choice>
+          <mc:Fallback>
+            <p:blipFill>
+              <a:blip r:embed="rId5"/>
+              <a:stretch>
+                <a:fillRect/>
+              </a:stretch>
+            </p:blipFill>
+          </mc:Fallback>
+        </mc:AlternateContent>
         <p:spPr>
           <a:xfrm>
-            <a:off x="4254481" y="1165414"/>
-            <a:ext cx="4878799" cy="2822386"/>
+            <a:off x="4483100" y="1384301"/>
+            <a:ext cx="4480200" cy="2718832"/>
           </a:xfrm>
           <a:prstGeom prst="rect">
             <a:avLst/>
           </a:prstGeom>
         </p:spPr>
       </p:pic>
+      <p:sp>
+        <p:nvSpPr>
+          <p:cNvPr id="10" name="Textfeld 9"/>
+          <p:cNvSpPr txBox="1"/>
+          <p:nvPr/>
+        </p:nvSpPr>
+        <p:spPr>
+          <a:xfrm>
+            <a:off x="4572000" y="1230411"/>
+            <a:ext cx="1950399" cy="307777"/>
+          </a:xfrm>
+          <a:prstGeom prst="rect">
+            <a:avLst/>
+          </a:prstGeom>
+          <a:noFill/>
+        </p:spPr>
+        <p:txBody>
+          <a:bodyPr wrap="none" rtlCol="0">
+            <a:spAutoFit/>
+          </a:bodyPr>
+          <a:lstStyle/>
+          <a:p>
+            <a:r>
+              <a:rPr lang="de-DE" sz="1400" dirty="0" smtClean="0"/>
+              <a:t>NAMD Performance</a:t>
+            </a:r>
+            <a:endParaRPr lang="de-DE" sz="1400" dirty="0"/>
+          </a:p>
+        </p:txBody>
+      </p:sp>
+      <p:sp>
+        <p:nvSpPr>
+          <p:cNvPr id="11" name="Textfeld 10"/>
+          <p:cNvSpPr txBox="1"/>
+          <p:nvPr/>
+        </p:nvSpPr>
+        <p:spPr>
+          <a:xfrm>
+            <a:off x="4572000" y="3870523"/>
+            <a:ext cx="2645313" cy="307777"/>
+          </a:xfrm>
+          <a:prstGeom prst="rect">
+            <a:avLst/>
+          </a:prstGeom>
+          <a:noFill/>
+        </p:spPr>
+        <p:txBody>
+          <a:bodyPr wrap="none" rtlCol="0">
+            <a:spAutoFit/>
+          </a:bodyPr>
+          <a:lstStyle/>
+          <a:p>
+            <a:r>
+              <a:rPr lang="de-DE" sz="1400" dirty="0" err="1" smtClean="0"/>
+              <a:t>Azure</a:t>
+            </a:r>
+            <a:r>
+              <a:rPr lang="de-DE" sz="1400" dirty="0" smtClean="0"/>
+              <a:t> </a:t>
+            </a:r>
+            <a:r>
+              <a:rPr lang="de-DE" sz="1400" dirty="0" err="1" smtClean="0"/>
+              <a:t>Network</a:t>
+            </a:r>
+            <a:r>
+              <a:rPr lang="de-DE" sz="1400" dirty="0" smtClean="0"/>
+              <a:t> Performance</a:t>
+            </a:r>
+            <a:endParaRPr lang="de-DE" sz="1400" dirty="0"/>
+          </a:p>
+        </p:txBody>
+      </p:sp>
     </p:spTree>
   </p:cSld>
   <p:clrMapOvr>
@@ -8499,37 +12051,7 @@
       </p:grpSpPr>
       <p:sp>
         <p:nvSpPr>
-          <p:cNvPr id="2" name="Title 1"/>
-          <p:cNvSpPr>
-            <a:spLocks noGrp="1"/>
-          </p:cNvSpPr>
-          <p:nvPr>
-            <p:ph type="title"/>
-          </p:nvPr>
-        </p:nvSpPr>
-        <p:spPr>
-          <a:xfrm>
-            <a:off x="927100" y="263714"/>
-            <a:ext cx="8216900" cy="914400"/>
-          </a:xfrm>
-        </p:spPr>
-        <p:txBody>
-          <a:bodyPr>
-            <a:normAutofit/>
-          </a:bodyPr>
-          <a:lstStyle/>
-          <a:p>
-            <a:r>
-              <a:rPr lang="en-US" sz="2800" dirty="0" smtClean="0"/>
-              <a:t>Although Clouds are not Panacea..</a:t>
-            </a:r>
-            <a:endParaRPr lang="en-US" sz="2667" dirty="0"/>
-          </a:p>
-        </p:txBody>
-      </p:sp>
-      <p:sp>
-        <p:nvSpPr>
-          <p:cNvPr id="3" name="Content Placeholder 2"/>
+          <p:cNvPr id="6" name="Inhaltsplatzhalter 5"/>
           <p:cNvSpPr>
             <a:spLocks noGrp="1"/>
           </p:cNvSpPr>
@@ -8540,145 +12062,173 @@
         <p:spPr>
           <a:xfrm>
             <a:off x="757947" y="1529880"/>
-            <a:ext cx="7966954" cy="5328120"/>
+            <a:ext cx="4029953" cy="4608884"/>
           </a:xfrm>
         </p:spPr>
         <p:txBody>
           <a:bodyPr>
-            <a:noAutofit/>
+            <a:normAutofit fontScale="92500" lnSpcReduction="10000"/>
           </a:bodyPr>
           <a:lstStyle/>
           <a:p>
             <a:r>
-              <a:rPr lang="en-US" sz="1700" dirty="0" smtClean="0"/>
-              <a:t>Nascent infrastructure do what Production DCI have not managed!</a:t>
-            </a:r>
-          </a:p>
-          <a:p>
-            <a:pPr lvl="0">
-              <a:buClr>
-                <a:prstClr val="black">
-                  <a:lumMod val="75000"/>
-                  <a:lumOff val="25000"/>
-                </a:prstClr>
-              </a:buClr>
-            </a:pPr>
-            <a:r>
-              <a:rPr lang="en-US" sz="1700" dirty="0" smtClean="0">
-                <a:solidFill>
-                  <a:prstClr val="black">
-                    <a:lumMod val="65000"/>
-                    <a:lumOff val="35000"/>
-                  </a:prstClr>
-                </a:solidFill>
-              </a:rPr>
-              <a:t>“We” have lost intellectual leadership to commercial providers!</a:t>
-            </a:r>
-            <a:endParaRPr lang="en-US" sz="1700" dirty="0" smtClean="0"/>
+              <a:rPr lang="en-US" dirty="0" smtClean="0"/>
+              <a:t>Replica-Exchange has been ported to </a:t>
+            </a:r>
+            <a:r>
+              <a:rPr lang="en-US" dirty="0" err="1" smtClean="0"/>
+              <a:t>BigJob</a:t>
+            </a:r>
+            <a:r>
+              <a:rPr lang="en-US" dirty="0" smtClean="0"/>
+              <a:t> Azure</a:t>
+            </a:r>
+          </a:p>
+          <a:p>
+            <a:r>
+              <a:rPr lang="en-US" dirty="0" smtClean="0"/>
+              <a:t>Azure </a:t>
+            </a:r>
+            <a:r>
+              <a:rPr lang="en-US" dirty="0" err="1" smtClean="0"/>
+              <a:t>BigJob</a:t>
+            </a:r>
+            <a:r>
+              <a:rPr lang="en-US" dirty="0" smtClean="0"/>
+              <a:t> scales well with the number of replicas. </a:t>
+            </a:r>
           </a:p>
           <a:p>
             <a:pPr lvl="1"/>
             <a:r>
-              <a:rPr lang="en-US" sz="1700" dirty="0" smtClean="0"/>
-              <a:t>Community busy agenda pushing, </a:t>
-            </a:r>
-            <a:r>
-              <a:rPr lang="en-US" sz="1700" dirty="0" err="1" smtClean="0"/>
-              <a:t>e.g</a:t>
-            </a:r>
-            <a:r>
-              <a:rPr lang="en-US" sz="1700" dirty="0" smtClean="0"/>
-              <a:t>, middleware/software stacks, most innovation in DC has come from  commercial sector!</a:t>
-            </a:r>
-          </a:p>
-          <a:p>
-            <a:pPr lvl="2"/>
-            <a:r>
-              <a:rPr lang="en-US" sz="1700" dirty="0" smtClean="0"/>
-              <a:t>Infrastructure, Algorithmic &amp; Development</a:t>
-            </a:r>
-          </a:p>
-          <a:p>
-            <a:pPr lvl="2"/>
-            <a:r>
-              <a:rPr lang="en-US" sz="1700" dirty="0" smtClean="0"/>
-              <a:t>e.g., (re-discovering) </a:t>
-            </a:r>
-            <a:r>
-              <a:rPr lang="en-US" sz="1700" dirty="0" err="1" smtClean="0"/>
-              <a:t>MapReduce</a:t>
-            </a:r>
-            <a:endParaRPr lang="en-US" sz="1700" dirty="0" smtClean="0"/>
-          </a:p>
-          <a:p>
-            <a:r>
-              <a:rPr lang="en-US" sz="1700" dirty="0" smtClean="0"/>
-              <a:t>Simplicity is the Ultimate Sophistication</a:t>
-            </a:r>
-          </a:p>
-          <a:p>
-            <a:pPr lvl="1"/>
-            <a:r>
-              <a:rPr lang="en-US" sz="1700" dirty="0" smtClean="0"/>
-              <a:t> </a:t>
-            </a:r>
-            <a:r>
-              <a:rPr lang="en-US" sz="1700" i="1" dirty="0" smtClean="0"/>
-              <a:t>“It seems that perfection is attained not when there remains nothing to add, but when there remains nothing to remove</a:t>
-            </a:r>
-            <a:r>
-              <a:rPr lang="en-US" sz="1700" dirty="0" smtClean="0"/>
-              <a:t>”</a:t>
-            </a:r>
-          </a:p>
-          <a:p>
-            <a:pPr lvl="1"/>
-            <a:r>
-              <a:rPr lang="en-US" sz="1700" dirty="0" smtClean="0"/>
-              <a:t>Confuse Functionality with Usability</a:t>
-            </a:r>
-          </a:p>
-          <a:p>
-            <a:pPr lvl="2"/>
-            <a:r>
-              <a:rPr lang="en-US" sz="1700" dirty="0" smtClean="0"/>
-              <a:t>“Confused Beauty for Truth”, -- “How Did Economists Get It So Wrong?”, in analogy to the Financial Crisis</a:t>
-            </a:r>
-          </a:p>
-          <a:p>
-            <a:pPr marL="342900" lvl="2" indent="-342900">
-              <a:spcBef>
-                <a:spcPts val="2000"/>
-              </a:spcBef>
-              <a:buFont typeface="Wingdings 2" pitchFamily="18" charset="2"/>
-              <a:buChar char=""/>
-            </a:pPr>
-            <a:r>
-              <a:rPr lang="en-US" sz="1700" dirty="0" smtClean="0"/>
-              <a:t>Moral and Intellectual courage to admit we got it wrong	</a:t>
-            </a:r>
-          </a:p>
-          <a:p>
-            <a:pPr lvl="1"/>
-            <a:r>
-              <a:rPr lang="en-US" sz="1700" dirty="0" smtClean="0"/>
-              <a:t>More condemnation in Grid2009, “Critical Analysis of PGI and DA” </a:t>
-            </a:r>
-          </a:p>
-        </p:txBody>
-      </p:sp>
+              <a:rPr lang="en-US" dirty="0" smtClean="0"/>
+              <a:t>Azure Queues proved to be effective for coordination of sub</a:t>
+            </a:r>
+            <a:r>
+              <a:rPr lang="en-US" smtClean="0"/>
+              <a:t>-jobs</a:t>
+            </a:r>
+          </a:p>
+          <a:p>
+            <a:r>
+              <a:rPr lang="en-US" dirty="0" smtClean="0"/>
+              <a:t>Larger </a:t>
+            </a:r>
+            <a:r>
+              <a:rPr lang="en-US" dirty="0" err="1" smtClean="0"/>
+              <a:t>VMs</a:t>
+            </a:r>
+            <a:r>
+              <a:rPr lang="en-US" dirty="0" smtClean="0"/>
+              <a:t> have a better performance. But, efficiency drops &lt;0.4 for the extra-large VM</a:t>
+            </a:r>
+          </a:p>
+          <a:p>
+            <a:r>
+              <a:rPr lang="en-US" dirty="0" smtClean="0"/>
+              <a:t>The different Azure data centers show a slightly different performance</a:t>
+            </a:r>
+            <a:endParaRPr lang="en-US" dirty="0"/>
+          </a:p>
+        </p:txBody>
+      </p:sp>
+      <p:sp>
+        <p:nvSpPr>
+          <p:cNvPr id="7" name="Titel 6"/>
+          <p:cNvSpPr>
+            <a:spLocks noGrp="1"/>
+          </p:cNvSpPr>
+          <p:nvPr>
+            <p:ph type="title"/>
+          </p:nvPr>
+        </p:nvSpPr>
+        <p:spPr/>
+        <p:txBody>
+          <a:bodyPr/>
+          <a:lstStyle/>
+          <a:p>
+            <a:r>
+              <a:rPr lang="de-DE" dirty="0" err="1" smtClean="0"/>
+              <a:t>Replica-Exchange</a:t>
+            </a:r>
+            <a:r>
+              <a:rPr lang="de-DE" dirty="0" smtClean="0"/>
+              <a:t> on </a:t>
+            </a:r>
+            <a:r>
+              <a:rPr lang="de-DE" dirty="0" err="1" smtClean="0"/>
+              <a:t>Azure</a:t>
+            </a:r>
+            <a:endParaRPr lang="de-DE" dirty="0"/>
+          </a:p>
+        </p:txBody>
+      </p:sp>
+      <p:pic>
+        <p:nvPicPr>
+          <p:cNvPr id="17" name="Content Placeholder 3" descr="repex-azure.png"/>
+          <p:cNvPicPr>
+            <a:picLocks noChangeAspect="1"/>
+          </p:cNvPicPr>
+          <p:nvPr/>
+        </p:nvPicPr>
+        <p:blipFill>
+          <a:blip r:embed="rId2"/>
+          <a:srcRect l="-10403" r="-10403"/>
+          <a:stretch>
+            <a:fillRect/>
+          </a:stretch>
+        </p:blipFill>
+        <p:spPr>
+          <a:xfrm>
+            <a:off x="4572000" y="1178114"/>
+            <a:ext cx="4878799" cy="2822386"/>
+          </a:xfrm>
+          <a:prstGeom prst="rect">
+            <a:avLst/>
+          </a:prstGeom>
+        </p:spPr>
+      </p:pic>
+      <p:pic>
+        <p:nvPicPr>
+          <p:cNvPr id="18" name="Bild 17" descr="repex_runtime_per_region.pdf"/>
+          <p:cNvPicPr>
+            <a:picLocks noChangeAspect="1"/>
+          </p:cNvPicPr>
+          <p:nvPr/>
+        </p:nvPicPr>
+        <mc:AlternateContent>
+          <mc:Choice xmlns:ma="http://schemas.microsoft.com/office/mac/drawingml/2008/main" Requires="ma">
+            <p:blipFill>
+              <a:blip r:embed="rId3"/>
+              <a:stretch>
+                <a:fillRect/>
+              </a:stretch>
+            </p:blipFill>
+          </mc:Choice>
+          <mc:Fallback>
+            <p:blipFill>
+              <a:blip r:embed="rId4"/>
+              <a:stretch>
+                <a:fillRect/>
+              </a:stretch>
+            </p:blipFill>
+          </mc:Fallback>
+        </mc:AlternateContent>
+        <p:spPr>
+          <a:xfrm>
+            <a:off x="4972691" y="4241800"/>
+            <a:ext cx="4196709" cy="2527300"/>
+          </a:xfrm>
+          <a:prstGeom prst="rect">
+            <a:avLst/>
+          </a:prstGeom>
+        </p:spPr>
+      </p:pic>
     </p:spTree>
   </p:cSld>
   <p:clrMapOvr>
     <a:masterClrMapping/>
   </p:clrMapOvr>
-  <p:timing>
-    <p:tnLst>
-      <p:par>
-        <p:cTn id="1" dur="indefinite" restart="never" nodeType="tmRoot"/>
-      </p:par>
-    </p:tnLst>
-  </p:timing>
 </p:sld>
 </file>
 
@@ -8836,6 +12386,442 @@
   <p:clrMapOvr>
     <a:masterClrMapping/>
   </p:clrMapOvr>
+  <p:timing>
+    <p:tnLst>
+      <p:par>
+        <p:cTn id="1" dur="indefinite" restart="never" nodeType="tmRoot"/>
+      </p:par>
+    </p:tnLst>
+  </p:timing>
+</p:sld>
+</file>
+
+<file path=ppt/slides/slide20.xml><?xml version="1.0" encoding="utf-8"?>
+<p:sld xmlns:a="http://schemas.openxmlformats.org/drawingml/2006/main" xmlns:r="http://schemas.openxmlformats.org/officeDocument/2006/relationships" xmlns:mc="http://schemas.openxmlformats.org/markup-compatibility/2006" xmlns:mv="urn:schemas-microsoft-com:mac:vml" xmlns:p="http://schemas.openxmlformats.org/presentationml/2006/main" mc:Ignorable="mv" mc:PreserveAttributes="mv:*">
+  <p:cSld>
+    <p:spTree>
+      <p:nvGrpSpPr>
+        <p:cNvPr id="1" name=""/>
+        <p:cNvGrpSpPr/>
+        <p:nvPr/>
+      </p:nvGrpSpPr>
+      <p:grpSpPr>
+        <a:xfrm>
+          <a:off x="0" y="0"/>
+          <a:ext cx="0" cy="0"/>
+          <a:chOff x="0" y="0"/>
+          <a:chExt cx="0" cy="0"/>
+        </a:xfrm>
+      </p:grpSpPr>
+      <p:sp>
+        <p:nvSpPr>
+          <p:cNvPr id="2" name="Title 1"/>
+          <p:cNvSpPr>
+            <a:spLocks noGrp="1"/>
+          </p:cNvSpPr>
+          <p:nvPr>
+            <p:ph type="title"/>
+          </p:nvPr>
+        </p:nvSpPr>
+        <p:spPr>
+          <a:xfrm>
+            <a:off x="927100" y="263714"/>
+            <a:ext cx="8216900" cy="914400"/>
+          </a:xfrm>
+        </p:spPr>
+        <p:txBody>
+          <a:bodyPr>
+            <a:normAutofit/>
+          </a:bodyPr>
+          <a:lstStyle/>
+          <a:p>
+            <a:r>
+              <a:rPr lang="en-US" sz="2800" dirty="0" smtClean="0"/>
+              <a:t>Although Clouds are not Panacea..</a:t>
+            </a:r>
+            <a:endParaRPr lang="en-US" sz="2667" dirty="0"/>
+          </a:p>
+        </p:txBody>
+      </p:sp>
+      <p:sp>
+        <p:nvSpPr>
+          <p:cNvPr id="3" name="Content Placeholder 2"/>
+          <p:cNvSpPr>
+            <a:spLocks noGrp="1"/>
+          </p:cNvSpPr>
+          <p:nvPr>
+            <p:ph idx="1"/>
+          </p:nvPr>
+        </p:nvSpPr>
+        <p:spPr>
+          <a:xfrm>
+            <a:off x="757947" y="1529880"/>
+            <a:ext cx="7966954" cy="5328120"/>
+          </a:xfrm>
+        </p:spPr>
+        <p:txBody>
+          <a:bodyPr>
+            <a:noAutofit/>
+          </a:bodyPr>
+          <a:lstStyle/>
+          <a:p>
+            <a:r>
+              <a:rPr lang="en-US" sz="1700" dirty="0" smtClean="0"/>
+              <a:t>Nascent infrastructure do what Production DCI have not managed!</a:t>
+            </a:r>
+          </a:p>
+          <a:p>
+            <a:pPr lvl="0">
+              <a:buClr>
+                <a:prstClr val="black">
+                  <a:lumMod val="75000"/>
+                  <a:lumOff val="25000"/>
+                </a:prstClr>
+              </a:buClr>
+            </a:pPr>
+            <a:r>
+              <a:rPr lang="en-US" sz="1700" dirty="0" smtClean="0">
+                <a:solidFill>
+                  <a:prstClr val="black">
+                    <a:lumMod val="65000"/>
+                    <a:lumOff val="35000"/>
+                  </a:prstClr>
+                </a:solidFill>
+              </a:rPr>
+              <a:t>“We” have lost intellectual leadership to commercial providers!</a:t>
+            </a:r>
+            <a:endParaRPr lang="en-US" sz="1700" dirty="0" smtClean="0"/>
+          </a:p>
+          <a:p>
+            <a:pPr lvl="1"/>
+            <a:r>
+              <a:rPr lang="en-US" sz="1700" dirty="0" smtClean="0"/>
+              <a:t>Community busy agenda pushing, </a:t>
+            </a:r>
+            <a:r>
+              <a:rPr lang="en-US" sz="1700" dirty="0" err="1" smtClean="0"/>
+              <a:t>e.g</a:t>
+            </a:r>
+            <a:r>
+              <a:rPr lang="en-US" sz="1700" dirty="0" smtClean="0"/>
+              <a:t>, middleware/software stacks, most innovation in DC has come from  commercial sector!</a:t>
+            </a:r>
+          </a:p>
+          <a:p>
+            <a:pPr lvl="2"/>
+            <a:r>
+              <a:rPr lang="en-US" sz="1700" dirty="0" smtClean="0"/>
+              <a:t>Infrastructure, Algorithmic &amp; Development</a:t>
+            </a:r>
+          </a:p>
+          <a:p>
+            <a:pPr lvl="2"/>
+            <a:r>
+              <a:rPr lang="en-US" sz="1700" dirty="0" smtClean="0"/>
+              <a:t>e.g., (re-discovering) </a:t>
+            </a:r>
+            <a:r>
+              <a:rPr lang="en-US" sz="1700" dirty="0" err="1" smtClean="0"/>
+              <a:t>MapReduce</a:t>
+            </a:r>
+            <a:endParaRPr lang="en-US" sz="1700" dirty="0" smtClean="0"/>
+          </a:p>
+          <a:p>
+            <a:r>
+              <a:rPr lang="en-US" sz="1700" dirty="0" smtClean="0"/>
+              <a:t>Simplicity is the Ultimate Sophistication</a:t>
+            </a:r>
+          </a:p>
+          <a:p>
+            <a:pPr lvl="1"/>
+            <a:r>
+              <a:rPr lang="en-US" sz="1700" dirty="0" smtClean="0"/>
+              <a:t> </a:t>
+            </a:r>
+            <a:r>
+              <a:rPr lang="en-US" sz="1700" i="1" dirty="0" smtClean="0"/>
+              <a:t>“It seems that perfection is attained not when there remains nothing to add, but when there remains nothing to remove</a:t>
+            </a:r>
+            <a:r>
+              <a:rPr lang="en-US" sz="1700" dirty="0" smtClean="0"/>
+              <a:t>”</a:t>
+            </a:r>
+          </a:p>
+          <a:p>
+            <a:pPr lvl="1"/>
+            <a:r>
+              <a:rPr lang="en-US" sz="1700" dirty="0" smtClean="0"/>
+              <a:t>Confuse Functionality with Usability</a:t>
+            </a:r>
+          </a:p>
+          <a:p>
+            <a:pPr lvl="2"/>
+            <a:r>
+              <a:rPr lang="en-US" sz="1700" dirty="0" smtClean="0"/>
+              <a:t>“Confused Beauty for Truth”, -- “How Did Economists Get It So Wrong?”, in analogy to the Financial Crisis</a:t>
+            </a:r>
+          </a:p>
+          <a:p>
+            <a:pPr marL="342900" lvl="2" indent="-342900">
+              <a:spcBef>
+                <a:spcPts val="2000"/>
+              </a:spcBef>
+              <a:buFont typeface="Wingdings 2" pitchFamily="18" charset="2"/>
+              <a:buChar char=""/>
+            </a:pPr>
+            <a:r>
+              <a:rPr lang="en-US" sz="1700" dirty="0" smtClean="0"/>
+              <a:t>Moral and Intellectual courage to admit we got it wrong	</a:t>
+            </a:r>
+          </a:p>
+          <a:p>
+            <a:pPr lvl="1"/>
+            <a:r>
+              <a:rPr lang="en-US" sz="1700" dirty="0" smtClean="0"/>
+              <a:t>More condemnation in Grid2009, “Critical Analysis of PGI and DA” </a:t>
+            </a:r>
+          </a:p>
+        </p:txBody>
+      </p:sp>
+    </p:spTree>
+  </p:cSld>
+  <p:clrMapOvr>
+    <a:masterClrMapping/>
+  </p:clrMapOvr>
+  <p:timing>
+    <p:tnLst>
+      <p:par>
+        <p:cTn id="1" dur="indefinite" restart="never" nodeType="tmRoot"/>
+      </p:par>
+    </p:tnLst>
+  </p:timing>
+</p:sld>
+</file>
+
+<file path=ppt/slides/slide21.xml><?xml version="1.0" encoding="utf-8"?>
+<p:sld xmlns:a="http://schemas.openxmlformats.org/drawingml/2006/main" xmlns:r="http://schemas.openxmlformats.org/officeDocument/2006/relationships" xmlns:mc="http://schemas.openxmlformats.org/markup-compatibility/2006" xmlns:mv="urn:schemas-microsoft-com:mac:vml" xmlns:p="http://schemas.openxmlformats.org/presentationml/2006/main" mc:Ignorable="mv" mc:PreserveAttributes="mv:*">
+  <p:cSld>
+    <p:spTree>
+      <p:nvGrpSpPr>
+        <p:cNvPr id="1" name=""/>
+        <p:cNvGrpSpPr/>
+        <p:nvPr/>
+      </p:nvGrpSpPr>
+      <p:grpSpPr>
+        <a:xfrm>
+          <a:off x="0" y="0"/>
+          <a:ext cx="0" cy="0"/>
+          <a:chOff x="0" y="0"/>
+          <a:chExt cx="0" cy="0"/>
+        </a:xfrm>
+      </p:grpSpPr>
+      <p:sp>
+        <p:nvSpPr>
+          <p:cNvPr id="20483" name="Rectangle 4"/>
+          <p:cNvSpPr>
+            <a:spLocks/>
+          </p:cNvSpPr>
+          <p:nvPr/>
+        </p:nvSpPr>
+        <p:spPr bwMode="auto">
+          <a:xfrm>
+            <a:off x="1447800" y="171450"/>
+            <a:ext cx="7162800" cy="647700"/>
+          </a:xfrm>
+          <a:prstGeom prst="rect">
+            <a:avLst/>
+          </a:prstGeom>
+          <a:noFill/>
+          <a:ln w="12700">
+            <a:noFill/>
+            <a:miter lim="800000"/>
+            <a:headEnd/>
+            <a:tailEnd/>
+          </a:ln>
+        </p:spPr>
+        <p:txBody>
+          <a:bodyPr lIns="0" tIns="0" rIns="0" bIns="0" anchor="ctr">
+            <a:prstTxWarp prst="textNoShape">
+              <a:avLst/>
+            </a:prstTxWarp>
+          </a:bodyPr>
+          <a:lstStyle/>
+          <a:p>
+            <a:pPr>
+              <a:lnSpc>
+                <a:spcPct val="100000"/>
+              </a:lnSpc>
+              <a:tabLst>
+                <a:tab pos="457200" algn="l"/>
+                <a:tab pos="914400" algn="l"/>
+                <a:tab pos="1371600" algn="l"/>
+                <a:tab pos="1828800" algn="l"/>
+                <a:tab pos="2286000" algn="l"/>
+                <a:tab pos="2743200" algn="l"/>
+                <a:tab pos="3200400" algn="l"/>
+                <a:tab pos="3657600" algn="l"/>
+                <a:tab pos="4114800" algn="l"/>
+                <a:tab pos="4572000" algn="l"/>
+                <a:tab pos="5029200" algn="l"/>
+                <a:tab pos="5486400" algn="l"/>
+                <a:tab pos="5943600" algn="l"/>
+                <a:tab pos="6400800" algn="l"/>
+                <a:tab pos="6858000" algn="l"/>
+                <a:tab pos="7315200" algn="l"/>
+                <a:tab pos="7772400" algn="l"/>
+                <a:tab pos="8229600" algn="l"/>
+                <a:tab pos="8686800" algn="l"/>
+                <a:tab pos="9144000" algn="l"/>
+              </a:tabLst>
+            </a:pPr>
+            <a:endParaRPr lang="en-US" sz="2800" dirty="0">
+              <a:solidFill>
+                <a:srgbClr val="000080"/>
+              </a:solidFill>
+              <a:ea typeface="Arial" charset="0"/>
+              <a:cs typeface="Arial" charset="0"/>
+            </a:endParaRPr>
+          </a:p>
+        </p:txBody>
+      </p:sp>
+      <p:sp>
+        <p:nvSpPr>
+          <p:cNvPr id="20485" name="Title 5"/>
+          <p:cNvSpPr>
+            <a:spLocks noGrp="1"/>
+          </p:cNvSpPr>
+          <p:nvPr>
+            <p:ph type="title"/>
+          </p:nvPr>
+        </p:nvSpPr>
+        <p:spPr/>
+        <p:txBody>
+          <a:bodyPr>
+            <a:normAutofit/>
+          </a:bodyPr>
+          <a:lstStyle/>
+          <a:p>
+            <a:r>
+              <a:rPr lang="en-US" dirty="0" smtClean="0"/>
+              <a:t>Future Work: Pilot Data</a:t>
+            </a:r>
+            <a:endParaRPr lang="en-US" dirty="0" smtClean="0"/>
+          </a:p>
+        </p:txBody>
+      </p:sp>
+      <p:sp>
+        <p:nvSpPr>
+          <p:cNvPr id="16" name="Content Placeholder 15"/>
+          <p:cNvSpPr>
+            <a:spLocks noGrp="1"/>
+          </p:cNvSpPr>
+          <p:nvPr>
+            <p:ph idx="1"/>
+          </p:nvPr>
+        </p:nvSpPr>
+        <p:spPr>
+          <a:xfrm>
+            <a:off x="757947" y="1529879"/>
+            <a:ext cx="4347453" cy="4993909"/>
+          </a:xfrm>
+        </p:spPr>
+        <p:txBody>
+          <a:bodyPr>
+            <a:normAutofit fontScale="85000" lnSpcReduction="20000"/>
+          </a:bodyPr>
+          <a:lstStyle/>
+          <a:p>
+            <a:r>
+              <a:rPr lang="en-US" sz="2400" dirty="0" smtClean="0"/>
+              <a:t>Pilot Data: </a:t>
+            </a:r>
+          </a:p>
+          <a:p>
+            <a:pPr lvl="1"/>
+            <a:r>
+              <a:rPr lang="en-US" sz="2400" dirty="0" smtClean="0"/>
+              <a:t>Abstraction for expressing data localities and affinities.</a:t>
+            </a:r>
+          </a:p>
+          <a:p>
+            <a:pPr lvl="1"/>
+            <a:r>
+              <a:rPr lang="en-US" sz="2400" dirty="0" smtClean="0"/>
+              <a:t>Pilot Data can be used to create groups of file that are always used together</a:t>
+            </a:r>
+            <a:r>
+              <a:rPr lang="en-US" sz="2400" dirty="0" smtClean="0"/>
+              <a:t> </a:t>
+            </a:r>
+            <a:endParaRPr lang="de-DE" sz="2400" dirty="0" smtClean="0"/>
+          </a:p>
+          <a:p>
+            <a:pPr lvl="1"/>
+            <a:r>
+              <a:rPr lang="en-US" sz="2400" dirty="0" smtClean="0"/>
+              <a:t>Pilot Data provides a set of basic operations on top of these file groups</a:t>
+            </a:r>
+          </a:p>
+          <a:p>
+            <a:r>
+              <a:rPr lang="en-US" sz="2400" dirty="0" smtClean="0"/>
+              <a:t>Pilot Store: A container that represents a logical group of physical files that share the same affinity</a:t>
+            </a:r>
+            <a:r>
+              <a:rPr lang="en-US" sz="2400" dirty="0" smtClean="0"/>
+              <a:t>.</a:t>
+            </a:r>
+          </a:p>
+          <a:p>
+            <a:r>
+              <a:rPr lang="en-US" sz="2400" dirty="0" smtClean="0"/>
+              <a:t>Abstraction can be used to express C-C, C-D and D-D </a:t>
+            </a:r>
+            <a:r>
+              <a:rPr lang="en-US" sz="2400" dirty="0" err="1" smtClean="0"/>
+              <a:t>affinitities</a:t>
+            </a:r>
+            <a:endParaRPr lang="en-US" sz="2400" dirty="0" smtClean="0"/>
+          </a:p>
+          <a:p>
+            <a:endParaRPr lang="en-US" dirty="0" smtClean="0"/>
+          </a:p>
+          <a:p>
+            <a:endParaRPr lang="en-US" dirty="0"/>
+          </a:p>
+        </p:txBody>
+      </p:sp>
+      <p:pic>
+        <p:nvPicPr>
+          <p:cNvPr id="5" name="Content Placeholder 3" descr="affinity_sketch-4.png"/>
+          <p:cNvPicPr>
+            <a:picLocks noChangeAspect="1"/>
+          </p:cNvPicPr>
+          <p:nvPr/>
+        </p:nvPicPr>
+        <p:blipFill>
+          <a:blip r:embed="rId3"/>
+          <a:srcRect l="935" r="-16339"/>
+          <a:stretch>
+            <a:fillRect/>
+          </a:stretch>
+        </p:blipFill>
+        <p:spPr>
+          <a:xfrm>
+            <a:off x="5626100" y="1529879"/>
+            <a:ext cx="3822700" cy="4796589"/>
+          </a:xfrm>
+          <a:prstGeom prst="rect">
+            <a:avLst/>
+          </a:prstGeom>
+        </p:spPr>
+      </p:pic>
+    </p:spTree>
+  </p:cSld>
+  <p:clrMapOvr>
+    <a:masterClrMapping/>
+  </p:clrMapOvr>
+  <p:transition/>
   <p:timing>
     <p:tnLst>
       <p:par>

</xml_diff>

<commit_message>
hide unnecessary slides added another perf slide
git-svn-id: file://localhost/tmp/svn2git/svn@3293 defb5e50-622e-49ec-a68e-d72c7db87b45
</commit_message>
<xml_diff>
--- a/papers/cloudcom10/presentation/saga-azure-cloudcom10.pptx
+++ b/papers/cloudcom10/presentation/saga-azure-cloudcom10.pptx
@@ -5,7 +5,7 @@
     <p:sldMasterId id="2147483660" r:id="rId1"/>
   </p:sldMasterIdLst>
   <p:notesMasterIdLst>
-    <p:notesMasterId r:id="rId23"/>
+    <p:notesMasterId r:id="rId24"/>
   </p:notesMasterIdLst>
   <p:sldIdLst>
     <p:sldId id="256" r:id="rId2"/>
@@ -26,9 +26,10 @@
     <p:sldId id="744" r:id="rId17"/>
     <p:sldId id="688" r:id="rId18"/>
     <p:sldId id="693" r:id="rId19"/>
-    <p:sldId id="748" r:id="rId20"/>
-    <p:sldId id="745" r:id="rId21"/>
-    <p:sldId id="749" r:id="rId22"/>
+    <p:sldId id="750" r:id="rId20"/>
+    <p:sldId id="748" r:id="rId21"/>
+    <p:sldId id="745" r:id="rId22"/>
+    <p:sldId id="749" r:id="rId23"/>
   </p:sldIdLst>
   <p:sldSz cx="9144000" cy="6858000" type="screen4x3"/>
   <p:notesSz cx="6858000" cy="9144000"/>
@@ -4520,7 +4521,7 @@
             <a:fld id="{EE41C05A-BBAC-0741-9B8E-1278839E95FE}" type="slidenum">
               <a:rPr lang="en-US" smtClean="0"/>
               <a:pPr/>
-              <a:t>21</a:t>
+              <a:t>22</a:t>
             </a:fld>
             <a:endParaRPr lang="en-US"/>
           </a:p>
@@ -9792,7 +9793,7 @@
 </file>
 
 <file path=ppt/slides/slide10.xml><?xml version="1.0" encoding="utf-8"?>
-<p:sld xmlns:a="http://schemas.openxmlformats.org/drawingml/2006/main" xmlns:r="http://schemas.openxmlformats.org/officeDocument/2006/relationships" xmlns:mc="http://schemas.openxmlformats.org/markup-compatibility/2006" xmlns:mv="urn:schemas-microsoft-com:mac:vml" xmlns:p="http://schemas.openxmlformats.org/presentationml/2006/main" mc:Ignorable="mv" mc:PreserveAttributes="mv:*">
+<p:sld xmlns:a="http://schemas.openxmlformats.org/drawingml/2006/main" xmlns:r="http://schemas.openxmlformats.org/officeDocument/2006/relationships" xmlns:mc="http://schemas.openxmlformats.org/markup-compatibility/2006" xmlns:mv="urn:schemas-microsoft-com:mac:vml" xmlns:p="http://schemas.openxmlformats.org/presentationml/2006/main" mc:Ignorable="mv" mc:PreserveAttributes="mv:*" show="0">
   <p:cSld>
     <p:spTree>
       <p:nvGrpSpPr>
@@ -11954,7 +11955,7 @@
         <p:spPr>
           <a:xfrm>
             <a:off x="4572000" y="1230411"/>
-            <a:ext cx="1950399" cy="307777"/>
+            <a:ext cx="2765062" cy="307777"/>
           </a:xfrm>
           <a:prstGeom prst="rect">
             <a:avLst/>
@@ -11969,7 +11970,11 @@
           <a:p>
             <a:r>
               <a:rPr lang="de-DE" sz="1400" dirty="0" smtClean="0"/>
-              <a:t>NAMD Performance</a:t>
+              <a:t>NAMD Performance on </a:t>
+            </a:r>
+            <a:r>
+              <a:rPr lang="de-DE" sz="1400" dirty="0" err="1" smtClean="0"/>
+              <a:t>Azure</a:t>
             </a:r>
             <a:endParaRPr lang="de-DE" sz="1400" dirty="0"/>
           </a:p>
@@ -12067,13 +12072,13 @@
         </p:spPr>
         <p:txBody>
           <a:bodyPr>
-            <a:normAutofit fontScale="92500" lnSpcReduction="10000"/>
+            <a:normAutofit/>
           </a:bodyPr>
           <a:lstStyle/>
           <a:p>
             <a:r>
               <a:rPr lang="en-US" dirty="0" smtClean="0"/>
-              <a:t>Replica-Exchange has been ported to </a:t>
+              <a:t>In Grids the </a:t>
             </a:r>
             <a:r>
               <a:rPr lang="en-US" dirty="0" err="1" smtClean="0"/>
@@ -12081,6 +12086,441 @@
             </a:r>
             <a:r>
               <a:rPr lang="en-US" dirty="0" smtClean="0"/>
+              <a:t> startup time depends mainly on queuing time</a:t>
+            </a:r>
+          </a:p>
+          <a:p>
+            <a:r>
+              <a:rPr lang="en-US" dirty="0" smtClean="0"/>
+              <a:t>Azure shows a longer startup than Amazon EC2 and </a:t>
+            </a:r>
+            <a:r>
+              <a:rPr lang="en-US" dirty="0" err="1" smtClean="0"/>
+              <a:t>FutureGrid</a:t>
+            </a:r>
+            <a:endParaRPr lang="en-US" dirty="0" smtClean="0"/>
+          </a:p>
+          <a:p>
+            <a:r>
+              <a:rPr lang="en-US" dirty="0" smtClean="0"/>
+              <a:t>Amazon EC2 has the highest fluctuation in the startup time (from all cloud resources)</a:t>
+            </a:r>
+          </a:p>
+          <a:p>
+            <a:r>
+              <a:rPr lang="en-US" dirty="0" smtClean="0"/>
+              <a:t>Sub-Job submission times are comparable</a:t>
+            </a:r>
+          </a:p>
+        </p:txBody>
+      </p:sp>
+      <p:sp>
+        <p:nvSpPr>
+          <p:cNvPr id="7" name="Titel 6"/>
+          <p:cNvSpPr>
+            <a:spLocks noGrp="1"/>
+          </p:cNvSpPr>
+          <p:nvPr>
+            <p:ph type="title"/>
+          </p:nvPr>
+        </p:nvSpPr>
+        <p:spPr/>
+        <p:txBody>
+          <a:bodyPr/>
+          <a:lstStyle/>
+          <a:p>
+            <a:r>
+              <a:rPr lang="de-DE" dirty="0" err="1" smtClean="0"/>
+              <a:t>BigJob</a:t>
+            </a:r>
+            <a:r>
+              <a:rPr lang="de-DE" dirty="0" smtClean="0"/>
+              <a:t> on </a:t>
+            </a:r>
+            <a:r>
+              <a:rPr lang="de-DE" dirty="0" err="1" smtClean="0"/>
+              <a:t>Azure</a:t>
+            </a:r>
+            <a:endParaRPr lang="de-DE" dirty="0"/>
+          </a:p>
+        </p:txBody>
+      </p:sp>
+      <p:pic>
+        <p:nvPicPr>
+          <p:cNvPr id="8" name="Bild 7" descr="startup.pdf"/>
+          <p:cNvPicPr>
+            <a:picLocks noChangeAspect="1"/>
+          </p:cNvPicPr>
+          <p:nvPr/>
+        </p:nvPicPr>
+        <mc:AlternateContent>
+          <mc:Choice xmlns:ma="http://schemas.microsoft.com/office/mac/drawingml/2008/main" Requires="ma">
+            <p:blipFill>
+              <a:blip r:embed="rId2"/>
+              <a:stretch>
+                <a:fillRect/>
+              </a:stretch>
+            </p:blipFill>
+          </mc:Choice>
+          <mc:Fallback>
+            <p:blipFill>
+              <a:blip r:embed="rId3"/>
+              <a:stretch>
+                <a:fillRect/>
+              </a:stretch>
+            </p:blipFill>
+          </mc:Fallback>
+        </mc:AlternateContent>
+        <p:spPr>
+          <a:xfrm>
+            <a:off x="5073825" y="4064000"/>
+            <a:ext cx="4070175" cy="2451100"/>
+          </a:xfrm>
+          <a:prstGeom prst="rect">
+            <a:avLst/>
+          </a:prstGeom>
+        </p:spPr>
+      </p:pic>
+      <p:pic>
+        <p:nvPicPr>
+          <p:cNvPr id="9" name="Bild 8" descr="setup-times.pdf"/>
+          <p:cNvPicPr>
+            <a:picLocks noChangeAspect="1"/>
+          </p:cNvPicPr>
+          <p:nvPr/>
+        </p:nvPicPr>
+        <mc:AlternateContent>
+          <mc:Choice xmlns:ma="http://schemas.microsoft.com/office/mac/drawingml/2008/main" Requires="ma">
+            <p:blipFill>
+              <a:blip r:embed="rId4"/>
+              <a:stretch>
+                <a:fillRect/>
+              </a:stretch>
+            </p:blipFill>
+          </mc:Choice>
+          <mc:Fallback>
+            <p:blipFill>
+              <a:blip r:embed="rId5"/>
+              <a:stretch>
+                <a:fillRect/>
+              </a:stretch>
+            </p:blipFill>
+          </mc:Fallback>
+        </mc:AlternateContent>
+        <p:spPr>
+          <a:xfrm>
+            <a:off x="5099223" y="1431078"/>
+            <a:ext cx="3951737" cy="2429722"/>
+          </a:xfrm>
+          <a:prstGeom prst="rect">
+            <a:avLst/>
+          </a:prstGeom>
+        </p:spPr>
+      </p:pic>
+      <p:sp>
+        <p:nvSpPr>
+          <p:cNvPr id="10" name="Textfeld 9"/>
+          <p:cNvSpPr txBox="1"/>
+          <p:nvPr/>
+        </p:nvSpPr>
+        <p:spPr>
+          <a:xfrm>
+            <a:off x="4978400" y="1230411"/>
+            <a:ext cx="1962496" cy="307777"/>
+          </a:xfrm>
+          <a:prstGeom prst="rect">
+            <a:avLst/>
+          </a:prstGeom>
+          <a:noFill/>
+        </p:spPr>
+        <p:txBody>
+          <a:bodyPr wrap="none" rtlCol="0">
+            <a:spAutoFit/>
+          </a:bodyPr>
+          <a:lstStyle/>
+          <a:p>
+            <a:r>
+              <a:rPr lang="de-DE" sz="1400" dirty="0" err="1" smtClean="0"/>
+              <a:t>BigJob</a:t>
+            </a:r>
+            <a:r>
+              <a:rPr lang="de-DE" sz="1400" dirty="0" smtClean="0"/>
+              <a:t> </a:t>
+            </a:r>
+            <a:r>
+              <a:rPr lang="de-DE" sz="1400" dirty="0" err="1" smtClean="0"/>
+              <a:t>Startup</a:t>
+            </a:r>
+            <a:r>
+              <a:rPr lang="de-DE" sz="1400" dirty="0" smtClean="0"/>
+              <a:t> Times</a:t>
+            </a:r>
+            <a:endParaRPr lang="de-DE" sz="1400" dirty="0"/>
+          </a:p>
+        </p:txBody>
+      </p:sp>
+      <p:sp>
+        <p:nvSpPr>
+          <p:cNvPr id="11" name="Textfeld 10"/>
+          <p:cNvSpPr txBox="1"/>
+          <p:nvPr/>
+        </p:nvSpPr>
+        <p:spPr>
+          <a:xfrm>
+            <a:off x="4978400" y="3870523"/>
+            <a:ext cx="3027792" cy="307777"/>
+          </a:xfrm>
+          <a:prstGeom prst="rect">
+            <a:avLst/>
+          </a:prstGeom>
+          <a:noFill/>
+        </p:spPr>
+        <p:txBody>
+          <a:bodyPr wrap="none" rtlCol="0">
+            <a:spAutoFit/>
+          </a:bodyPr>
+          <a:lstStyle/>
+          <a:p>
+            <a:r>
+              <a:rPr lang="de-DE" sz="1400" dirty="0" err="1" smtClean="0"/>
+              <a:t>BigJob</a:t>
+            </a:r>
+            <a:r>
+              <a:rPr lang="de-DE" sz="1400" dirty="0" smtClean="0"/>
+              <a:t> Sub-Job Submission Times</a:t>
+            </a:r>
+            <a:endParaRPr lang="de-DE" sz="1400" dirty="0"/>
+          </a:p>
+        </p:txBody>
+      </p:sp>
+    </p:spTree>
+  </p:cSld>
+  <p:clrMapOvr>
+    <a:masterClrMapping/>
+  </p:clrMapOvr>
+  <p:timing>
+    <p:tnLst>
+      <p:par>
+        <p:cTn id="1" dur="indefinite" restart="never" nodeType="tmRoot"/>
+      </p:par>
+    </p:tnLst>
+  </p:timing>
+</p:sld>
+</file>
+
+<file path=ppt/slides/slide2.xml><?xml version="1.0" encoding="utf-8"?>
+<p:sld xmlns:a="http://schemas.openxmlformats.org/drawingml/2006/main" xmlns:r="http://schemas.openxmlformats.org/officeDocument/2006/relationships" xmlns:mc="http://schemas.openxmlformats.org/markup-compatibility/2006" xmlns:mv="urn:schemas-microsoft-com:mac:vml" xmlns:p="http://schemas.openxmlformats.org/presentationml/2006/main" mc:Ignorable="mv" mc:PreserveAttributes="mv:*">
+  <p:cSld>
+    <p:spTree>
+      <p:nvGrpSpPr>
+        <p:cNvPr id="1" name=""/>
+        <p:cNvGrpSpPr/>
+        <p:nvPr/>
+      </p:nvGrpSpPr>
+      <p:grpSpPr>
+        <a:xfrm>
+          <a:off x="0" y="0"/>
+          <a:ext cx="0" cy="0"/>
+          <a:chOff x="0" y="0"/>
+          <a:chExt cx="0" cy="0"/>
+        </a:xfrm>
+      </p:grpSpPr>
+      <p:sp>
+        <p:nvSpPr>
+          <p:cNvPr id="15362" name="Title 1"/>
+          <p:cNvSpPr>
+            <a:spLocks noGrp="1"/>
+          </p:cNvSpPr>
+          <p:nvPr>
+            <p:ph type="title"/>
+          </p:nvPr>
+        </p:nvSpPr>
+        <p:spPr/>
+        <p:txBody>
+          <a:bodyPr/>
+          <a:lstStyle/>
+          <a:p>
+            <a:r>
+              <a:rPr lang="en-US" dirty="0" smtClean="0"/>
+              <a:t>Overview</a:t>
+            </a:r>
+          </a:p>
+        </p:txBody>
+      </p:sp>
+      <p:sp>
+        <p:nvSpPr>
+          <p:cNvPr id="15363" name="Content Placeholder 2"/>
+          <p:cNvSpPr>
+            <a:spLocks noGrp="1"/>
+          </p:cNvSpPr>
+          <p:nvPr>
+            <p:ph idx="1"/>
+          </p:nvPr>
+        </p:nvSpPr>
+        <p:spPr/>
+        <p:txBody>
+          <a:bodyPr>
+            <a:normAutofit lnSpcReduction="10000"/>
+          </a:bodyPr>
+          <a:lstStyle/>
+          <a:p>
+            <a:r>
+              <a:rPr lang="en-US" dirty="0" smtClean="0"/>
+              <a:t>Introduction: Understanding Distributed Abstractions</a:t>
+            </a:r>
+          </a:p>
+          <a:p>
+            <a:pPr lvl="1"/>
+            <a:r>
+              <a:rPr lang="en-US" dirty="0" smtClean="0"/>
+              <a:t>Introduce IDEAS as minimal set of DA Design Objective</a:t>
+            </a:r>
+          </a:p>
+          <a:p>
+            <a:r>
+              <a:rPr lang="en-US" dirty="0" smtClean="0"/>
+              <a:t>SAGA, Pilot-Jobs and SAGA </a:t>
+            </a:r>
+            <a:r>
+              <a:rPr lang="en-US" dirty="0" err="1" smtClean="0"/>
+              <a:t>BigJob</a:t>
+            </a:r>
+            <a:endParaRPr lang="en-US" dirty="0" smtClean="0"/>
+          </a:p>
+          <a:p>
+            <a:pPr lvl="1"/>
+            <a:r>
+              <a:rPr lang="en-US" dirty="0" smtClean="0"/>
+              <a:t>Abstractions for dynamic executions</a:t>
+            </a:r>
+          </a:p>
+          <a:p>
+            <a:pPr lvl="1"/>
+            <a:r>
+              <a:rPr lang="en-US" dirty="0" smtClean="0"/>
+              <a:t>Pilot-Job: Power of “right” Abstractions</a:t>
+            </a:r>
+          </a:p>
+          <a:p>
+            <a:pPr lvl="1"/>
+            <a:r>
+              <a:rPr lang="en-US" dirty="0" smtClean="0"/>
+              <a:t>Interoperability is the starting point</a:t>
+            </a:r>
+          </a:p>
+          <a:p>
+            <a:r>
+              <a:rPr lang="en-US" dirty="0" err="1" smtClean="0"/>
+              <a:t>EnMD</a:t>
+            </a:r>
+            <a:r>
+              <a:rPr lang="en-US" dirty="0" smtClean="0"/>
+              <a:t> and RE Simulations</a:t>
+            </a:r>
+          </a:p>
+          <a:p>
+            <a:pPr lvl="1"/>
+            <a:r>
+              <a:rPr lang="en-US" dirty="0" smtClean="0"/>
+              <a:t>Free Energy Calculation (</a:t>
+            </a:r>
+            <a:r>
+              <a:rPr lang="en-US" dirty="0" err="1" smtClean="0"/>
+              <a:t>e.g</a:t>
+            </a:r>
+            <a:r>
+              <a:rPr lang="en-US" dirty="0" smtClean="0"/>
+              <a:t> replica-exchange) using bio-molecular simulations for range of biophysical and personalized medicine</a:t>
+            </a:r>
+          </a:p>
+          <a:p>
+            <a:r>
+              <a:rPr lang="en-US" dirty="0" err="1" smtClean="0"/>
+              <a:t>BigJob</a:t>
+            </a:r>
+            <a:r>
+              <a:rPr lang="en-US" dirty="0" smtClean="0"/>
+              <a:t> on Azure: Architecture, Performance and Scalability</a:t>
+            </a:r>
+          </a:p>
+          <a:p>
+            <a:pPr lvl="1"/>
+            <a:r>
+              <a:rPr lang="en-US" dirty="0" smtClean="0"/>
+              <a:t>Utilizing Azure’s </a:t>
+            </a:r>
+            <a:r>
+              <a:rPr lang="en-US" smtClean="0"/>
+              <a:t>native abstractions</a:t>
+            </a:r>
+            <a:endParaRPr lang="en-US" dirty="0" smtClean="0"/>
+          </a:p>
+        </p:txBody>
+      </p:sp>
+    </p:spTree>
+  </p:cSld>
+  <p:clrMapOvr>
+    <a:masterClrMapping/>
+  </p:clrMapOvr>
+  <p:timing>
+    <p:tnLst>
+      <p:par>
+        <p:cTn id="1" dur="indefinite" restart="never" nodeType="tmRoot"/>
+      </p:par>
+    </p:tnLst>
+  </p:timing>
+</p:sld>
+</file>
+
+<file path=ppt/slides/slide20.xml><?xml version="1.0" encoding="utf-8"?>
+<p:sld xmlns:a="http://schemas.openxmlformats.org/drawingml/2006/main" xmlns:r="http://schemas.openxmlformats.org/officeDocument/2006/relationships" xmlns:mc="http://schemas.openxmlformats.org/markup-compatibility/2006" xmlns:mv="urn:schemas-microsoft-com:mac:vml" xmlns:p="http://schemas.openxmlformats.org/presentationml/2006/main" mc:Ignorable="mv" mc:PreserveAttributes="mv:*">
+  <p:cSld>
+    <p:spTree>
+      <p:nvGrpSpPr>
+        <p:cNvPr id="1" name=""/>
+        <p:cNvGrpSpPr/>
+        <p:nvPr/>
+      </p:nvGrpSpPr>
+      <p:grpSpPr>
+        <a:xfrm>
+          <a:off x="0" y="0"/>
+          <a:ext cx="0" cy="0"/>
+          <a:chOff x="0" y="0"/>
+          <a:chExt cx="0" cy="0"/>
+        </a:xfrm>
+      </p:grpSpPr>
+      <p:sp>
+        <p:nvSpPr>
+          <p:cNvPr id="6" name="Inhaltsplatzhalter 5"/>
+          <p:cNvSpPr>
+            <a:spLocks noGrp="1"/>
+          </p:cNvSpPr>
+          <p:nvPr>
+            <p:ph idx="1"/>
+          </p:nvPr>
+        </p:nvSpPr>
+        <p:spPr>
+          <a:xfrm>
+            <a:off x="757947" y="1529880"/>
+            <a:ext cx="4029953" cy="4608884"/>
+          </a:xfrm>
+        </p:spPr>
+        <p:txBody>
+          <a:bodyPr>
+            <a:normAutofit fontScale="92500" lnSpcReduction="20000"/>
+          </a:bodyPr>
+          <a:lstStyle/>
+          <a:p>
+            <a:r>
+              <a:rPr lang="en-US" dirty="0" smtClean="0"/>
+              <a:t>Replica-Exchange has been ported to </a:t>
+            </a:r>
+            <a:r>
+              <a:rPr lang="en-US" dirty="0" err="1" smtClean="0"/>
+              <a:t>BigJob</a:t>
+            </a:r>
+            <a:r>
+              <a:rPr lang="en-US" dirty="0" smtClean="0"/>
               <a:t> Azure</a:t>
             </a:r>
           </a:p>
@@ -12102,11 +12542,7 @@
             <a:pPr lvl="1"/>
             <a:r>
               <a:rPr lang="en-US" dirty="0" smtClean="0"/>
-              <a:t>Azure Queues proved to be effective for coordination of sub</a:t>
-            </a:r>
-            <a:r>
-              <a:rPr lang="en-US" smtClean="0"/>
-              <a:t>-jobs</a:t>
+              <a:t>Azure Queues proved to be effective for coordination of sub-jobs</a:t>
             </a:r>
           </a:p>
           <a:p>
@@ -12126,7 +12562,15 @@
           <a:p>
             <a:r>
               <a:rPr lang="en-US" dirty="0" smtClean="0"/>
-              <a:t>The different Azure data centers show a slightly different performance</a:t>
+              <a:t>The different Azure data centers show a slight fluctuation </a:t>
+            </a:r>
+            <a:r>
+              <a:rPr lang="en-US" smtClean="0"/>
+              <a:t>in their </a:t>
+            </a:r>
+            <a:r>
+              <a:rPr lang="en-US" dirty="0" smtClean="0"/>
+              <a:t>performance</a:t>
             </a:r>
             <a:endParaRPr lang="en-US" dirty="0"/>
           </a:p>
@@ -12229,10 +12673,17 @@
   <p:clrMapOvr>
     <a:masterClrMapping/>
   </p:clrMapOvr>
+  <p:timing>
+    <p:tnLst>
+      <p:par>
+        <p:cTn id="1" dur="indefinite" restart="never" nodeType="tmRoot"/>
+      </p:par>
+    </p:tnLst>
+  </p:timing>
 </p:sld>
 </file>
 
-<file path=ppt/slides/slide2.xml><?xml version="1.0" encoding="utf-8"?>
+<file path=ppt/slides/slide21.xml><?xml version="1.0" encoding="utf-8"?>
 <p:sld xmlns:a="http://schemas.openxmlformats.org/drawingml/2006/main" xmlns:r="http://schemas.openxmlformats.org/officeDocument/2006/relationships" xmlns:mc="http://schemas.openxmlformats.org/markup-compatibility/2006" xmlns:mv="urn:schemas-microsoft-com:mac:vml" xmlns:p="http://schemas.openxmlformats.org/presentationml/2006/main" mc:Ignorable="mv" mc:PreserveAttributes="mv:*">
   <p:cSld>
     <p:spTree>
@@ -12251,7 +12702,7 @@
       </p:grpSpPr>
       <p:sp>
         <p:nvSpPr>
-          <p:cNvPr id="15362" name="Title 1"/>
+          <p:cNvPr id="2" name="Title 1"/>
           <p:cNvSpPr>
             <a:spLocks noGrp="1"/>
           </p:cNvSpPr>
@@ -12259,125 +12710,163 @@
             <p:ph type="title"/>
           </p:nvPr>
         </p:nvSpPr>
-        <p:spPr/>
-        <p:txBody>
-          <a:bodyPr/>
-          <a:lstStyle/>
-          <a:p>
-            <a:r>
-              <a:rPr lang="en-US" dirty="0" smtClean="0"/>
-              <a:t>Overview</a:t>
-            </a:r>
-          </a:p>
-        </p:txBody>
-      </p:sp>
-      <p:sp>
-        <p:nvSpPr>
-          <p:cNvPr id="15363" name="Content Placeholder 2"/>
-          <p:cNvSpPr>
-            <a:spLocks noGrp="1"/>
-          </p:cNvSpPr>
-          <p:nvPr>
-            <p:ph idx="1"/>
-          </p:nvPr>
-        </p:nvSpPr>
-        <p:spPr/>
+        <p:spPr>
+          <a:xfrm>
+            <a:off x="927100" y="263714"/>
+            <a:ext cx="8216900" cy="914400"/>
+          </a:xfrm>
+        </p:spPr>
         <p:txBody>
           <a:bodyPr>
-            <a:normAutofit lnSpcReduction="10000"/>
+            <a:normAutofit/>
           </a:bodyPr>
           <a:lstStyle/>
           <a:p>
             <a:r>
-              <a:rPr lang="en-US" dirty="0" smtClean="0"/>
-              <a:t>Introduction: Understanding Distributed Abstractions</a:t>
-            </a:r>
+              <a:rPr lang="en-US" sz="2800" dirty="0" smtClean="0"/>
+              <a:t>Although Clouds are not Panacea..</a:t>
+            </a:r>
+            <a:endParaRPr lang="en-US" sz="2667" dirty="0"/>
+          </a:p>
+        </p:txBody>
+      </p:sp>
+      <p:sp>
+        <p:nvSpPr>
+          <p:cNvPr id="3" name="Content Placeholder 2"/>
+          <p:cNvSpPr>
+            <a:spLocks noGrp="1"/>
+          </p:cNvSpPr>
+          <p:nvPr>
+            <p:ph idx="1"/>
+          </p:nvPr>
+        </p:nvSpPr>
+        <p:spPr>
+          <a:xfrm>
+            <a:off x="757947" y="1529880"/>
+            <a:ext cx="7966954" cy="5328120"/>
+          </a:xfrm>
+        </p:spPr>
+        <p:txBody>
+          <a:bodyPr>
+            <a:noAutofit/>
+          </a:bodyPr>
+          <a:lstStyle/>
+          <a:p>
+            <a:r>
+              <a:rPr lang="en-US" sz="1700" dirty="0" smtClean="0"/>
+              <a:t>Nascent infrastructure do what Production DCI have not managed!</a:t>
+            </a:r>
+          </a:p>
+          <a:p>
+            <a:pPr lvl="0">
+              <a:buClr>
+                <a:prstClr val="black">
+                  <a:lumMod val="75000"/>
+                  <a:lumOff val="25000"/>
+                </a:prstClr>
+              </a:buClr>
+            </a:pPr>
+            <a:r>
+              <a:rPr lang="en-US" sz="1700" dirty="0" smtClean="0">
+                <a:solidFill>
+                  <a:prstClr val="black">
+                    <a:lumMod val="65000"/>
+                    <a:lumOff val="35000"/>
+                  </a:prstClr>
+                </a:solidFill>
+              </a:rPr>
+              <a:t>“We” have lost intellectual leadership to commercial providers!</a:t>
+            </a:r>
+            <a:endParaRPr lang="en-US" sz="1700" dirty="0" smtClean="0"/>
           </a:p>
           <a:p>
             <a:pPr lvl="1"/>
             <a:r>
-              <a:rPr lang="en-US" dirty="0" smtClean="0"/>
-              <a:t>Introduce IDEAS as minimal set of DA Design Objective</a:t>
-            </a:r>
-          </a:p>
-          <a:p>
-            <a:r>
-              <a:rPr lang="en-US" dirty="0" smtClean="0"/>
-              <a:t>SAGA, Pilot-Jobs and SAGA </a:t>
-            </a:r>
-            <a:r>
-              <a:rPr lang="en-US" dirty="0" err="1" smtClean="0"/>
-              <a:t>BigJob</a:t>
-            </a:r>
-            <a:endParaRPr lang="en-US" dirty="0" smtClean="0"/>
+              <a:rPr lang="en-US" sz="1700" dirty="0" smtClean="0"/>
+              <a:t>Community busy agenda pushing, </a:t>
+            </a:r>
+            <a:r>
+              <a:rPr lang="en-US" sz="1700" dirty="0" err="1" smtClean="0"/>
+              <a:t>e.g</a:t>
+            </a:r>
+            <a:r>
+              <a:rPr lang="en-US" sz="1700" dirty="0" smtClean="0"/>
+              <a:t>, middleware/software stacks, most innovation in DC has come from  commercial sector!</a:t>
+            </a:r>
+          </a:p>
+          <a:p>
+            <a:pPr lvl="2"/>
+            <a:r>
+              <a:rPr lang="en-US" sz="1700" dirty="0" smtClean="0"/>
+              <a:t>Infrastructure, Algorithmic &amp; Development</a:t>
+            </a:r>
+          </a:p>
+          <a:p>
+            <a:pPr lvl="2"/>
+            <a:r>
+              <a:rPr lang="en-US" sz="1700" dirty="0" smtClean="0"/>
+              <a:t>e.g., (re-discovering) </a:t>
+            </a:r>
+            <a:r>
+              <a:rPr lang="en-US" sz="1700" dirty="0" err="1" smtClean="0"/>
+              <a:t>MapReduce</a:t>
+            </a:r>
+            <a:endParaRPr lang="en-US" sz="1700" dirty="0" smtClean="0"/>
+          </a:p>
+          <a:p>
+            <a:r>
+              <a:rPr lang="en-US" sz="1700" dirty="0" smtClean="0"/>
+              <a:t>Simplicity is the Ultimate Sophistication</a:t>
+            </a:r>
           </a:p>
           <a:p>
             <a:pPr lvl="1"/>
             <a:r>
-              <a:rPr lang="en-US" dirty="0" smtClean="0"/>
-              <a:t>Abstractions for dynamic executions</a:t>
+              <a:rPr lang="en-US" sz="1700" dirty="0" smtClean="0"/>
+              <a:t> </a:t>
+            </a:r>
+            <a:r>
+              <a:rPr lang="en-US" sz="1700" i="1" dirty="0" smtClean="0"/>
+              <a:t>“It seems that perfection is attained not when there remains nothing to add, but when there remains nothing to remove</a:t>
+            </a:r>
+            <a:r>
+              <a:rPr lang="en-US" sz="1700" dirty="0" smtClean="0"/>
+              <a:t>”</a:t>
             </a:r>
           </a:p>
           <a:p>
             <a:pPr lvl="1"/>
             <a:r>
-              <a:rPr lang="en-US" dirty="0" smtClean="0"/>
-              <a:t>Pilot-Job: Power of “right” Abstractions</a:t>
+              <a:rPr lang="en-US" sz="1700" dirty="0" smtClean="0"/>
+              <a:t>Confuse Functionality with Usability</a:t>
+            </a:r>
+          </a:p>
+          <a:p>
+            <a:pPr lvl="2"/>
+            <a:r>
+              <a:rPr lang="en-US" sz="1700" dirty="0" smtClean="0"/>
+              <a:t>“Confused Beauty for Truth”, -- “How Did Economists Get It So Wrong?”, in analogy to the Financial Crisis</a:t>
+            </a:r>
+          </a:p>
+          <a:p>
+            <a:pPr marL="342900" lvl="2" indent="-342900">
+              <a:spcBef>
+                <a:spcPts val="2000"/>
+              </a:spcBef>
+              <a:buFont typeface="Wingdings 2" pitchFamily="18" charset="2"/>
+              <a:buChar char=""/>
+            </a:pPr>
+            <a:r>
+              <a:rPr lang="en-US" sz="1700" dirty="0" smtClean="0"/>
+              <a:t>Moral and Intellectual courage to admit we got it wrong	</a:t>
             </a:r>
           </a:p>
           <a:p>
             <a:pPr lvl="1"/>
             <a:r>
-              <a:rPr lang="en-US" dirty="0" smtClean="0"/>
-              <a:t>Interoperability is the starting point</a:t>
-            </a:r>
-          </a:p>
-          <a:p>
-            <a:r>
-              <a:rPr lang="en-US" dirty="0" err="1" smtClean="0"/>
-              <a:t>EnMD</a:t>
-            </a:r>
-            <a:r>
-              <a:rPr lang="en-US" dirty="0" smtClean="0"/>
-              <a:t> and RE Simulations</a:t>
-            </a:r>
-          </a:p>
-          <a:p>
-            <a:pPr lvl="1"/>
-            <a:r>
-              <a:rPr lang="en-US" dirty="0" smtClean="0"/>
-              <a:t>Free Energy Calculation (</a:t>
-            </a:r>
-            <a:r>
-              <a:rPr lang="en-US" dirty="0" err="1" smtClean="0"/>
-              <a:t>e.g</a:t>
-            </a:r>
-            <a:r>
-              <a:rPr lang="en-US" dirty="0" smtClean="0"/>
-              <a:t> replica-exchange) using bio-molecular simulations for range of biophysical and personalized medicine</a:t>
-            </a:r>
-          </a:p>
-          <a:p>
-            <a:r>
-              <a:rPr lang="en-US" dirty="0" err="1" smtClean="0"/>
-              <a:t>BigJob</a:t>
-            </a:r>
-            <a:r>
-              <a:rPr lang="en-US" dirty="0" smtClean="0"/>
-              <a:t> on Azure: Architecture, Performance and Scalability</a:t>
-            </a:r>
-          </a:p>
-          <a:p>
-            <a:pPr lvl="1"/>
-            <a:r>
-              <a:rPr lang="en-US" dirty="0" smtClean="0"/>
-              <a:t>Utilizing Azure’s </a:t>
-            </a:r>
-            <a:r>
-              <a:rPr lang="en-US" smtClean="0"/>
-              <a:t>native abstractions</a:t>
-            </a:r>
-            <a:endParaRPr lang="en-US" dirty="0" smtClean="0"/>
+              <a:rPr lang="en-US" sz="1700" dirty="0" smtClean="0"/>
+              <a:t>More condemnation in Grid2009, “Critical Analysis of PGI and DA” </a:t>
+            </a:r>
           </a:p>
         </p:txBody>
       </p:sp>
@@ -12396,209 +12885,7 @@
 </p:sld>
 </file>
 
-<file path=ppt/slides/slide20.xml><?xml version="1.0" encoding="utf-8"?>
-<p:sld xmlns:a="http://schemas.openxmlformats.org/drawingml/2006/main" xmlns:r="http://schemas.openxmlformats.org/officeDocument/2006/relationships" xmlns:mc="http://schemas.openxmlformats.org/markup-compatibility/2006" xmlns:mv="urn:schemas-microsoft-com:mac:vml" xmlns:p="http://schemas.openxmlformats.org/presentationml/2006/main" mc:Ignorable="mv" mc:PreserveAttributes="mv:*">
-  <p:cSld>
-    <p:spTree>
-      <p:nvGrpSpPr>
-        <p:cNvPr id="1" name=""/>
-        <p:cNvGrpSpPr/>
-        <p:nvPr/>
-      </p:nvGrpSpPr>
-      <p:grpSpPr>
-        <a:xfrm>
-          <a:off x="0" y="0"/>
-          <a:ext cx="0" cy="0"/>
-          <a:chOff x="0" y="0"/>
-          <a:chExt cx="0" cy="0"/>
-        </a:xfrm>
-      </p:grpSpPr>
-      <p:sp>
-        <p:nvSpPr>
-          <p:cNvPr id="2" name="Title 1"/>
-          <p:cNvSpPr>
-            <a:spLocks noGrp="1"/>
-          </p:cNvSpPr>
-          <p:nvPr>
-            <p:ph type="title"/>
-          </p:nvPr>
-        </p:nvSpPr>
-        <p:spPr>
-          <a:xfrm>
-            <a:off x="927100" y="263714"/>
-            <a:ext cx="8216900" cy="914400"/>
-          </a:xfrm>
-        </p:spPr>
-        <p:txBody>
-          <a:bodyPr>
-            <a:normAutofit/>
-          </a:bodyPr>
-          <a:lstStyle/>
-          <a:p>
-            <a:r>
-              <a:rPr lang="en-US" sz="2800" dirty="0" smtClean="0"/>
-              <a:t>Although Clouds are not Panacea..</a:t>
-            </a:r>
-            <a:endParaRPr lang="en-US" sz="2667" dirty="0"/>
-          </a:p>
-        </p:txBody>
-      </p:sp>
-      <p:sp>
-        <p:nvSpPr>
-          <p:cNvPr id="3" name="Content Placeholder 2"/>
-          <p:cNvSpPr>
-            <a:spLocks noGrp="1"/>
-          </p:cNvSpPr>
-          <p:nvPr>
-            <p:ph idx="1"/>
-          </p:nvPr>
-        </p:nvSpPr>
-        <p:spPr>
-          <a:xfrm>
-            <a:off x="757947" y="1529880"/>
-            <a:ext cx="7966954" cy="5328120"/>
-          </a:xfrm>
-        </p:spPr>
-        <p:txBody>
-          <a:bodyPr>
-            <a:noAutofit/>
-          </a:bodyPr>
-          <a:lstStyle/>
-          <a:p>
-            <a:r>
-              <a:rPr lang="en-US" sz="1700" dirty="0" smtClean="0"/>
-              <a:t>Nascent infrastructure do what Production DCI have not managed!</a:t>
-            </a:r>
-          </a:p>
-          <a:p>
-            <a:pPr lvl="0">
-              <a:buClr>
-                <a:prstClr val="black">
-                  <a:lumMod val="75000"/>
-                  <a:lumOff val="25000"/>
-                </a:prstClr>
-              </a:buClr>
-            </a:pPr>
-            <a:r>
-              <a:rPr lang="en-US" sz="1700" dirty="0" smtClean="0">
-                <a:solidFill>
-                  <a:prstClr val="black">
-                    <a:lumMod val="65000"/>
-                    <a:lumOff val="35000"/>
-                  </a:prstClr>
-                </a:solidFill>
-              </a:rPr>
-              <a:t>“We” have lost intellectual leadership to commercial providers!</a:t>
-            </a:r>
-            <a:endParaRPr lang="en-US" sz="1700" dirty="0" smtClean="0"/>
-          </a:p>
-          <a:p>
-            <a:pPr lvl="1"/>
-            <a:r>
-              <a:rPr lang="en-US" sz="1700" dirty="0" smtClean="0"/>
-              <a:t>Community busy agenda pushing, </a:t>
-            </a:r>
-            <a:r>
-              <a:rPr lang="en-US" sz="1700" dirty="0" err="1" smtClean="0"/>
-              <a:t>e.g</a:t>
-            </a:r>
-            <a:r>
-              <a:rPr lang="en-US" sz="1700" dirty="0" smtClean="0"/>
-              <a:t>, middleware/software stacks, most innovation in DC has come from  commercial sector!</a:t>
-            </a:r>
-          </a:p>
-          <a:p>
-            <a:pPr lvl="2"/>
-            <a:r>
-              <a:rPr lang="en-US" sz="1700" dirty="0" smtClean="0"/>
-              <a:t>Infrastructure, Algorithmic &amp; Development</a:t>
-            </a:r>
-          </a:p>
-          <a:p>
-            <a:pPr lvl="2"/>
-            <a:r>
-              <a:rPr lang="en-US" sz="1700" dirty="0" smtClean="0"/>
-              <a:t>e.g., (re-discovering) </a:t>
-            </a:r>
-            <a:r>
-              <a:rPr lang="en-US" sz="1700" dirty="0" err="1" smtClean="0"/>
-              <a:t>MapReduce</a:t>
-            </a:r>
-            <a:endParaRPr lang="en-US" sz="1700" dirty="0" smtClean="0"/>
-          </a:p>
-          <a:p>
-            <a:r>
-              <a:rPr lang="en-US" sz="1700" dirty="0" smtClean="0"/>
-              <a:t>Simplicity is the Ultimate Sophistication</a:t>
-            </a:r>
-          </a:p>
-          <a:p>
-            <a:pPr lvl="1"/>
-            <a:r>
-              <a:rPr lang="en-US" sz="1700" dirty="0" smtClean="0"/>
-              <a:t> </a:t>
-            </a:r>
-            <a:r>
-              <a:rPr lang="en-US" sz="1700" i="1" dirty="0" smtClean="0"/>
-              <a:t>“It seems that perfection is attained not when there remains nothing to add, but when there remains nothing to remove</a:t>
-            </a:r>
-            <a:r>
-              <a:rPr lang="en-US" sz="1700" dirty="0" smtClean="0"/>
-              <a:t>”</a:t>
-            </a:r>
-          </a:p>
-          <a:p>
-            <a:pPr lvl="1"/>
-            <a:r>
-              <a:rPr lang="en-US" sz="1700" dirty="0" smtClean="0"/>
-              <a:t>Confuse Functionality with Usability</a:t>
-            </a:r>
-          </a:p>
-          <a:p>
-            <a:pPr lvl="2"/>
-            <a:r>
-              <a:rPr lang="en-US" sz="1700" dirty="0" smtClean="0"/>
-              <a:t>“Confused Beauty for Truth”, -- “How Did Economists Get It So Wrong?”, in analogy to the Financial Crisis</a:t>
-            </a:r>
-          </a:p>
-          <a:p>
-            <a:pPr marL="342900" lvl="2" indent="-342900">
-              <a:spcBef>
-                <a:spcPts val="2000"/>
-              </a:spcBef>
-              <a:buFont typeface="Wingdings 2" pitchFamily="18" charset="2"/>
-              <a:buChar char=""/>
-            </a:pPr>
-            <a:r>
-              <a:rPr lang="en-US" sz="1700" dirty="0" smtClean="0"/>
-              <a:t>Moral and Intellectual courage to admit we got it wrong	</a:t>
-            </a:r>
-          </a:p>
-          <a:p>
-            <a:pPr lvl="1"/>
-            <a:r>
-              <a:rPr lang="en-US" sz="1700" dirty="0" smtClean="0"/>
-              <a:t>More condemnation in Grid2009, “Critical Analysis of PGI and DA” </a:t>
-            </a:r>
-          </a:p>
-        </p:txBody>
-      </p:sp>
-    </p:spTree>
-  </p:cSld>
-  <p:clrMapOvr>
-    <a:masterClrMapping/>
-  </p:clrMapOvr>
-  <p:timing>
-    <p:tnLst>
-      <p:par>
-        <p:cTn id="1" dur="indefinite" restart="never" nodeType="tmRoot"/>
-      </p:par>
-    </p:tnLst>
-  </p:timing>
-</p:sld>
-</file>
-
-<file path=ppt/slides/slide21.xml><?xml version="1.0" encoding="utf-8"?>
+<file path=ppt/slides/slide22.xml><?xml version="1.0" encoding="utf-8"?>
 <p:sld xmlns:a="http://schemas.openxmlformats.org/drawingml/2006/main" xmlns:r="http://schemas.openxmlformats.org/officeDocument/2006/relationships" xmlns:mc="http://schemas.openxmlformats.org/markup-compatibility/2006" xmlns:mv="urn:schemas-microsoft-com:mac:vml" xmlns:p="http://schemas.openxmlformats.org/presentationml/2006/main" mc:Ignorable="mv" mc:PreserveAttributes="mv:*">
   <p:cSld>
     <p:spTree>
@@ -13014,7 +13301,7 @@
 </file>
 
 <file path=ppt/slides/slide4.xml><?xml version="1.0" encoding="utf-8"?>
-<p:sld xmlns:a="http://schemas.openxmlformats.org/drawingml/2006/main" xmlns:r="http://schemas.openxmlformats.org/officeDocument/2006/relationships" xmlns:mc="http://schemas.openxmlformats.org/markup-compatibility/2006" xmlns:mv="urn:schemas-microsoft-com:mac:vml" xmlns:p="http://schemas.openxmlformats.org/presentationml/2006/main" mc:Ignorable="mv" mc:PreserveAttributes="mv:*">
+<p:sld xmlns:a="http://schemas.openxmlformats.org/drawingml/2006/main" xmlns:r="http://schemas.openxmlformats.org/officeDocument/2006/relationships" xmlns:mc="http://schemas.openxmlformats.org/markup-compatibility/2006" xmlns:mv="urn:schemas-microsoft-com:mac:vml" xmlns:p="http://schemas.openxmlformats.org/presentationml/2006/main" mc:Ignorable="mv" mc:PreserveAttributes="mv:*" show="0">
   <p:cSld>
     <p:spTree>
       <p:nvGrpSpPr>
@@ -13244,7 +13531,7 @@
 </file>
 
 <file path=ppt/slides/slide5.xml><?xml version="1.0" encoding="utf-8"?>
-<p:sld xmlns:a="http://schemas.openxmlformats.org/drawingml/2006/main" xmlns:r="http://schemas.openxmlformats.org/officeDocument/2006/relationships" xmlns:mc="http://schemas.openxmlformats.org/markup-compatibility/2006" xmlns:mv="urn:schemas-microsoft-com:mac:vml" xmlns:p="http://schemas.openxmlformats.org/presentationml/2006/main" mc:Ignorable="mv" mc:PreserveAttributes="mv:*">
+<p:sld xmlns:a="http://schemas.openxmlformats.org/drawingml/2006/main" xmlns:r="http://schemas.openxmlformats.org/officeDocument/2006/relationships" xmlns:mc="http://schemas.openxmlformats.org/markup-compatibility/2006" xmlns:mv="urn:schemas-microsoft-com:mac:vml" xmlns:p="http://schemas.openxmlformats.org/presentationml/2006/main" mc:Ignorable="mv" mc:PreserveAttributes="mv:*" show="0">
   <p:cSld>
     <p:spTree>
       <p:nvGrpSpPr>
@@ -13494,7 +13781,7 @@
 </file>
 
 <file path=ppt/slides/slide6.xml><?xml version="1.0" encoding="utf-8"?>
-<p:sld xmlns:a="http://schemas.openxmlformats.org/drawingml/2006/main" xmlns:r="http://schemas.openxmlformats.org/officeDocument/2006/relationships" xmlns:mc="http://schemas.openxmlformats.org/markup-compatibility/2006" xmlns:mv="urn:schemas-microsoft-com:mac:vml" xmlns:p="http://schemas.openxmlformats.org/presentationml/2006/main" mc:Ignorable="mv" mc:PreserveAttributes="mv:*">
+<p:sld xmlns:a="http://schemas.openxmlformats.org/drawingml/2006/main" xmlns:r="http://schemas.openxmlformats.org/officeDocument/2006/relationships" xmlns:mc="http://schemas.openxmlformats.org/markup-compatibility/2006" xmlns:mv="urn:schemas-microsoft-com:mac:vml" xmlns:p="http://schemas.openxmlformats.org/presentationml/2006/main" mc:Ignorable="mv" mc:PreserveAttributes="mv:*" show="0">
   <p:cSld>
     <p:spTree>
       <p:nvGrpSpPr>
@@ -13716,7 +14003,7 @@
 </file>
 
 <file path=ppt/slides/slide7.xml><?xml version="1.0" encoding="utf-8"?>
-<p:sld xmlns:a="http://schemas.openxmlformats.org/drawingml/2006/main" xmlns:r="http://schemas.openxmlformats.org/officeDocument/2006/relationships" xmlns:mc="http://schemas.openxmlformats.org/markup-compatibility/2006" xmlns:mv="urn:schemas-microsoft-com:mac:vml" xmlns:p="http://schemas.openxmlformats.org/presentationml/2006/main" mc:Ignorable="mv" mc:PreserveAttributes="mv:*">
+<p:sld xmlns:a="http://schemas.openxmlformats.org/drawingml/2006/main" xmlns:r="http://schemas.openxmlformats.org/officeDocument/2006/relationships" xmlns:mc="http://schemas.openxmlformats.org/markup-compatibility/2006" xmlns:mv="urn:schemas-microsoft-com:mac:vml" xmlns:p="http://schemas.openxmlformats.org/presentationml/2006/main" mc:Ignorable="mv" mc:PreserveAttributes="mv:*" show="0">
   <p:cSld>
     <p:spTree>
       <p:nvGrpSpPr>
@@ -13889,6 +14176,7 @@
   <p:clrMapOvr>
     <a:masterClrMapping/>
   </p:clrMapOvr>
+  <p:transition/>
   <p:timing>
     <p:tnLst>
       <p:par>
@@ -13998,13 +14286,17 @@
         <p:spPr/>
         <p:txBody>
           <a:bodyPr>
-            <a:normAutofit fontScale="90000"/>
+            <a:normAutofit/>
           </a:bodyPr>
           <a:lstStyle/>
           <a:p>
             <a:r>
               <a:rPr lang="en-US" sz="2600" dirty="0" smtClean="0"/>
-              <a:t>Assertion #4: Role for a Pattern-Oriented and Abstraction-Based Development Cycle</a:t>
+              <a:t>Role </a:t>
+            </a:r>
+            <a:r>
+              <a:rPr lang="en-US" sz="2600" dirty="0" smtClean="0"/>
+              <a:t>for a Pattern-Oriented and Abstraction-Based Development Cycle</a:t>
             </a:r>
           </a:p>
         </p:txBody>
@@ -14132,7 +14424,7 @@
 </file>
 
 <file path=ppt/slides/slide9.xml><?xml version="1.0" encoding="utf-8"?>
-<p:sld xmlns:a="http://schemas.openxmlformats.org/drawingml/2006/main" xmlns:r="http://schemas.openxmlformats.org/officeDocument/2006/relationships" xmlns:mc="http://schemas.openxmlformats.org/markup-compatibility/2006" xmlns:mv="urn:schemas-microsoft-com:mac:vml" xmlns:p="http://schemas.openxmlformats.org/presentationml/2006/main" mc:Ignorable="mv" mc:PreserveAttributes="mv:*">
+<p:sld xmlns:a="http://schemas.openxmlformats.org/drawingml/2006/main" xmlns:r="http://schemas.openxmlformats.org/officeDocument/2006/relationships" xmlns:mc="http://schemas.openxmlformats.org/markup-compatibility/2006" xmlns:mv="urn:schemas-microsoft-com:mac:vml" xmlns:p="http://schemas.openxmlformats.org/presentationml/2006/main" mc:Ignorable="mv" mc:PreserveAttributes="mv:*" show="0">
   <p:cSld>
     <p:spTree>
       <p:nvGrpSpPr>

</xml_diff>

<commit_message>
Tweaks on the flight.
git-svn-id: file://localhost/tmp/svn2git/svn@3295 defb5e50-622e-49ec-a68e-d72c7db87b45
</commit_message>
<xml_diff>
--- a/papers/cloudcom10/presentation/saga-azure-cloudcom10.pptx
+++ b/papers/cloudcom10/presentation/saga-azure-cloudcom10.pptx
@@ -5,31 +5,27 @@
     <p:sldMasterId id="2147483660" r:id="rId1"/>
   </p:sldMasterIdLst>
   <p:notesMasterIdLst>
-    <p:notesMasterId r:id="rId24"/>
+    <p:notesMasterId r:id="rId20"/>
   </p:notesMasterIdLst>
   <p:sldIdLst>
     <p:sldId id="256" r:id="rId2"/>
     <p:sldId id="715" r:id="rId3"/>
     <p:sldId id="747" r:id="rId4"/>
-    <p:sldId id="746" r:id="rId5"/>
-    <p:sldId id="576" r:id="rId6"/>
-    <p:sldId id="578" r:id="rId7"/>
-    <p:sldId id="634" r:id="rId8"/>
-    <p:sldId id="731" r:id="rId9"/>
-    <p:sldId id="743" r:id="rId10"/>
-    <p:sldId id="733" r:id="rId11"/>
-    <p:sldId id="274" r:id="rId12"/>
-    <p:sldId id="645" r:id="rId13"/>
-    <p:sldId id="647" r:id="rId14"/>
-    <p:sldId id="478" r:id="rId15"/>
-    <p:sldId id="555" r:id="rId16"/>
-    <p:sldId id="744" r:id="rId17"/>
-    <p:sldId id="688" r:id="rId18"/>
-    <p:sldId id="693" r:id="rId19"/>
-    <p:sldId id="750" r:id="rId20"/>
-    <p:sldId id="748" r:id="rId21"/>
-    <p:sldId id="745" r:id="rId22"/>
-    <p:sldId id="749" r:id="rId23"/>
+    <p:sldId id="576" r:id="rId5"/>
+    <p:sldId id="578" r:id="rId6"/>
+    <p:sldId id="634" r:id="rId7"/>
+    <p:sldId id="753" r:id="rId8"/>
+    <p:sldId id="754" r:id="rId9"/>
+    <p:sldId id="647" r:id="rId10"/>
+    <p:sldId id="478" r:id="rId11"/>
+    <p:sldId id="555" r:id="rId12"/>
+    <p:sldId id="744" r:id="rId13"/>
+    <p:sldId id="688" r:id="rId14"/>
+    <p:sldId id="693" r:id="rId15"/>
+    <p:sldId id="750" r:id="rId16"/>
+    <p:sldId id="748" r:id="rId17"/>
+    <p:sldId id="745" r:id="rId18"/>
+    <p:sldId id="749" r:id="rId19"/>
   </p:sldIdLst>
   <p:sldSz cx="9144000" cy="6858000" type="screen4x3"/>
   <p:notesSz cx="6858000" cy="9144000"/>
@@ -214,7 +210,7 @@
             <a:fld id="{8E161E8F-4E15-A840-9658-105F9DD3DE22}" type="datetimeFigureOut">
               <a:rPr lang="en-US" smtClean="0"/>
               <a:pPr/>
-              <a:t>30.11.2010</a:t>
+              <a:t>11/30/10</a:t>
             </a:fld>
             <a:endParaRPr lang="en-US"/>
           </a:p>
@@ -376,7 +372,7 @@
             <a:fld id="{D344DA2A-F2F4-D74A-8AEC-1933B33E97E0}" type="slidenum">
               <a:rPr lang="en-US" smtClean="0"/>
               <a:pPr/>
-              <a:t>‹Nr.›</a:t>
+              <a:t>‹#›</a:t>
             </a:fld>
             <a:endParaRPr lang="en-US"/>
           </a:p>
@@ -630,6 +626,30 @@
           </a:bodyPr>
           <a:lstStyle/>
           <a:p>
+            <a:r>
+              <a:rPr lang="en-US" dirty="0" smtClean="0"/>
+              <a:t>“Clouds are about provisioning, grids are about federation”</a:t>
+            </a:r>
+          </a:p>
+          <a:p>
+            <a:r>
+              <a:rPr lang="en-US" dirty="0" smtClean="0"/>
+              <a:t>“</a:t>
+            </a:r>
+            <a:r>
+              <a:rPr lang="en-US" i="1" dirty="0" smtClean="0"/>
+              <a:t>IF</a:t>
+            </a:r>
+            <a:r>
+              <a:rPr lang="en-US" dirty="0" smtClean="0"/>
+              <a:t> you can keep your head when all about you, Are losing theirs and blaming it on you..”</a:t>
+            </a:r>
+          </a:p>
+          <a:p>
+            <a:r>
+              <a:rPr lang="en-US" dirty="0" smtClean="0"/>
+              <a:t>“The reason why we are so well prepared to handle the multi-core era, is because we took the trouble to understand parallel programming</a:t>
+            </a:r>
             <a:endParaRPr lang="en-US" dirty="0"/>
           </a:p>
         </p:txBody>
@@ -652,7 +672,7 @@
             <a:fld id="{D344DA2A-F2F4-D74A-8AEC-1933B33E97E0}" type="slidenum">
               <a:rPr lang="en-US" smtClean="0"/>
               <a:pPr/>
-              <a:t>4</a:t>
+              <a:t>6</a:t>
             </a:fld>
             <a:endParaRPr lang="en-US"/>
           </a:p>
@@ -818,6 +838,23 @@
           </a:bodyPr>
           <a:lstStyle/>
           <a:p>
+            <a:pPr marL="0" marR="0" lvl="1" indent="0" algn="l" defTabSz="457200" rtl="0" eaLnBrk="1" fontAlgn="auto" latinLnBrk="0" hangingPunct="1">
+              <a:lnSpc>
+                <a:spcPct val="100000"/>
+              </a:lnSpc>
+              <a:spcBef>
+                <a:spcPts val="0"/>
+              </a:spcBef>
+              <a:spcAft>
+                <a:spcPts val="0"/>
+              </a:spcAft>
+              <a:buClrTx/>
+              <a:buSzTx/>
+              <a:buFontTx/>
+              <a:buNone/>
+              <a:tabLst/>
+              <a:defRPr/>
+            </a:pPr>
             <a:endParaRPr lang="en-US" dirty="0"/>
           </a:p>
         </p:txBody>
@@ -837,10 +874,10 @@
           <a:bodyPr/>
           <a:lstStyle/>
           <a:p>
-            <a:fld id="{D344DA2A-F2F4-D74A-8AEC-1933B33E97E0}" type="slidenum">
+            <a:fld id="{D770256F-FACB-CC4B-A3D9-71375CB20943}" type="slidenum">
               <a:rPr lang="en-US" smtClean="0"/>
               <a:pPr/>
-              <a:t>9</a:t>
+              <a:t>12</a:t>
             </a:fld>
             <a:endParaRPr lang="en-US"/>
           </a:p>
@@ -873,7 +910,7 @@
       </p:grpSpPr>
       <p:sp>
         <p:nvSpPr>
-          <p:cNvPr id="2" name="Slide Image Placeholder 1"/>
+          <p:cNvPr id="2" name="Folienbildplatzhalter 1"/>
           <p:cNvSpPr>
             <a:spLocks noGrp="1" noRot="1" noChangeAspect="1"/>
           </p:cNvSpPr>
@@ -885,7 +922,7 @@
       </p:sp>
       <p:sp>
         <p:nvSpPr>
-          <p:cNvPr id="3" name="Notes Placeholder 2"/>
+          <p:cNvPr id="3" name="Notizenplatzhalter 2"/>
           <p:cNvSpPr>
             <a:spLocks noGrp="1"/>
           </p:cNvSpPr>
@@ -900,42 +937,13 @@
           </a:bodyPr>
           <a:lstStyle/>
           <a:p>
-            <a:r>
-              <a:rPr lang="en-US" sz="1800" dirty="0" smtClean="0"/>
-              <a:t>“User knows where to run”:</a:t>
-            </a:r>
-          </a:p>
-          <a:p>
-            <a:endParaRPr lang="en-US" sz="1800" dirty="0" smtClean="0"/>
-          </a:p>
-          <a:p>
-            <a:r>
-              <a:rPr lang="en-US" sz="1800" dirty="0" smtClean="0"/>
-              <a:t>“Information Service is only required to determine decisions at the  deployment stage not run time”</a:t>
-            </a:r>
-          </a:p>
-          <a:p>
-            <a:r>
-              <a:rPr lang="en-US" sz="1800" dirty="0" smtClean="0"/>
-              <a:t>“Tool X provides Dynamic Decision </a:t>
-            </a:r>
-            <a:r>
-              <a:rPr lang="en-US" sz="1800" dirty="0" err="1" smtClean="0"/>
-              <a:t>Capabilties</a:t>
-            </a:r>
-            <a:r>
-              <a:rPr lang="en-US" sz="1800" dirty="0" smtClean="0"/>
-              <a:t>”</a:t>
-            </a:r>
-          </a:p>
-          <a:p>
-            <a:endParaRPr lang="en-US" sz="1800" dirty="0"/>
-          </a:p>
-        </p:txBody>
-      </p:sp>
-      <p:sp>
-        <p:nvSpPr>
-          <p:cNvPr id="4" name="Slide Number Placeholder 3"/>
+            <a:endParaRPr lang="de-DE" dirty="0"/>
+          </a:p>
+        </p:txBody>
+      </p:sp>
+      <p:sp>
+        <p:nvSpPr>
+          <p:cNvPr id="4" name="Foliennummernplatzhalter 3"/>
           <p:cNvSpPr>
             <a:spLocks noGrp="1"/>
           </p:cNvSpPr>
@@ -951,7 +959,7 @@
             <a:fld id="{D344DA2A-F2F4-D74A-8AEC-1933B33E97E0}" type="slidenum">
               <a:rPr lang="en-US" smtClean="0"/>
               <a:pPr/>
-              <a:t>11</a:t>
+              <a:t>14</a:t>
             </a:fld>
             <a:endParaRPr lang="en-US"/>
           </a:p>
@@ -984,187 +992,6 @@
       </p:grpSpPr>
       <p:sp>
         <p:nvSpPr>
-          <p:cNvPr id="2" name="Slide Image Placeholder 1"/>
-          <p:cNvSpPr>
-            <a:spLocks noGrp="1" noRot="1" noChangeAspect="1"/>
-          </p:cNvSpPr>
-          <p:nvPr>
-            <p:ph type="sldImg"/>
-          </p:nvPr>
-        </p:nvSpPr>
-        <p:spPr/>
-      </p:sp>
-      <p:sp>
-        <p:nvSpPr>
-          <p:cNvPr id="3" name="Notes Placeholder 2"/>
-          <p:cNvSpPr>
-            <a:spLocks noGrp="1"/>
-          </p:cNvSpPr>
-          <p:nvPr>
-            <p:ph type="body" idx="1"/>
-          </p:nvPr>
-        </p:nvSpPr>
-        <p:spPr/>
-        <p:txBody>
-          <a:bodyPr>
-            <a:normAutofit/>
-          </a:bodyPr>
-          <a:lstStyle/>
-          <a:p>
-            <a:pPr marL="0" marR="0" lvl="1" indent="0" algn="l" defTabSz="457200" rtl="0" eaLnBrk="1" fontAlgn="auto" latinLnBrk="0" hangingPunct="1">
-              <a:lnSpc>
-                <a:spcPct val="100000"/>
-              </a:lnSpc>
-              <a:spcBef>
-                <a:spcPts val="0"/>
-              </a:spcBef>
-              <a:spcAft>
-                <a:spcPts val="0"/>
-              </a:spcAft>
-              <a:buClrTx/>
-              <a:buSzTx/>
-              <a:buFontTx/>
-              <a:buNone/>
-              <a:tabLst/>
-              <a:defRPr/>
-            </a:pPr>
-            <a:endParaRPr lang="en-US" dirty="0"/>
-          </a:p>
-        </p:txBody>
-      </p:sp>
-      <p:sp>
-        <p:nvSpPr>
-          <p:cNvPr id="4" name="Slide Number Placeholder 3"/>
-          <p:cNvSpPr>
-            <a:spLocks noGrp="1"/>
-          </p:cNvSpPr>
-          <p:nvPr>
-            <p:ph type="sldNum" sz="quarter" idx="10"/>
-          </p:nvPr>
-        </p:nvSpPr>
-        <p:spPr/>
-        <p:txBody>
-          <a:bodyPr/>
-          <a:lstStyle/>
-          <a:p>
-            <a:fld id="{D770256F-FACB-CC4B-A3D9-71375CB20943}" type="slidenum">
-              <a:rPr lang="en-US" smtClean="0"/>
-              <a:pPr/>
-              <a:t>16</a:t>
-            </a:fld>
-            <a:endParaRPr lang="en-US"/>
-          </a:p>
-        </p:txBody>
-      </p:sp>
-    </p:spTree>
-  </p:cSld>
-  <p:clrMapOvr>
-    <a:masterClrMapping/>
-  </p:clrMapOvr>
-</p:notes>
-</file>
-
-<file path=ppt/notesSlides/notesSlide7.xml><?xml version="1.0" encoding="utf-8"?>
-<p:notes xmlns:a="http://schemas.openxmlformats.org/drawingml/2006/main" xmlns:r="http://schemas.openxmlformats.org/officeDocument/2006/relationships" xmlns:mc="http://schemas.openxmlformats.org/markup-compatibility/2006" xmlns:mv="urn:schemas-microsoft-com:mac:vml" xmlns:p="http://schemas.openxmlformats.org/presentationml/2006/main" mc:Ignorable="mv" mc:PreserveAttributes="mv:*">
-  <p:cSld>
-    <p:spTree>
-      <p:nvGrpSpPr>
-        <p:cNvPr id="1" name=""/>
-        <p:cNvGrpSpPr/>
-        <p:nvPr/>
-      </p:nvGrpSpPr>
-      <p:grpSpPr>
-        <a:xfrm>
-          <a:off x="0" y="0"/>
-          <a:ext cx="0" cy="0"/>
-          <a:chOff x="0" y="0"/>
-          <a:chExt cx="0" cy="0"/>
-        </a:xfrm>
-      </p:grpSpPr>
-      <p:sp>
-        <p:nvSpPr>
-          <p:cNvPr id="2" name="Folienbildplatzhalter 1"/>
-          <p:cNvSpPr>
-            <a:spLocks noGrp="1" noRot="1" noChangeAspect="1"/>
-          </p:cNvSpPr>
-          <p:nvPr>
-            <p:ph type="sldImg"/>
-          </p:nvPr>
-        </p:nvSpPr>
-        <p:spPr/>
-      </p:sp>
-      <p:sp>
-        <p:nvSpPr>
-          <p:cNvPr id="3" name="Notizenplatzhalter 2"/>
-          <p:cNvSpPr>
-            <a:spLocks noGrp="1"/>
-          </p:cNvSpPr>
-          <p:nvPr>
-            <p:ph type="body" idx="1"/>
-          </p:nvPr>
-        </p:nvSpPr>
-        <p:spPr/>
-        <p:txBody>
-          <a:bodyPr>
-            <a:normAutofit/>
-          </a:bodyPr>
-          <a:lstStyle/>
-          <a:p>
-            <a:endParaRPr lang="de-DE" dirty="0"/>
-          </a:p>
-        </p:txBody>
-      </p:sp>
-      <p:sp>
-        <p:nvSpPr>
-          <p:cNvPr id="4" name="Foliennummernplatzhalter 3"/>
-          <p:cNvSpPr>
-            <a:spLocks noGrp="1"/>
-          </p:cNvSpPr>
-          <p:nvPr>
-            <p:ph type="sldNum" sz="quarter" idx="10"/>
-          </p:nvPr>
-        </p:nvSpPr>
-        <p:spPr/>
-        <p:txBody>
-          <a:bodyPr/>
-          <a:lstStyle/>
-          <a:p>
-            <a:fld id="{D344DA2A-F2F4-D74A-8AEC-1933B33E97E0}" type="slidenum">
-              <a:rPr lang="en-US" smtClean="0"/>
-              <a:pPr/>
-              <a:t>18</a:t>
-            </a:fld>
-            <a:endParaRPr lang="en-US"/>
-          </a:p>
-        </p:txBody>
-      </p:sp>
-    </p:spTree>
-  </p:cSld>
-  <p:clrMapOvr>
-    <a:masterClrMapping/>
-  </p:clrMapOvr>
-</p:notes>
-</file>
-
-<file path=ppt/notesSlides/notesSlide8.xml><?xml version="1.0" encoding="utf-8"?>
-<p:notes xmlns:a="http://schemas.openxmlformats.org/drawingml/2006/main" xmlns:r="http://schemas.openxmlformats.org/officeDocument/2006/relationships" xmlns:mc="http://schemas.openxmlformats.org/markup-compatibility/2006" xmlns:mv="urn:schemas-microsoft-com:mac:vml" xmlns:p="http://schemas.openxmlformats.org/presentationml/2006/main" mc:Ignorable="mv" mc:PreserveAttributes="mv:*">
-  <p:cSld>
-    <p:spTree>
-      <p:nvGrpSpPr>
-        <p:cNvPr id="1" name=""/>
-        <p:cNvGrpSpPr/>
-        <p:nvPr/>
-      </p:nvGrpSpPr>
-      <p:grpSpPr>
-        <a:xfrm>
-          <a:off x="0" y="0"/>
-          <a:ext cx="0" cy="0"/>
-          <a:chOff x="0" y="0"/>
-          <a:chExt cx="0" cy="0"/>
-        </a:xfrm>
-      </p:grpSpPr>
-      <p:sp>
-        <p:nvSpPr>
           <p:cNvPr id="2" name="Folienbildplatzhalter 1"/>
           <p:cNvSpPr>
             <a:spLocks noGrp="1" noRot="1" noChangeAspect="1"/>
@@ -4521,7 +4348,7 @@
             <a:fld id="{EE41C05A-BBAC-0741-9B8E-1278839E95FE}" type="slidenum">
               <a:rPr lang="en-US" smtClean="0"/>
               <a:pPr/>
-              <a:t>22</a:t>
+              <a:t>18</a:t>
             </a:fld>
             <a:endParaRPr lang="en-US"/>
           </a:p>
@@ -4761,7 +4588,7 @@
             <a:fld id="{4C4AD4EB-88D0-C141-9474-CCD86A78CB94}" type="datetimeFigureOut">
               <a:rPr lang="en-US" smtClean="0"/>
               <a:pPr/>
-              <a:t>30.11.2010</a:t>
+              <a:t>11/30/10</a:t>
             </a:fld>
             <a:endParaRPr lang="en-US" dirty="0"/>
           </a:p>
@@ -4804,7 +4631,7 @@
             <a:fld id="{DF7665AF-92BA-E649-941D-268879B3EA81}" type="slidenum">
               <a:rPr lang="en-US" smtClean="0"/>
               <a:pPr/>
-              <a:t>‹Nr.›</a:t>
+              <a:t>‹#›</a:t>
             </a:fld>
             <a:endParaRPr lang="en-US"/>
           </a:p>
@@ -5084,7 +4911,7 @@
             <a:fld id="{4C4AD4EB-88D0-C141-9474-CCD86A78CB94}" type="datetimeFigureOut">
               <a:rPr lang="en-US" smtClean="0"/>
               <a:pPr/>
-              <a:t>30.11.2010</a:t>
+              <a:t>11/30/10</a:t>
             </a:fld>
             <a:endParaRPr lang="en-US"/>
           </a:p>
@@ -5127,7 +4954,7 @@
             <a:fld id="{DF7665AF-92BA-E649-941D-268879B3EA81}" type="slidenum">
               <a:rPr lang="en-US" smtClean="0"/>
               <a:pPr/>
-              <a:t>‹Nr.›</a:t>
+              <a:t>‹#›</a:t>
             </a:fld>
             <a:endParaRPr lang="en-US"/>
           </a:p>
@@ -5360,7 +5187,7 @@
             <a:fld id="{4C4AD4EB-88D0-C141-9474-CCD86A78CB94}" type="datetimeFigureOut">
               <a:rPr lang="en-US" smtClean="0"/>
               <a:pPr/>
-              <a:t>30.11.2010</a:t>
+              <a:t>11/30/10</a:t>
             </a:fld>
             <a:endParaRPr lang="en-US"/>
           </a:p>
@@ -5652,7 +5479,7 @@
             <a:fld id="{4C4AD4EB-88D0-C141-9474-CCD86A78CB94}" type="datetimeFigureOut">
               <a:rPr lang="en-US" smtClean="0"/>
               <a:pPr/>
-              <a:t>30.11.2010</a:t>
+              <a:t>11/30/10</a:t>
             </a:fld>
             <a:endParaRPr lang="en-US"/>
           </a:p>
@@ -5979,7 +5806,7 @@
             <a:fld id="{4C4AD4EB-88D0-C141-9474-CCD86A78CB94}" type="datetimeFigureOut">
               <a:rPr lang="en-US" smtClean="0"/>
               <a:pPr/>
-              <a:t>30.11.2010</a:t>
+              <a:t>11/30/10</a:t>
             </a:fld>
             <a:endParaRPr lang="en-US"/>
           </a:p>
@@ -6227,7 +6054,7 @@
             <a:fld id="{4C4AD4EB-88D0-C141-9474-CCD86A78CB94}" type="datetimeFigureOut">
               <a:rPr lang="en-US" smtClean="0"/>
               <a:pPr/>
-              <a:t>30.11.2010</a:t>
+              <a:t>11/30/10</a:t>
             </a:fld>
             <a:endParaRPr lang="en-US"/>
           </a:p>
@@ -6270,7 +6097,7 @@
             <a:fld id="{DF7665AF-92BA-E649-941D-268879B3EA81}" type="slidenum">
               <a:rPr lang="en-US" smtClean="0"/>
               <a:pPr/>
-              <a:t>‹Nr.›</a:t>
+              <a:t>‹#›</a:t>
             </a:fld>
             <a:endParaRPr lang="en-US"/>
           </a:p>
@@ -6404,7 +6231,7 @@
             <a:fld id="{4C4AD4EB-88D0-C141-9474-CCD86A78CB94}" type="datetimeFigureOut">
               <a:rPr lang="en-US" smtClean="0"/>
               <a:pPr/>
-              <a:t>30.11.2010</a:t>
+              <a:t>11/30/10</a:t>
             </a:fld>
             <a:endParaRPr lang="en-US"/>
           </a:p>
@@ -6447,7 +6274,7 @@
             <a:fld id="{DF7665AF-92BA-E649-941D-268879B3EA81}" type="slidenum">
               <a:rPr lang="en-US" smtClean="0"/>
               <a:pPr/>
-              <a:t>‹Nr.›</a:t>
+              <a:t>‹#›</a:t>
             </a:fld>
             <a:endParaRPr lang="en-US"/>
           </a:p>
@@ -6609,7 +6436,7 @@
               <a:pPr>
                 <a:defRPr/>
               </a:pPr>
-              <a:t>‹Nr.›</a:t>
+              <a:t>‹#›</a:t>
             </a:fld>
             <a:endParaRPr lang="en-US"/>
           </a:p>
@@ -6781,7 +6608,7 @@
             <a:fld id="{4C4AD4EB-88D0-C141-9474-CCD86A78CB94}" type="datetimeFigureOut">
               <a:rPr lang="en-US" smtClean="0"/>
               <a:pPr/>
-              <a:t>30.11.2010</a:t>
+              <a:t>11/30/10</a:t>
             </a:fld>
             <a:endParaRPr lang="en-US"/>
           </a:p>
@@ -6824,7 +6651,7 @@
             <a:fld id="{DF7665AF-92BA-E649-941D-268879B3EA81}" type="slidenum">
               <a:rPr lang="en-US" smtClean="0"/>
               <a:pPr/>
-              <a:t>‹Nr.›</a:t>
+              <a:t>‹#›</a:t>
             </a:fld>
             <a:endParaRPr lang="en-US"/>
           </a:p>
@@ -7052,7 +6879,7 @@
             <a:fld id="{4C4AD4EB-88D0-C141-9474-CCD86A78CB94}" type="datetimeFigureOut">
               <a:rPr lang="en-US" smtClean="0"/>
               <a:pPr/>
-              <a:t>30.11.2010</a:t>
+              <a:t>11/30/10</a:t>
             </a:fld>
             <a:endParaRPr lang="en-US"/>
           </a:p>
@@ -7360,7 +7187,7 @@
             <a:fld id="{4C4AD4EB-88D0-C141-9474-CCD86A78CB94}" type="datetimeFigureOut">
               <a:rPr lang="en-US" smtClean="0"/>
               <a:pPr/>
-              <a:t>30.11.2010</a:t>
+              <a:t>11/30/10</a:t>
             </a:fld>
             <a:endParaRPr lang="en-US"/>
           </a:p>
@@ -7403,7 +7230,7 @@
             <a:fld id="{DF7665AF-92BA-E649-941D-268879B3EA81}" type="slidenum">
               <a:rPr lang="en-US" smtClean="0"/>
               <a:pPr/>
-              <a:t>‹Nr.›</a:t>
+              <a:t>‹#›</a:t>
             </a:fld>
             <a:endParaRPr lang="en-US"/>
           </a:p>
@@ -7654,7 +7481,7 @@
             <a:fld id="{4C4AD4EB-88D0-C141-9474-CCD86A78CB94}" type="datetimeFigureOut">
               <a:rPr lang="en-US" smtClean="0"/>
               <a:pPr/>
-              <a:t>30.11.2010</a:t>
+              <a:t>11/30/10</a:t>
             </a:fld>
             <a:endParaRPr lang="en-US"/>
           </a:p>
@@ -7697,7 +7524,7 @@
             <a:fld id="{DF7665AF-92BA-E649-941D-268879B3EA81}" type="slidenum">
               <a:rPr lang="en-US" smtClean="0"/>
               <a:pPr/>
-              <a:t>‹Nr.›</a:t>
+              <a:t>‹#›</a:t>
             </a:fld>
             <a:endParaRPr lang="en-US"/>
           </a:p>
@@ -8086,7 +7913,7 @@
             <a:fld id="{4C4AD4EB-88D0-C141-9474-CCD86A78CB94}" type="datetimeFigureOut">
               <a:rPr lang="en-US" smtClean="0"/>
               <a:pPr/>
-              <a:t>30.11.2010</a:t>
+              <a:t>11/30/10</a:t>
             </a:fld>
             <a:endParaRPr lang="en-US"/>
           </a:p>
@@ -8134,7 +7961,7 @@
             <a:fld id="{DF7665AF-92BA-E649-941D-268879B3EA81}" type="slidenum">
               <a:rPr lang="en-US" smtClean="0"/>
               <a:pPr/>
-              <a:t>‹Nr.›</a:t>
+              <a:t>‹#›</a:t>
             </a:fld>
             <a:endParaRPr lang="en-US"/>
           </a:p>
@@ -8434,7 +8261,7 @@
             <a:fld id="{4C4AD4EB-88D0-C141-9474-CCD86A78CB94}" type="datetimeFigureOut">
               <a:rPr lang="en-US" smtClean="0"/>
               <a:pPr/>
-              <a:t>30.11.2010</a:t>
+              <a:t>11/30/10</a:t>
             </a:fld>
             <a:endParaRPr lang="en-US"/>
           </a:p>
@@ -8477,7 +8304,7 @@
             <a:fld id="{DF7665AF-92BA-E649-941D-268879B3EA81}" type="slidenum">
               <a:rPr lang="en-US" smtClean="0"/>
               <a:pPr/>
-              <a:t>‹Nr.›</a:t>
+              <a:t>‹#›</a:t>
             </a:fld>
             <a:endParaRPr lang="en-US"/>
           </a:p>
@@ -8526,7 +8353,7 @@
             <a:fld id="{4C4AD4EB-88D0-C141-9474-CCD86A78CB94}" type="datetimeFigureOut">
               <a:rPr lang="en-US" smtClean="0"/>
               <a:pPr/>
-              <a:t>30.11.2010</a:t>
+              <a:t>11/30/10</a:t>
             </a:fld>
             <a:endParaRPr lang="en-US"/>
           </a:p>
@@ -8569,7 +8396,7 @@
             <a:fld id="{DF7665AF-92BA-E649-941D-268879B3EA81}" type="slidenum">
               <a:rPr lang="en-US" smtClean="0"/>
               <a:pPr/>
-              <a:t>‹Nr.›</a:t>
+              <a:t>‹#›</a:t>
             </a:fld>
             <a:endParaRPr lang="en-US"/>
           </a:p>
@@ -8865,7 +8692,7 @@
             <a:fld id="{4C4AD4EB-88D0-C141-9474-CCD86A78CB94}" type="datetimeFigureOut">
               <a:rPr lang="en-US" smtClean="0"/>
               <a:pPr/>
-              <a:t>30.11.2010</a:t>
+              <a:t>11/30/10</a:t>
             </a:fld>
             <a:endParaRPr lang="en-US"/>
           </a:p>
@@ -8908,7 +8735,7 @@
             <a:fld id="{DF7665AF-92BA-E649-941D-268879B3EA81}" type="slidenum">
               <a:rPr lang="en-US" smtClean="0"/>
               <a:pPr/>
-              <a:t>‹Nr.›</a:t>
+              <a:t>‹#›</a:t>
             </a:fld>
             <a:endParaRPr lang="en-US"/>
           </a:p>
@@ -9079,7 +8906,7 @@
             <a:fld id="{4C4AD4EB-88D0-C141-9474-CCD86A78CB94}" type="datetimeFigureOut">
               <a:rPr lang="en-US" smtClean="0"/>
               <a:pPr/>
-              <a:t>30.11.2010</a:t>
+              <a:t>11/30/10</a:t>
             </a:fld>
             <a:endParaRPr lang="en-US"/>
           </a:p>
@@ -9160,7 +8987,7 @@
             <a:fld id="{DF7665AF-92BA-E649-941D-268879B3EA81}" type="slidenum">
               <a:rPr lang="en-US" smtClean="0"/>
               <a:pPr/>
-              <a:t>‹Nr.›</a:t>
+              <a:t>‹#›</a:t>
             </a:fld>
             <a:endParaRPr lang="en-US"/>
           </a:p>
@@ -9661,7 +9488,7 @@
                   <a:schemeClr val="accent5"/>
                 </a:solidFill>
               </a:rPr>
-              <a:t>www.cct.lsu.edu/~sjha/dpa_publications</a:t>
+              <a:t>www.cct.lsu.edu/~sjha</a:t>
             </a:r>
             <a:r>
               <a:rPr lang="en-US" sz="2100" dirty="0" smtClean="0">
@@ -9671,8 +9498,6 @@
               </a:rPr>
               <a:t>/</a:t>
             </a:r>
-          </a:p>
-          <a:p>
             <a:endParaRPr lang="en-US" sz="2100" dirty="0" smtClean="0"/>
           </a:p>
           <a:p>
@@ -9793,7 +9618,7 @@
 </file>
 
 <file path=ppt/slides/slide10.xml><?xml version="1.0" encoding="utf-8"?>
-<p:sld xmlns:a="http://schemas.openxmlformats.org/drawingml/2006/main" xmlns:r="http://schemas.openxmlformats.org/officeDocument/2006/relationships" xmlns:mc="http://schemas.openxmlformats.org/markup-compatibility/2006" xmlns:mv="urn:schemas-microsoft-com:mac:vml" xmlns:p="http://schemas.openxmlformats.org/presentationml/2006/main" mc:Ignorable="mv" mc:PreserveAttributes="mv:*" show="0">
+<p:sld xmlns:a="http://schemas.openxmlformats.org/drawingml/2006/main" xmlns:r="http://schemas.openxmlformats.org/officeDocument/2006/relationships" xmlns:mc="http://schemas.openxmlformats.org/markup-compatibility/2006" xmlns:mv="urn:schemas-microsoft-com:mac:vml" xmlns:p="http://schemas.openxmlformats.org/presentationml/2006/main" mc:Ignorable="mv" mc:PreserveAttributes="mv:*">
   <p:cSld>
     <p:spTree>
       <p:nvGrpSpPr>
@@ -9811,76 +9636,7 @@
       </p:grpSpPr>
       <p:sp>
         <p:nvSpPr>
-          <p:cNvPr id="20483" name="Rectangle 4"/>
-          <p:cNvSpPr>
-            <a:spLocks/>
-          </p:cNvSpPr>
-          <p:nvPr/>
-        </p:nvSpPr>
-        <p:spPr bwMode="auto">
-          <a:xfrm>
-            <a:off x="1447800" y="171450"/>
-            <a:ext cx="7162800" cy="647700"/>
-          </a:xfrm>
-          <a:prstGeom prst="rect">
-            <a:avLst/>
-          </a:prstGeom>
-          <a:noFill/>
-          <a:ln w="12700">
-            <a:noFill/>
-            <a:miter lim="800000"/>
-            <a:headEnd/>
-            <a:tailEnd/>
-          </a:ln>
-        </p:spPr>
-        <p:txBody>
-          <a:bodyPr lIns="0" tIns="0" rIns="0" bIns="0" anchor="ctr">
-            <a:prstTxWarp prst="textNoShape">
-              <a:avLst/>
-            </a:prstTxWarp>
-          </a:bodyPr>
-          <a:lstStyle/>
-          <a:p>
-            <a:pPr>
-              <a:lnSpc>
-                <a:spcPct val="100000"/>
-              </a:lnSpc>
-              <a:tabLst>
-                <a:tab pos="457200" algn="l"/>
-                <a:tab pos="914400" algn="l"/>
-                <a:tab pos="1371600" algn="l"/>
-                <a:tab pos="1828800" algn="l"/>
-                <a:tab pos="2286000" algn="l"/>
-                <a:tab pos="2743200" algn="l"/>
-                <a:tab pos="3200400" algn="l"/>
-                <a:tab pos="3657600" algn="l"/>
-                <a:tab pos="4114800" algn="l"/>
-                <a:tab pos="4572000" algn="l"/>
-                <a:tab pos="5029200" algn="l"/>
-                <a:tab pos="5486400" algn="l"/>
-                <a:tab pos="5943600" algn="l"/>
-                <a:tab pos="6400800" algn="l"/>
-                <a:tab pos="6858000" algn="l"/>
-                <a:tab pos="7315200" algn="l"/>
-                <a:tab pos="7772400" algn="l"/>
-                <a:tab pos="8229600" algn="l"/>
-                <a:tab pos="8686800" algn="l"/>
-                <a:tab pos="9144000" algn="l"/>
-              </a:tabLst>
-            </a:pPr>
-            <a:endParaRPr lang="en-US" sz="2800">
-              <a:solidFill>
-                <a:srgbClr val="000080"/>
-              </a:solidFill>
-              <a:ea typeface="Arial" charset="0"/>
-              <a:cs typeface="Arial" charset="0"/>
-            </a:endParaRPr>
-          </a:p>
-        </p:txBody>
-      </p:sp>
-      <p:sp>
-        <p:nvSpPr>
-          <p:cNvPr id="20485" name="Title 5"/>
+          <p:cNvPr id="2" name="Title 1"/>
           <p:cNvSpPr>
             <a:spLocks noGrp="1"/>
           </p:cNvSpPr>
@@ -9889,35 +9645,6 @@
           </p:nvPr>
         </p:nvSpPr>
         <p:spPr/>
-        <p:txBody>
-          <a:bodyPr>
-            <a:normAutofit fontScale="90000"/>
-          </a:bodyPr>
-          <a:lstStyle/>
-          <a:p>
-            <a:r>
-              <a:rPr lang="en-US" sz="2600" dirty="0" smtClean="0"/>
-              <a:t>Assertion #5: Need an Autonomic Approach to managing complexity and dynamism</a:t>
-            </a:r>
-          </a:p>
-        </p:txBody>
-      </p:sp>
-      <p:sp>
-        <p:nvSpPr>
-          <p:cNvPr id="16" name="Content Placeholder 15"/>
-          <p:cNvSpPr>
-            <a:spLocks noGrp="1"/>
-          </p:cNvSpPr>
-          <p:nvPr>
-            <p:ph sz="half" idx="1"/>
-          </p:nvPr>
-        </p:nvSpPr>
-        <p:spPr>
-          <a:xfrm>
-            <a:off x="355600" y="1219200"/>
-            <a:ext cx="8597900" cy="5016500"/>
-          </a:xfrm>
-        </p:spPr>
         <p:txBody>
           <a:bodyPr>
             <a:noAutofit/>
@@ -9925,244 +9652,45 @@
           <a:lstStyle/>
           <a:p>
             <a:r>
-              <a:rPr lang="en-US" sz="1700" dirty="0" smtClean="0"/>
-              <a:t>Challenges in Distributed Applications:</a:t>
-            </a:r>
-          </a:p>
-          <a:p>
-            <a:pPr lvl="1"/>
-            <a:r>
-              <a:rPr lang="en-US" sz="1700" dirty="0" smtClean="0"/>
-              <a:t>Complexity: </a:t>
-            </a:r>
-            <a:r>
-              <a:rPr lang="en-US" sz="1700" dirty="0" smtClean="0">
-                <a:solidFill>
-                  <a:schemeClr val="tx1">
-                    <a:lumMod val="65000"/>
-                    <a:lumOff val="35000"/>
-                  </a:schemeClr>
-                </a:solidFill>
-              </a:rPr>
-              <a:t>Multiple-levels, External Dependency, Varying control </a:t>
-            </a:r>
-          </a:p>
-          <a:p>
-            <a:pPr lvl="1"/>
-            <a:r>
-              <a:rPr lang="en-US" sz="1700" dirty="0" smtClean="0"/>
-              <a:t>Dynamism:   </a:t>
-            </a:r>
-            <a:r>
-              <a:rPr lang="en-US" sz="1700" dirty="0" smtClean="0">
-                <a:solidFill>
-                  <a:schemeClr val="tx1">
-                    <a:lumMod val="65000"/>
-                    <a:lumOff val="35000"/>
-                  </a:schemeClr>
-                </a:solidFill>
-              </a:rPr>
-              <a:t>Changing resource availability and requirements</a:t>
-            </a:r>
-          </a:p>
-          <a:p>
-            <a:r>
-              <a:rPr lang="en-US" sz="1700" dirty="0" smtClean="0"/>
-              <a:t>Posit that Autonomic Approaches can help address two challenges</a:t>
-            </a:r>
-          </a:p>
-          <a:p>
-            <a:pPr lvl="1"/>
-            <a:r>
-              <a:rPr lang="en-US" sz="1700" dirty="0" smtClean="0"/>
-              <a:t> Provide formulations that hide complexity &amp; support dynamism</a:t>
-            </a:r>
-          </a:p>
-          <a:p>
-            <a:pPr lvl="2"/>
-            <a:r>
-              <a:rPr lang="en-US" sz="1700" dirty="0" smtClean="0"/>
-              <a:t>Programming the Infrastructure “</a:t>
-            </a:r>
-            <a:r>
-              <a:rPr lang="en-US" sz="1700" dirty="0" err="1" smtClean="0"/>
-              <a:t>autonomically</a:t>
-            </a:r>
-            <a:r>
-              <a:rPr lang="en-US" sz="1700" dirty="0" smtClean="0"/>
-              <a:t>”</a:t>
-            </a:r>
-          </a:p>
-          <a:p>
-            <a:pPr lvl="3"/>
-            <a:endParaRPr lang="en-US" sz="1700" dirty="0" smtClean="0"/>
-          </a:p>
-          <a:p>
-            <a:pPr lvl="2">
-              <a:buNone/>
-            </a:pPr>
-            <a:r>
-              <a:rPr lang="en-US" sz="1700" dirty="0" smtClean="0"/>
-              <a:t>	</a:t>
-            </a:r>
-          </a:p>
-          <a:p>
-            <a:endParaRPr lang="en-US" sz="1700" dirty="0" smtClean="0"/>
-          </a:p>
-          <a:p>
-            <a:pPr lvl="1"/>
-            <a:endParaRPr lang="en-US" sz="1700" dirty="0" smtClean="0"/>
-          </a:p>
-          <a:p>
-            <a:pPr lvl="1"/>
-            <a:endParaRPr lang="en-US" sz="1700" dirty="0" smtClean="0"/>
-          </a:p>
-          <a:p>
-            <a:pPr lvl="1"/>
-            <a:endParaRPr lang="en-US" sz="1700" dirty="0" smtClean="0"/>
+              <a:rPr lang="en-US" sz="2600" dirty="0" smtClean="0"/>
+              <a:t>Abstractions for Dynamic Execution SAGA Pilot-Job (</a:t>
+            </a:r>
+            <a:r>
+              <a:rPr lang="en-US" sz="2600" dirty="0" err="1" smtClean="0"/>
+              <a:t>BigJob</a:t>
+            </a:r>
+            <a:r>
+              <a:rPr lang="en-US" sz="2600" dirty="0" smtClean="0"/>
+              <a:t>)</a:t>
+            </a:r>
+            <a:endParaRPr lang="en-US" sz="2600" dirty="0"/>
           </a:p>
         </p:txBody>
       </p:sp>
       <p:pic>
         <p:nvPicPr>
-          <p:cNvPr id="5" name="Picture 4" descr="proposed_f3.jpg"/>
+          <p:cNvPr id="4" name="Content Placeholder 3" descr="bigjob.png"/>
           <p:cNvPicPr>
-            <a:picLocks noChangeAspect="1"/>
+            <a:picLocks noGrp="1" noChangeAspect="1"/>
           </p:cNvPicPr>
-          <p:nvPr/>
+          <p:nvPr>
+            <p:ph idx="1"/>
+          </p:nvPr>
         </p:nvPicPr>
         <p:blipFill>
           <a:blip r:embed="rId2"/>
+          <a:srcRect l="-2356" r="-2356"/>
           <a:stretch>
             <a:fillRect/>
           </a:stretch>
         </p:blipFill>
-        <p:spPr>
-          <a:xfrm>
-            <a:off x="5515278" y="4688681"/>
-            <a:ext cx="3628722" cy="1976438"/>
-          </a:xfrm>
-          <a:prstGeom prst="rect">
-            <a:avLst/>
-          </a:prstGeom>
-        </p:spPr>
+        <p:spPr/>
       </p:pic>
-      <p:sp>
-        <p:nvSpPr>
-          <p:cNvPr id="6" name="Content Placeholder 15"/>
-          <p:cNvSpPr>
-            <a:spLocks noGrp="1"/>
-          </p:cNvSpPr>
-          <p:nvPr>
-            <p:ph sz="half" idx="1"/>
-          </p:nvPr>
-        </p:nvSpPr>
-        <p:spPr>
-          <a:xfrm>
-            <a:off x="355600" y="3505200"/>
-            <a:ext cx="6807200" cy="2743200"/>
-          </a:xfrm>
-        </p:spPr>
-        <p:txBody>
-          <a:bodyPr>
-            <a:noAutofit/>
-          </a:bodyPr>
-          <a:lstStyle/>
-          <a:p>
-            <a:r>
-              <a:rPr lang="en-US" sz="1700" dirty="0" smtClean="0"/>
-              <a:t>Objective: Intelligence in Compute-Data placement</a:t>
-            </a:r>
-          </a:p>
-          <a:p>
-            <a:pPr lvl="1"/>
-            <a:r>
-              <a:rPr lang="en-US" sz="1700" dirty="0" smtClean="0"/>
-              <a:t>Sophisticated models of data-compute co-movement</a:t>
-            </a:r>
-          </a:p>
-          <a:p>
-            <a:pPr lvl="2"/>
-            <a:r>
-              <a:rPr lang="en-US" sz="1700" dirty="0" smtClean="0"/>
-              <a:t>Tier 0 data at BNL; all compute migrated to Tier 0 </a:t>
-            </a:r>
-          </a:p>
-          <a:p>
-            <a:r>
-              <a:rPr lang="en-US" dirty="0" smtClean="0"/>
-              <a:t>For an objective, which strategy? </a:t>
-            </a:r>
-            <a:endParaRPr lang="en-US" sz="1700" dirty="0" smtClean="0"/>
-          </a:p>
-          <a:p>
-            <a:pPr lvl="1"/>
-            <a:r>
-              <a:rPr lang="en-US" dirty="0" smtClean="0"/>
-              <a:t>S1: Assignment of workers  determined by min </a:t>
-            </a:r>
-            <a:r>
-              <a:rPr lang="en-US" dirty="0" err="1" smtClean="0"/>
-              <a:t>T</a:t>
-            </a:r>
-            <a:r>
-              <a:rPr lang="en-US" baseline="-25000" dirty="0" err="1" smtClean="0"/>
-              <a:t>r</a:t>
-            </a:r>
-            <a:endParaRPr lang="en-US" baseline="-25000" dirty="0" smtClean="0"/>
-          </a:p>
-          <a:p>
-            <a:pPr lvl="1"/>
-            <a:r>
-              <a:rPr lang="en-US" dirty="0" smtClean="0"/>
-              <a:t>S2: Assignment of workers, by min data transfer</a:t>
-            </a:r>
-          </a:p>
-          <a:p>
-            <a:pPr lvl="1"/>
-            <a:r>
-              <a:rPr lang="en-US" dirty="0" smtClean="0"/>
-              <a:t>S3: Upon tracked dependencies</a:t>
-            </a:r>
-          </a:p>
-          <a:p>
-            <a:r>
-              <a:rPr lang="en-US" dirty="0" smtClean="0"/>
-              <a:t>Each S</a:t>
-            </a:r>
-            <a:r>
-              <a:rPr lang="en-US" sz="1600" dirty="0" smtClean="0"/>
-              <a:t>N</a:t>
-            </a:r>
-            <a:r>
-              <a:rPr lang="en-US" dirty="0" smtClean="0"/>
-              <a:t>: Could have different mechanism</a:t>
-            </a:r>
-            <a:endParaRPr lang="en-US" sz="2000" dirty="0" smtClean="0"/>
-          </a:p>
-          <a:p>
-            <a:pPr lvl="1"/>
-            <a:endParaRPr lang="en-US" dirty="0" smtClean="0"/>
-          </a:p>
-          <a:p>
-            <a:pPr lvl="1"/>
-            <a:endParaRPr lang="en-US" dirty="0" smtClean="0"/>
-          </a:p>
-          <a:p>
-            <a:pPr lvl="1"/>
-            <a:endParaRPr lang="en-US" baseline="-25000" dirty="0" smtClean="0"/>
-          </a:p>
-          <a:p>
-            <a:endParaRPr lang="en-US" sz="1700" dirty="0" smtClean="0"/>
-          </a:p>
-        </p:txBody>
-      </p:sp>
     </p:spTree>
   </p:cSld>
   <p:clrMapOvr>
     <a:masterClrMapping/>
   </p:clrMapOvr>
-  <p:transition/>
   <p:timing>
     <p:tnLst>
       <p:par>
@@ -10192,1090 +9720,6 @@
       </p:grpSpPr>
       <p:sp>
         <p:nvSpPr>
-          <p:cNvPr id="33794" name="Title 1"/>
-          <p:cNvSpPr>
-            <a:spLocks noGrp="1"/>
-          </p:cNvSpPr>
-          <p:nvPr>
-            <p:ph type="title"/>
-          </p:nvPr>
-        </p:nvSpPr>
-        <p:spPr>
-          <a:xfrm>
-            <a:off x="928542" y="263714"/>
-            <a:ext cx="8215458" cy="914400"/>
-          </a:xfrm>
-        </p:spPr>
-        <p:txBody>
-          <a:bodyPr>
-            <a:noAutofit/>
-          </a:bodyPr>
-          <a:lstStyle/>
-          <a:p>
-            <a:r>
-              <a:rPr lang="en-US" sz="2400" dirty="0" smtClean="0">
-                <a:solidFill>
-                  <a:schemeClr val="bg1">
-                    <a:lumMod val="95000"/>
-                  </a:schemeClr>
-                </a:solidFill>
-              </a:rPr>
-              <a:t>IDEAS: DA Development Objectives</a:t>
-            </a:r>
-          </a:p>
-        </p:txBody>
-      </p:sp>
-      <p:sp>
-        <p:nvSpPr>
-          <p:cNvPr id="33795" name="Content Placeholder 2"/>
-          <p:cNvSpPr>
-            <a:spLocks noGrp="1"/>
-          </p:cNvSpPr>
-          <p:nvPr>
-            <p:ph idx="1"/>
-          </p:nvPr>
-        </p:nvSpPr>
-        <p:spPr>
-          <a:xfrm>
-            <a:off x="673100" y="1498600"/>
-            <a:ext cx="8191501" cy="4765778"/>
-          </a:xfrm>
-        </p:spPr>
-        <p:txBody>
-          <a:bodyPr>
-            <a:noAutofit/>
-          </a:bodyPr>
-          <a:lstStyle/>
-          <a:p>
-            <a:r>
-              <a:rPr lang="en-US" sz="1700" b="1" dirty="0" smtClean="0">
-                <a:solidFill>
-                  <a:srgbClr val="800000"/>
-                </a:solidFill>
-              </a:rPr>
-              <a:t>Interoperable:</a:t>
-            </a:r>
-            <a:r>
-              <a:rPr lang="en-US" sz="1700" b="1" dirty="0" smtClean="0"/>
-              <a:t>  </a:t>
-            </a:r>
-            <a:r>
-              <a:rPr lang="en-US" sz="1700" dirty="0" smtClean="0"/>
-              <a:t>Ability to work across multiple resources concurrently</a:t>
-            </a:r>
-          </a:p>
-          <a:p>
-            <a:pPr lvl="2"/>
-            <a:r>
-              <a:rPr lang="en-US" sz="1700" dirty="0" smtClean="0"/>
-              <a:t>Includes jobs submission, coordination mechanism,</a:t>
-            </a:r>
-          </a:p>
-          <a:p>
-            <a:r>
-              <a:rPr lang="en-US" sz="1700" b="1" dirty="0" smtClean="0">
-                <a:solidFill>
-                  <a:srgbClr val="800000"/>
-                </a:solidFill>
-              </a:rPr>
-              <a:t>Dynamic: </a:t>
-            </a:r>
-            <a:r>
-              <a:rPr lang="en-US" sz="1700" dirty="0" smtClean="0"/>
-              <a:t>Beyond legacy static execution &amp;  resource allocation models</a:t>
-            </a:r>
-          </a:p>
-          <a:p>
-            <a:pPr lvl="2"/>
-            <a:r>
-              <a:rPr lang="en-US" sz="1700" dirty="0" smtClean="0"/>
-              <a:t>Decisions at both deployment and run-time</a:t>
-            </a:r>
-          </a:p>
-          <a:p>
-            <a:pPr lvl="2"/>
-            <a:r>
-              <a:rPr lang="en-US" sz="1700" dirty="0" smtClean="0"/>
-              <a:t>Dynamical execution is  almost fundamental at scale</a:t>
-            </a:r>
-            <a:endParaRPr lang="en-US" sz="1700" baseline="-25000" dirty="0" smtClean="0"/>
-          </a:p>
-          <a:p>
-            <a:r>
-              <a:rPr lang="en-US" sz="1700" b="1" dirty="0" smtClean="0">
-                <a:solidFill>
-                  <a:srgbClr val="800000"/>
-                </a:solidFill>
-              </a:rPr>
-              <a:t>Extensible:</a:t>
-            </a:r>
-            <a:r>
-              <a:rPr lang="en-US" sz="1700" dirty="0" smtClean="0">
-                <a:solidFill>
-                  <a:srgbClr val="800000"/>
-                </a:solidFill>
-              </a:rPr>
-              <a:t> </a:t>
-            </a:r>
-            <a:r>
-              <a:rPr lang="en-US" sz="1700" dirty="0" smtClean="0"/>
-              <a:t>Support new functionality &amp; infrastructure without wholesale refactoring, i.e., lower coupling to tools &amp; infrastructure</a:t>
-            </a:r>
-          </a:p>
-          <a:p>
-            <a:r>
-              <a:rPr lang="en-US" sz="1700" b="1" dirty="0" smtClean="0">
-                <a:solidFill>
-                  <a:srgbClr val="800000"/>
-                </a:solidFill>
-              </a:rPr>
-              <a:t>Adaptive/Autonomic:</a:t>
-            </a:r>
-            <a:r>
-              <a:rPr lang="en-US" sz="1700" dirty="0" smtClean="0">
-                <a:solidFill>
-                  <a:srgbClr val="800000"/>
-                </a:solidFill>
-              </a:rPr>
-              <a:t> </a:t>
-            </a:r>
-            <a:r>
-              <a:rPr lang="en-US" sz="1700" dirty="0" smtClean="0"/>
-              <a:t>Flexible response to fluctuations in dynamic resources, availability of dynamic data</a:t>
-            </a:r>
-          </a:p>
-          <a:p>
-            <a:r>
-              <a:rPr lang="en-US" sz="1700" b="1" dirty="0" smtClean="0">
-                <a:solidFill>
-                  <a:srgbClr val="800000"/>
-                </a:solidFill>
-              </a:rPr>
-              <a:t>Scalable:</a:t>
-            </a:r>
-            <a:r>
-              <a:rPr lang="en-US" sz="1700" dirty="0" smtClean="0">
-                <a:solidFill>
-                  <a:srgbClr val="800000"/>
-                </a:solidFill>
-              </a:rPr>
-              <a:t> </a:t>
-            </a:r>
-            <a:r>
-              <a:rPr lang="en-US" sz="1700" dirty="0" smtClean="0"/>
-              <a:t>Along many dimensions and design points </a:t>
-            </a:r>
-          </a:p>
-          <a:p>
-            <a:pPr>
-              <a:buNone/>
-            </a:pPr>
-            <a:r>
-              <a:rPr lang="en-US" sz="1700" dirty="0" smtClean="0">
-                <a:solidFill>
-                  <a:srgbClr val="800000"/>
-                </a:solidFill>
-              </a:rPr>
-              <a:t>     Challenge: To develop DA effectively and efficiently with IDEAS as first class objectives with  simplicity an over-aching concern</a:t>
-            </a:r>
-          </a:p>
-          <a:p>
-            <a:endParaRPr lang="en-US" sz="1700" dirty="0" smtClean="0"/>
-          </a:p>
-          <a:p>
-            <a:endParaRPr lang="en-US" sz="1700" dirty="0" smtClean="0"/>
-          </a:p>
-        </p:txBody>
-      </p:sp>
-    </p:spTree>
-  </p:cSld>
-  <p:clrMapOvr>
-    <a:masterClrMapping/>
-  </p:clrMapOvr>
-  <p:transition/>
-  <p:timing>
-    <p:tnLst>
-      <p:par>
-        <p:cTn id="1" dur="indefinite" restart="never" nodeType="tmRoot"/>
-      </p:par>
-    </p:tnLst>
-  </p:timing>
-</p:sld>
-</file>
-
-<file path=ppt/slides/slide12.xml><?xml version="1.0" encoding="utf-8"?>
-<p:sld xmlns:a="http://schemas.openxmlformats.org/drawingml/2006/main" xmlns:r="http://schemas.openxmlformats.org/officeDocument/2006/relationships" xmlns:mc="http://schemas.openxmlformats.org/markup-compatibility/2006" xmlns:mv="urn:schemas-microsoft-com:mac:vml" xmlns:p="http://schemas.openxmlformats.org/presentationml/2006/main" mc:Ignorable="mv" mc:PreserveAttributes="mv:*">
-  <p:cSld>
-    <p:spTree>
-      <p:nvGrpSpPr>
-        <p:cNvPr id="1" name=""/>
-        <p:cNvGrpSpPr/>
-        <p:nvPr/>
-      </p:nvGrpSpPr>
-      <p:grpSpPr>
-        <a:xfrm>
-          <a:off x="0" y="0"/>
-          <a:ext cx="0" cy="0"/>
-          <a:chOff x="0" y="0"/>
-          <a:chExt cx="0" cy="0"/>
-        </a:xfrm>
-      </p:grpSpPr>
-      <p:pic>
-        <p:nvPicPr>
-          <p:cNvPr id="26626" name="Picture 1"/>
-          <p:cNvPicPr>
-            <a:picLocks noChangeArrowheads="1"/>
-          </p:cNvPicPr>
-          <p:nvPr/>
-        </p:nvPicPr>
-        <p:blipFill>
-          <a:blip r:embed="rId2"/>
-          <a:srcRect/>
-          <a:stretch>
-            <a:fillRect/>
-          </a:stretch>
-        </p:blipFill>
-        <p:spPr bwMode="auto">
-          <a:xfrm>
-            <a:off x="9525" y="44450"/>
-            <a:ext cx="1290638" cy="1062038"/>
-          </a:xfrm>
-          <a:prstGeom prst="rect">
-            <a:avLst/>
-          </a:prstGeom>
-          <a:noFill/>
-          <a:ln w="12700">
-            <a:noFill/>
-            <a:miter lim="800000"/>
-            <a:headEnd/>
-            <a:tailEnd/>
-          </a:ln>
-        </p:spPr>
-      </p:pic>
-      <p:pic>
-        <p:nvPicPr>
-          <p:cNvPr id="26627" name="Picture 2"/>
-          <p:cNvPicPr>
-            <a:picLocks noChangeArrowheads="1"/>
-          </p:cNvPicPr>
-          <p:nvPr/>
-        </p:nvPicPr>
-        <p:blipFill>
-          <a:blip r:embed="rId3"/>
-          <a:srcRect/>
-          <a:stretch>
-            <a:fillRect/>
-          </a:stretch>
-        </p:blipFill>
-        <p:spPr bwMode="auto">
-          <a:xfrm>
-            <a:off x="7567613" y="36513"/>
-            <a:ext cx="1576387" cy="954087"/>
-          </a:xfrm>
-          <a:prstGeom prst="rect">
-            <a:avLst/>
-          </a:prstGeom>
-          <a:noFill/>
-          <a:ln w="12700">
-            <a:noFill/>
-            <a:miter lim="800000"/>
-            <a:headEnd/>
-            <a:tailEnd/>
-          </a:ln>
-        </p:spPr>
-      </p:pic>
-      <p:sp>
-        <p:nvSpPr>
-          <p:cNvPr id="26629" name="Rectangle 4"/>
-          <p:cNvSpPr>
-            <a:spLocks noGrp="1" noChangeArrowheads="1"/>
-          </p:cNvSpPr>
-          <p:nvPr>
-            <p:ph type="title"/>
-          </p:nvPr>
-        </p:nvSpPr>
-        <p:spPr/>
-        <p:txBody>
-          <a:bodyPr/>
-          <a:lstStyle/>
-          <a:p>
-            <a:r>
-              <a:rPr lang="en-US" dirty="0" smtClean="0"/>
-              <a:t>SAGA: In a nutshell</a:t>
-            </a:r>
-            <a:endParaRPr lang="en-US" dirty="0"/>
-          </a:p>
-        </p:txBody>
-      </p:sp>
-      <p:sp>
-        <p:nvSpPr>
-          <p:cNvPr id="12" name="Rectangle 5"/>
-          <p:cNvSpPr txBox="1">
-            <a:spLocks noChangeArrowheads="1"/>
-          </p:cNvSpPr>
-          <p:nvPr/>
-        </p:nvSpPr>
-        <p:spPr>
-          <a:xfrm>
-            <a:off x="757947" y="1529880"/>
-            <a:ext cx="7966954" cy="5033310"/>
-          </a:xfrm>
-          <a:prstGeom prst="rect">
-            <a:avLst/>
-          </a:prstGeom>
-        </p:spPr>
-        <p:txBody>
-          <a:bodyPr vert="horz" lIns="91440" tIns="45720" rIns="91440" bIns="45720" rtlCol="0">
-            <a:noAutofit/>
-          </a:bodyPr>
-          <a:lstStyle/>
-          <a:p>
-            <a:pPr marL="342900" marR="0" lvl="0" indent="-342900" algn="l" defTabSz="914400" rtl="0" eaLnBrk="1" fontAlgn="auto" latinLnBrk="0" hangingPunct="1">
-              <a:lnSpc>
-                <a:spcPct val="100000"/>
-              </a:lnSpc>
-              <a:spcBef>
-                <a:spcPts val="2000"/>
-              </a:spcBef>
-              <a:spcAft>
-                <a:spcPts val="0"/>
-              </a:spcAft>
-              <a:buClr>
-                <a:schemeClr val="tx1">
-                  <a:lumMod val="75000"/>
-                  <a:lumOff val="25000"/>
-                </a:schemeClr>
-              </a:buClr>
-              <a:buSzTx/>
-              <a:buFont typeface="Wingdings 2" pitchFamily="18" charset="2"/>
-              <a:buChar char=""/>
-              <a:tabLst/>
-              <a:defRPr/>
-            </a:pPr>
-            <a:r>
-              <a:rPr kumimoji="0" lang="en-US" sz="1700" b="0" i="0" u="none" strike="noStrike" kern="1200" cap="none" spc="0" normalizeH="0" baseline="0" noProof="0" dirty="0" smtClean="0">
-                <a:ln>
-                  <a:noFill/>
-                </a:ln>
-                <a:solidFill>
-                  <a:schemeClr val="tx1">
-                    <a:lumMod val="65000"/>
-                    <a:lumOff val="35000"/>
-                  </a:schemeClr>
-                </a:solidFill>
-                <a:effectLst/>
-                <a:uLnTx/>
-                <a:uFillTx/>
-                <a:latin typeface="+mn-lt"/>
-                <a:ea typeface="+mn-ea"/>
-                <a:cs typeface="+mn-cs"/>
-              </a:rPr>
-              <a:t>There exists a lack of Programmatic approaches that:</a:t>
-            </a:r>
-          </a:p>
-          <a:p>
-            <a:pPr marL="685800" marR="0" lvl="1" indent="-336550" algn="l" defTabSz="914400" rtl="0" eaLnBrk="1" fontAlgn="auto" latinLnBrk="0" hangingPunct="1">
-              <a:lnSpc>
-                <a:spcPct val="100000"/>
-              </a:lnSpc>
-              <a:spcBef>
-                <a:spcPts val="600"/>
-              </a:spcBef>
-              <a:spcAft>
-                <a:spcPts val="0"/>
-              </a:spcAft>
-              <a:buClr>
-                <a:schemeClr val="tx1">
-                  <a:lumMod val="95000"/>
-                  <a:lumOff val="5000"/>
-                </a:schemeClr>
-              </a:buClr>
-              <a:buSzTx/>
-              <a:buFont typeface="Arial"/>
-              <a:buChar char="•"/>
-              <a:tabLst/>
-              <a:defRPr/>
-            </a:pPr>
-            <a:r>
-              <a:rPr kumimoji="0" lang="en-US" sz="1700" b="0" i="0" u="none" strike="noStrike" kern="1200" cap="none" spc="0" normalizeH="0" baseline="0" noProof="0" dirty="0" smtClean="0">
-                <a:ln>
-                  <a:noFill/>
-                </a:ln>
-                <a:solidFill>
-                  <a:schemeClr val="accent5"/>
-                </a:solidFill>
-                <a:effectLst/>
-                <a:uLnTx/>
-                <a:uFillTx/>
-                <a:latin typeface="+mn-lt"/>
-                <a:ea typeface="+mn-ea"/>
-                <a:cs typeface="+mn-cs"/>
-              </a:rPr>
-              <a:t>Provide general-purpose,</a:t>
-            </a:r>
-            <a:r>
-              <a:rPr kumimoji="0" lang="en-US" sz="1700" b="0" i="0" u="none" strike="noStrike" kern="1200" cap="none" spc="0" normalizeH="0" noProof="0" dirty="0" smtClean="0">
-                <a:ln>
-                  <a:noFill/>
-                </a:ln>
-                <a:solidFill>
-                  <a:schemeClr val="accent5"/>
-                </a:solidFill>
-                <a:effectLst/>
-                <a:uLnTx/>
-                <a:uFillTx/>
-                <a:latin typeface="+mn-lt"/>
-                <a:ea typeface="+mn-ea"/>
-                <a:cs typeface="+mn-cs"/>
-              </a:rPr>
-              <a:t> basic &amp; </a:t>
-            </a:r>
-            <a:r>
-              <a:rPr kumimoji="0" lang="en-US" sz="1700" b="0" i="0" u="none" strike="noStrike" kern="1200" cap="none" spc="0" normalizeH="0" baseline="0" noProof="0" dirty="0" smtClean="0">
-                <a:ln>
-                  <a:noFill/>
-                </a:ln>
-                <a:solidFill>
-                  <a:schemeClr val="accent5"/>
-                </a:solidFill>
-                <a:effectLst/>
-                <a:uLnTx/>
-                <a:uFillTx/>
-                <a:latin typeface="+mn-lt"/>
-                <a:ea typeface="+mn-ea"/>
-                <a:cs typeface="+mn-cs"/>
-              </a:rPr>
-              <a:t>common grid functionality for applications</a:t>
-            </a:r>
-            <a:r>
-              <a:rPr lang="en-US" sz="1700" dirty="0" smtClean="0">
-                <a:solidFill>
-                  <a:schemeClr val="accent5"/>
-                </a:solidFill>
-              </a:rPr>
-              <a:t>; </a:t>
-            </a:r>
-            <a:r>
-              <a:rPr kumimoji="0" lang="en-US" sz="1700" b="0" i="0" u="none" strike="noStrike" kern="1200" cap="none" spc="0" normalizeH="0" baseline="0" noProof="0" dirty="0" smtClean="0">
-                <a:ln>
-                  <a:noFill/>
-                </a:ln>
-                <a:solidFill>
-                  <a:schemeClr val="accent5"/>
-                </a:solidFill>
-                <a:effectLst/>
-                <a:uLnTx/>
-                <a:uFillTx/>
-                <a:latin typeface="+mn-lt"/>
-                <a:ea typeface="+mn-ea"/>
-                <a:cs typeface="+mn-cs"/>
-              </a:rPr>
-              <a:t>hide underlying complexity, varying semantics..</a:t>
-            </a:r>
-          </a:p>
-          <a:p>
-            <a:pPr marL="685800" marR="0" lvl="1" indent="-336550" algn="l" defTabSz="914400" rtl="0" eaLnBrk="1" fontAlgn="auto" latinLnBrk="0" hangingPunct="1">
-              <a:lnSpc>
-                <a:spcPct val="100000"/>
-              </a:lnSpc>
-              <a:spcBef>
-                <a:spcPts val="600"/>
-              </a:spcBef>
-              <a:spcAft>
-                <a:spcPts val="0"/>
-              </a:spcAft>
-              <a:buClr>
-                <a:schemeClr val="tx1">
-                  <a:lumMod val="95000"/>
-                  <a:lumOff val="5000"/>
-                </a:schemeClr>
-              </a:buClr>
-              <a:buSzTx/>
-              <a:buFont typeface="Arial"/>
-              <a:buChar char="•"/>
-              <a:tabLst/>
-              <a:defRPr/>
-            </a:pPr>
-            <a:r>
-              <a:rPr kumimoji="0" lang="en-US" sz="1700" b="0" i="0" u="none" strike="noStrike" kern="1200" cap="none" spc="0" normalizeH="0" baseline="0" noProof="0" dirty="0" smtClean="0">
-                <a:ln>
-                  <a:noFill/>
-                </a:ln>
-                <a:solidFill>
-                  <a:schemeClr val="accent5"/>
-                </a:solidFill>
-                <a:effectLst/>
-                <a:uLnTx/>
-                <a:uFillTx/>
-                <a:latin typeface="+mn-lt"/>
-                <a:ea typeface="+mn-ea"/>
-                <a:cs typeface="+mn-cs"/>
-              </a:rPr>
-              <a:t>The building blocks upon which to construct “consistent” higher-levels of functionality and abstractions</a:t>
-            </a:r>
-          </a:p>
-          <a:p>
-            <a:pPr marL="685800" marR="0" lvl="1" indent="-336550" algn="l" defTabSz="914400" rtl="0" eaLnBrk="1" fontAlgn="auto" latinLnBrk="0" hangingPunct="1">
-              <a:lnSpc>
-                <a:spcPct val="100000"/>
-              </a:lnSpc>
-              <a:spcBef>
-                <a:spcPts val="600"/>
-              </a:spcBef>
-              <a:spcAft>
-                <a:spcPts val="0"/>
-              </a:spcAft>
-              <a:buClr>
-                <a:schemeClr val="tx1">
-                  <a:lumMod val="95000"/>
-                  <a:lumOff val="5000"/>
-                </a:schemeClr>
-              </a:buClr>
-              <a:buSzTx/>
-              <a:buFont typeface="Arial"/>
-              <a:buChar char="•"/>
-              <a:tabLst/>
-              <a:defRPr/>
-            </a:pPr>
-            <a:r>
-              <a:rPr kumimoji="0" lang="en-US" sz="1700" b="0" i="0" u="none" strike="noStrike" kern="1200" cap="none" spc="0" normalizeH="0" baseline="0" noProof="0" dirty="0" smtClean="0">
-                <a:ln>
-                  <a:noFill/>
-                </a:ln>
-                <a:solidFill>
-                  <a:schemeClr val="accent5"/>
-                </a:solidFill>
-                <a:effectLst/>
-                <a:uLnTx/>
-                <a:uFillTx/>
-                <a:latin typeface="+mn-lt"/>
-                <a:ea typeface="+mn-ea"/>
-                <a:cs typeface="+mn-cs"/>
-              </a:rPr>
-              <a:t>Meets the need for a Broad Spectrum of Application: </a:t>
-            </a:r>
-          </a:p>
-          <a:p>
-            <a:pPr marL="1035050" marR="0" lvl="2" indent="-349250" algn="l" defTabSz="914400" rtl="0" eaLnBrk="1" fontAlgn="auto" latinLnBrk="0" hangingPunct="1">
-              <a:lnSpc>
-                <a:spcPct val="100000"/>
-              </a:lnSpc>
-              <a:spcBef>
-                <a:spcPts val="600"/>
-              </a:spcBef>
-              <a:spcAft>
-                <a:spcPts val="0"/>
-              </a:spcAft>
-              <a:buClr>
-                <a:schemeClr val="tx1">
-                  <a:lumMod val="75000"/>
-                  <a:lumOff val="25000"/>
-                </a:schemeClr>
-              </a:buClr>
-              <a:buSzTx/>
-              <a:buFont typeface="Arial"/>
-              <a:buChar char="•"/>
-              <a:tabLst/>
-              <a:defRPr/>
-            </a:pPr>
-            <a:r>
-              <a:rPr kumimoji="0" lang="en-US" sz="1700" b="0" i="0" u="none" strike="noStrike" kern="1200" cap="none" spc="0" normalizeH="0" baseline="0" noProof="0" dirty="0" smtClean="0">
-                <a:ln>
-                  <a:noFill/>
-                </a:ln>
-                <a:solidFill>
-                  <a:schemeClr val="tx1">
-                    <a:lumMod val="75000"/>
-                    <a:lumOff val="25000"/>
-                  </a:schemeClr>
-                </a:solidFill>
-                <a:effectLst/>
-                <a:uLnTx/>
-                <a:uFillTx/>
-                <a:latin typeface="+mn-lt"/>
-                <a:ea typeface="+mn-ea"/>
-                <a:cs typeface="+mn-cs"/>
-              </a:rPr>
-              <a:t>Simple scripts, Gateways, Smart Applications and Production Grade Tooling, Workflow…</a:t>
-            </a:r>
-          </a:p>
-          <a:p>
-            <a:pPr marL="342900" marR="0" lvl="0" indent="-342900" algn="l" defTabSz="914400" rtl="0" eaLnBrk="1" fontAlgn="auto" latinLnBrk="0" hangingPunct="1">
-              <a:lnSpc>
-                <a:spcPct val="100000"/>
-              </a:lnSpc>
-              <a:spcBef>
-                <a:spcPts val="2000"/>
-              </a:spcBef>
-              <a:spcAft>
-                <a:spcPts val="0"/>
-              </a:spcAft>
-              <a:buClr>
-                <a:schemeClr val="tx1">
-                  <a:lumMod val="75000"/>
-                  <a:lumOff val="25000"/>
-                </a:schemeClr>
-              </a:buClr>
-              <a:buSzTx/>
-              <a:buFont typeface="Wingdings 2" pitchFamily="18" charset="2"/>
-              <a:buChar char=""/>
-              <a:tabLst/>
-              <a:defRPr/>
-            </a:pPr>
-            <a:r>
-              <a:rPr kumimoji="0" lang="en-US" sz="1700" b="0" i="0" u="none" strike="noStrike" kern="1200" cap="none" spc="0" normalizeH="0" baseline="0" noProof="0" dirty="0" smtClean="0">
-                <a:ln>
-                  <a:noFill/>
-                </a:ln>
-                <a:solidFill>
-                  <a:schemeClr val="tx1">
-                    <a:lumMod val="65000"/>
-                    <a:lumOff val="35000"/>
-                  </a:schemeClr>
-                </a:solidFill>
-                <a:effectLst/>
-                <a:uLnTx/>
-                <a:uFillTx/>
-                <a:latin typeface="+mn-lt"/>
-                <a:ea typeface="+mn-ea"/>
-                <a:cs typeface="+mn-cs"/>
-              </a:rPr>
-              <a:t>Simple, integrated, stable, uniform and high-level interface</a:t>
-            </a:r>
-          </a:p>
-          <a:p>
-            <a:pPr marL="685800" marR="0" lvl="1" indent="-336550" algn="l" defTabSz="914400" rtl="0" eaLnBrk="1" fontAlgn="auto" latinLnBrk="0" hangingPunct="1">
-              <a:lnSpc>
-                <a:spcPct val="100000"/>
-              </a:lnSpc>
-              <a:spcBef>
-                <a:spcPts val="600"/>
-              </a:spcBef>
-              <a:spcAft>
-                <a:spcPts val="0"/>
-              </a:spcAft>
-              <a:buClr>
-                <a:schemeClr val="tx1">
-                  <a:lumMod val="95000"/>
-                  <a:lumOff val="5000"/>
-                </a:schemeClr>
-              </a:buClr>
-              <a:buSzTx/>
-              <a:buFont typeface="Arial"/>
-              <a:buChar char="•"/>
-              <a:tabLst/>
-              <a:defRPr/>
-            </a:pPr>
-            <a:r>
-              <a:rPr kumimoji="0" lang="en-US" sz="1700" b="0" i="0" u="none" strike="noStrike" kern="1200" cap="none" spc="0" normalizeH="0" baseline="0" noProof="0" dirty="0" smtClean="0">
-                <a:ln>
-                  <a:noFill/>
-                </a:ln>
-                <a:solidFill>
-                  <a:schemeClr val="accent5"/>
-                </a:solidFill>
-                <a:effectLst/>
-                <a:uLnTx/>
-                <a:uFillTx/>
-                <a:latin typeface="+mn-lt"/>
-                <a:ea typeface="+mn-ea"/>
-                <a:cs typeface="+mn-cs"/>
-              </a:rPr>
-              <a:t>Simple and Stable: 80:20 restricted scope and </a:t>
-            </a:r>
-            <a:r>
-              <a:rPr kumimoji="0" lang="en-US" sz="1700" b="1" i="0" u="none" strike="noStrike" kern="1200" cap="none" spc="0" normalizeH="0" baseline="0" noProof="0" dirty="0" smtClean="0">
-                <a:ln>
-                  <a:noFill/>
-                </a:ln>
-                <a:solidFill>
-                  <a:srgbClr val="800000"/>
-                </a:solidFill>
-                <a:effectLst/>
-                <a:uLnTx/>
-                <a:uFillTx/>
-                <a:latin typeface="+mn-lt"/>
-                <a:ea typeface="+mn-ea"/>
-                <a:cs typeface="+mn-cs"/>
-              </a:rPr>
-              <a:t>Standard</a:t>
-            </a:r>
-          </a:p>
-          <a:p>
-            <a:pPr marL="685800" marR="0" lvl="1" indent="-336550" algn="l" defTabSz="914400" rtl="0" eaLnBrk="1" fontAlgn="auto" latinLnBrk="0" hangingPunct="1">
-              <a:lnSpc>
-                <a:spcPct val="100000"/>
-              </a:lnSpc>
-              <a:spcBef>
-                <a:spcPts val="600"/>
-              </a:spcBef>
-              <a:spcAft>
-                <a:spcPts val="0"/>
-              </a:spcAft>
-              <a:buClr>
-                <a:schemeClr val="tx1">
-                  <a:lumMod val="95000"/>
-                  <a:lumOff val="5000"/>
-                </a:schemeClr>
-              </a:buClr>
-              <a:buSzTx/>
-              <a:buFont typeface="Arial"/>
-              <a:buChar char="•"/>
-              <a:tabLst/>
-              <a:defRPr/>
-            </a:pPr>
-            <a:r>
-              <a:rPr kumimoji="0" lang="en-US" sz="1700" b="0" i="0" u="none" strike="noStrike" kern="1200" cap="none" spc="0" normalizeH="0" baseline="0" noProof="0" dirty="0" smtClean="0">
-                <a:ln>
-                  <a:noFill/>
-                </a:ln>
-                <a:solidFill>
-                  <a:schemeClr val="accent5"/>
-                </a:solidFill>
-                <a:effectLst/>
-                <a:uLnTx/>
-                <a:uFillTx/>
-                <a:latin typeface="+mn-lt"/>
-                <a:ea typeface="+mn-ea"/>
-                <a:cs typeface="+mn-cs"/>
-              </a:rPr>
-              <a:t>Integrated: Similar semantics &amp; style across</a:t>
-            </a:r>
-          </a:p>
-          <a:p>
-            <a:pPr marL="685800" marR="0" lvl="1" indent="-336550" algn="l" defTabSz="914400" rtl="0" eaLnBrk="1" fontAlgn="auto" latinLnBrk="0" hangingPunct="1">
-              <a:lnSpc>
-                <a:spcPct val="100000"/>
-              </a:lnSpc>
-              <a:spcBef>
-                <a:spcPts val="600"/>
-              </a:spcBef>
-              <a:spcAft>
-                <a:spcPts val="0"/>
-              </a:spcAft>
-              <a:buClr>
-                <a:schemeClr val="tx1">
-                  <a:lumMod val="95000"/>
-                  <a:lumOff val="5000"/>
-                </a:schemeClr>
-              </a:buClr>
-              <a:buSzTx/>
-              <a:buFont typeface="Arial"/>
-              <a:buChar char="•"/>
-              <a:tabLst/>
-              <a:defRPr/>
-            </a:pPr>
-            <a:r>
-              <a:rPr kumimoji="0" lang="en-US" sz="1700" b="0" i="0" u="none" strike="noStrike" kern="1200" cap="none" spc="0" normalizeH="0" baseline="0" noProof="0" dirty="0" smtClean="0">
-                <a:ln>
-                  <a:noFill/>
-                </a:ln>
-                <a:solidFill>
-                  <a:schemeClr val="accent5"/>
-                </a:solidFill>
-                <a:effectLst/>
-                <a:uLnTx/>
-                <a:uFillTx/>
-                <a:latin typeface="+mn-lt"/>
-                <a:ea typeface="+mn-ea"/>
-                <a:cs typeface="+mn-cs"/>
-              </a:rPr>
-              <a:t>Uniform: Same interface for different distributed systems</a:t>
-            </a:r>
-          </a:p>
-          <a:p>
-            <a:pPr marL="342900" marR="0" lvl="0" indent="-342900" algn="l" defTabSz="914400" rtl="0" eaLnBrk="1" fontAlgn="auto" latinLnBrk="0" hangingPunct="1">
-              <a:lnSpc>
-                <a:spcPct val="100000"/>
-              </a:lnSpc>
-              <a:spcBef>
-                <a:spcPts val="2000"/>
-              </a:spcBef>
-              <a:spcAft>
-                <a:spcPts val="0"/>
-              </a:spcAft>
-              <a:buClr>
-                <a:schemeClr val="tx1">
-                  <a:lumMod val="75000"/>
-                  <a:lumOff val="25000"/>
-                </a:schemeClr>
-              </a:buClr>
-              <a:buSzTx/>
-              <a:buFont typeface="Wingdings 2" pitchFamily="18" charset="2"/>
-              <a:buChar char=""/>
-              <a:tabLst/>
-              <a:defRPr/>
-            </a:pPr>
-            <a:r>
-              <a:rPr kumimoji="0" lang="en-US" sz="1700" b="0" i="0" u="none" strike="noStrike" kern="1200" cap="none" spc="0" normalizeH="0" baseline="0" noProof="0" dirty="0" smtClean="0">
-                <a:ln>
-                  <a:noFill/>
-                </a:ln>
-                <a:solidFill>
-                  <a:schemeClr val="tx1">
-                    <a:lumMod val="65000"/>
-                    <a:lumOff val="35000"/>
-                  </a:schemeClr>
-                </a:solidFill>
-                <a:effectLst/>
-                <a:uLnTx/>
-                <a:uFillTx/>
-                <a:latin typeface="+mn-lt"/>
-                <a:ea typeface="+mn-ea"/>
-                <a:cs typeface="+mn-cs"/>
-              </a:rPr>
-              <a:t>SAGA: Provides Application* developers with units required to compose high-level functionality across (distinct) distributed systems</a:t>
-            </a:r>
-          </a:p>
-          <a:p>
-            <a:pPr marL="685800" marR="0" lvl="1" indent="-336550" algn="l" defTabSz="914400" rtl="0" eaLnBrk="1" fontAlgn="auto" latinLnBrk="0" hangingPunct="1">
-              <a:lnSpc>
-                <a:spcPct val="100000"/>
-              </a:lnSpc>
-              <a:spcBef>
-                <a:spcPts val="600"/>
-              </a:spcBef>
-              <a:spcAft>
-                <a:spcPts val="0"/>
-              </a:spcAft>
-              <a:buClr>
-                <a:schemeClr val="tx1">
-                  <a:lumMod val="95000"/>
-                  <a:lumOff val="5000"/>
-                </a:schemeClr>
-              </a:buClr>
-              <a:buSzTx/>
-              <a:tabLst/>
-              <a:defRPr/>
-            </a:pPr>
-            <a:r>
-              <a:rPr kumimoji="0" lang="en-US" sz="1700" b="0" i="0" u="none" strike="noStrike" kern="1200" cap="none" spc="0" normalizeH="0" baseline="0" noProof="0" dirty="0" smtClean="0">
-                <a:ln>
-                  <a:noFill/>
-                </a:ln>
-                <a:solidFill>
-                  <a:schemeClr val="accent5"/>
-                </a:solidFill>
-                <a:effectLst/>
-                <a:uLnTx/>
-                <a:uFillTx/>
-                <a:latin typeface="+mn-lt"/>
-                <a:ea typeface="+mn-ea"/>
-                <a:cs typeface="+mn-cs"/>
-              </a:rPr>
-              <a:t>    (*) One Person’s Application is another Person’s Tool</a:t>
-            </a:r>
-            <a:endParaRPr kumimoji="0" lang="en-US" sz="1700" b="0" i="0" u="none" strike="noStrike" kern="1200" cap="none" spc="0" normalizeH="0" baseline="0" noProof="0" dirty="0">
-              <a:ln>
-                <a:noFill/>
-              </a:ln>
-              <a:solidFill>
-                <a:schemeClr val="accent5"/>
-              </a:solidFill>
-              <a:effectLst/>
-              <a:uLnTx/>
-              <a:uFillTx/>
-              <a:latin typeface="+mn-lt"/>
-              <a:ea typeface="+mn-ea"/>
-              <a:cs typeface="+mn-cs"/>
-            </a:endParaRPr>
-          </a:p>
-        </p:txBody>
-      </p:sp>
-    </p:spTree>
-  </p:cSld>
-  <p:clrMapOvr>
-    <a:masterClrMapping/>
-  </p:clrMapOvr>
-  <p:transition/>
-  <p:timing>
-    <p:tnLst>
-      <p:par>
-        <p:cTn id="1" dur="indefinite" restart="never" nodeType="tmRoot"/>
-      </p:par>
-    </p:tnLst>
-  </p:timing>
-</p:sld>
-</file>
-
-<file path=ppt/slides/slide13.xml><?xml version="1.0" encoding="utf-8"?>
-<p:sld xmlns:a="http://schemas.openxmlformats.org/drawingml/2006/main" xmlns:r="http://schemas.openxmlformats.org/officeDocument/2006/relationships" xmlns:mc="http://schemas.openxmlformats.org/markup-compatibility/2006" xmlns:mv="urn:schemas-microsoft-com:mac:vml" xmlns:p="http://schemas.openxmlformats.org/presentationml/2006/main" mc:Ignorable="mv" mc:PreserveAttributes="mv:*">
-  <p:cSld>
-    <p:spTree>
-      <p:nvGrpSpPr>
-        <p:cNvPr id="1" name=""/>
-        <p:cNvGrpSpPr/>
-        <p:nvPr/>
-      </p:nvGrpSpPr>
-      <p:grpSpPr>
-        <a:xfrm>
-          <a:off x="0" y="0"/>
-          <a:ext cx="0" cy="0"/>
-          <a:chOff x="0" y="0"/>
-          <a:chExt cx="0" cy="0"/>
-        </a:xfrm>
-      </p:grpSpPr>
-      <p:sp>
-        <p:nvSpPr>
-          <p:cNvPr id="2" name="Title 1"/>
-          <p:cNvSpPr>
-            <a:spLocks noGrp="1"/>
-          </p:cNvSpPr>
-          <p:nvPr>
-            <p:ph type="title"/>
-          </p:nvPr>
-        </p:nvSpPr>
-        <p:spPr/>
-        <p:txBody>
-          <a:bodyPr/>
-          <a:lstStyle/>
-          <a:p>
-            <a:r>
-              <a:rPr lang="en-US" dirty="0" smtClean="0"/>
-              <a:t>SAGA: Architecture</a:t>
-            </a:r>
-            <a:endParaRPr lang="en-US" dirty="0"/>
-          </a:p>
-        </p:txBody>
-      </p:sp>
-      <p:pic>
-        <p:nvPicPr>
-          <p:cNvPr id="4" name="Content Placeholder 3" descr="saga-architecture.png"/>
-          <p:cNvPicPr>
-            <a:picLocks noGrp="1" noChangeAspect="1"/>
-          </p:cNvPicPr>
-          <p:nvPr>
-            <p:ph idx="1"/>
-          </p:nvPr>
-        </p:nvPicPr>
-        <p:blipFill>
-          <a:blip r:embed="rId2"/>
-          <a:srcRect t="-1090" b="-1090"/>
-          <a:stretch>
-            <a:fillRect/>
-          </a:stretch>
-        </p:blipFill>
-        <p:spPr/>
-      </p:pic>
-    </p:spTree>
-  </p:cSld>
-  <p:clrMapOvr>
-    <a:masterClrMapping/>
-  </p:clrMapOvr>
-  <p:transition/>
-  <p:timing>
-    <p:tnLst>
-      <p:par>
-        <p:cTn id="1" dur="indefinite" restart="never" nodeType="tmRoot"/>
-      </p:par>
-    </p:tnLst>
-  </p:timing>
-</p:sld>
-</file>
-
-<file path=ppt/slides/slide14.xml><?xml version="1.0" encoding="utf-8"?>
-<p:sld xmlns:a="http://schemas.openxmlformats.org/drawingml/2006/main" xmlns:r="http://schemas.openxmlformats.org/officeDocument/2006/relationships" xmlns:mc="http://schemas.openxmlformats.org/markup-compatibility/2006" xmlns:mv="urn:schemas-microsoft-com:mac:vml" xmlns:p="http://schemas.openxmlformats.org/presentationml/2006/main" mc:Ignorable="mv" mc:PreserveAttributes="mv:*">
-  <p:cSld>
-    <p:spTree>
-      <p:nvGrpSpPr>
-        <p:cNvPr id="1" name=""/>
-        <p:cNvGrpSpPr/>
-        <p:nvPr/>
-      </p:nvGrpSpPr>
-      <p:grpSpPr>
-        <a:xfrm>
-          <a:off x="0" y="0"/>
-          <a:ext cx="0" cy="0"/>
-          <a:chOff x="0" y="0"/>
-          <a:chExt cx="0" cy="0"/>
-        </a:xfrm>
-      </p:grpSpPr>
-      <p:sp>
-        <p:nvSpPr>
-          <p:cNvPr id="2" name="Title 1"/>
-          <p:cNvSpPr>
-            <a:spLocks noGrp="1"/>
-          </p:cNvSpPr>
-          <p:nvPr>
-            <p:ph type="title"/>
-          </p:nvPr>
-        </p:nvSpPr>
-        <p:spPr/>
-        <p:txBody>
-          <a:bodyPr>
-            <a:noAutofit/>
-          </a:bodyPr>
-          <a:lstStyle/>
-          <a:p>
-            <a:r>
-              <a:rPr lang="en-US" sz="2600" dirty="0" smtClean="0"/>
-              <a:t>Abstractions for Dynamic Execution SAGA Pilot-Job (</a:t>
-            </a:r>
-            <a:r>
-              <a:rPr lang="en-US" sz="2600" dirty="0" err="1" smtClean="0"/>
-              <a:t>BigJob</a:t>
-            </a:r>
-            <a:r>
-              <a:rPr lang="en-US" sz="2600" dirty="0" smtClean="0"/>
-              <a:t>)</a:t>
-            </a:r>
-            <a:endParaRPr lang="en-US" sz="2600" dirty="0"/>
-          </a:p>
-        </p:txBody>
-      </p:sp>
-      <p:pic>
-        <p:nvPicPr>
-          <p:cNvPr id="4" name="Content Placeholder 3" descr="bigjob.png"/>
-          <p:cNvPicPr>
-            <a:picLocks noGrp="1" noChangeAspect="1"/>
-          </p:cNvPicPr>
-          <p:nvPr>
-            <p:ph idx="1"/>
-          </p:nvPr>
-        </p:nvPicPr>
-        <p:blipFill>
-          <a:blip r:embed="rId2"/>
-          <a:srcRect l="-2356" r="-2356"/>
-          <a:stretch>
-            <a:fillRect/>
-          </a:stretch>
-        </p:blipFill>
-        <p:spPr/>
-      </p:pic>
-    </p:spTree>
-  </p:cSld>
-  <p:clrMapOvr>
-    <a:masterClrMapping/>
-  </p:clrMapOvr>
-  <p:timing>
-    <p:tnLst>
-      <p:par>
-        <p:cTn id="1" dur="indefinite" restart="never" nodeType="tmRoot"/>
-      </p:par>
-    </p:tnLst>
-  </p:timing>
-</p:sld>
-</file>
-
-<file path=ppt/slides/slide15.xml><?xml version="1.0" encoding="utf-8"?>
-<p:sld xmlns:a="http://schemas.openxmlformats.org/drawingml/2006/main" xmlns:r="http://schemas.openxmlformats.org/officeDocument/2006/relationships" xmlns:mc="http://schemas.openxmlformats.org/markup-compatibility/2006" xmlns:mv="urn:schemas-microsoft-com:mac:vml" xmlns:p="http://schemas.openxmlformats.org/presentationml/2006/main" mc:Ignorable="mv" mc:PreserveAttributes="mv:*">
-  <p:cSld>
-    <p:spTree>
-      <p:nvGrpSpPr>
-        <p:cNvPr id="1" name=""/>
-        <p:cNvGrpSpPr/>
-        <p:nvPr/>
-      </p:nvGrpSpPr>
-      <p:grpSpPr>
-        <a:xfrm>
-          <a:off x="0" y="0"/>
-          <a:ext cx="0" cy="0"/>
-          <a:chOff x="0" y="0"/>
-          <a:chExt cx="0" cy="0"/>
-        </a:xfrm>
-      </p:grpSpPr>
-      <p:sp>
-        <p:nvSpPr>
           <p:cNvPr id="2" name="Title 1"/>
           <p:cNvSpPr>
             <a:spLocks noGrp="1"/>
@@ -11333,7 +9777,7 @@
 </p:sld>
 </file>
 
-<file path=ppt/slides/slide16.xml><?xml version="1.0" encoding="utf-8"?>
+<file path=ppt/slides/slide12.xml><?xml version="1.0" encoding="utf-8"?>
 <p:sld xmlns:a="http://schemas.openxmlformats.org/drawingml/2006/main" xmlns:r="http://schemas.openxmlformats.org/officeDocument/2006/relationships" xmlns:mc="http://schemas.openxmlformats.org/markup-compatibility/2006" xmlns:mv="urn:schemas-microsoft-com:mac:vml" xmlns:p="http://schemas.openxmlformats.org/presentationml/2006/main" mc:Ignorable="mv" mc:PreserveAttributes="mv:*">
   <p:cSld>
     <p:spTree>
@@ -11496,7 +9940,7 @@
 </p:sld>
 </file>
 
-<file path=ppt/slides/slide17.xml><?xml version="1.0" encoding="utf-8"?>
+<file path=ppt/slides/slide13.xml><?xml version="1.0" encoding="utf-8"?>
 <p:sld xmlns:a="http://schemas.openxmlformats.org/drawingml/2006/main" xmlns:r="http://schemas.openxmlformats.org/officeDocument/2006/relationships" xmlns:mc="http://schemas.openxmlformats.org/markup-compatibility/2006" xmlns:mv="urn:schemas-microsoft-com:mac:vml" xmlns:p="http://schemas.openxmlformats.org/presentationml/2006/main" mc:Ignorable="mv" mc:PreserveAttributes="mv:*">
   <p:cSld>
     <p:spTree>
@@ -11744,7 +10188,7 @@
 </p:sld>
 </file>
 
-<file path=ppt/slides/slide18.xml><?xml version="1.0" encoding="utf-8"?>
+<file path=ppt/slides/slide14.xml><?xml version="1.0" encoding="utf-8"?>
 <p:sld xmlns:a="http://schemas.openxmlformats.org/drawingml/2006/main" xmlns:r="http://schemas.openxmlformats.org/officeDocument/2006/relationships" xmlns:mc="http://schemas.openxmlformats.org/markup-compatibility/2006" xmlns:mv="urn:schemas-microsoft-com:mac:vml" xmlns:p="http://schemas.openxmlformats.org/presentationml/2006/main" mc:Ignorable="mv" mc:PreserveAttributes="mv:*">
   <p:cSld>
     <p:spTree>
@@ -12037,7 +10481,7 @@
 </p:sld>
 </file>
 
-<file path=ppt/slides/slide19.xml><?xml version="1.0" encoding="utf-8"?>
+<file path=ppt/slides/slide15.xml><?xml version="1.0" encoding="utf-8"?>
 <p:sld xmlns:a="http://schemas.openxmlformats.org/drawingml/2006/main" xmlns:r="http://schemas.openxmlformats.org/officeDocument/2006/relationships" xmlns:mc="http://schemas.openxmlformats.org/markup-compatibility/2006" xmlns:mv="urn:schemas-microsoft-com:mac:vml" xmlns:p="http://schemas.openxmlformats.org/presentationml/2006/main" mc:Ignorable="mv" mc:PreserveAttributes="mv:*">
   <p:cSld>
     <p:spTree>
@@ -12103,7 +10547,7 @@
           <a:p>
             <a:r>
               <a:rPr lang="en-US" dirty="0" smtClean="0"/>
-              <a:t>Amazon EC2 has the highest fluctuation in the startup time (from all cloud resources)</a:t>
+              <a:t>Amazon EC2 has the highest fluctuation in the startup time (of all cloud resources)</a:t>
             </a:r>
           </a:p>
           <a:p>
@@ -12130,16 +10574,28 @@
           <a:lstStyle/>
           <a:p>
             <a:r>
+              <a:rPr lang="de-DE" dirty="0" smtClean="0"/>
+              <a:t>Pilot-Job </a:t>
+            </a:r>
+            <a:r>
+              <a:rPr lang="de-DE" dirty="0" err="1" smtClean="0"/>
+              <a:t>for</a:t>
+            </a:r>
+            <a:r>
+              <a:rPr lang="de-DE" dirty="0" smtClean="0"/>
+              <a:t> </a:t>
+            </a:r>
+            <a:r>
+              <a:rPr lang="de-DE" dirty="0" err="1" smtClean="0"/>
+              <a:t>Azure</a:t>
+            </a:r>
+            <a:r>
+              <a:rPr lang="de-DE" dirty="0" smtClean="0"/>
+              <a:t>: SAGA </a:t>
+            </a:r>
+            <a:r>
               <a:rPr lang="de-DE" dirty="0" err="1" smtClean="0"/>
               <a:t>BigJob</a:t>
-            </a:r>
-            <a:r>
-              <a:rPr lang="de-DE" dirty="0" smtClean="0"/>
-              <a:t> on </a:t>
-            </a:r>
-            <a:r>
-              <a:rPr lang="de-DE" dirty="0" err="1" smtClean="0"/>
-              <a:t>Azure</a:t>
             </a:r>
             <a:endParaRPr lang="de-DE" dirty="0"/>
           </a:p>
@@ -12308,7 +10764,7 @@
 </p:sld>
 </file>
 
-<file path=ppt/slides/slide2.xml><?xml version="1.0" encoding="utf-8"?>
+<file path=ppt/slides/slide16.xml><?xml version="1.0" encoding="utf-8"?>
 <p:sld xmlns:a="http://schemas.openxmlformats.org/drawingml/2006/main" xmlns:r="http://schemas.openxmlformats.org/officeDocument/2006/relationships" xmlns:mc="http://schemas.openxmlformats.org/markup-compatibility/2006" xmlns:mv="urn:schemas-microsoft-com:mac:vml" xmlns:p="http://schemas.openxmlformats.org/presentationml/2006/main" mc:Ignorable="mv" mc:PreserveAttributes="mv:*">
   <p:cSld>
     <p:spTree>
@@ -12327,170 +10783,6 @@
       </p:grpSpPr>
       <p:sp>
         <p:nvSpPr>
-          <p:cNvPr id="15362" name="Title 1"/>
-          <p:cNvSpPr>
-            <a:spLocks noGrp="1"/>
-          </p:cNvSpPr>
-          <p:nvPr>
-            <p:ph type="title"/>
-          </p:nvPr>
-        </p:nvSpPr>
-        <p:spPr/>
-        <p:txBody>
-          <a:bodyPr/>
-          <a:lstStyle/>
-          <a:p>
-            <a:r>
-              <a:rPr lang="en-US" dirty="0" smtClean="0"/>
-              <a:t>Overview</a:t>
-            </a:r>
-          </a:p>
-        </p:txBody>
-      </p:sp>
-      <p:sp>
-        <p:nvSpPr>
-          <p:cNvPr id="15363" name="Content Placeholder 2"/>
-          <p:cNvSpPr>
-            <a:spLocks noGrp="1"/>
-          </p:cNvSpPr>
-          <p:nvPr>
-            <p:ph idx="1"/>
-          </p:nvPr>
-        </p:nvSpPr>
-        <p:spPr/>
-        <p:txBody>
-          <a:bodyPr>
-            <a:normAutofit lnSpcReduction="10000"/>
-          </a:bodyPr>
-          <a:lstStyle/>
-          <a:p>
-            <a:r>
-              <a:rPr lang="en-US" dirty="0" smtClean="0"/>
-              <a:t>Introduction: Understanding Distributed Abstractions</a:t>
-            </a:r>
-          </a:p>
-          <a:p>
-            <a:pPr lvl="1"/>
-            <a:r>
-              <a:rPr lang="en-US" dirty="0" smtClean="0"/>
-              <a:t>Introduce IDEAS as minimal set of DA Design Objective</a:t>
-            </a:r>
-          </a:p>
-          <a:p>
-            <a:r>
-              <a:rPr lang="en-US" dirty="0" smtClean="0"/>
-              <a:t>SAGA, Pilot-Jobs and SAGA </a:t>
-            </a:r>
-            <a:r>
-              <a:rPr lang="en-US" dirty="0" err="1" smtClean="0"/>
-              <a:t>BigJob</a:t>
-            </a:r>
-            <a:endParaRPr lang="en-US" dirty="0" smtClean="0"/>
-          </a:p>
-          <a:p>
-            <a:pPr lvl="1"/>
-            <a:r>
-              <a:rPr lang="en-US" dirty="0" smtClean="0"/>
-              <a:t>Abstractions for dynamic executions</a:t>
-            </a:r>
-          </a:p>
-          <a:p>
-            <a:pPr lvl="1"/>
-            <a:r>
-              <a:rPr lang="en-US" dirty="0" smtClean="0"/>
-              <a:t>Pilot-Job: Power of “right” Abstractions</a:t>
-            </a:r>
-          </a:p>
-          <a:p>
-            <a:pPr lvl="1"/>
-            <a:r>
-              <a:rPr lang="en-US" dirty="0" smtClean="0"/>
-              <a:t>Interoperability is the starting point</a:t>
-            </a:r>
-          </a:p>
-          <a:p>
-            <a:r>
-              <a:rPr lang="en-US" dirty="0" err="1" smtClean="0"/>
-              <a:t>EnMD</a:t>
-            </a:r>
-            <a:r>
-              <a:rPr lang="en-US" dirty="0" smtClean="0"/>
-              <a:t> and RE Simulations</a:t>
-            </a:r>
-          </a:p>
-          <a:p>
-            <a:pPr lvl="1"/>
-            <a:r>
-              <a:rPr lang="en-US" dirty="0" smtClean="0"/>
-              <a:t>Free Energy Calculation (</a:t>
-            </a:r>
-            <a:r>
-              <a:rPr lang="en-US" dirty="0" err="1" smtClean="0"/>
-              <a:t>e.g</a:t>
-            </a:r>
-            <a:r>
-              <a:rPr lang="en-US" dirty="0" smtClean="0"/>
-              <a:t> replica-exchange) using bio-molecular simulations for range of biophysical and personalized medicine</a:t>
-            </a:r>
-          </a:p>
-          <a:p>
-            <a:r>
-              <a:rPr lang="en-US" dirty="0" err="1" smtClean="0"/>
-              <a:t>BigJob</a:t>
-            </a:r>
-            <a:r>
-              <a:rPr lang="en-US" dirty="0" smtClean="0"/>
-              <a:t> on Azure: Architecture, Performance and Scalability</a:t>
-            </a:r>
-          </a:p>
-          <a:p>
-            <a:pPr lvl="1"/>
-            <a:r>
-              <a:rPr lang="en-US" dirty="0" smtClean="0"/>
-              <a:t>Utilizing Azure’s </a:t>
-            </a:r>
-            <a:r>
-              <a:rPr lang="en-US" smtClean="0"/>
-              <a:t>native abstractions</a:t>
-            </a:r>
-            <a:endParaRPr lang="en-US" dirty="0" smtClean="0"/>
-          </a:p>
-        </p:txBody>
-      </p:sp>
-    </p:spTree>
-  </p:cSld>
-  <p:clrMapOvr>
-    <a:masterClrMapping/>
-  </p:clrMapOvr>
-  <p:timing>
-    <p:tnLst>
-      <p:par>
-        <p:cTn id="1" dur="indefinite" restart="never" nodeType="tmRoot"/>
-      </p:par>
-    </p:tnLst>
-  </p:timing>
-</p:sld>
-</file>
-
-<file path=ppt/slides/slide20.xml><?xml version="1.0" encoding="utf-8"?>
-<p:sld xmlns:a="http://schemas.openxmlformats.org/drawingml/2006/main" xmlns:r="http://schemas.openxmlformats.org/officeDocument/2006/relationships" xmlns:mc="http://schemas.openxmlformats.org/markup-compatibility/2006" xmlns:mv="urn:schemas-microsoft-com:mac:vml" xmlns:p="http://schemas.openxmlformats.org/presentationml/2006/main" mc:Ignorable="mv" mc:PreserveAttributes="mv:*">
-  <p:cSld>
-    <p:spTree>
-      <p:nvGrpSpPr>
-        <p:cNvPr id="1" name=""/>
-        <p:cNvGrpSpPr/>
-        <p:nvPr/>
-      </p:nvGrpSpPr>
-      <p:grpSpPr>
-        <a:xfrm>
-          <a:off x="0" y="0"/>
-          <a:ext cx="0" cy="0"/>
-          <a:chOff x="0" y="0"/>
-          <a:chExt cx="0" cy="0"/>
-        </a:xfrm>
-      </p:grpSpPr>
-      <p:sp>
-        <p:nvSpPr>
           <p:cNvPr id="6" name="Inhaltsplatzhalter 5"/>
           <p:cNvSpPr>
             <a:spLocks noGrp="1"/>
@@ -12501,19 +10793,19 @@
         </p:nvSpPr>
         <p:spPr>
           <a:xfrm>
-            <a:off x="757947" y="1529880"/>
+            <a:off x="757947" y="1212380"/>
             <a:ext cx="4029953" cy="4608884"/>
           </a:xfrm>
         </p:spPr>
         <p:txBody>
           <a:bodyPr>
-            <a:normAutofit fontScale="92500" lnSpcReduction="20000"/>
+            <a:noAutofit/>
           </a:bodyPr>
           <a:lstStyle/>
           <a:p>
             <a:r>
               <a:rPr lang="en-US" dirty="0" smtClean="0"/>
-              <a:t>Replica-Exchange has been ported to </a:t>
+              <a:t>Azure </a:t>
             </a:r>
             <a:r>
               <a:rPr lang="en-US" dirty="0" err="1" smtClean="0"/>
@@ -12521,28 +10813,14 @@
             </a:r>
             <a:r>
               <a:rPr lang="en-US" dirty="0" smtClean="0"/>
-              <a:t> Azure</a:t>
-            </a:r>
-          </a:p>
-          <a:p>
-            <a:r>
-              <a:rPr lang="en-US" dirty="0" smtClean="0"/>
-              <a:t>Azure </a:t>
-            </a:r>
-            <a:r>
-              <a:rPr lang="en-US" dirty="0" err="1" smtClean="0"/>
-              <a:t>BigJob</a:t>
-            </a:r>
-            <a:r>
-              <a:rPr lang="en-US" dirty="0" smtClean="0"/>
               <a:t> scales well with the number of replicas. </a:t>
             </a:r>
           </a:p>
           <a:p>
             <a:pPr lvl="1"/>
             <a:r>
-              <a:rPr lang="en-US" dirty="0" smtClean="0"/>
-              <a:t>Azure Queues proved to be effective for coordination of sub-jobs</a:t>
+              <a:rPr lang="en-US" sz="2000" dirty="0" smtClean="0"/>
+              <a:t>AQS proved to be effective for coordination of sub-jobs/replicas</a:t>
             </a:r>
           </a:p>
           <a:p>
@@ -12556,21 +10834,13 @@
             </a:r>
             <a:r>
               <a:rPr lang="en-US" dirty="0" smtClean="0"/>
-              <a:t> have a better performance. But, efficiency drops &lt;0.4 for the extra-large VM</a:t>
+              <a:t> have a better performance. But, efficiency drops &lt; 0.4 for the extra-large VM</a:t>
             </a:r>
           </a:p>
           <a:p>
             <a:r>
               <a:rPr lang="en-US" dirty="0" smtClean="0"/>
-              <a:t>The different Azure data centers show a slight fluctuation </a:t>
-            </a:r>
-            <a:r>
-              <a:rPr lang="en-US" smtClean="0"/>
-              <a:t>in their </a:t>
-            </a:r>
-            <a:r>
-              <a:rPr lang="en-US" dirty="0" smtClean="0"/>
-              <a:t>performance</a:t>
+              <a:t>The different Azure data centers show a slight fluctuation in their performance</a:t>
             </a:r>
             <a:endParaRPr lang="en-US" dirty="0"/>
           </a:p>
@@ -12683,7 +10953,7 @@
 </p:sld>
 </file>
 
-<file path=ppt/slides/slide21.xml><?xml version="1.0" encoding="utf-8"?>
+<file path=ppt/slides/slide17.xml><?xml version="1.0" encoding="utf-8"?>
 <p:sld xmlns:a="http://schemas.openxmlformats.org/drawingml/2006/main" xmlns:r="http://schemas.openxmlformats.org/officeDocument/2006/relationships" xmlns:mc="http://schemas.openxmlformats.org/markup-compatibility/2006" xmlns:mv="urn:schemas-microsoft-com:mac:vml" xmlns:p="http://schemas.openxmlformats.org/presentationml/2006/main" mc:Ignorable="mv" mc:PreserveAttributes="mv:*">
   <p:cSld>
     <p:spTree>
@@ -12758,6 +11028,44 @@
             </a:r>
           </a:p>
           <a:p>
+            <a:pPr lvl="1"/>
+            <a:r>
+              <a:rPr lang="en-US" sz="1700" dirty="0" smtClean="0"/>
+              <a:t>Confuse Functionality with Usability</a:t>
+            </a:r>
+          </a:p>
+          <a:p>
+            <a:pPr lvl="2"/>
+            <a:r>
+              <a:rPr lang="en-US" sz="1700" dirty="0" smtClean="0"/>
+              <a:t>Simplicity is the Ultimate Sophistication:  </a:t>
+            </a:r>
+            <a:r>
+              <a:rPr lang="en-US" sz="1700" i="1" dirty="0" smtClean="0"/>
+              <a:t>“It seems that perfection is attained not when there remains nothing to add, but when there remains nothing to remove</a:t>
+            </a:r>
+            <a:r>
+              <a:rPr lang="en-US" sz="1700" dirty="0" smtClean="0"/>
+              <a:t>”</a:t>
+            </a:r>
+          </a:p>
+          <a:p>
+            <a:pPr lvl="2"/>
+            <a:r>
+              <a:rPr lang="en-US" sz="1600" dirty="0" smtClean="0"/>
+              <a:t>Community busy agenda pushing, </a:t>
+            </a:r>
+            <a:r>
+              <a:rPr lang="en-US" sz="1600" dirty="0" err="1" smtClean="0"/>
+              <a:t>e.g</a:t>
+            </a:r>
+            <a:r>
+              <a:rPr lang="en-US" sz="1600" dirty="0" smtClean="0"/>
+              <a:t>, middleware/software stacks, most innovation in DC has come from  commercial sector!</a:t>
+            </a:r>
+            <a:endParaRPr lang="en-US" sz="1500" dirty="0" smtClean="0"/>
+          </a:p>
+          <a:p>
             <a:pPr lvl="0">
               <a:buClr>
                 <a:prstClr val="black">
@@ -12780,93 +11088,16 @@
             <a:endParaRPr lang="en-US" sz="1700" dirty="0" smtClean="0"/>
           </a:p>
           <a:p>
-            <a:pPr lvl="1"/>
+            <a:pPr lvl="2"/>
             <a:r>
               <a:rPr lang="en-US" sz="1700" dirty="0" smtClean="0"/>
-              <a:t>Community busy agenda pushing, </a:t>
-            </a:r>
-            <a:r>
-              <a:rPr lang="en-US" sz="1700" dirty="0" err="1" smtClean="0"/>
-              <a:t>e.g</a:t>
-            </a:r>
-            <a:r>
-              <a:rPr lang="en-US" sz="1700" dirty="0" smtClean="0"/>
-              <a:t>, middleware/software stacks, most innovation in DC has come from  commercial sector!</a:t>
-            </a:r>
-          </a:p>
-          <a:p>
-            <a:pPr lvl="2"/>
-            <a:r>
-              <a:rPr lang="en-US" sz="1700" dirty="0" smtClean="0"/>
-              <a:t>Infrastructure, Algorithmic &amp; Development</a:t>
-            </a:r>
-          </a:p>
-          <a:p>
-            <a:pPr lvl="2"/>
-            <a:r>
-              <a:rPr lang="en-US" sz="1700" dirty="0" smtClean="0"/>
-              <a:t>e.g., (re-discovering) </a:t>
+              <a:t>Infrastructure, Algorithmic &amp; Development e.g., (re-discovering) </a:t>
             </a:r>
             <a:r>
               <a:rPr lang="en-US" sz="1700" dirty="0" err="1" smtClean="0"/>
               <a:t>MapReduce</a:t>
             </a:r>
             <a:endParaRPr lang="en-US" sz="1700" dirty="0" smtClean="0"/>
-          </a:p>
-          <a:p>
-            <a:r>
-              <a:rPr lang="en-US" sz="1700" dirty="0" smtClean="0"/>
-              <a:t>Simplicity is the Ultimate Sophistication</a:t>
-            </a:r>
-          </a:p>
-          <a:p>
-            <a:pPr lvl="1"/>
-            <a:r>
-              <a:rPr lang="en-US" sz="1700" dirty="0" smtClean="0"/>
-              <a:t> </a:t>
-            </a:r>
-            <a:r>
-              <a:rPr lang="en-US" sz="1700" i="1" dirty="0" smtClean="0"/>
-              <a:t>“It seems that perfection is attained not when there remains nothing to add, but when there remains nothing to remove</a:t>
-            </a:r>
-            <a:r>
-              <a:rPr lang="en-US" sz="1700" dirty="0" smtClean="0"/>
-              <a:t>”</a:t>
-            </a:r>
-          </a:p>
-          <a:p>
-            <a:pPr lvl="1"/>
-            <a:r>
-              <a:rPr lang="en-US" sz="1700" dirty="0" smtClean="0"/>
-              <a:t>Confuse Functionality with Usability</a:t>
-            </a:r>
-          </a:p>
-          <a:p>
-            <a:pPr lvl="2"/>
-            <a:r>
-              <a:rPr lang="en-US" sz="1700" dirty="0" smtClean="0"/>
-              <a:t>“Confused Beauty for Truth”, -- “How Did Economists Get It So Wrong?”, in analogy to the Financial Crisis</a:t>
-            </a:r>
-          </a:p>
-          <a:p>
-            <a:pPr marL="342900" lvl="2" indent="-342900">
-              <a:spcBef>
-                <a:spcPts val="2000"/>
-              </a:spcBef>
-              <a:buFont typeface="Wingdings 2" pitchFamily="18" charset="2"/>
-              <a:buChar char=""/>
-            </a:pPr>
-            <a:r>
-              <a:rPr lang="en-US" sz="1700" dirty="0" smtClean="0"/>
-              <a:t>Moral and Intellectual courage to admit we got it wrong	</a:t>
-            </a:r>
-          </a:p>
-          <a:p>
-            <a:pPr lvl="1"/>
-            <a:r>
-              <a:rPr lang="en-US" sz="1700" dirty="0" smtClean="0"/>
-              <a:t>More condemnation in Grid2009, “Critical Analysis of PGI and DA” </a:t>
-            </a:r>
           </a:p>
         </p:txBody>
       </p:sp>
@@ -12885,7 +11116,7 @@
 </p:sld>
 </file>
 
-<file path=ppt/slides/slide22.xml><?xml version="1.0" encoding="utf-8"?>
+<file path=ppt/slides/slide18.xml><?xml version="1.0" encoding="utf-8"?>
 <p:sld xmlns:a="http://schemas.openxmlformats.org/drawingml/2006/main" xmlns:r="http://schemas.openxmlformats.org/officeDocument/2006/relationships" xmlns:mc="http://schemas.openxmlformats.org/markup-compatibility/2006" xmlns:mv="urn:schemas-microsoft-com:mac:vml" xmlns:p="http://schemas.openxmlformats.org/presentationml/2006/main" mc:Ignorable="mv" mc:PreserveAttributes="mv:*">
   <p:cSld>
     <p:spTree>
@@ -12981,7 +11212,12 @@
             <p:ph type="title"/>
           </p:nvPr>
         </p:nvSpPr>
-        <p:spPr/>
+        <p:spPr>
+          <a:xfrm>
+            <a:off x="1114424" y="238314"/>
+            <a:ext cx="8029576" cy="914400"/>
+          </a:xfrm>
+        </p:spPr>
         <p:txBody>
           <a:bodyPr>
             <a:normAutofit/>
@@ -12992,7 +11228,6 @@
               <a:rPr lang="en-US" dirty="0" smtClean="0"/>
               <a:t>Future Work: Pilot Data</a:t>
             </a:r>
-            <a:endParaRPr lang="en-US" dirty="0" smtClean="0"/>
           </a:p>
         </p:txBody>
       </p:sp>
@@ -13008,67 +11243,59 @@
         </p:nvSpPr>
         <p:spPr>
           <a:xfrm>
-            <a:off x="757947" y="1529879"/>
-            <a:ext cx="4347453" cy="4993909"/>
+            <a:off x="757947" y="1263179"/>
+            <a:ext cx="4347453" cy="5063289"/>
           </a:xfrm>
         </p:spPr>
         <p:txBody>
           <a:bodyPr>
-            <a:normAutofit fontScale="85000" lnSpcReduction="20000"/>
+            <a:noAutofit/>
           </a:bodyPr>
           <a:lstStyle/>
           <a:p>
             <a:r>
-              <a:rPr lang="en-US" sz="2400" dirty="0" smtClean="0"/>
+              <a:rPr lang="en-US" dirty="0" smtClean="0"/>
               <a:t>Pilot Data: </a:t>
             </a:r>
           </a:p>
           <a:p>
             <a:pPr lvl="1"/>
             <a:r>
-              <a:rPr lang="en-US" sz="2400" dirty="0" smtClean="0"/>
+              <a:rPr lang="en-US" sz="2000" dirty="0" smtClean="0"/>
               <a:t>Abstraction for expressing data localities and affinities.</a:t>
             </a:r>
           </a:p>
           <a:p>
             <a:pPr lvl="1"/>
             <a:r>
-              <a:rPr lang="en-US" sz="2400" dirty="0" smtClean="0"/>
-              <a:t>Pilot Data can be used to create groups of file that are always used together</a:t>
-            </a:r>
-            <a:r>
-              <a:rPr lang="en-US" sz="2400" dirty="0" smtClean="0"/>
-              <a:t> </a:t>
-            </a:r>
-            <a:endParaRPr lang="de-DE" sz="2400" dirty="0" smtClean="0"/>
+              <a:rPr lang="en-US" sz="2000" dirty="0" smtClean="0"/>
+              <a:t>Pilot Data can be used to create groups of file that are always used together </a:t>
+            </a:r>
+            <a:endParaRPr lang="de-DE" sz="2000" dirty="0" smtClean="0"/>
           </a:p>
           <a:p>
             <a:pPr lvl="1"/>
             <a:r>
-              <a:rPr lang="en-US" sz="2400" dirty="0" smtClean="0"/>
+              <a:rPr lang="en-US" sz="2000" dirty="0" smtClean="0"/>
               <a:t>Pilot Data provides a set of basic operations on top of these file groups</a:t>
             </a:r>
           </a:p>
           <a:p>
             <a:r>
-              <a:rPr lang="en-US" sz="2400" dirty="0" smtClean="0"/>
-              <a:t>Pilot Store: A container that represents a logical group of physical files that share the same affinity</a:t>
-            </a:r>
-            <a:r>
-              <a:rPr lang="en-US" sz="2400" dirty="0" smtClean="0"/>
-              <a:t>.</a:t>
-            </a:r>
-          </a:p>
-          <a:p>
-            <a:r>
-              <a:rPr lang="en-US" sz="2400" dirty="0" smtClean="0"/>
+              <a:rPr lang="en-US" dirty="0" smtClean="0"/>
+              <a:t>Pilot Store: A container that represents a logical group of physical files that share the same affinity.</a:t>
+            </a:r>
+          </a:p>
+          <a:p>
+            <a:r>
+              <a:rPr lang="en-US" dirty="0" smtClean="0"/>
               <a:t>Abstraction can be used to express C-C, C-D and D-D </a:t>
             </a:r>
             <a:r>
-              <a:rPr lang="en-US" sz="2400" dirty="0" err="1" smtClean="0"/>
+              <a:rPr lang="en-US" dirty="0" err="1" smtClean="0"/>
               <a:t>affinitities</a:t>
             </a:r>
-            <a:endParaRPr lang="en-US" sz="2400" dirty="0" smtClean="0"/>
+            <a:endParaRPr lang="en-US" dirty="0" smtClean="0"/>
           </a:p>
           <a:p>
             <a:endParaRPr lang="en-US" dirty="0" smtClean="0"/>
@@ -13119,6 +11346,170 @@
 </p:sld>
 </file>
 
+<file path=ppt/slides/slide2.xml><?xml version="1.0" encoding="utf-8"?>
+<p:sld xmlns:a="http://schemas.openxmlformats.org/drawingml/2006/main" xmlns:r="http://schemas.openxmlformats.org/officeDocument/2006/relationships" xmlns:mc="http://schemas.openxmlformats.org/markup-compatibility/2006" xmlns:mv="urn:schemas-microsoft-com:mac:vml" xmlns:p="http://schemas.openxmlformats.org/presentationml/2006/main" mc:Ignorable="mv" mc:PreserveAttributes="mv:*">
+  <p:cSld>
+    <p:spTree>
+      <p:nvGrpSpPr>
+        <p:cNvPr id="1" name=""/>
+        <p:cNvGrpSpPr/>
+        <p:nvPr/>
+      </p:nvGrpSpPr>
+      <p:grpSpPr>
+        <a:xfrm>
+          <a:off x="0" y="0"/>
+          <a:ext cx="0" cy="0"/>
+          <a:chOff x="0" y="0"/>
+          <a:chExt cx="0" cy="0"/>
+        </a:xfrm>
+      </p:grpSpPr>
+      <p:sp>
+        <p:nvSpPr>
+          <p:cNvPr id="15362" name="Title 1"/>
+          <p:cNvSpPr>
+            <a:spLocks noGrp="1"/>
+          </p:cNvSpPr>
+          <p:nvPr>
+            <p:ph type="title"/>
+          </p:nvPr>
+        </p:nvSpPr>
+        <p:spPr/>
+        <p:txBody>
+          <a:bodyPr/>
+          <a:lstStyle/>
+          <a:p>
+            <a:r>
+              <a:rPr lang="en-US" dirty="0" smtClean="0"/>
+              <a:t>Overview</a:t>
+            </a:r>
+          </a:p>
+        </p:txBody>
+      </p:sp>
+      <p:sp>
+        <p:nvSpPr>
+          <p:cNvPr id="15363" name="Content Placeholder 2"/>
+          <p:cNvSpPr>
+            <a:spLocks noGrp="1"/>
+          </p:cNvSpPr>
+          <p:nvPr>
+            <p:ph idx="1"/>
+          </p:nvPr>
+        </p:nvSpPr>
+        <p:spPr/>
+        <p:txBody>
+          <a:bodyPr>
+            <a:normAutofit lnSpcReduction="10000"/>
+          </a:bodyPr>
+          <a:lstStyle/>
+          <a:p>
+            <a:r>
+              <a:rPr lang="en-US" dirty="0" smtClean="0"/>
+              <a:t>Introduction: Understanding Distributed Abstractions</a:t>
+            </a:r>
+          </a:p>
+          <a:p>
+            <a:pPr lvl="1"/>
+            <a:r>
+              <a:rPr lang="en-US" dirty="0" smtClean="0"/>
+              <a:t>Introduce IDEAS as minimal set of DA Design Objective</a:t>
+            </a:r>
+          </a:p>
+          <a:p>
+            <a:r>
+              <a:rPr lang="en-US" dirty="0" smtClean="0"/>
+              <a:t>SAGA, Pilot-Jobs and SAGA </a:t>
+            </a:r>
+            <a:r>
+              <a:rPr lang="en-US" dirty="0" err="1" smtClean="0"/>
+              <a:t>BigJob</a:t>
+            </a:r>
+            <a:endParaRPr lang="en-US" dirty="0" smtClean="0"/>
+          </a:p>
+          <a:p>
+            <a:pPr lvl="1"/>
+            <a:r>
+              <a:rPr lang="en-US" dirty="0" smtClean="0"/>
+              <a:t>Abstractions for dynamic executions</a:t>
+            </a:r>
+          </a:p>
+          <a:p>
+            <a:pPr lvl="1"/>
+            <a:r>
+              <a:rPr lang="en-US" dirty="0" smtClean="0"/>
+              <a:t>Pilot-Job: Power of “right” Abstractions</a:t>
+            </a:r>
+          </a:p>
+          <a:p>
+            <a:pPr lvl="1"/>
+            <a:r>
+              <a:rPr lang="en-US" dirty="0" smtClean="0"/>
+              <a:t>Interoperability is the starting point</a:t>
+            </a:r>
+          </a:p>
+          <a:p>
+            <a:r>
+              <a:rPr lang="en-US" dirty="0" err="1" smtClean="0"/>
+              <a:t>EnMD</a:t>
+            </a:r>
+            <a:r>
+              <a:rPr lang="en-US" dirty="0" smtClean="0"/>
+              <a:t> and RE Simulations</a:t>
+            </a:r>
+          </a:p>
+          <a:p>
+            <a:pPr lvl="1"/>
+            <a:r>
+              <a:rPr lang="en-US" dirty="0" smtClean="0"/>
+              <a:t>Free Energy Calculation (</a:t>
+            </a:r>
+            <a:r>
+              <a:rPr lang="en-US" dirty="0" err="1" smtClean="0"/>
+              <a:t>e.g</a:t>
+            </a:r>
+            <a:r>
+              <a:rPr lang="en-US" dirty="0" smtClean="0"/>
+              <a:t> replica-exchange) using bio-molecular simulations for range of biophysical and personalized medicine</a:t>
+            </a:r>
+          </a:p>
+          <a:p>
+            <a:r>
+              <a:rPr lang="en-US" dirty="0" err="1" smtClean="0"/>
+              <a:t>BigJob</a:t>
+            </a:r>
+            <a:r>
+              <a:rPr lang="en-US" dirty="0" smtClean="0"/>
+              <a:t> on Azure: Architecture, Performance and Scalability</a:t>
+            </a:r>
+          </a:p>
+          <a:p>
+            <a:pPr lvl="1"/>
+            <a:r>
+              <a:rPr lang="en-US" dirty="0" smtClean="0"/>
+              <a:t>Utilizing Azure’s </a:t>
+            </a:r>
+            <a:r>
+              <a:rPr lang="en-US" smtClean="0"/>
+              <a:t>native abstractions</a:t>
+            </a:r>
+            <a:endParaRPr lang="en-US" dirty="0" smtClean="0"/>
+          </a:p>
+        </p:txBody>
+      </p:sp>
+    </p:spTree>
+  </p:cSld>
+  <p:clrMapOvr>
+    <a:masterClrMapping/>
+  </p:clrMapOvr>
+  <p:timing>
+    <p:tnLst>
+      <p:par>
+        <p:cTn id="1" dur="indefinite" restart="never" nodeType="tmRoot"/>
+      </p:par>
+    </p:tnLst>
+  </p:timing>
+</p:sld>
+</file>
+
 <file path=ppt/slides/slide3.xml><?xml version="1.0" encoding="utf-8"?>
 <p:sld xmlns:a="http://schemas.openxmlformats.org/drawingml/2006/main" xmlns:r="http://schemas.openxmlformats.org/officeDocument/2006/relationships" xmlns:mc="http://schemas.openxmlformats.org/markup-compatibility/2006" xmlns:mv="urn:schemas-microsoft-com:mac:vml" xmlns:p="http://schemas.openxmlformats.org/presentationml/2006/main" mc:Ignorable="mv" mc:PreserveAttributes="mv:*">
   <p:cSld>
@@ -13155,7 +11546,7 @@
           <a:p>
             <a:r>
               <a:rPr lang="en-US" sz="2600" dirty="0" smtClean="0"/>
-              <a:t>DPA: Primary Observations</a:t>
+              <a:t>Some Primary Observations</a:t>
             </a:r>
             <a:endParaRPr lang="en-US" sz="2600" dirty="0"/>
           </a:p>
@@ -13183,105 +11574,120 @@
           </a:bodyPr>
           <a:lstStyle/>
           <a:p>
-            <a:r>
-              <a:rPr lang="en-US" sz="1700" dirty="0" smtClean="0"/>
+            <a:pPr>
+              <a:buFont typeface="+mj-lt"/>
+              <a:buAutoNum type="arabicPeriod"/>
+            </a:pPr>
+            <a:r>
+              <a:rPr lang="en-US" dirty="0" smtClean="0"/>
               <a:t>Is large (and rich), but the number of effective and extensible DA small</a:t>
             </a:r>
           </a:p>
           <a:p>
             <a:pPr lvl="1"/>
             <a:r>
-              <a:rPr lang="en-US" sz="1700" dirty="0" smtClean="0"/>
+              <a:rPr lang="en-US" sz="2000" dirty="0" smtClean="0"/>
               <a:t>More than just submitting jobs here and there!</a:t>
             </a:r>
           </a:p>
           <a:p>
-            <a:r>
-              <a:rPr lang="en-US" sz="1700" dirty="0" smtClean="0"/>
+            <a:pPr>
+              <a:buFont typeface="+mj-lt"/>
+              <a:buAutoNum type="arabicPeriod"/>
+            </a:pPr>
+            <a:r>
+              <a:rPr lang="en-US" dirty="0" smtClean="0"/>
               <a:t>Developing DA is a hard undertaking</a:t>
             </a:r>
           </a:p>
           <a:p>
             <a:pPr lvl="1"/>
             <a:r>
-              <a:rPr lang="en-US" sz="1700" dirty="0" smtClean="0"/>
+              <a:rPr lang="en-US" sz="2000" dirty="0" smtClean="0"/>
               <a:t>Intrinsic and Extrinsic Factors</a:t>
             </a:r>
           </a:p>
           <a:p>
             <a:pPr lvl="1"/>
             <a:r>
-              <a:rPr lang="en-US" sz="1700" dirty="0" smtClean="0"/>
+              <a:rPr lang="en-US" sz="2000" dirty="0" smtClean="0"/>
               <a:t>Unique role of the Execution Environment (Infrastructure)</a:t>
             </a:r>
           </a:p>
           <a:p>
-            <a:r>
-              <a:rPr lang="en-US" sz="1700" dirty="0" smtClean="0"/>
+            <a:pPr>
+              <a:buFont typeface="+mj-lt"/>
+              <a:buAutoNum type="arabicPeriod"/>
+            </a:pPr>
+            <a:r>
+              <a:rPr lang="en-US" dirty="0" smtClean="0"/>
               <a:t>Embrace “</a:t>
             </a:r>
             <a:r>
-              <a:rPr lang="en-US" sz="1700" dirty="0" err="1" smtClean="0"/>
+              <a:rPr lang="en-US" dirty="0" err="1" smtClean="0"/>
               <a:t>distributedness</a:t>
             </a:r>
             <a:r>
-              <a:rPr lang="en-US" sz="1700" dirty="0" smtClean="0"/>
+              <a:rPr lang="en-US" dirty="0" smtClean="0"/>
               <a:t>”</a:t>
             </a:r>
           </a:p>
           <a:p>
             <a:pPr lvl="1"/>
             <a:r>
-              <a:rPr lang="en-US" sz="1700" dirty="0" smtClean="0"/>
+              <a:rPr lang="en-US" sz="2000" dirty="0" smtClean="0"/>
               <a:t>Understanding </a:t>
             </a:r>
             <a:r>
-              <a:rPr lang="en-US" sz="1700" dirty="0" err="1" smtClean="0"/>
+              <a:rPr lang="en-US" sz="2000" dirty="0" err="1" smtClean="0"/>
               <a:t>distributedness</a:t>
             </a:r>
             <a:r>
-              <a:rPr lang="en-US" sz="1700" dirty="0" smtClean="0"/>
+              <a:rPr lang="en-US" sz="2000" dirty="0" smtClean="0"/>
               <a:t>,  heterogeneity &amp; dynamic execution is fundamental (e.g., </a:t>
             </a:r>
             <a:r>
-              <a:rPr lang="en-US" sz="1700" dirty="0" err="1" smtClean="0"/>
+              <a:rPr lang="en-US" sz="2000" dirty="0" err="1" smtClean="0"/>
               <a:t>Exascale</a:t>
             </a:r>
             <a:r>
-              <a:rPr lang="en-US" sz="1700" dirty="0" smtClean="0"/>
+              <a:rPr lang="en-US" sz="2000" dirty="0" smtClean="0"/>
               <a:t> logically distributed </a:t>
             </a:r>
             <a:r>
-              <a:rPr lang="en-US" sz="1700" dirty="0" err="1" smtClean="0"/>
+              <a:rPr lang="en-US" sz="2000" dirty="0" err="1" smtClean="0"/>
               <a:t>prog</a:t>
             </a:r>
             <a:r>
-              <a:rPr lang="en-US" sz="1700" dirty="0" smtClean="0"/>
+              <a:rPr lang="en-US" sz="2000" dirty="0" smtClean="0"/>
               <a:t>. Models)</a:t>
             </a:r>
           </a:p>
           <a:p>
             <a:pPr lvl="1"/>
             <a:r>
-              <a:rPr lang="en-US" sz="1700" dirty="0" smtClean="0"/>
+              <a:rPr lang="en-US" sz="2000" dirty="0" smtClean="0"/>
               <a:t>Data-centric application will be the drivers!</a:t>
             </a:r>
           </a:p>
           <a:p>
-            <a:r>
-              <a:rPr lang="en-US" sz="1700" dirty="0" smtClean="0"/>
+            <a:pPr>
+              <a:buFont typeface="+mj-lt"/>
+              <a:buAutoNum type="arabicPeriod"/>
+            </a:pPr>
+            <a:r>
+              <a:rPr lang="en-US" dirty="0" smtClean="0"/>
               <a:t>Role for Pattern-oriented and Abstractions-based Development</a:t>
             </a:r>
-            <a:endParaRPr lang="en-US" sz="1500" dirty="0" smtClean="0"/>
-          </a:p>
-          <a:p>
-            <a:r>
-              <a:rPr lang="en-US" sz="1700" dirty="0" smtClean="0"/>
-              <a:t>Autonomic approaches  required to manage complexity and dynamism</a:t>
-            </a:r>
-          </a:p>
-          <a:p>
-            <a:endParaRPr lang="en-US" sz="1700" dirty="0" smtClean="0"/>
+          </a:p>
+          <a:p>
+            <a:pPr>
+              <a:buNone/>
+            </a:pPr>
+            <a:endParaRPr lang="en-US" dirty="0" smtClean="0"/>
+          </a:p>
+          <a:p>
+            <a:endParaRPr lang="en-US" dirty="0" smtClean="0"/>
           </a:p>
         </p:txBody>
       </p:sp>
@@ -13405,67 +11811,7 @@
           <a:p>
             <a:r>
               <a:rPr lang="en-US" sz="2100" dirty="0" smtClean="0"/>
-              <a:t>Assertion #1: </a:t>
-            </a:r>
-            <a:r>
-              <a:rPr lang="de-DE" sz="2400" dirty="0" err="1" smtClean="0"/>
-              <a:t>The</a:t>
-            </a:r>
-            <a:r>
-              <a:rPr lang="de-DE" sz="2400" dirty="0" smtClean="0"/>
-              <a:t> </a:t>
-            </a:r>
-            <a:r>
-              <a:rPr lang="de-DE" sz="2400" dirty="0" err="1" smtClean="0"/>
-              <a:t>space</a:t>
-            </a:r>
-            <a:r>
-              <a:rPr lang="de-DE" sz="2400" dirty="0" smtClean="0"/>
-              <a:t> of </a:t>
-            </a:r>
-            <a:r>
-              <a:rPr lang="de-DE" sz="2400" dirty="0" err="1" smtClean="0"/>
-              <a:t>possible</a:t>
-            </a:r>
-            <a:r>
-              <a:rPr lang="de-DE" sz="2400" dirty="0" smtClean="0"/>
-              <a:t> DA </a:t>
-            </a:r>
-            <a:r>
-              <a:rPr lang="de-DE" sz="2400" dirty="0" err="1" smtClean="0"/>
-              <a:t>is</a:t>
-            </a:r>
-            <a:r>
-              <a:rPr lang="de-DE" sz="2400" dirty="0" smtClean="0"/>
-              <a:t> large, </a:t>
-            </a:r>
-            <a:r>
-              <a:rPr lang="de-DE" sz="2400" dirty="0" err="1" smtClean="0"/>
-              <a:t>but</a:t>
-            </a:r>
-            <a:r>
-              <a:rPr lang="de-DE" sz="2400" dirty="0" smtClean="0"/>
-              <a:t> </a:t>
-            </a:r>
-            <a:r>
-              <a:rPr lang="de-DE" sz="2400" dirty="0" err="1" smtClean="0"/>
-              <a:t>number</a:t>
-            </a:r>
-            <a:r>
-              <a:rPr lang="de-DE" sz="2400" dirty="0" smtClean="0"/>
-              <a:t> of </a:t>
-            </a:r>
-            <a:r>
-              <a:rPr lang="de-DE" sz="2400" dirty="0" err="1" smtClean="0"/>
-              <a:t>effective</a:t>
-            </a:r>
-            <a:r>
-              <a:rPr lang="de-DE" sz="2400" dirty="0" smtClean="0"/>
-              <a:t> DA </a:t>
-            </a:r>
-            <a:r>
-              <a:rPr lang="de-DE" sz="2400" dirty="0" err="1" smtClean="0"/>
-              <a:t>small</a:t>
+              <a:t>#2: Developing DA is a hard undertaking</a:t>
             </a:r>
             <a:endParaRPr lang="en-US" sz="2100" dirty="0" smtClean="0">
               <a:solidFill>
@@ -13501,7 +11847,87 @@
           <a:p>
             <a:r>
               <a:rPr lang="en-US" sz="1700" dirty="0" smtClean="0"/>
-              <a:t>TODO add slide from grid 2010</a:t>
+              <a:t>Intrinsic reasons why developing DA is fundamentally hard:</a:t>
+            </a:r>
+          </a:p>
+          <a:p>
+            <a:pPr lvl="1"/>
+            <a:r>
+              <a:rPr lang="en-US" sz="1700" dirty="0" smtClean="0"/>
+              <a:t>Control &amp; Coordination over Multiple &amp; Distributed  sites</a:t>
+            </a:r>
+          </a:p>
+          <a:p>
+            <a:pPr lvl="2"/>
+            <a:r>
+              <a:rPr lang="en-US" sz="1700" dirty="0" smtClean="0"/>
+              <a:t>Effective coordination in order for whole &gt; sum of the parts </a:t>
+            </a:r>
+          </a:p>
+          <a:p>
+            <a:pPr lvl="1"/>
+            <a:r>
+              <a:rPr lang="en-US" sz="1700" dirty="0" smtClean="0"/>
+              <a:t>Complex design points; wide-range of models of DA</a:t>
+            </a:r>
+          </a:p>
+          <a:p>
+            <a:pPr lvl="2"/>
+            <a:r>
+              <a:rPr lang="en-US" sz="1700" dirty="0" smtClean="0"/>
+              <a:t>Many reasons for using DA,  more than (just) peak performance</a:t>
+            </a:r>
+          </a:p>
+          <a:p>
+            <a:r>
+              <a:rPr lang="en-US" sz="1700" dirty="0" smtClean="0"/>
+              <a:t>Extrinsic: </a:t>
+            </a:r>
+          </a:p>
+          <a:p>
+            <a:pPr lvl="1"/>
+            <a:r>
+              <a:rPr lang="en-US" sz="1700" dirty="0" smtClean="0"/>
+              <a:t>Execution environments will be dynamic, heterogeneous and varying degrees-of-control</a:t>
+            </a:r>
+          </a:p>
+          <a:p>
+            <a:pPr lvl="2"/>
+            <a:r>
+              <a:rPr lang="en-US" sz="1700" dirty="0" smtClean="0"/>
+              <a:t>Fundamental  different variation in role of Execution Environment- distinguishing feature of DA from “regular environment” HPC </a:t>
+            </a:r>
+          </a:p>
+          <a:p>
+            <a:pPr lvl="1"/>
+            <a:r>
+              <a:rPr lang="en-US" sz="1700" dirty="0" smtClean="0">
+                <a:sym typeface="Arial" pitchFamily="-110" charset="0"/>
+              </a:rPr>
+              <a:t>Application types strongly coupled to the infrastructure capabilities, abstractions/tools, &amp; policy:</a:t>
+            </a:r>
+            <a:endParaRPr lang="en-US" sz="1700" dirty="0" smtClean="0"/>
+          </a:p>
+          <a:p>
+            <a:pPr lvl="2"/>
+            <a:r>
+              <a:rPr lang="en-US" sz="1700" dirty="0" smtClean="0"/>
+              <a:t>Often development tools assume “specific” deployment and execution environments, or don’t where needed!</a:t>
+            </a:r>
+          </a:p>
+          <a:p>
+            <a:pPr lvl="2"/>
+            <a:r>
+              <a:rPr lang="en-US" sz="1700" dirty="0" smtClean="0"/>
+              <a:t>Policies and tools, </a:t>
+            </a:r>
+            <a:r>
+              <a:rPr lang="en-US" sz="1700" dirty="0" err="1" smtClean="0"/>
+              <a:t>e.g</a:t>
+            </a:r>
+            <a:r>
+              <a:rPr lang="en-US" sz="1700" dirty="0" smtClean="0"/>
+              <a:t> production DCI has been missing for DDDAS</a:t>
             </a:r>
           </a:p>
           <a:p>
@@ -13629,21 +12055,14 @@
         <p:spPr/>
         <p:txBody>
           <a:bodyPr>
-            <a:noAutofit/>
+            <a:normAutofit/>
           </a:bodyPr>
           <a:lstStyle/>
           <a:p>
             <a:r>
-              <a:rPr lang="en-US" sz="2100" dirty="0" smtClean="0"/>
-              <a:t>Assertion #2: Developing DA is a hard undertaking</a:t>
-            </a:r>
-            <a:endParaRPr lang="en-US" sz="2100" dirty="0" smtClean="0">
-              <a:solidFill>
-                <a:schemeClr val="bg1">
-                  <a:lumMod val="75000"/>
-                </a:schemeClr>
-              </a:solidFill>
-            </a:endParaRPr>
+              <a:rPr lang="en-US" sz="2600" dirty="0" smtClean="0"/>
+              <a:t>#3: Embrace Distribution</a:t>
+            </a:r>
           </a:p>
         </p:txBody>
       </p:sp>
@@ -13654,13 +12073,13 @@
             <a:spLocks noGrp="1"/>
           </p:cNvSpPr>
           <p:nvPr>
-            <p:ph idx="1"/>
+            <p:ph sz="half" idx="1"/>
           </p:nvPr>
         </p:nvSpPr>
         <p:spPr>
           <a:xfrm>
-            <a:off x="757946" y="1330514"/>
-            <a:ext cx="8132053" cy="5292202"/>
+            <a:off x="228600" y="1651000"/>
+            <a:ext cx="8534400" cy="5016500"/>
           </a:xfrm>
         </p:spPr>
         <p:txBody>
@@ -13671,95 +12090,74 @@
           <a:p>
             <a:r>
               <a:rPr lang="en-US" sz="1700" dirty="0" smtClean="0"/>
-              <a:t>Intrinsic reasons why developing DA is fundamentally hard:</a:t>
+              <a:t>“History of computing like pendulum, swings from centralized to distributed”</a:t>
             </a:r>
           </a:p>
           <a:p>
             <a:pPr lvl="1"/>
             <a:r>
               <a:rPr lang="en-US" sz="1700" dirty="0" smtClean="0"/>
-              <a:t>Control &amp; Coordination over Multiple &amp; Distributed  sites</a:t>
-            </a:r>
-          </a:p>
-          <a:p>
-            <a:pPr lvl="2"/>
+              <a:t>Indications this time there is a fundamental paradigm shift due to DATA</a:t>
+            </a:r>
+          </a:p>
+          <a:p>
+            <a:pPr lvl="1"/>
             <a:r>
               <a:rPr lang="en-US" sz="1700" dirty="0" smtClean="0"/>
-              <a:t>Effective coordination in order for whole &gt; sum of the parts </a:t>
+              <a:t>Too much to move around; learn how to do analytics/compute </a:t>
+            </a:r>
+            <a:r>
+              <a:rPr lang="en-US" sz="1700" i="1" dirty="0" smtClean="0"/>
+              <a:t>in situ</a:t>
+            </a:r>
+          </a:p>
+          <a:p>
+            <a:r>
+              <a:rPr lang="en-US" sz="1700" dirty="0" smtClean="0"/>
+              <a:t>Decoupling and delocalization of the producers-consumers of computation</a:t>
             </a:r>
           </a:p>
           <a:p>
             <a:pPr lvl="1"/>
             <a:r>
               <a:rPr lang="en-US" sz="1700" dirty="0" smtClean="0"/>
-              <a:t>Complex design points; wide-range of models of DA</a:t>
-            </a:r>
-          </a:p>
-          <a:p>
-            <a:pPr lvl="2"/>
+              <a:t>Localized special services; people and collaborations are distributed</a:t>
+            </a:r>
+          </a:p>
+          <a:p>
             <a:r>
               <a:rPr lang="en-US" sz="1700" dirty="0" smtClean="0"/>
-              <a:t>Many reasons for using DA,  more than (just) peak performance</a:t>
-            </a:r>
-          </a:p>
-          <a:p>
+              <a:t>(Ironically) Most applications have been developed to hide from heterogeneity and dynamism; not embrace them</a:t>
+            </a:r>
+          </a:p>
+          <a:p>
+            <a:pPr lvl="1"/>
             <a:r>
               <a:rPr lang="en-US" sz="1700" dirty="0" smtClean="0"/>
-              <a:t>Extrinsic: </a:t>
+              <a:t>Programming models that provide dynamic execution (opposed to static), address heterogeneity etc</a:t>
             </a:r>
           </a:p>
           <a:p>
             <a:pPr lvl="1"/>
             <a:r>
               <a:rPr lang="en-US" sz="1700" dirty="0" smtClean="0"/>
-              <a:t>Execution environments will be dynamic, heterogeneous and varying degrees-of-control</a:t>
-            </a:r>
-          </a:p>
-          <a:p>
-            <a:pPr lvl="2"/>
+              <a:t>Logically </a:t>
+            </a:r>
+            <a:r>
+              <a:rPr lang="en-US" sz="1700" dirty="0" err="1" smtClean="0"/>
+              <a:t>vs</a:t>
+            </a:r>
             <a:r>
               <a:rPr lang="en-US" sz="1700" dirty="0" smtClean="0"/>
-              <a:t>Fundamental  different variation in role of Execution Environment- distinguishing feature of DA from “regular environment” HPC </a:t>
+              <a:t> Physically Distributed: NG programming models will need to support dynamic execution, heterogeneity at a logically-distributed level</a:t>
             </a:r>
           </a:p>
           <a:p>
             <a:pPr lvl="1"/>
-            <a:r>
-              <a:rPr lang="en-US" sz="1700" dirty="0" smtClean="0">
-                <a:sym typeface="Arial" pitchFamily="-110" charset="0"/>
-              </a:rPr>
-              <a:t>Application types strongly coupled to the infrastructure capabilities, abstractions/tools, &amp; policy:</a:t>
-            </a:r>
             <a:endParaRPr lang="en-US" sz="1700" dirty="0" smtClean="0"/>
           </a:p>
           <a:p>
-            <a:pPr lvl="2"/>
-            <a:r>
-              <a:rPr lang="en-US" sz="1700" dirty="0" smtClean="0"/>
-              <a:t>Often development tools assume “specific” deployment and execution environments, or don’t where needed!</a:t>
-            </a:r>
-          </a:p>
-          <a:p>
-            <a:pPr lvl="2"/>
-            <a:r>
-              <a:rPr lang="en-US" sz="1700" dirty="0" smtClean="0"/>
-              <a:t>Policies and tools, </a:t>
-            </a:r>
-            <a:r>
-              <a:rPr lang="en-US" sz="1700" dirty="0" err="1" smtClean="0"/>
-              <a:t>e.g</a:t>
-            </a:r>
-            <a:r>
-              <a:rPr lang="en-US" sz="1700" dirty="0" smtClean="0"/>
-              <a:t> production DCI has been missing for DDDAS</a:t>
-            </a:r>
-          </a:p>
-          <a:p>
-            <a:pPr lvl="3"/>
-            <a:endParaRPr lang="en-US" sz="1700" dirty="0" smtClean="0"/>
-          </a:p>
-          <a:p>
-            <a:pPr lvl="3"/>
+            <a:pPr lvl="1"/>
             <a:endParaRPr lang="en-US" sz="1700" dirty="0" smtClean="0"/>
           </a:p>
         </p:txBody>
@@ -13799,76 +12197,7 @@
       </p:grpSpPr>
       <p:sp>
         <p:nvSpPr>
-          <p:cNvPr id="20483" name="Rectangle 4"/>
-          <p:cNvSpPr>
-            <a:spLocks/>
-          </p:cNvSpPr>
-          <p:nvPr/>
-        </p:nvSpPr>
-        <p:spPr bwMode="auto">
-          <a:xfrm>
-            <a:off x="1447800" y="171450"/>
-            <a:ext cx="7162800" cy="647700"/>
-          </a:xfrm>
-          <a:prstGeom prst="rect">
-            <a:avLst/>
-          </a:prstGeom>
-          <a:noFill/>
-          <a:ln w="12700">
-            <a:noFill/>
-            <a:miter lim="800000"/>
-            <a:headEnd/>
-            <a:tailEnd/>
-          </a:ln>
-        </p:spPr>
-        <p:txBody>
-          <a:bodyPr lIns="0" tIns="0" rIns="0" bIns="0" anchor="ctr">
-            <a:prstTxWarp prst="textNoShape">
-              <a:avLst/>
-            </a:prstTxWarp>
-          </a:bodyPr>
-          <a:lstStyle/>
-          <a:p>
-            <a:pPr>
-              <a:lnSpc>
-                <a:spcPct val="100000"/>
-              </a:lnSpc>
-              <a:tabLst>
-                <a:tab pos="457200" algn="l"/>
-                <a:tab pos="914400" algn="l"/>
-                <a:tab pos="1371600" algn="l"/>
-                <a:tab pos="1828800" algn="l"/>
-                <a:tab pos="2286000" algn="l"/>
-                <a:tab pos="2743200" algn="l"/>
-                <a:tab pos="3200400" algn="l"/>
-                <a:tab pos="3657600" algn="l"/>
-                <a:tab pos="4114800" algn="l"/>
-                <a:tab pos="4572000" algn="l"/>
-                <a:tab pos="5029200" algn="l"/>
-                <a:tab pos="5486400" algn="l"/>
-                <a:tab pos="5943600" algn="l"/>
-                <a:tab pos="6400800" algn="l"/>
-                <a:tab pos="6858000" algn="l"/>
-                <a:tab pos="7315200" algn="l"/>
-                <a:tab pos="7772400" algn="l"/>
-                <a:tab pos="8229600" algn="l"/>
-                <a:tab pos="8686800" algn="l"/>
-                <a:tab pos="9144000" algn="l"/>
-              </a:tabLst>
-            </a:pPr>
-            <a:endParaRPr lang="en-US" sz="2800">
-              <a:solidFill>
-                <a:srgbClr val="000080"/>
-              </a:solidFill>
-              <a:ea typeface="Arial" charset="0"/>
-              <a:cs typeface="Arial" charset="0"/>
-            </a:endParaRPr>
-          </a:p>
-        </p:txBody>
-      </p:sp>
-      <p:sp>
-        <p:nvSpPr>
-          <p:cNvPr id="20485" name="Title 5"/>
+          <p:cNvPr id="2" name="Title 1"/>
           <p:cNvSpPr>
             <a:spLocks noGrp="1"/>
           </p:cNvSpPr>
@@ -13885,25 +12214,33 @@
           <a:p>
             <a:r>
               <a:rPr lang="en-US" sz="2600" dirty="0" smtClean="0"/>
-              <a:t>Assertion #3: Embrace Distribution</a:t>
-            </a:r>
-          </a:p>
-        </p:txBody>
-      </p:sp>
-      <p:sp>
-        <p:nvSpPr>
-          <p:cNvPr id="16" name="Content Placeholder 15"/>
-          <p:cNvSpPr>
-            <a:spLocks noGrp="1"/>
-          </p:cNvSpPr>
-          <p:nvPr>
-            <p:ph sz="half" idx="1"/>
+              <a:t>#3: Embrace Distribution</a:t>
+            </a:r>
+            <a:br>
+              <a:rPr lang="en-US" sz="2600" dirty="0" smtClean="0"/>
+            </a:br>
+            <a:r>
+              <a:rPr lang="en-US" sz="2400" i="1" dirty="0" smtClean="0"/>
+              <a:t>Corollary: Clouds are not Panacea</a:t>
+            </a:r>
+            <a:endParaRPr lang="en-US" sz="2400" i="1" dirty="0"/>
+          </a:p>
+        </p:txBody>
+      </p:sp>
+      <p:sp>
+        <p:nvSpPr>
+          <p:cNvPr id="3" name="Content Placeholder 2"/>
+          <p:cNvSpPr>
+            <a:spLocks noGrp="1"/>
+          </p:cNvSpPr>
+          <p:nvPr>
+            <p:ph idx="1"/>
           </p:nvPr>
         </p:nvSpPr>
         <p:spPr>
           <a:xfrm>
-            <a:off x="228600" y="1651000"/>
-            <a:ext cx="8534400" cy="5016500"/>
+            <a:off x="571500" y="1428280"/>
+            <a:ext cx="8356599" cy="5251920"/>
           </a:xfrm>
         </p:spPr>
         <p:txBody>
@@ -13914,74 +12251,90 @@
           <a:p>
             <a:r>
               <a:rPr lang="en-US" sz="1700" dirty="0" smtClean="0"/>
-              <a:t>“History of computing like pendulum, swings from centralized to distributed”</a:t>
+              <a:t>Clouds: Novel or more of the same?</a:t>
             </a:r>
           </a:p>
           <a:p>
             <a:pPr lvl="1"/>
             <a:r>
               <a:rPr lang="en-US" sz="1700" dirty="0" smtClean="0"/>
-              <a:t>Indications this time there is a fundamental paradigm shift due to DATA</a:t>
+              <a:t>Better control over software environment via virtualization</a:t>
             </a:r>
           </a:p>
           <a:p>
             <a:pPr lvl="1"/>
             <a:r>
               <a:rPr lang="en-US" sz="1700" dirty="0" smtClean="0"/>
-              <a:t>Too much to move around; learn how to do analytics/compute </a:t>
-            </a:r>
+              <a:t>Illusion of unlimited and immediate available resource can lead to better capacity planning and scheduling </a:t>
+            </a:r>
+          </a:p>
+          <a:p>
+            <a:pPr lvl="2"/>
+            <a:r>
+              <a:rPr lang="en-US" sz="1700" dirty="0" smtClean="0"/>
+              <a:t>Partly due to underlying economic model and </a:t>
+            </a:r>
+            <a:r>
+              <a:rPr lang="en-US" sz="1700" dirty="0" err="1" smtClean="0"/>
+              <a:t>SLAs</a:t>
+            </a:r>
+            <a:endParaRPr lang="en-US" sz="1700" dirty="0" smtClean="0"/>
+          </a:p>
+          <a:p>
+            <a:r>
+              <a:rPr lang="en-US" sz="1700" dirty="0" smtClean="0"/>
+              <a:t>Clouds do not remove many/all of the challenges inherent in  DA</a:t>
+            </a:r>
+          </a:p>
+          <a:p>
+            <a:pPr lvl="1"/>
+            <a:r>
+              <a:rPr lang="en-US" sz="1700" dirty="0" smtClean="0"/>
+              <a:t>Clouds are about provisioning, grids are about federation</a:t>
+            </a:r>
+          </a:p>
+          <a:p>
+            <a:pPr lvl="1"/>
+            <a:r>
+              <a:rPr lang="en-US" sz="1700" dirty="0" smtClean="0"/>
+              <a:t>Fundamental challenges in distribution remain</a:t>
+            </a:r>
+          </a:p>
+          <a:p>
+            <a:pPr lvl="2"/>
+            <a:r>
+              <a:rPr lang="en-US" sz="1700" dirty="0" smtClean="0"/>
+              <a:t>Makes some thing worse as impose a model of strong localization</a:t>
+            </a:r>
+          </a:p>
+          <a:p>
+            <a:pPr lvl="1"/>
             <a:r>
               <a:rPr lang="en-US" sz="1700" i="1" dirty="0" smtClean="0"/>
-              <a:t>in situ</a:t>
-            </a:r>
-          </a:p>
-          <a:p>
+              <a:t> “The reason why we are so well prepared to handle the multi-core era, is because we took the trouble to understand and learn parallel programming” – </a:t>
+            </a:r>
             <a:r>
               <a:rPr lang="en-US" sz="1700" dirty="0" smtClean="0"/>
-              <a:t>Decoupling and delocalization of the producers-consumers of computation</a:t>
+              <a:t>Ken Kennedy</a:t>
+            </a:r>
+          </a:p>
+          <a:p>
+            <a:r>
+              <a:rPr lang="en-US" sz="1700" dirty="0" smtClean="0"/>
+              <a:t>Clouds part of a larger distributed CI</a:t>
             </a:r>
           </a:p>
           <a:p>
             <a:pPr lvl="1"/>
             <a:r>
               <a:rPr lang="en-US" sz="1700" dirty="0" smtClean="0"/>
-              <a:t>Localized special services; people and collaborations are distributed</a:t>
-            </a:r>
-          </a:p>
-          <a:p>
-            <a:r>
-              <a:rPr lang="en-US" sz="1700" dirty="0" smtClean="0"/>
-              <a:t>(Ironically) Most applications have been developed to hide from heterogeneity and dynamism; not embrace them</a:t>
-            </a:r>
-          </a:p>
-          <a:p>
-            <a:pPr lvl="1"/>
-            <a:r>
-              <a:rPr lang="en-US" sz="1700" dirty="0" smtClean="0"/>
-              <a:t>Programming models that provide dynamic execution (opposed to static), address heterogeneity etc</a:t>
-            </a:r>
-          </a:p>
-          <a:p>
-            <a:pPr lvl="1"/>
-            <a:r>
-              <a:rPr lang="en-US" sz="1700" dirty="0" smtClean="0"/>
-              <a:t>Logically </a:t>
-            </a:r>
-            <a:r>
-              <a:rPr lang="en-US" sz="1700" dirty="0" err="1" smtClean="0"/>
-              <a:t>vs</a:t>
-            </a:r>
-            <a:r>
-              <a:rPr lang="en-US" sz="1700" dirty="0" smtClean="0"/>
-              <a:t> Physically Distributed: NG programming models will need to support dynamic execution, heterogeneity at a logically-distributed level</a:t>
-            </a:r>
-          </a:p>
-          <a:p>
-            <a:pPr lvl="1"/>
-            <a:endParaRPr lang="en-US" sz="1700" dirty="0" smtClean="0"/>
-          </a:p>
-          <a:p>
-            <a:pPr lvl="1"/>
+              <a:t>Certain tasks better suited for Grids, others on Clouds</a:t>
+            </a:r>
+          </a:p>
+          <a:p>
+            <a:pPr lvl="2">
+              <a:buNone/>
+            </a:pPr>
             <a:endParaRPr lang="en-US" sz="1700" dirty="0" smtClean="0"/>
           </a:p>
         </p:txBody>
@@ -14038,15 +12391,7 @@
           <a:p>
             <a:r>
               <a:rPr lang="en-US" sz="2600" dirty="0" smtClean="0"/>
-              <a:t>Assertion #3: Embrace </a:t>
-            </a:r>
-            <a:r>
-              <a:rPr lang="en-US" sz="2600" dirty="0" err="1" smtClean="0"/>
-              <a:t>Distributedness</a:t>
-            </a:r>
-            <a:r>
-              <a:rPr lang="en-US" sz="2600" dirty="0" smtClean="0"/>
-              <a:t/>
+              <a:t>#3: Embrace Distribution</a:t>
             </a:r>
             <a:br>
               <a:rPr lang="en-US" sz="2600" dirty="0" smtClean="0"/>
@@ -14204,18 +12549,25 @@
           <a:chExt cx="0" cy="0"/>
         </a:xfrm>
       </p:grpSpPr>
-      <p:sp>
-        <p:nvSpPr>
-          <p:cNvPr id="20483" name="Rectangle 4"/>
-          <p:cNvSpPr>
-            <a:spLocks/>
-          </p:cNvSpPr>
+      <p:pic>
+        <p:nvPicPr>
+          <p:cNvPr id="26626" name="Picture 1"/>
+          <p:cNvPicPr>
+            <a:picLocks noChangeArrowheads="1"/>
+          </p:cNvPicPr>
           <p:nvPr/>
-        </p:nvSpPr>
+        </p:nvPicPr>
+        <p:blipFill>
+          <a:blip r:embed="rId2"/>
+          <a:srcRect/>
+          <a:stretch>
+            <a:fillRect/>
+          </a:stretch>
+        </p:blipFill>
         <p:spPr bwMode="auto">
           <a:xfrm>
-            <a:off x="1447800" y="171450"/>
-            <a:ext cx="7162800" cy="647700"/>
+            <a:off x="9525" y="44450"/>
+            <a:ext cx="1290638" cy="1062038"/>
           </a:xfrm>
           <a:prstGeom prst="rect">
             <a:avLst/>
@@ -14228,185 +12580,251 @@
             <a:tailEnd/>
           </a:ln>
         </p:spPr>
-        <p:txBody>
-          <a:bodyPr lIns="0" tIns="0" rIns="0" bIns="0" anchor="ctr">
-            <a:prstTxWarp prst="textNoShape">
-              <a:avLst/>
-            </a:prstTxWarp>
-          </a:bodyPr>
-          <a:lstStyle/>
-          <a:p>
-            <a:pPr>
-              <a:lnSpc>
-                <a:spcPct val="100000"/>
-              </a:lnSpc>
-              <a:tabLst>
-                <a:tab pos="457200" algn="l"/>
-                <a:tab pos="914400" algn="l"/>
-                <a:tab pos="1371600" algn="l"/>
-                <a:tab pos="1828800" algn="l"/>
-                <a:tab pos="2286000" algn="l"/>
-                <a:tab pos="2743200" algn="l"/>
-                <a:tab pos="3200400" algn="l"/>
-                <a:tab pos="3657600" algn="l"/>
-                <a:tab pos="4114800" algn="l"/>
-                <a:tab pos="4572000" algn="l"/>
-                <a:tab pos="5029200" algn="l"/>
-                <a:tab pos="5486400" algn="l"/>
-                <a:tab pos="5943600" algn="l"/>
-                <a:tab pos="6400800" algn="l"/>
-                <a:tab pos="6858000" algn="l"/>
-                <a:tab pos="7315200" algn="l"/>
-                <a:tab pos="7772400" algn="l"/>
-                <a:tab pos="8229600" algn="l"/>
-                <a:tab pos="8686800" algn="l"/>
-                <a:tab pos="9144000" algn="l"/>
-              </a:tabLst>
-            </a:pPr>
-            <a:endParaRPr lang="en-US" sz="2800">
-              <a:solidFill>
-                <a:srgbClr val="000080"/>
-              </a:solidFill>
-              <a:ea typeface="Arial" charset="0"/>
-              <a:cs typeface="Arial" charset="0"/>
-            </a:endParaRPr>
-          </a:p>
-        </p:txBody>
-      </p:sp>
-      <p:sp>
-        <p:nvSpPr>
-          <p:cNvPr id="20485" name="Title 5"/>
-          <p:cNvSpPr>
-            <a:spLocks noGrp="1"/>
-          </p:cNvSpPr>
-          <p:nvPr>
-            <p:ph type="title"/>
-          </p:nvPr>
-        </p:nvSpPr>
-        <p:spPr/>
-        <p:txBody>
-          <a:bodyPr>
-            <a:normAutofit/>
-          </a:bodyPr>
-          <a:lstStyle/>
-          <a:p>
-            <a:r>
-              <a:rPr lang="en-US" sz="2600" dirty="0" smtClean="0"/>
-              <a:t>Role </a:t>
-            </a:r>
-            <a:r>
-              <a:rPr lang="en-US" sz="2600" dirty="0" smtClean="0"/>
-              <a:t>for a Pattern-Oriented and Abstraction-Based Development Cycle</a:t>
-            </a:r>
-          </a:p>
-        </p:txBody>
-      </p:sp>
-      <p:sp>
-        <p:nvSpPr>
-          <p:cNvPr id="16" name="Content Placeholder 15"/>
-          <p:cNvSpPr>
-            <a:spLocks noGrp="1"/>
-          </p:cNvSpPr>
-          <p:nvPr>
-            <p:ph sz="half" idx="1"/>
-          </p:nvPr>
-        </p:nvSpPr>
-        <p:spPr>
-          <a:xfrm>
-            <a:off x="317500" y="1282700"/>
-            <a:ext cx="4711700" cy="5016500"/>
-          </a:xfrm>
-        </p:spPr>
-        <p:txBody>
-          <a:bodyPr>
-            <a:noAutofit/>
-          </a:bodyPr>
-          <a:lstStyle/>
-          <a:p>
-            <a:r>
-              <a:rPr lang="en-US" sz="1700" dirty="0" smtClean="0"/>
-              <a:t>Relation between Application, Abstractions and Patterns:</a:t>
-            </a:r>
-          </a:p>
-          <a:p>
-            <a:pPr lvl="1"/>
-            <a:r>
-              <a:rPr lang="en-US" sz="1700" dirty="0" smtClean="0"/>
-              <a:t>Application: Need or can use &gt;1 R</a:t>
-            </a:r>
-          </a:p>
-          <a:p>
-            <a:pPr lvl="1"/>
-            <a:r>
-              <a:rPr lang="en-US" dirty="0" smtClean="0"/>
-              <a:t>Patterns: Formalizations of commonly occurring modes of computation, composition, and/or resource usage</a:t>
-            </a:r>
-          </a:p>
-          <a:p>
-            <a:pPr lvl="2"/>
-            <a:r>
-              <a:rPr lang="en-US" dirty="0" smtClean="0"/>
-              <a:t>Develop, Deploy &amp; Exec Phase</a:t>
-            </a:r>
-          </a:p>
-          <a:p>
-            <a:pPr lvl="1"/>
-            <a:r>
-              <a:rPr lang="en-US" dirty="0" smtClean="0"/>
-              <a:t>Abstractions: Process, mechanism or infrastructure to support a commonly occurring usage </a:t>
-            </a:r>
-            <a:endParaRPr lang="en-US" sz="7200" dirty="0" smtClean="0"/>
-          </a:p>
-        </p:txBody>
-      </p:sp>
-      <p:pic>
-        <p:nvPicPr>
-          <p:cNvPr id="5" name="Content Placeholder 4" descr="figure_1.png"/>
-          <p:cNvPicPr>
-            <a:picLocks noGrp="1" noChangeAspect="1"/>
-          </p:cNvPicPr>
-          <p:nvPr>
-            <p:ph sz="half" idx="1"/>
-          </p:nvPr>
-        </p:nvPicPr>
-        <p:blipFill>
-          <a:blip r:embed="rId2"/>
-          <a:srcRect l="-2982" r="-2982"/>
-          <a:stretch>
-            <a:fillRect/>
-          </a:stretch>
-        </p:blipFill>
-        <p:spPr>
-          <a:xfrm>
-            <a:off x="5026464" y="1770063"/>
-            <a:ext cx="4042878" cy="4173537"/>
-          </a:xfrm>
-        </p:spPr>
       </p:pic>
       <p:pic>
         <p:nvPicPr>
-          <p:cNvPr id="7" name="Picture 6" descr="table2.png"/>
+          <p:cNvPr id="26627" name="Picture 2"/>
           <p:cNvPicPr>
-            <a:picLocks noChangeAspect="1"/>
+            <a:picLocks noChangeArrowheads="1"/>
           </p:cNvPicPr>
           <p:nvPr/>
         </p:nvPicPr>
         <p:blipFill>
           <a:blip r:embed="rId3"/>
+          <a:srcRect/>
           <a:stretch>
             <a:fillRect/>
           </a:stretch>
         </p:blipFill>
+        <p:spPr bwMode="auto">
+          <a:xfrm>
+            <a:off x="7567613" y="36513"/>
+            <a:ext cx="1576387" cy="954087"/>
+          </a:xfrm>
+          <a:prstGeom prst="rect">
+            <a:avLst/>
+          </a:prstGeom>
+          <a:noFill/>
+          <a:ln w="12700">
+            <a:noFill/>
+            <a:miter lim="800000"/>
+            <a:headEnd/>
+            <a:tailEnd/>
+          </a:ln>
+        </p:spPr>
+      </p:pic>
+      <p:sp>
+        <p:nvSpPr>
+          <p:cNvPr id="26629" name="Rectangle 4"/>
+          <p:cNvSpPr>
+            <a:spLocks noGrp="1" noChangeArrowheads="1"/>
+          </p:cNvSpPr>
+          <p:nvPr>
+            <p:ph type="title"/>
+          </p:nvPr>
+        </p:nvSpPr>
+        <p:spPr/>
+        <p:txBody>
+          <a:bodyPr/>
+          <a:lstStyle/>
+          <a:p>
+            <a:r>
+              <a:rPr lang="en-US" dirty="0" smtClean="0"/>
+              <a:t>SAGA: In a nutshell</a:t>
+            </a:r>
+            <a:endParaRPr lang="en-US" dirty="0"/>
+          </a:p>
+        </p:txBody>
+      </p:sp>
+      <p:sp>
+        <p:nvSpPr>
+          <p:cNvPr id="6" name="Content Placeholder 5"/>
+          <p:cNvSpPr>
+            <a:spLocks noGrp="1"/>
+          </p:cNvSpPr>
+          <p:nvPr>
+            <p:ph idx="1"/>
+          </p:nvPr>
+        </p:nvSpPr>
         <p:spPr>
           <a:xfrm>
-            <a:off x="0" y="4775200"/>
-            <a:ext cx="5185943" cy="1803400"/>
+            <a:off x="1062747" y="1212380"/>
+            <a:ext cx="7966954" cy="4608884"/>
+          </a:xfrm>
+        </p:spPr>
+        <p:txBody>
+          <a:bodyPr>
+            <a:noAutofit/>
+          </a:bodyPr>
+          <a:lstStyle/>
+          <a:p>
+            <a:pPr lvl="0">
+              <a:defRPr/>
+            </a:pPr>
+            <a:r>
+              <a:rPr lang="en-US" dirty="0" smtClean="0"/>
+              <a:t>There exists a lack of Programmatic approaches that:</a:t>
+            </a:r>
+          </a:p>
+          <a:p>
+            <a:pPr lvl="1">
+              <a:defRPr/>
+            </a:pPr>
+            <a:r>
+              <a:rPr lang="en-US" sz="2000" dirty="0" smtClean="0"/>
+              <a:t>Provide general-purpose, basic &amp; common grid functionality for applications; hide underlying complexity, varying semantics..</a:t>
+            </a:r>
+          </a:p>
+          <a:p>
+            <a:pPr lvl="1">
+              <a:defRPr/>
+            </a:pPr>
+            <a:r>
+              <a:rPr lang="en-US" sz="2000" dirty="0" smtClean="0"/>
+              <a:t>The building blocks upon which to construct “consistent” higher-levels of functionality and abstractions</a:t>
+            </a:r>
+          </a:p>
+          <a:p>
+            <a:pPr lvl="1">
+              <a:defRPr/>
+            </a:pPr>
+            <a:r>
+              <a:rPr lang="en-US" sz="2000" dirty="0" smtClean="0"/>
+              <a:t>Meets the need for a Broad Spectrum of Application: </a:t>
+            </a:r>
+          </a:p>
+          <a:p>
+            <a:pPr lvl="2">
+              <a:defRPr/>
+            </a:pPr>
+            <a:r>
+              <a:rPr lang="en-US" sz="2000" dirty="0" smtClean="0"/>
+              <a:t>Simple scripts, Gateways,  Tooling, Workflow…</a:t>
+            </a:r>
+          </a:p>
+          <a:p>
+            <a:pPr lvl="0">
+              <a:defRPr/>
+            </a:pPr>
+            <a:r>
+              <a:rPr lang="en-US" dirty="0" smtClean="0"/>
+              <a:t>Simple, integrated, stable, uniform and high-level interface</a:t>
+            </a:r>
+          </a:p>
+          <a:p>
+            <a:pPr lvl="1">
+              <a:defRPr/>
+            </a:pPr>
+            <a:r>
+              <a:rPr lang="en-US" sz="2000" dirty="0" smtClean="0"/>
+              <a:t>Simple and Stable: 80:20 restricted scope and </a:t>
+            </a:r>
+            <a:r>
+              <a:rPr lang="en-US" sz="2000" b="1" dirty="0" smtClean="0">
+                <a:solidFill>
+                  <a:srgbClr val="800000"/>
+                </a:solidFill>
+              </a:rPr>
+              <a:t>Standard</a:t>
+            </a:r>
+          </a:p>
+          <a:p>
+            <a:pPr lvl="1">
+              <a:defRPr/>
+            </a:pPr>
+            <a:r>
+              <a:rPr lang="en-US" sz="2000" dirty="0" smtClean="0"/>
+              <a:t>Integrated: Similar semantics &amp; style across</a:t>
+            </a:r>
+          </a:p>
+          <a:p>
+            <a:pPr lvl="1">
+              <a:defRPr/>
+            </a:pPr>
+            <a:r>
+              <a:rPr lang="en-US" sz="2000" dirty="0" smtClean="0"/>
+              <a:t>Uniform: Same interface for different distributed systems</a:t>
+            </a:r>
+          </a:p>
+          <a:p>
+            <a:pPr>
+              <a:defRPr/>
+            </a:pPr>
+            <a:r>
+              <a:rPr lang="en-US" dirty="0" smtClean="0"/>
+              <a:t>Standards-based approach: A Technical and an Economic  (Moral?) imperative &amp; case:</a:t>
+            </a:r>
+          </a:p>
+          <a:p>
+            <a:endParaRPr lang="en-US" dirty="0"/>
+          </a:p>
+        </p:txBody>
+      </p:sp>
+      <p:sp>
+        <p:nvSpPr>
+          <p:cNvPr id="12" name="Rectangle 5"/>
+          <p:cNvSpPr txBox="1">
+            <a:spLocks noChangeArrowheads="1"/>
+          </p:cNvSpPr>
+          <p:nvPr/>
+        </p:nvSpPr>
+        <p:spPr>
+          <a:xfrm>
+            <a:off x="757947" y="1178114"/>
+            <a:ext cx="7966954" cy="5033310"/>
           </a:xfrm>
           <a:prstGeom prst="rect">
             <a:avLst/>
           </a:prstGeom>
         </p:spPr>
-      </p:pic>
+        <p:txBody>
+          <a:bodyPr vert="horz" lIns="91440" tIns="45720" rIns="91440" bIns="45720" rtlCol="0">
+            <a:noAutofit/>
+          </a:bodyPr>
+          <a:lstStyle/>
+          <a:p>
+            <a:pPr marL="342900" marR="0" lvl="0" indent="-342900" algn="l" defTabSz="914400" rtl="0" eaLnBrk="1" fontAlgn="auto" latinLnBrk="0" hangingPunct="1">
+              <a:lnSpc>
+                <a:spcPct val="100000"/>
+              </a:lnSpc>
+              <a:spcBef>
+                <a:spcPts val="2000"/>
+              </a:spcBef>
+              <a:spcAft>
+                <a:spcPts val="0"/>
+              </a:spcAft>
+              <a:buClr>
+                <a:schemeClr val="tx1">
+                  <a:lumMod val="75000"/>
+                  <a:lumOff val="25000"/>
+                </a:schemeClr>
+              </a:buClr>
+              <a:buSzTx/>
+              <a:buFont typeface="Wingdings 2" pitchFamily="18" charset="2"/>
+              <a:buChar char=""/>
+              <a:tabLst/>
+              <a:defRPr/>
+            </a:pPr>
+            <a:endParaRPr kumimoji="0" lang="en-US" sz="1700" b="0" i="0" u="none" strike="noStrike" kern="1200" cap="none" spc="0" normalizeH="0" baseline="0" noProof="0" dirty="0" smtClean="0">
+              <a:ln>
+                <a:noFill/>
+              </a:ln>
+              <a:solidFill>
+                <a:schemeClr val="tx1">
+                  <a:lumMod val="65000"/>
+                  <a:lumOff val="35000"/>
+                </a:schemeClr>
+              </a:solidFill>
+              <a:effectLst/>
+              <a:uLnTx/>
+              <a:uFillTx/>
+              <a:latin typeface="+mn-lt"/>
+              <a:ea typeface="+mn-ea"/>
+              <a:cs typeface="+mn-cs"/>
+            </a:endParaRPr>
+          </a:p>
+        </p:txBody>
+      </p:sp>
     </p:spTree>
   </p:cSld>
   <p:clrMapOvr>
@@ -14424,7 +12842,7 @@
 </file>
 
 <file path=ppt/slides/slide9.xml><?xml version="1.0" encoding="utf-8"?>
-<p:sld xmlns:a="http://schemas.openxmlformats.org/drawingml/2006/main" xmlns:r="http://schemas.openxmlformats.org/officeDocument/2006/relationships" xmlns:mc="http://schemas.openxmlformats.org/markup-compatibility/2006" xmlns:mv="urn:schemas-microsoft-com:mac:vml" xmlns:p="http://schemas.openxmlformats.org/presentationml/2006/main" mc:Ignorable="mv" mc:PreserveAttributes="mv:*" show="0">
+<p:sld xmlns:a="http://schemas.openxmlformats.org/drawingml/2006/main" xmlns:r="http://schemas.openxmlformats.org/officeDocument/2006/relationships" xmlns:mc="http://schemas.openxmlformats.org/markup-compatibility/2006" xmlns:mv="urn:schemas-microsoft-com:mac:vml" xmlns:p="http://schemas.openxmlformats.org/presentationml/2006/main" mc:Ignorable="mv" mc:PreserveAttributes="mv:*">
   <p:cSld>
     <p:spTree>
       <p:nvGrpSpPr>
@@ -14442,224 +12860,45 @@
       </p:grpSpPr>
       <p:sp>
         <p:nvSpPr>
-          <p:cNvPr id="20483" name="Rectangle 4"/>
-          <p:cNvSpPr>
-            <a:spLocks/>
-          </p:cNvSpPr>
-          <p:nvPr/>
-        </p:nvSpPr>
-        <p:spPr bwMode="auto">
-          <a:xfrm>
-            <a:off x="1447800" y="171450"/>
-            <a:ext cx="7162800" cy="647700"/>
-          </a:xfrm>
-          <a:prstGeom prst="rect">
-            <a:avLst/>
-          </a:prstGeom>
-          <a:noFill/>
-          <a:ln w="12700">
-            <a:noFill/>
-            <a:miter lim="800000"/>
-            <a:headEnd/>
-            <a:tailEnd/>
-          </a:ln>
-        </p:spPr>
-        <p:txBody>
-          <a:bodyPr lIns="0" tIns="0" rIns="0" bIns="0" anchor="ctr">
-            <a:prstTxWarp prst="textNoShape">
-              <a:avLst/>
-            </a:prstTxWarp>
-          </a:bodyPr>
+          <p:cNvPr id="2" name="Title 1"/>
+          <p:cNvSpPr>
+            <a:spLocks noGrp="1"/>
+          </p:cNvSpPr>
+          <p:nvPr>
+            <p:ph type="title"/>
+          </p:nvPr>
+        </p:nvSpPr>
+        <p:spPr/>
+        <p:txBody>
+          <a:bodyPr/>
           <a:lstStyle/>
           <a:p>
-            <a:pPr>
-              <a:lnSpc>
-                <a:spcPct val="100000"/>
-              </a:lnSpc>
-              <a:tabLst>
-                <a:tab pos="457200" algn="l"/>
-                <a:tab pos="914400" algn="l"/>
-                <a:tab pos="1371600" algn="l"/>
-                <a:tab pos="1828800" algn="l"/>
-                <a:tab pos="2286000" algn="l"/>
-                <a:tab pos="2743200" algn="l"/>
-                <a:tab pos="3200400" algn="l"/>
-                <a:tab pos="3657600" algn="l"/>
-                <a:tab pos="4114800" algn="l"/>
-                <a:tab pos="4572000" algn="l"/>
-                <a:tab pos="5029200" algn="l"/>
-                <a:tab pos="5486400" algn="l"/>
-                <a:tab pos="5943600" algn="l"/>
-                <a:tab pos="6400800" algn="l"/>
-                <a:tab pos="6858000" algn="l"/>
-                <a:tab pos="7315200" algn="l"/>
-                <a:tab pos="7772400" algn="l"/>
-                <a:tab pos="8229600" algn="l"/>
-                <a:tab pos="8686800" algn="l"/>
-                <a:tab pos="9144000" algn="l"/>
-              </a:tabLst>
-            </a:pPr>
-            <a:endParaRPr lang="en-US" sz="2800">
-              <a:solidFill>
-                <a:srgbClr val="000080"/>
-              </a:solidFill>
-              <a:ea typeface="Arial" charset="0"/>
-              <a:cs typeface="Arial" charset="0"/>
-            </a:endParaRPr>
-          </a:p>
-        </p:txBody>
-      </p:sp>
-      <p:sp>
-        <p:nvSpPr>
-          <p:cNvPr id="20485" name="Title 5"/>
-          <p:cNvSpPr>
-            <a:spLocks noGrp="1"/>
-          </p:cNvSpPr>
-          <p:nvPr>
-            <p:ph type="title"/>
-          </p:nvPr>
-        </p:nvSpPr>
-        <p:spPr/>
-        <p:txBody>
-          <a:bodyPr>
-            <a:normAutofit fontScale="90000"/>
-          </a:bodyPr>
-          <a:lstStyle/>
-          <a:p>
-            <a:r>
-              <a:rPr lang="en-US" sz="2600" dirty="0" smtClean="0"/>
-              <a:t>Assertion #4: Role for a Pattern-Oriented and Abstraction-Based Development Cycle</a:t>
-            </a:r>
-          </a:p>
-        </p:txBody>
-      </p:sp>
-      <p:sp>
-        <p:nvSpPr>
-          <p:cNvPr id="16" name="Content Placeholder 15"/>
-          <p:cNvSpPr>
-            <a:spLocks noGrp="1"/>
-          </p:cNvSpPr>
-          <p:nvPr>
-            <p:ph sz="half" idx="1"/>
-          </p:nvPr>
-        </p:nvSpPr>
-        <p:spPr>
-          <a:xfrm>
-            <a:off x="38100" y="1346200"/>
-            <a:ext cx="4470400" cy="5016500"/>
-          </a:xfrm>
-        </p:spPr>
-        <p:txBody>
-          <a:bodyPr>
-            <a:noAutofit/>
-          </a:bodyPr>
-          <a:lstStyle/>
-          <a:p>
-            <a:r>
-              <a:rPr lang="en-US" sz="1700" dirty="0" smtClean="0"/>
-              <a:t>Analysis of Distributed Applications leads to three types of patterns</a:t>
-            </a:r>
-          </a:p>
-          <a:p>
-            <a:pPr lvl="1"/>
-            <a:r>
-              <a:rPr lang="en-US" sz="1700" dirty="0" smtClean="0"/>
-              <a:t>Patterns that appear in the Parallel Programming </a:t>
-            </a:r>
-          </a:p>
-          <a:p>
-            <a:pPr lvl="1"/>
-            <a:r>
-              <a:rPr lang="en-US" sz="1700" dirty="0" smtClean="0"/>
-              <a:t>Patterns driven by distributed concerns (</a:t>
-            </a:r>
-            <a:r>
-              <a:rPr lang="en-US" sz="1700" dirty="0" err="1" smtClean="0"/>
-              <a:t>eg</a:t>
-            </a:r>
-            <a:r>
-              <a:rPr lang="en-US" sz="1700" dirty="0" smtClean="0"/>
-              <a:t> @HOME, consensus)</a:t>
-            </a:r>
-          </a:p>
-          <a:p>
-            <a:pPr lvl="1"/>
-            <a:r>
-              <a:rPr lang="en-US" sz="1700" dirty="0" smtClean="0"/>
-              <a:t>Patterns addressing distributed environment concerns exclusively (</a:t>
-            </a:r>
-            <a:r>
-              <a:rPr lang="en-US" sz="1700" dirty="0" err="1" smtClean="0"/>
-              <a:t>eg</a:t>
-            </a:r>
-            <a:r>
-              <a:rPr lang="en-US" sz="1700" dirty="0" smtClean="0"/>
-              <a:t> co-allocation)</a:t>
-            </a:r>
-          </a:p>
-          <a:p>
-            <a:r>
-              <a:rPr lang="en-US" sz="1700" dirty="0" smtClean="0"/>
-              <a:t>There exists tools that support patterns, i.e., provide abstractions </a:t>
-            </a:r>
-          </a:p>
-          <a:p>
-            <a:pPr lvl="1"/>
-            <a:endParaRPr lang="en-US" sz="1700" dirty="0" smtClean="0"/>
-          </a:p>
-          <a:p>
-            <a:pPr lvl="1"/>
-            <a:endParaRPr lang="en-US" sz="1700" dirty="0" smtClean="0"/>
+            <a:r>
+              <a:rPr lang="en-US" dirty="0" smtClean="0"/>
+              <a:t>SAGA: Architecture</a:t>
+            </a:r>
+            <a:endParaRPr lang="en-US" dirty="0"/>
           </a:p>
         </p:txBody>
       </p:sp>
       <p:pic>
         <p:nvPicPr>
-          <p:cNvPr id="10" name="Picture 9" descr="table3.png"/>
+          <p:cNvPr id="4" name="Content Placeholder 3" descr="saga-architecture.png"/>
           <p:cNvPicPr>
-            <a:picLocks noChangeAspect="1"/>
+            <a:picLocks noGrp="1" noChangeAspect="1"/>
           </p:cNvPicPr>
-          <p:nvPr/>
+          <p:nvPr>
+            <p:ph idx="1"/>
+          </p:nvPr>
         </p:nvPicPr>
         <p:blipFill>
-          <a:blip r:embed="rId3"/>
+          <a:blip r:embed="rId2"/>
+          <a:srcRect t="-1090" b="-1090"/>
           <a:stretch>
             <a:fillRect/>
           </a:stretch>
         </p:blipFill>
-        <p:spPr>
-          <a:xfrm>
-            <a:off x="4368800" y="1739900"/>
-            <a:ext cx="4775200" cy="2641600"/>
-          </a:xfrm>
-          <a:prstGeom prst="rect">
-            <a:avLst/>
-          </a:prstGeom>
-        </p:spPr>
-      </p:pic>
-      <p:pic>
-        <p:nvPicPr>
-          <p:cNvPr id="12" name="Picture 11" descr="table1.png"/>
-          <p:cNvPicPr>
-            <a:picLocks noChangeAspect="1"/>
-          </p:cNvPicPr>
-          <p:nvPr/>
-        </p:nvPicPr>
-        <p:blipFill>
-          <a:blip r:embed="rId4"/>
-          <a:stretch>
-            <a:fillRect/>
-          </a:stretch>
-        </p:blipFill>
-        <p:spPr>
-          <a:xfrm>
-            <a:off x="520700" y="4740897"/>
-            <a:ext cx="7467600" cy="2117103"/>
-          </a:xfrm>
-          <a:prstGeom prst="rect">
-            <a:avLst/>
-          </a:prstGeom>
-        </p:spPr>
+        <p:spPr/>
       </p:pic>
     </p:spTree>
   </p:cSld>

</xml_diff>

<commit_message>
I think final version..
git-svn-id: file://localhost/tmp/svn2git/svn@3302 defb5e50-622e-49ec-a68e-d72c7db87b45
</commit_message>
<xml_diff>
--- a/papers/cloudcom10/presentation/saga-azure-cloudcom10.pptx
+++ b/papers/cloudcom10/presentation/saga-azure-cloudcom10.pptx
@@ -5,7 +5,7 @@
     <p:sldMasterId id="2147483660" r:id="rId1"/>
   </p:sldMasterIdLst>
   <p:notesMasterIdLst>
-    <p:notesMasterId r:id="rId19"/>
+    <p:notesMasterId r:id="rId20"/>
   </p:notesMasterIdLst>
   <p:sldIdLst>
     <p:sldId id="256" r:id="rId2"/>
@@ -24,7 +24,8 @@
     <p:sldId id="693" r:id="rId15"/>
     <p:sldId id="748" r:id="rId16"/>
     <p:sldId id="757" r:id="rId17"/>
-    <p:sldId id="758" r:id="rId18"/>
+    <p:sldId id="759" r:id="rId18"/>
+    <p:sldId id="758" r:id="rId19"/>
   </p:sldIdLst>
   <p:sldSz cx="9144000" cy="6858000" type="screen4x3"/>
   <p:notesSz cx="6858000" cy="9144000"/>
@@ -934,7 +935,7 @@
             <a:fld id="{D344DA2A-F2F4-D74A-8AEC-1933B33E97E0}" type="slidenum">
               <a:rPr lang="en-US" smtClean="0"/>
               <a:pPr/>
-              <a:t>17</a:t>
+              <a:t>18</a:t>
             </a:fld>
             <a:endParaRPr lang="en-US"/>
           </a:p>
@@ -6454,7 +6455,23 @@
             <a:pPr lvl="1"/>
             <a:r>
               <a:rPr lang="en-US" dirty="0" smtClean="0"/>
-              <a:t>Python library created to this capability</a:t>
+              <a:t>Python library created</a:t>
+            </a:r>
+            <a:r>
+              <a:rPr lang="en-US" dirty="0" smtClean="0"/>
+              <a:t> </a:t>
+            </a:r>
+            <a:r>
+              <a:rPr lang="en-US" dirty="0" smtClean="0"/>
+              <a:t>for</a:t>
+            </a:r>
+            <a:r>
+              <a:rPr lang="en-US" dirty="0" smtClean="0"/>
+              <a:t> </a:t>
+            </a:r>
+            <a:r>
+              <a:rPr lang="en-US" dirty="0" smtClean="0"/>
+              <a:t>this capability</a:t>
             </a:r>
           </a:p>
           <a:p>
@@ -6570,11 +6587,7 @@
           <a:p>
             <a:r>
               <a:rPr lang="en-US" dirty="0" smtClean="0"/>
-              <a:t>Coordinating Multiple </a:t>
-            </a:r>
-            <a:r>
-              <a:rPr lang="en-US" dirty="0" smtClean="0"/>
-              <a:t>Tasks Using </a:t>
+              <a:t>Coordinating Multiple Tasks Using </a:t>
             </a:r>
             <a:r>
               <a:rPr lang="en-US" dirty="0" err="1" smtClean="0"/>
@@ -6582,11 +6595,7 @@
             </a:r>
             <a:r>
               <a:rPr lang="en-US" dirty="0" smtClean="0"/>
-              <a:t> </a:t>
-            </a:r>
-            <a:r>
-              <a:rPr lang="en-US" dirty="0" smtClean="0"/>
-              <a:t>for Azure</a:t>
+              <a:t> for Azure</a:t>
             </a:r>
             <a:endParaRPr lang="en-US" dirty="0"/>
           </a:p>
@@ -7270,7 +7279,7 @@
         <p:spPr>
           <a:xfrm>
             <a:off x="757947" y="1212380"/>
-            <a:ext cx="4029953" cy="4608884"/>
+            <a:ext cx="4029953" cy="5404320"/>
           </a:xfrm>
         </p:spPr>
         <p:txBody>
@@ -7316,8 +7325,22 @@
           <a:p>
             <a:r>
               <a:rPr lang="en-US" dirty="0" smtClean="0"/>
-              <a:t>The different Azure data centers show a slight fluctuation in their performance</a:t>
-            </a:r>
+              <a:t>The different Azure data centers show a slight fluctuation in their </a:t>
+            </a:r>
+            <a:r>
+              <a:rPr lang="en-US" dirty="0" smtClean="0"/>
+              <a:t>performance</a:t>
+            </a:r>
+          </a:p>
+          <a:p>
+            <a:pPr lvl="1"/>
+            <a:r>
+              <a:rPr lang="en-US" dirty="0" smtClean="0"/>
+              <a:t>16 replicas, small VM</a:t>
+            </a:r>
+            <a:endParaRPr lang="en-US" dirty="0" smtClean="0"/>
+          </a:p>
+          <a:p>
             <a:endParaRPr lang="en-US" dirty="0"/>
           </a:p>
         </p:txBody>
@@ -7584,6 +7607,230 @@
       </p:grpSpPr>
       <p:sp>
         <p:nvSpPr>
+          <p:cNvPr id="2" name="Title 1"/>
+          <p:cNvSpPr>
+            <a:spLocks noGrp="1"/>
+          </p:cNvSpPr>
+          <p:nvPr>
+            <p:ph type="title"/>
+          </p:nvPr>
+        </p:nvSpPr>
+        <p:spPr/>
+        <p:txBody>
+          <a:bodyPr/>
+          <a:lstStyle/>
+          <a:p>
+            <a:r>
+              <a:rPr lang="en-US" dirty="0" err="1" smtClean="0"/>
+              <a:t>Futuregrid</a:t>
+            </a:r>
+            <a:r>
+              <a:rPr lang="en-US" smtClean="0"/>
+              <a:t> Acknowledgement</a:t>
+            </a:r>
+            <a:endParaRPr lang="en-US" dirty="0"/>
+          </a:p>
+        </p:txBody>
+      </p:sp>
+      <p:sp>
+        <p:nvSpPr>
+          <p:cNvPr id="3" name="Content Placeholder 2"/>
+          <p:cNvSpPr>
+            <a:spLocks noGrp="1"/>
+          </p:cNvSpPr>
+          <p:nvPr>
+            <p:ph idx="1"/>
+          </p:nvPr>
+        </p:nvSpPr>
+        <p:spPr/>
+        <p:txBody>
+          <a:bodyPr/>
+          <a:lstStyle/>
+          <a:p>
+            <a:pPr>
+              <a:buNone/>
+            </a:pPr>
+            <a:r>
+              <a:rPr lang="en-US" dirty="0" smtClean="0">
+                <a:solidFill>
+                  <a:schemeClr val="tx1"/>
+                </a:solidFill>
+              </a:rPr>
+              <a:t>This document was developed with support from the</a:t>
+            </a:r>
+          </a:p>
+          <a:p>
+            <a:pPr>
+              <a:buNone/>
+            </a:pPr>
+            <a:r>
+              <a:rPr lang="en-US" dirty="0" smtClean="0">
+                <a:solidFill>
+                  <a:schemeClr val="tx1"/>
+                </a:solidFill>
+              </a:rPr>
+              <a:t>National Science Foundation (NSF) under Grant No.</a:t>
+            </a:r>
+          </a:p>
+          <a:p>
+            <a:pPr>
+              <a:buNone/>
+            </a:pPr>
+            <a:r>
+              <a:rPr lang="en-US" dirty="0" smtClean="0">
+                <a:solidFill>
+                  <a:schemeClr val="tx1"/>
+                </a:solidFill>
+              </a:rPr>
+              <a:t>0910812 to Indiana University for "</a:t>
+            </a:r>
+            <a:r>
+              <a:rPr lang="en-US" dirty="0" err="1" smtClean="0">
+                <a:solidFill>
+                  <a:schemeClr val="tx1"/>
+                </a:solidFill>
+              </a:rPr>
+              <a:t>FutureGrid</a:t>
+            </a:r>
+            <a:r>
+              <a:rPr lang="en-US" dirty="0" smtClean="0">
+                <a:solidFill>
+                  <a:schemeClr val="tx1"/>
+                </a:solidFill>
+              </a:rPr>
+              <a:t>: An</a:t>
+            </a:r>
+          </a:p>
+          <a:p>
+            <a:pPr>
+              <a:buNone/>
+            </a:pPr>
+            <a:r>
+              <a:rPr lang="en-US" dirty="0" smtClean="0">
+                <a:solidFill>
+                  <a:schemeClr val="tx1"/>
+                </a:solidFill>
+              </a:rPr>
+              <a:t>Experimental, High-Performance Grid Test-bed." Any</a:t>
+            </a:r>
+          </a:p>
+          <a:p>
+            <a:pPr>
+              <a:buNone/>
+            </a:pPr>
+            <a:r>
+              <a:rPr lang="en-US" dirty="0" smtClean="0">
+                <a:solidFill>
+                  <a:schemeClr val="tx1"/>
+                </a:solidFill>
+              </a:rPr>
+              <a:t>opinions, </a:t>
+            </a:r>
+            <a:r>
+              <a:rPr lang="en-US" dirty="0" err="1" smtClean="0">
+                <a:solidFill>
+                  <a:schemeClr val="tx1"/>
+                </a:solidFill>
+              </a:rPr>
+              <a:t>ndings</a:t>
+            </a:r>
+            <a:r>
+              <a:rPr lang="en-US" dirty="0" smtClean="0">
+                <a:solidFill>
+                  <a:schemeClr val="tx1"/>
+                </a:solidFill>
+              </a:rPr>
+              <a:t>, and conclusions or recommendations</a:t>
+            </a:r>
+          </a:p>
+          <a:p>
+            <a:pPr>
+              <a:buNone/>
+            </a:pPr>
+            <a:r>
+              <a:rPr lang="en-US" dirty="0" smtClean="0">
+                <a:solidFill>
+                  <a:schemeClr val="tx1"/>
+                </a:solidFill>
+              </a:rPr>
+              <a:t>expressed in this material are those of the </a:t>
+            </a:r>
+            <a:r>
+              <a:rPr lang="en-US" dirty="0" err="1" smtClean="0">
+                <a:solidFill>
+                  <a:schemeClr val="tx1"/>
+                </a:solidFill>
+              </a:rPr>
+              <a:t>author(s</a:t>
+            </a:r>
+            <a:r>
+              <a:rPr lang="en-US" dirty="0" smtClean="0">
+                <a:solidFill>
+                  <a:schemeClr val="tx1"/>
+                </a:solidFill>
+              </a:rPr>
+              <a:t>)</a:t>
+            </a:r>
+          </a:p>
+          <a:p>
+            <a:pPr>
+              <a:buNone/>
+            </a:pPr>
+            <a:r>
+              <a:rPr lang="en-US" dirty="0" smtClean="0">
+                <a:solidFill>
+                  <a:schemeClr val="tx1"/>
+                </a:solidFill>
+              </a:rPr>
+              <a:t>and do not necessarily re </a:t>
+            </a:r>
+            <a:r>
+              <a:rPr lang="en-US" dirty="0" err="1" smtClean="0">
+                <a:solidFill>
+                  <a:schemeClr val="tx1"/>
+                </a:solidFill>
+              </a:rPr>
+              <a:t>ect</a:t>
+            </a:r>
+            <a:r>
+              <a:rPr lang="en-US" dirty="0" smtClean="0">
+                <a:solidFill>
+                  <a:schemeClr val="tx1"/>
+                </a:solidFill>
+              </a:rPr>
+              <a:t> the views </a:t>
+            </a:r>
+            <a:endParaRPr lang="en-US" dirty="0"/>
+          </a:p>
+        </p:txBody>
+      </p:sp>
+    </p:spTree>
+  </p:cSld>
+  <p:clrMapOvr>
+    <a:masterClrMapping/>
+  </p:clrMapOvr>
+</p:sld>
+</file>
+
+<file path=ppt/slides/slide18.xml><?xml version="1.0" encoding="utf-8"?>
+<p:sld xmlns:a="http://schemas.openxmlformats.org/drawingml/2006/main" xmlns:r="http://schemas.openxmlformats.org/officeDocument/2006/relationships" xmlns:mc="http://schemas.openxmlformats.org/markup-compatibility/2006" xmlns:mv="urn:schemas-microsoft-com:mac:vml" xmlns:p="http://schemas.openxmlformats.org/presentationml/2006/main" mc:Ignorable="mv" mc:PreserveAttributes="mv:*">
+  <p:cSld>
+    <p:spTree>
+      <p:nvGrpSpPr>
+        <p:cNvPr id="1" name=""/>
+        <p:cNvGrpSpPr/>
+        <p:nvPr/>
+      </p:nvGrpSpPr>
+      <p:grpSpPr>
+        <a:xfrm>
+          <a:off x="0" y="0"/>
+          <a:ext cx="0" cy="0"/>
+          <a:chOff x="0" y="0"/>
+          <a:chExt cx="0" cy="0"/>
+        </a:xfrm>
+      </p:grpSpPr>
+      <p:sp>
+        <p:nvSpPr>
           <p:cNvPr id="4" name="Title 3"/>
           <p:cNvSpPr>
             <a:spLocks noGrp="1"/>
@@ -7910,89 +8157,114 @@
         <p:spPr/>
         <p:txBody>
           <a:bodyPr>
-            <a:normAutofit/>
+            <a:normAutofit lnSpcReduction="10000"/>
           </a:bodyPr>
           <a:lstStyle/>
           <a:p>
             <a:r>
               <a:rPr lang="en-US" dirty="0" smtClean="0"/>
-              <a:t>Introduction: Understanding Distributed Abstractions</a:t>
-            </a:r>
-          </a:p>
-          <a:p>
-            <a:r>
-              <a:rPr lang="en-US" dirty="0" smtClean="0"/>
-              <a:t>Explore abstractions that Azure provides and their suitability for loosely-coupled simulations </a:t>
+              <a:t>Introduction: Understanding Distributed </a:t>
+            </a:r>
+            <a:r>
+              <a:rPr lang="en-US" dirty="0" smtClean="0"/>
+              <a:t>Abstractions</a:t>
             </a:r>
           </a:p>
           <a:p>
             <a:pPr lvl="1"/>
             <a:r>
               <a:rPr lang="en-US" dirty="0" smtClean="0"/>
-              <a:t>SAGA, Pilot-Jobs and SAGA </a:t>
-            </a:r>
+              <a:t>Unique Role for Abstractions for Distributed Applications </a:t>
+            </a:r>
+            <a:endParaRPr lang="en-US" dirty="0" smtClean="0"/>
+          </a:p>
+          <a:p>
+            <a:r>
+              <a:rPr lang="en-US" dirty="0" smtClean="0"/>
+              <a:t>Explore abstractions that Azure provides and their suitability for loosely-coupled simulations</a:t>
+            </a:r>
+            <a:r>
+              <a:rPr lang="en-US" dirty="0" smtClean="0"/>
+              <a:t> </a:t>
+            </a:r>
+          </a:p>
+          <a:p>
+            <a:pPr lvl="1"/>
+            <a:r>
+              <a:rPr lang="en-US" dirty="0" smtClean="0"/>
+              <a:t>Pattern not quite amenable to CIRRUS (at least not out of box)</a:t>
+            </a:r>
+            <a:endParaRPr lang="en-US" dirty="0" smtClean="0"/>
+          </a:p>
+          <a:p>
+            <a:pPr lvl="1"/>
+            <a:r>
+              <a:rPr lang="en-US" dirty="0" smtClean="0"/>
+              <a:t>Thus abstractions </a:t>
+            </a:r>
+            <a:r>
+              <a:rPr lang="en-US" dirty="0" smtClean="0"/>
+              <a:t>for dynamic </a:t>
+            </a:r>
+            <a:r>
+              <a:rPr lang="en-US" dirty="0" smtClean="0"/>
+              <a:t>executions</a:t>
+            </a:r>
+          </a:p>
+          <a:p>
+            <a:pPr lvl="2"/>
+            <a:r>
+              <a:rPr lang="en-US" dirty="0" smtClean="0"/>
+              <a:t>Interoperable </a:t>
+            </a:r>
+            <a:r>
+              <a:rPr lang="en-US" dirty="0" smtClean="0"/>
+              <a:t>Pilot-Job </a:t>
+            </a:r>
+            <a:endParaRPr lang="en-US" dirty="0" smtClean="0"/>
+          </a:p>
+          <a:p>
+            <a:r>
+              <a:rPr lang="en-US" dirty="0" err="1" smtClean="0"/>
+              <a:t>EnMD</a:t>
+            </a:r>
+            <a:r>
+              <a:rPr lang="en-US" dirty="0" smtClean="0"/>
+              <a:t> </a:t>
+            </a:r>
+            <a:r>
+              <a:rPr lang="en-US" dirty="0" smtClean="0"/>
+              <a:t>and RE Simulations</a:t>
+            </a:r>
+          </a:p>
+          <a:p>
+            <a:pPr lvl="1"/>
+            <a:r>
+              <a:rPr lang="en-US" dirty="0" smtClean="0"/>
+              <a:t>Free Energy Calculation</a:t>
+            </a:r>
+            <a:r>
+              <a:rPr lang="en-US" dirty="0" smtClean="0"/>
+              <a:t> using replica-exchange simulations </a:t>
+            </a:r>
+            <a:r>
+              <a:rPr lang="en-US" dirty="0" smtClean="0"/>
+              <a:t>for range of biophysical and personalized medicine</a:t>
+            </a:r>
+            <a:endParaRPr lang="en-US" dirty="0" smtClean="0"/>
+          </a:p>
+          <a:p>
             <a:r>
               <a:rPr lang="en-US" dirty="0" err="1" smtClean="0"/>
               <a:t>BigJob</a:t>
             </a:r>
-            <a:endParaRPr lang="en-US" dirty="0" smtClean="0"/>
-          </a:p>
-          <a:p>
-            <a:pPr lvl="1"/>
-            <a:r>
-              <a:rPr lang="en-US" dirty="0" smtClean="0"/>
-              <a:t>Abstractions for dynamic </a:t>
-            </a:r>
-            <a:r>
-              <a:rPr lang="en-US" dirty="0" smtClean="0"/>
-              <a:t>executions: Interoperable Pilot</a:t>
-            </a:r>
-            <a:r>
-              <a:rPr lang="en-US" dirty="0" smtClean="0"/>
-              <a:t>-</a:t>
-            </a:r>
-            <a:r>
-              <a:rPr lang="en-US" dirty="0" smtClean="0"/>
-              <a:t>Job </a:t>
-            </a:r>
-          </a:p>
-          <a:p>
-            <a:r>
-              <a:rPr lang="en-US" dirty="0" err="1" smtClean="0"/>
-              <a:t>EnMD</a:t>
-            </a:r>
             <a:r>
               <a:rPr lang="en-US" dirty="0" smtClean="0"/>
               <a:t> </a:t>
             </a:r>
             <a:r>
               <a:rPr lang="en-US" dirty="0" smtClean="0"/>
-              <a:t>and RE Simulations</a:t>
-            </a:r>
-          </a:p>
-          <a:p>
-            <a:pPr lvl="1"/>
-            <a:r>
-              <a:rPr lang="en-US" dirty="0" smtClean="0"/>
-              <a:t>Free Energy Calculation (</a:t>
-            </a:r>
-            <a:r>
-              <a:rPr lang="en-US" dirty="0" err="1" smtClean="0"/>
-              <a:t>e.g</a:t>
-            </a:r>
-            <a:r>
-              <a:rPr lang="en-US" dirty="0" smtClean="0"/>
-              <a:t> replica-exchange) using bio-molecular simulations for range of biophysical and personalized medicine</a:t>
-            </a:r>
-          </a:p>
-          <a:p>
-            <a:r>
-              <a:rPr lang="en-US" dirty="0" err="1" smtClean="0"/>
-              <a:t>BigJob</a:t>
-            </a:r>
-            <a:r>
-              <a:rPr lang="en-US" dirty="0" smtClean="0"/>
-              <a:t> on Azure: Architecture, Performance and Scalability</a:t>
+              <a:t>on Azure: Architecture, Performance and Scalability</a:t>
             </a:r>
           </a:p>
           <a:p>
@@ -8089,19 +8361,7 @@
             </a:pPr>
             <a:r>
               <a:rPr lang="en-US" dirty="0" smtClean="0"/>
-              <a:t>Space of </a:t>
-            </a:r>
-            <a:r>
-              <a:rPr lang="en-US" dirty="0" smtClean="0"/>
-              <a:t>Distributed Applications (DA) </a:t>
-            </a:r>
-            <a:r>
-              <a:rPr lang="en-US" dirty="0" smtClean="0"/>
-              <a:t>Is </a:t>
-            </a:r>
-            <a:r>
-              <a:rPr lang="en-US" dirty="0" smtClean="0"/>
-              <a:t>large (and rich), but the number of effective and extensible DA small</a:t>
+              <a:t>Space of Distributed Applications (DA) Is large (and rich), but the number of effective and extensible DA small</a:t>
             </a:r>
           </a:p>
           <a:p>
@@ -8125,26 +8385,14 @@
             <a:pPr lvl="1"/>
             <a:r>
               <a:rPr lang="en-US" sz="2000" dirty="0" smtClean="0"/>
-              <a:t>Intrinsic and Extrinsic </a:t>
-            </a:r>
+              <a:t>Intrinsic and Extrinsic Factors: </a:t>
+            </a:r>
+          </a:p>
+          <a:p>
+            <a:pPr lvl="2"/>
             <a:r>
               <a:rPr lang="en-US" sz="2000" dirty="0" smtClean="0"/>
-              <a:t>Factors: </a:t>
-            </a:r>
-          </a:p>
-          <a:p>
-            <a:pPr lvl="2"/>
-            <a:r>
-              <a:rPr lang="en-US" sz="2000" dirty="0" smtClean="0"/>
-              <a:t>Coordination across resources </a:t>
-            </a:r>
-            <a:r>
-              <a:rPr lang="en-US" sz="2000" dirty="0" smtClean="0"/>
-              <a:t>&amp; </a:t>
-            </a:r>
-            <a:r>
-              <a:rPr lang="en-US" sz="2000" dirty="0" smtClean="0"/>
-              <a:t>Execution Environment</a:t>
+              <a:t>Coordination across resources &amp; Execution Environment</a:t>
             </a:r>
           </a:p>
           <a:p>
@@ -8154,11 +8402,7 @@
             </a:pPr>
             <a:r>
               <a:rPr lang="en-US" dirty="0" smtClean="0"/>
-              <a:t>Embrace </a:t>
-            </a:r>
-            <a:r>
-              <a:rPr lang="en-US" dirty="0" smtClean="0"/>
-              <a:t>“</a:t>
+              <a:t>Embrace “</a:t>
             </a:r>
             <a:r>
               <a:rPr lang="en-US" dirty="0" err="1" smtClean="0"/>
@@ -8181,31 +8425,32 @@
             </a:r>
             <a:r>
               <a:rPr lang="en-US" sz="2000" dirty="0" smtClean="0"/>
-              <a:t>,  heterogeneity &amp; dynamic execution is fundamental (e.g., </a:t>
-            </a:r>
-            <a:r>
-              <a:rPr lang="en-US" sz="2000" dirty="0" err="1" smtClean="0"/>
-              <a:t>Exascale</a:t>
+              <a:t> -- </a:t>
             </a:r>
             <a:r>
               <a:rPr lang="en-US" sz="2000" dirty="0" smtClean="0"/>
-              <a:t> logically distributed </a:t>
-            </a:r>
-            <a:r>
-              <a:rPr lang="en-US" sz="2000" dirty="0" err="1" smtClean="0"/>
-              <a:t>prog</a:t>
+              <a:t>data</a:t>
             </a:r>
             <a:r>
               <a:rPr lang="en-US" sz="2000" dirty="0" smtClean="0"/>
-              <a:t>. Models)</a:t>
+              <a:t>-centric application will be the drivers</a:t>
+            </a:r>
+            <a:r>
+              <a:rPr lang="en-US" sz="2000" dirty="0" smtClean="0"/>
+              <a:t>!</a:t>
             </a:r>
           </a:p>
           <a:p>
             <a:pPr lvl="1"/>
             <a:r>
               <a:rPr lang="en-US" sz="2000" dirty="0" smtClean="0"/>
-              <a:t>Data-centric application will be the drivers!</a:t>
-            </a:r>
+              <a:t>Heterogeneity </a:t>
+            </a:r>
+            <a:r>
+              <a:rPr lang="en-US" sz="2000" dirty="0" smtClean="0"/>
+              <a:t>&amp; dynamic execution is fundamental</a:t>
+            </a:r>
+            <a:endParaRPr lang="en-US" sz="2000" dirty="0" smtClean="0"/>
           </a:p>
           <a:p>
             <a:pPr>
@@ -8214,7 +8459,23 @@
             </a:pPr>
             <a:r>
               <a:rPr lang="en-US" dirty="0" smtClean="0"/>
-              <a:t>Role for Pattern-oriented and Abstractions-based Development</a:t>
+              <a:t>Points 2 &amp; 3: Point to </a:t>
+            </a:r>
+            <a:r>
+              <a:rPr lang="en-US" dirty="0" smtClean="0"/>
+              <a:t>a unique </a:t>
+            </a:r>
+            <a:r>
+              <a:rPr lang="en-US" dirty="0" smtClean="0"/>
+              <a:t>role </a:t>
+            </a:r>
+            <a:r>
+              <a:rPr lang="en-US" dirty="0" smtClean="0"/>
+              <a:t>for Pattern-oriented and Abstractions-based </a:t>
+            </a:r>
+            <a:r>
+              <a:rPr lang="en-US" dirty="0" smtClean="0"/>
+              <a:t>Development of Distributed Applications</a:t>
             </a:r>
           </a:p>
           <a:p>

</xml_diff>